<commit_message>
Update report and presentation documents to add particle filter and visualization;
</commit_message>
<xml_diff>
--- a/PracticeModule_Presentation.pptx
+++ b/PracticeModule_Presentation.pptx
@@ -5,10 +5,10 @@
     <p:sldMasterId id="2147483684" r:id="rId1"/>
   </p:sldMasterIdLst>
   <p:notesMasterIdLst>
-    <p:notesMasterId r:id="rId28"/>
+    <p:notesMasterId r:id="rId32"/>
   </p:notesMasterIdLst>
   <p:handoutMasterIdLst>
-    <p:handoutMasterId r:id="rId29"/>
+    <p:handoutMasterId r:id="rId33"/>
   </p:handoutMasterIdLst>
   <p:sldIdLst>
     <p:sldId id="281" r:id="rId2"/>
@@ -36,12 +36,16 @@
     <p:sldId id="513" r:id="rId24"/>
     <p:sldId id="507" r:id="rId25"/>
     <p:sldId id="508" r:id="rId26"/>
-    <p:sldId id="370" r:id="rId27"/>
+    <p:sldId id="515" r:id="rId27"/>
+    <p:sldId id="516" r:id="rId28"/>
+    <p:sldId id="517" r:id="rId29"/>
+    <p:sldId id="518" r:id="rId30"/>
+    <p:sldId id="370" r:id="rId31"/>
   </p:sldIdLst>
   <p:sldSz cx="9144000" cy="6858000" type="screen4x3"/>
   <p:notesSz cx="7099300" cy="10234613"/>
   <p:custDataLst>
-    <p:tags r:id="rId30"/>
+    <p:tags r:id="rId34"/>
   </p:custDataLst>
   <p:defaultTextStyle>
     <a:defPPr>
@@ -2576,14 +2580,35 @@
         </dgm:presLayoutVars>
       </dgm:prSet>
       <dgm:spPr/>
+      <dgm:t>
+        <a:bodyPr/>
+        <a:lstStyle/>
+        <a:p>
+          <a:endParaRPr lang="en-US"/>
+        </a:p>
+      </dgm:t>
     </dgm:pt>
     <dgm:pt modelId="{4B5D39CA-8147-4B81-8770-5E31FC6D1CFB}" type="pres">
       <dgm:prSet presAssocID="{91D0FCC9-0385-42AC-A8E5-78283D5D669C}" presName="sibTrans" presStyleLbl="sibTrans2D1" presStyleIdx="0" presStyleCnt="3"/>
       <dgm:spPr/>
+      <dgm:t>
+        <a:bodyPr/>
+        <a:lstStyle/>
+        <a:p>
+          <a:endParaRPr lang="en-US"/>
+        </a:p>
+      </dgm:t>
     </dgm:pt>
     <dgm:pt modelId="{41341A21-0806-411D-A443-625FA97E4491}" type="pres">
       <dgm:prSet presAssocID="{91D0FCC9-0385-42AC-A8E5-78283D5D669C}" presName="connectorText" presStyleLbl="sibTrans2D1" presStyleIdx="0" presStyleCnt="3"/>
       <dgm:spPr/>
+      <dgm:t>
+        <a:bodyPr/>
+        <a:lstStyle/>
+        <a:p>
+          <a:endParaRPr lang="en-US"/>
+        </a:p>
+      </dgm:t>
     </dgm:pt>
     <dgm:pt modelId="{EA5BC1ED-EB03-45BA-BC56-621EEE9BEBD1}" type="pres">
       <dgm:prSet presAssocID="{92249E20-58D4-4E75-BB12-FE5FBD54F135}" presName="node" presStyleLbl="node1" presStyleIdx="1" presStyleCnt="4">
@@ -2592,14 +2617,35 @@
         </dgm:presLayoutVars>
       </dgm:prSet>
       <dgm:spPr/>
+      <dgm:t>
+        <a:bodyPr/>
+        <a:lstStyle/>
+        <a:p>
+          <a:endParaRPr lang="en-US"/>
+        </a:p>
+      </dgm:t>
     </dgm:pt>
     <dgm:pt modelId="{95B3EF49-35D3-4519-9F1F-B39D5A0566E4}" type="pres">
       <dgm:prSet presAssocID="{0B72DC99-4E95-4ADB-960C-E769354E6A5D}" presName="sibTrans" presStyleLbl="sibTrans2D1" presStyleIdx="1" presStyleCnt="3"/>
       <dgm:spPr/>
+      <dgm:t>
+        <a:bodyPr/>
+        <a:lstStyle/>
+        <a:p>
+          <a:endParaRPr lang="en-US"/>
+        </a:p>
+      </dgm:t>
     </dgm:pt>
     <dgm:pt modelId="{9B203DD1-3145-4590-8ACC-2517ACFE25A8}" type="pres">
       <dgm:prSet presAssocID="{0B72DC99-4E95-4ADB-960C-E769354E6A5D}" presName="connectorText" presStyleLbl="sibTrans2D1" presStyleIdx="1" presStyleCnt="3"/>
       <dgm:spPr/>
+      <dgm:t>
+        <a:bodyPr/>
+        <a:lstStyle/>
+        <a:p>
+          <a:endParaRPr lang="en-US"/>
+        </a:p>
+      </dgm:t>
     </dgm:pt>
     <dgm:pt modelId="{A37733E1-C31E-4430-AEEA-7CC4BDFAF84B}" type="pres">
       <dgm:prSet presAssocID="{38DD500D-6BEB-44F1-A480-39EBC85B7D1B}" presName="node" presStyleLbl="node1" presStyleIdx="2" presStyleCnt="4">
@@ -2608,14 +2654,35 @@
         </dgm:presLayoutVars>
       </dgm:prSet>
       <dgm:spPr/>
+      <dgm:t>
+        <a:bodyPr/>
+        <a:lstStyle/>
+        <a:p>
+          <a:endParaRPr lang="en-US"/>
+        </a:p>
+      </dgm:t>
     </dgm:pt>
     <dgm:pt modelId="{7300E7F4-ED3F-436A-A1F0-90BEABB46E71}" type="pres">
       <dgm:prSet presAssocID="{6D1E928F-781F-462C-A8AC-2A960BFDA67A}" presName="sibTrans" presStyleLbl="sibTrans2D1" presStyleIdx="2" presStyleCnt="3"/>
       <dgm:spPr/>
+      <dgm:t>
+        <a:bodyPr/>
+        <a:lstStyle/>
+        <a:p>
+          <a:endParaRPr lang="en-US"/>
+        </a:p>
+      </dgm:t>
     </dgm:pt>
     <dgm:pt modelId="{D7B13FD1-4A98-4993-ACFA-933B70FB5D81}" type="pres">
       <dgm:prSet presAssocID="{6D1E928F-781F-462C-A8AC-2A960BFDA67A}" presName="connectorText" presStyleLbl="sibTrans2D1" presStyleIdx="2" presStyleCnt="3"/>
       <dgm:spPr/>
+      <dgm:t>
+        <a:bodyPr/>
+        <a:lstStyle/>
+        <a:p>
+          <a:endParaRPr lang="en-US"/>
+        </a:p>
+      </dgm:t>
     </dgm:pt>
     <dgm:pt modelId="{F65F4BF1-A7B9-4C27-8B28-16C04C25982E}" type="pres">
       <dgm:prSet presAssocID="{764C4D4F-B7F7-4995-9F46-8E01C62C581B}" presName="node" presStyleLbl="node1" presStyleIdx="3" presStyleCnt="4">
@@ -2624,23 +2691,30 @@
         </dgm:presLayoutVars>
       </dgm:prSet>
       <dgm:spPr/>
+      <dgm:t>
+        <a:bodyPr/>
+        <a:lstStyle/>
+        <a:p>
+          <a:endParaRPr lang="en-US"/>
+        </a:p>
+      </dgm:t>
     </dgm:pt>
   </dgm:ptLst>
   <dgm:cxnLst>
+    <dgm:cxn modelId="{3EBFAACE-A4CF-4057-9EC8-3A59330D069F}" type="presOf" srcId="{69C95212-ACBD-498E-A011-59076A4285CB}" destId="{4D4E5D9B-DE30-46F3-864F-B20CBCB47B81}" srcOrd="0" destOrd="0" presId="urn:microsoft.com/office/officeart/2005/8/layout/process1"/>
+    <dgm:cxn modelId="{2D076695-4491-4B11-95EC-7786C59603C3}" type="presOf" srcId="{0B72DC99-4E95-4ADB-960C-E769354E6A5D}" destId="{95B3EF49-35D3-4519-9F1F-B39D5A0566E4}" srcOrd="0" destOrd="0" presId="urn:microsoft.com/office/officeart/2005/8/layout/process1"/>
+    <dgm:cxn modelId="{05EBE6A4-21D9-4E6D-96DC-9D3E50C88595}" type="presOf" srcId="{38DD500D-6BEB-44F1-A480-39EBC85B7D1B}" destId="{A37733E1-C31E-4430-AEEA-7CC4BDFAF84B}" srcOrd="0" destOrd="0" presId="urn:microsoft.com/office/officeart/2005/8/layout/process1"/>
+    <dgm:cxn modelId="{B7AF3A68-AEB3-4860-978B-B262BEBB9ECB}" type="presOf" srcId="{6D1E928F-781F-462C-A8AC-2A960BFDA67A}" destId="{7300E7F4-ED3F-436A-A1F0-90BEABB46E71}" srcOrd="0" destOrd="0" presId="urn:microsoft.com/office/officeart/2005/8/layout/process1"/>
+    <dgm:cxn modelId="{31005A28-3819-43FC-A794-27C122A41925}" srcId="{9496E0A2-784B-483A-9A32-E68AF617843D}" destId="{38DD500D-6BEB-44F1-A480-39EBC85B7D1B}" srcOrd="2" destOrd="0" parTransId="{3CE2BC79-A484-4240-A2CB-1BC232A1E53F}" sibTransId="{6D1E928F-781F-462C-A8AC-2A960BFDA67A}"/>
+    <dgm:cxn modelId="{01F09420-6EB0-4A7F-B4CE-2315FD06751C}" type="presOf" srcId="{6D1E928F-781F-462C-A8AC-2A960BFDA67A}" destId="{D7B13FD1-4A98-4993-ACFA-933B70FB5D81}" srcOrd="1" destOrd="0" presId="urn:microsoft.com/office/officeart/2005/8/layout/process1"/>
+    <dgm:cxn modelId="{1530AF90-D573-4EFA-A3BC-840C3370D71B}" srcId="{9496E0A2-784B-483A-9A32-E68AF617843D}" destId="{764C4D4F-B7F7-4995-9F46-8E01C62C581B}" srcOrd="3" destOrd="0" parTransId="{A6A82594-4016-4707-8656-642BA426B3D4}" sibTransId="{356D9044-9DCA-4929-92DF-A2BDE3B61A47}"/>
+    <dgm:cxn modelId="{D1CF8BBB-F3E6-4482-8B69-D1BE9774788E}" type="presOf" srcId="{91D0FCC9-0385-42AC-A8E5-78283D5D669C}" destId="{4B5D39CA-8147-4B81-8770-5E31FC6D1CFB}" srcOrd="0" destOrd="0" presId="urn:microsoft.com/office/officeart/2005/8/layout/process1"/>
+    <dgm:cxn modelId="{5E0FD1A2-149D-4CF9-AEE7-688223EDC542}" type="presOf" srcId="{764C4D4F-B7F7-4995-9F46-8E01C62C581B}" destId="{F65F4BF1-A7B9-4C27-8B28-16C04C25982E}" srcOrd="0" destOrd="0" presId="urn:microsoft.com/office/officeart/2005/8/layout/process1"/>
+    <dgm:cxn modelId="{79D506E8-F752-4BA4-B280-EF0BEBC86F63}" srcId="{9496E0A2-784B-483A-9A32-E68AF617843D}" destId="{92249E20-58D4-4E75-BB12-FE5FBD54F135}" srcOrd="1" destOrd="0" parTransId="{105B3AA3-CBE4-4ECA-BC44-B6DCA5E7A036}" sibTransId="{0B72DC99-4E95-4ADB-960C-E769354E6A5D}"/>
     <dgm:cxn modelId="{23BC981F-CC7C-4D5F-91BD-DE6EC72DB040}" srcId="{9496E0A2-784B-483A-9A32-E68AF617843D}" destId="{69C95212-ACBD-498E-A011-59076A4285CB}" srcOrd="0" destOrd="0" parTransId="{BF3D5BE3-835C-4027-9271-54CEA95A0702}" sibTransId="{91D0FCC9-0385-42AC-A8E5-78283D5D669C}"/>
-    <dgm:cxn modelId="{01F09420-6EB0-4A7F-B4CE-2315FD06751C}" type="presOf" srcId="{6D1E928F-781F-462C-A8AC-2A960BFDA67A}" destId="{D7B13FD1-4A98-4993-ACFA-933B70FB5D81}" srcOrd="1" destOrd="0" presId="urn:microsoft.com/office/officeart/2005/8/layout/process1"/>
-    <dgm:cxn modelId="{31005A28-3819-43FC-A794-27C122A41925}" srcId="{9496E0A2-784B-483A-9A32-E68AF617843D}" destId="{38DD500D-6BEB-44F1-A480-39EBC85B7D1B}" srcOrd="2" destOrd="0" parTransId="{3CE2BC79-A484-4240-A2CB-1BC232A1E53F}" sibTransId="{6D1E928F-781F-462C-A8AC-2A960BFDA67A}"/>
-    <dgm:cxn modelId="{B7AF3A68-AEB3-4860-978B-B262BEBB9ECB}" type="presOf" srcId="{6D1E928F-781F-462C-A8AC-2A960BFDA67A}" destId="{7300E7F4-ED3F-436A-A1F0-90BEABB46E71}" srcOrd="0" destOrd="0" presId="urn:microsoft.com/office/officeart/2005/8/layout/process1"/>
     <dgm:cxn modelId="{F4BB5269-9705-4D80-8BF8-3B73A8F8EE8D}" type="presOf" srcId="{91D0FCC9-0385-42AC-A8E5-78283D5D669C}" destId="{41341A21-0806-411D-A443-625FA97E4491}" srcOrd="1" destOrd="0" presId="urn:microsoft.com/office/officeart/2005/8/layout/process1"/>
     <dgm:cxn modelId="{FEAE6454-4E5D-4190-8A76-D27FC4FC4790}" type="presOf" srcId="{9496E0A2-784B-483A-9A32-E68AF617843D}" destId="{9EA8A120-7984-4A2B-9532-24393BA5D7A2}" srcOrd="0" destOrd="0" presId="urn:microsoft.com/office/officeart/2005/8/layout/process1"/>
     <dgm:cxn modelId="{F8BD9F76-8AA1-4A33-B686-C2C5DEA97305}" type="presOf" srcId="{0B72DC99-4E95-4ADB-960C-E769354E6A5D}" destId="{9B203DD1-3145-4590-8ACC-2517ACFE25A8}" srcOrd="1" destOrd="0" presId="urn:microsoft.com/office/officeart/2005/8/layout/process1"/>
-    <dgm:cxn modelId="{1530AF90-D573-4EFA-A3BC-840C3370D71B}" srcId="{9496E0A2-784B-483A-9A32-E68AF617843D}" destId="{764C4D4F-B7F7-4995-9F46-8E01C62C581B}" srcOrd="3" destOrd="0" parTransId="{A6A82594-4016-4707-8656-642BA426B3D4}" sibTransId="{356D9044-9DCA-4929-92DF-A2BDE3B61A47}"/>
-    <dgm:cxn modelId="{2D076695-4491-4B11-95EC-7786C59603C3}" type="presOf" srcId="{0B72DC99-4E95-4ADB-960C-E769354E6A5D}" destId="{95B3EF49-35D3-4519-9F1F-B39D5A0566E4}" srcOrd="0" destOrd="0" presId="urn:microsoft.com/office/officeart/2005/8/layout/process1"/>
-    <dgm:cxn modelId="{5E0FD1A2-149D-4CF9-AEE7-688223EDC542}" type="presOf" srcId="{764C4D4F-B7F7-4995-9F46-8E01C62C581B}" destId="{F65F4BF1-A7B9-4C27-8B28-16C04C25982E}" srcOrd="0" destOrd="0" presId="urn:microsoft.com/office/officeart/2005/8/layout/process1"/>
-    <dgm:cxn modelId="{05EBE6A4-21D9-4E6D-96DC-9D3E50C88595}" type="presOf" srcId="{38DD500D-6BEB-44F1-A480-39EBC85B7D1B}" destId="{A37733E1-C31E-4430-AEEA-7CC4BDFAF84B}" srcOrd="0" destOrd="0" presId="urn:microsoft.com/office/officeart/2005/8/layout/process1"/>
-    <dgm:cxn modelId="{D1CF8BBB-F3E6-4482-8B69-D1BE9774788E}" type="presOf" srcId="{91D0FCC9-0385-42AC-A8E5-78283D5D669C}" destId="{4B5D39CA-8147-4B81-8770-5E31FC6D1CFB}" srcOrd="0" destOrd="0" presId="urn:microsoft.com/office/officeart/2005/8/layout/process1"/>
-    <dgm:cxn modelId="{3EBFAACE-A4CF-4057-9EC8-3A59330D069F}" type="presOf" srcId="{69C95212-ACBD-498E-A011-59076A4285CB}" destId="{4D4E5D9B-DE30-46F3-864F-B20CBCB47B81}" srcOrd="0" destOrd="0" presId="urn:microsoft.com/office/officeart/2005/8/layout/process1"/>
-    <dgm:cxn modelId="{79D506E8-F752-4BA4-B280-EF0BEBC86F63}" srcId="{9496E0A2-784B-483A-9A32-E68AF617843D}" destId="{92249E20-58D4-4E75-BB12-FE5FBD54F135}" srcOrd="1" destOrd="0" parTransId="{105B3AA3-CBE4-4ECA-BC44-B6DCA5E7A036}" sibTransId="{0B72DC99-4E95-4ADB-960C-E769354E6A5D}"/>
     <dgm:cxn modelId="{099D99FB-52B2-434C-BA10-1675505A420B}" type="presOf" srcId="{92249E20-58D4-4E75-BB12-FE5FBD54F135}" destId="{EA5BC1ED-EB03-45BA-BC56-621EEE9BEBD1}" srcOrd="0" destOrd="0" presId="urn:microsoft.com/office/officeart/2005/8/layout/process1"/>
     <dgm:cxn modelId="{DA8115C2-D2F4-4CCB-9D90-0A509018B8F1}" type="presParOf" srcId="{9EA8A120-7984-4A2B-9532-24393BA5D7A2}" destId="{4D4E5D9B-DE30-46F3-864F-B20CBCB47B81}" srcOrd="0" destOrd="0" presId="urn:microsoft.com/office/officeart/2005/8/layout/process1"/>
     <dgm:cxn modelId="{0C3F32CC-6A85-4291-B66A-941971627454}" type="presParOf" srcId="{9EA8A120-7984-4A2B-9532-24393BA5D7A2}" destId="{4B5D39CA-8147-4B81-8770-5E31FC6D1CFB}" srcOrd="1" destOrd="0" presId="urn:microsoft.com/office/officeart/2005/8/layout/process1"/>
@@ -3032,6 +3106,13 @@
         </dgm:presLayoutVars>
       </dgm:prSet>
       <dgm:spPr/>
+      <dgm:t>
+        <a:bodyPr/>
+        <a:lstStyle/>
+        <a:p>
+          <a:endParaRPr lang="en-US"/>
+        </a:p>
+      </dgm:t>
     </dgm:pt>
     <dgm:pt modelId="{189D6A4B-21E2-4FCD-A1A9-B0A37070679D}" type="pres">
       <dgm:prSet presAssocID="{6909E702-DF4A-4621-83E4-C7AE51A47D48}" presName="node" presStyleLbl="node1" presStyleIdx="0" presStyleCnt="8">
@@ -3040,14 +3121,35 @@
         </dgm:presLayoutVars>
       </dgm:prSet>
       <dgm:spPr/>
+      <dgm:t>
+        <a:bodyPr/>
+        <a:lstStyle/>
+        <a:p>
+          <a:endParaRPr lang="en-US"/>
+        </a:p>
+      </dgm:t>
     </dgm:pt>
     <dgm:pt modelId="{E5D9E9D1-B554-4B69-88C2-23DB15039166}" type="pres">
       <dgm:prSet presAssocID="{76AC9EB8-B499-4014-9C2D-CF84A71AB784}" presName="sibTrans" presStyleLbl="sibTrans2D1" presStyleIdx="0" presStyleCnt="7"/>
       <dgm:spPr/>
+      <dgm:t>
+        <a:bodyPr/>
+        <a:lstStyle/>
+        <a:p>
+          <a:endParaRPr lang="en-US"/>
+        </a:p>
+      </dgm:t>
     </dgm:pt>
     <dgm:pt modelId="{7BEE8685-09E9-4964-906A-51AD9B41B2B2}" type="pres">
       <dgm:prSet presAssocID="{76AC9EB8-B499-4014-9C2D-CF84A71AB784}" presName="connectorText" presStyleLbl="sibTrans2D1" presStyleIdx="0" presStyleCnt="7"/>
       <dgm:spPr/>
+      <dgm:t>
+        <a:bodyPr/>
+        <a:lstStyle/>
+        <a:p>
+          <a:endParaRPr lang="en-US"/>
+        </a:p>
+      </dgm:t>
     </dgm:pt>
     <dgm:pt modelId="{D5C5BD5A-4727-46B4-AED3-2156E2F1911C}" type="pres">
       <dgm:prSet presAssocID="{16DB864F-1D40-4E34-8BD9-F1C660CD2CFB}" presName="node" presStyleLbl="node1" presStyleIdx="1" presStyleCnt="8" custScaleX="177674">
@@ -3056,14 +3158,35 @@
         </dgm:presLayoutVars>
       </dgm:prSet>
       <dgm:spPr/>
+      <dgm:t>
+        <a:bodyPr/>
+        <a:lstStyle/>
+        <a:p>
+          <a:endParaRPr lang="en-US"/>
+        </a:p>
+      </dgm:t>
     </dgm:pt>
     <dgm:pt modelId="{70E8EFBD-24AF-49C1-AB74-E0E433B72786}" type="pres">
       <dgm:prSet presAssocID="{0CC9A380-740E-4425-AC43-31F4F13B3004}" presName="sibTrans" presStyleLbl="sibTrans2D1" presStyleIdx="1" presStyleCnt="7"/>
       <dgm:spPr/>
+      <dgm:t>
+        <a:bodyPr/>
+        <a:lstStyle/>
+        <a:p>
+          <a:endParaRPr lang="en-US"/>
+        </a:p>
+      </dgm:t>
     </dgm:pt>
     <dgm:pt modelId="{6C363702-4613-491B-B93A-F5677269E603}" type="pres">
       <dgm:prSet presAssocID="{0CC9A380-740E-4425-AC43-31F4F13B3004}" presName="connectorText" presStyleLbl="sibTrans2D1" presStyleIdx="1" presStyleCnt="7"/>
       <dgm:spPr/>
+      <dgm:t>
+        <a:bodyPr/>
+        <a:lstStyle/>
+        <a:p>
+          <a:endParaRPr lang="en-US"/>
+        </a:p>
+      </dgm:t>
     </dgm:pt>
     <dgm:pt modelId="{5E07831F-96AB-45D4-BDD8-76735DEC4F3D}" type="pres">
       <dgm:prSet presAssocID="{B0120D59-46F5-4609-8A90-D19147655A7C}" presName="node" presStyleLbl="node1" presStyleIdx="2" presStyleCnt="8" custScaleX="178712">
@@ -3072,14 +3195,35 @@
         </dgm:presLayoutVars>
       </dgm:prSet>
       <dgm:spPr/>
+      <dgm:t>
+        <a:bodyPr/>
+        <a:lstStyle/>
+        <a:p>
+          <a:endParaRPr lang="en-US"/>
+        </a:p>
+      </dgm:t>
     </dgm:pt>
     <dgm:pt modelId="{C3ADE6CA-9FE3-4A69-9EF9-3DEB92BC6215}" type="pres">
       <dgm:prSet presAssocID="{05504F13-8F6D-4A96-A060-7C7C04BCCDC5}" presName="sibTrans" presStyleLbl="sibTrans2D1" presStyleIdx="2" presStyleCnt="7"/>
       <dgm:spPr/>
+      <dgm:t>
+        <a:bodyPr/>
+        <a:lstStyle/>
+        <a:p>
+          <a:endParaRPr lang="en-US"/>
+        </a:p>
+      </dgm:t>
     </dgm:pt>
     <dgm:pt modelId="{FC02DA56-149D-4855-9DCF-0DD82448A01C}" type="pres">
       <dgm:prSet presAssocID="{05504F13-8F6D-4A96-A060-7C7C04BCCDC5}" presName="connectorText" presStyleLbl="sibTrans2D1" presStyleIdx="2" presStyleCnt="7"/>
       <dgm:spPr/>
+      <dgm:t>
+        <a:bodyPr/>
+        <a:lstStyle/>
+        <a:p>
+          <a:endParaRPr lang="en-US"/>
+        </a:p>
+      </dgm:t>
     </dgm:pt>
     <dgm:pt modelId="{015423F5-9245-4C68-91D2-E0D99B323ECB}" type="pres">
       <dgm:prSet presAssocID="{4E8DDCF5-1131-4B7B-8DC9-CA1D909DEB4C}" presName="node" presStyleLbl="node1" presStyleIdx="3" presStyleCnt="8" custScaleX="181548">
@@ -3088,14 +3232,35 @@
         </dgm:presLayoutVars>
       </dgm:prSet>
       <dgm:spPr/>
+      <dgm:t>
+        <a:bodyPr/>
+        <a:lstStyle/>
+        <a:p>
+          <a:endParaRPr lang="en-US"/>
+        </a:p>
+      </dgm:t>
     </dgm:pt>
     <dgm:pt modelId="{BB051662-59CA-41A7-A56A-FFBA00380174}" type="pres">
       <dgm:prSet presAssocID="{1E64BDA1-8C1C-4293-9ECF-B16190F3555C}" presName="sibTrans" presStyleLbl="sibTrans2D1" presStyleIdx="3" presStyleCnt="7"/>
       <dgm:spPr/>
+      <dgm:t>
+        <a:bodyPr/>
+        <a:lstStyle/>
+        <a:p>
+          <a:endParaRPr lang="en-US"/>
+        </a:p>
+      </dgm:t>
     </dgm:pt>
     <dgm:pt modelId="{85ACBFE3-ED12-472D-9155-8AECC46A625D}" type="pres">
       <dgm:prSet presAssocID="{1E64BDA1-8C1C-4293-9ECF-B16190F3555C}" presName="connectorText" presStyleLbl="sibTrans2D1" presStyleIdx="3" presStyleCnt="7"/>
       <dgm:spPr/>
+      <dgm:t>
+        <a:bodyPr/>
+        <a:lstStyle/>
+        <a:p>
+          <a:endParaRPr lang="en-US"/>
+        </a:p>
+      </dgm:t>
     </dgm:pt>
     <dgm:pt modelId="{DE8A9ADE-4EA7-4E5F-9B22-8F0A88EF3F94}" type="pres">
       <dgm:prSet presAssocID="{6BB4A08D-9009-408D-A672-847AAAD9D481}" presName="node" presStyleLbl="node1" presStyleIdx="4" presStyleCnt="8" custScaleX="184493">
@@ -3104,14 +3269,35 @@
         </dgm:presLayoutVars>
       </dgm:prSet>
       <dgm:spPr/>
+      <dgm:t>
+        <a:bodyPr/>
+        <a:lstStyle/>
+        <a:p>
+          <a:endParaRPr lang="en-US"/>
+        </a:p>
+      </dgm:t>
     </dgm:pt>
     <dgm:pt modelId="{99F1D40A-DB5B-4C5D-98D8-82EDE31912FE}" type="pres">
       <dgm:prSet presAssocID="{F27D3CED-FAAD-45A0-B25C-96C0B097E61C}" presName="sibTrans" presStyleLbl="sibTrans2D1" presStyleIdx="4" presStyleCnt="7"/>
       <dgm:spPr/>
+      <dgm:t>
+        <a:bodyPr/>
+        <a:lstStyle/>
+        <a:p>
+          <a:endParaRPr lang="en-US"/>
+        </a:p>
+      </dgm:t>
     </dgm:pt>
     <dgm:pt modelId="{228957F4-EE3C-408A-83BB-E73D4ED2802F}" type="pres">
       <dgm:prSet presAssocID="{F27D3CED-FAAD-45A0-B25C-96C0B097E61C}" presName="connectorText" presStyleLbl="sibTrans2D1" presStyleIdx="4" presStyleCnt="7"/>
       <dgm:spPr/>
+      <dgm:t>
+        <a:bodyPr/>
+        <a:lstStyle/>
+        <a:p>
+          <a:endParaRPr lang="en-US"/>
+        </a:p>
+      </dgm:t>
     </dgm:pt>
     <dgm:pt modelId="{52BF1B02-38BA-490D-B49F-F7F428D4159F}" type="pres">
       <dgm:prSet presAssocID="{F77B9BF5-4593-4B18-BA5C-8BE2B8071A44}" presName="node" presStyleLbl="node1" presStyleIdx="5" presStyleCnt="8" custScaleX="183378">
@@ -3120,14 +3306,35 @@
         </dgm:presLayoutVars>
       </dgm:prSet>
       <dgm:spPr/>
+      <dgm:t>
+        <a:bodyPr/>
+        <a:lstStyle/>
+        <a:p>
+          <a:endParaRPr lang="en-US"/>
+        </a:p>
+      </dgm:t>
     </dgm:pt>
     <dgm:pt modelId="{FFAB1546-EE89-4905-B200-014D9D15DEB5}" type="pres">
       <dgm:prSet presAssocID="{B8A5FD80-BDA8-4DB0-BAA6-7D996DB83F32}" presName="sibTrans" presStyleLbl="sibTrans2D1" presStyleIdx="5" presStyleCnt="7"/>
       <dgm:spPr/>
+      <dgm:t>
+        <a:bodyPr/>
+        <a:lstStyle/>
+        <a:p>
+          <a:endParaRPr lang="en-US"/>
+        </a:p>
+      </dgm:t>
     </dgm:pt>
     <dgm:pt modelId="{F99DF6A8-FCCC-45FE-984E-74BB5D13A325}" type="pres">
       <dgm:prSet presAssocID="{B8A5FD80-BDA8-4DB0-BAA6-7D996DB83F32}" presName="connectorText" presStyleLbl="sibTrans2D1" presStyleIdx="5" presStyleCnt="7"/>
       <dgm:spPr/>
+      <dgm:t>
+        <a:bodyPr/>
+        <a:lstStyle/>
+        <a:p>
+          <a:endParaRPr lang="en-US"/>
+        </a:p>
+      </dgm:t>
     </dgm:pt>
     <dgm:pt modelId="{CFBA9DB8-BD38-47A9-83E9-C039D73A7363}" type="pres">
       <dgm:prSet presAssocID="{44D9E930-28F8-42A2-AEDE-C2AF9832F680}" presName="node" presStyleLbl="node1" presStyleIdx="6" presStyleCnt="8" custScaleX="187609">
@@ -3136,14 +3343,35 @@
         </dgm:presLayoutVars>
       </dgm:prSet>
       <dgm:spPr/>
+      <dgm:t>
+        <a:bodyPr/>
+        <a:lstStyle/>
+        <a:p>
+          <a:endParaRPr lang="en-US"/>
+        </a:p>
+      </dgm:t>
     </dgm:pt>
     <dgm:pt modelId="{AA747EB2-8553-4BFB-A459-0AE4760BF603}" type="pres">
       <dgm:prSet presAssocID="{BEF039B9-78B3-44AC-BCD2-D5D97EFF241A}" presName="sibTrans" presStyleLbl="sibTrans2D1" presStyleIdx="6" presStyleCnt="7"/>
       <dgm:spPr/>
+      <dgm:t>
+        <a:bodyPr/>
+        <a:lstStyle/>
+        <a:p>
+          <a:endParaRPr lang="en-US"/>
+        </a:p>
+      </dgm:t>
     </dgm:pt>
     <dgm:pt modelId="{6B4A65B5-2DFC-4228-9C5F-110DC47622B7}" type="pres">
       <dgm:prSet presAssocID="{BEF039B9-78B3-44AC-BCD2-D5D97EFF241A}" presName="connectorText" presStyleLbl="sibTrans2D1" presStyleIdx="6" presStyleCnt="7"/>
       <dgm:spPr/>
+      <dgm:t>
+        <a:bodyPr/>
+        <a:lstStyle/>
+        <a:p>
+          <a:endParaRPr lang="en-US"/>
+        </a:p>
+      </dgm:t>
     </dgm:pt>
     <dgm:pt modelId="{C66BF0E9-CB5D-486D-B436-1555A05A59F0}" type="pres">
       <dgm:prSet presAssocID="{9A14F079-F04B-4CC9-9700-618484CACBA1}" presName="node" presStyleLbl="node1" presStyleIdx="7" presStyleCnt="8">
@@ -3152,39 +3380,46 @@
         </dgm:presLayoutVars>
       </dgm:prSet>
       <dgm:spPr/>
+      <dgm:t>
+        <a:bodyPr/>
+        <a:lstStyle/>
+        <a:p>
+          <a:endParaRPr lang="en-US"/>
+        </a:p>
+      </dgm:t>
     </dgm:pt>
   </dgm:ptLst>
   <dgm:cxnLst>
+    <dgm:cxn modelId="{CA6ECBB7-3C85-4C7D-B933-A652218F8480}" type="presOf" srcId="{76AC9EB8-B499-4014-9C2D-CF84A71AB784}" destId="{E5D9E9D1-B554-4B69-88C2-23DB15039166}" srcOrd="0" destOrd="0" presId="urn:microsoft.com/office/officeart/2005/8/layout/process2"/>
+    <dgm:cxn modelId="{B1AAA544-2A7A-462B-8263-6FCDC6C98228}" type="presOf" srcId="{0CC9A380-740E-4425-AC43-31F4F13B3004}" destId="{6C363702-4613-491B-B93A-F5677269E603}" srcOrd="1" destOrd="0" presId="urn:microsoft.com/office/officeart/2005/8/layout/process2"/>
+    <dgm:cxn modelId="{97036991-5E3A-46EC-8150-B28E18F668ED}" type="presOf" srcId="{1E64BDA1-8C1C-4293-9ECF-B16190F3555C}" destId="{BB051662-59CA-41A7-A56A-FFBA00380174}" srcOrd="0" destOrd="0" presId="urn:microsoft.com/office/officeart/2005/8/layout/process2"/>
+    <dgm:cxn modelId="{62E71CF5-02C6-426F-B29D-352D349A767B}" type="presOf" srcId="{831248B5-42BE-41CC-B00B-93FDF821FE9F}" destId="{D7B6869B-4E62-4ED6-98D4-117812227983}" srcOrd="0" destOrd="0" presId="urn:microsoft.com/office/officeart/2005/8/layout/process2"/>
+    <dgm:cxn modelId="{C1508D8D-DC9F-4A4C-B426-EDCB0C2D4635}" type="presOf" srcId="{BEF039B9-78B3-44AC-BCD2-D5D97EFF241A}" destId="{AA747EB2-8553-4BFB-A459-0AE4760BF603}" srcOrd="0" destOrd="0" presId="urn:microsoft.com/office/officeart/2005/8/layout/process2"/>
+    <dgm:cxn modelId="{9E8B0EC8-CDD5-4D01-BB78-42B94FC3B680}" srcId="{831248B5-42BE-41CC-B00B-93FDF821FE9F}" destId="{44D9E930-28F8-42A2-AEDE-C2AF9832F680}" srcOrd="6" destOrd="0" parTransId="{F461D74D-E1BE-4262-9A51-8AF93A2A9DAE}" sibTransId="{BEF039B9-78B3-44AC-BCD2-D5D97EFF241A}"/>
+    <dgm:cxn modelId="{AFB1F2F6-1307-4941-86BA-4A12F4B9B558}" type="presOf" srcId="{05504F13-8F6D-4A96-A060-7C7C04BCCDC5}" destId="{C3ADE6CA-9FE3-4A69-9EF9-3DEB92BC6215}" srcOrd="0" destOrd="0" presId="urn:microsoft.com/office/officeart/2005/8/layout/process2"/>
+    <dgm:cxn modelId="{417CA51D-93DA-40F2-8DB1-5C199B54D276}" type="presOf" srcId="{6909E702-DF4A-4621-83E4-C7AE51A47D48}" destId="{189D6A4B-21E2-4FCD-A1A9-B0A37070679D}" srcOrd="0" destOrd="0" presId="urn:microsoft.com/office/officeart/2005/8/layout/process2"/>
+    <dgm:cxn modelId="{D724B969-C453-40A9-A4DD-724E37D812DE}" type="presOf" srcId="{16DB864F-1D40-4E34-8BD9-F1C660CD2CFB}" destId="{D5C5BD5A-4727-46B4-AED3-2156E2F1911C}" srcOrd="0" destOrd="0" presId="urn:microsoft.com/office/officeart/2005/8/layout/process2"/>
     <dgm:cxn modelId="{1B41AA09-DD62-4EB7-9BBC-88AFF9167CB2}" type="presOf" srcId="{BEF039B9-78B3-44AC-BCD2-D5D97EFF241A}" destId="{6B4A65B5-2DFC-4228-9C5F-110DC47622B7}" srcOrd="1" destOrd="0" presId="urn:microsoft.com/office/officeart/2005/8/layout/process2"/>
-    <dgm:cxn modelId="{CCBB2E18-AEAA-4DC0-9E3C-F88CDCA45059}" type="presOf" srcId="{F27D3CED-FAAD-45A0-B25C-96C0B097E61C}" destId="{228957F4-EE3C-408A-83BB-E73D4ED2802F}" srcOrd="1" destOrd="0" presId="urn:microsoft.com/office/officeart/2005/8/layout/process2"/>
     <dgm:cxn modelId="{F848FD1B-9938-40DA-B871-80D23B94C0A1}" srcId="{831248B5-42BE-41CC-B00B-93FDF821FE9F}" destId="{6BB4A08D-9009-408D-A672-847AAAD9D481}" srcOrd="4" destOrd="0" parTransId="{41DA4F41-3DCF-4131-AA4C-8DFB2599D393}" sibTransId="{F27D3CED-FAAD-45A0-B25C-96C0B097E61C}"/>
-    <dgm:cxn modelId="{417CA51D-93DA-40F2-8DB1-5C199B54D276}" type="presOf" srcId="{6909E702-DF4A-4621-83E4-C7AE51A47D48}" destId="{189D6A4B-21E2-4FCD-A1A9-B0A37070679D}" srcOrd="0" destOrd="0" presId="urn:microsoft.com/office/officeart/2005/8/layout/process2"/>
-    <dgm:cxn modelId="{D497E32E-9E75-4ED1-AB75-FDC6416370FF}" type="presOf" srcId="{1E64BDA1-8C1C-4293-9ECF-B16190F3555C}" destId="{85ACBFE3-ED12-472D-9155-8AECC46A625D}" srcOrd="1" destOrd="0" presId="urn:microsoft.com/office/officeart/2005/8/layout/process2"/>
-    <dgm:cxn modelId="{6B5C7332-53C1-44A1-987C-DD115C27287D}" type="presOf" srcId="{B0120D59-46F5-4609-8A90-D19147655A7C}" destId="{5E07831F-96AB-45D4-BDD8-76735DEC4F3D}" srcOrd="0" destOrd="0" presId="urn:microsoft.com/office/officeart/2005/8/layout/process2"/>
+    <dgm:cxn modelId="{74E0374E-C34F-4DBF-9C88-16D4690BFED2}" type="presOf" srcId="{F27D3CED-FAAD-45A0-B25C-96C0B097E61C}" destId="{99F1D40A-DB5B-4C5D-98D8-82EDE31912FE}" srcOrd="0" destOrd="0" presId="urn:microsoft.com/office/officeart/2005/8/layout/process2"/>
+    <dgm:cxn modelId="{E273DFAF-B31F-4432-9592-248697CD484E}" type="presOf" srcId="{0CC9A380-740E-4425-AC43-31F4F13B3004}" destId="{70E8EFBD-24AF-49C1-AB74-E0E433B72786}" srcOrd="0" destOrd="0" presId="urn:microsoft.com/office/officeart/2005/8/layout/process2"/>
     <dgm:cxn modelId="{94C5DB3A-31F4-43ED-AF25-F5889F60EB0E}" type="presOf" srcId="{4E8DDCF5-1131-4B7B-8DC9-CA1D909DEB4C}" destId="{015423F5-9245-4C68-91D2-E0D99B323ECB}" srcOrd="0" destOrd="0" presId="urn:microsoft.com/office/officeart/2005/8/layout/process2"/>
-    <dgm:cxn modelId="{67A6795E-B981-4D59-8045-63955DC05E94}" type="presOf" srcId="{B8A5FD80-BDA8-4DB0-BAA6-7D996DB83F32}" destId="{F99DF6A8-FCCC-45FE-984E-74BB5D13A325}" srcOrd="1" destOrd="0" presId="urn:microsoft.com/office/officeart/2005/8/layout/process2"/>
-    <dgm:cxn modelId="{B1AAA544-2A7A-462B-8263-6FCDC6C98228}" type="presOf" srcId="{0CC9A380-740E-4425-AC43-31F4F13B3004}" destId="{6C363702-4613-491B-B93A-F5677269E603}" srcOrd="1" destOrd="0" presId="urn:microsoft.com/office/officeart/2005/8/layout/process2"/>
     <dgm:cxn modelId="{3C976765-D4C8-4738-B7C4-C1318D78CD1F}" srcId="{831248B5-42BE-41CC-B00B-93FDF821FE9F}" destId="{6909E702-DF4A-4621-83E4-C7AE51A47D48}" srcOrd="0" destOrd="0" parTransId="{1DE2D664-EDBC-46EB-96F3-DDBF3F502ACD}" sibTransId="{76AC9EB8-B499-4014-9C2D-CF84A71AB784}"/>
     <dgm:cxn modelId="{F15E6F49-4000-47CC-8885-1783141097E5}" srcId="{831248B5-42BE-41CC-B00B-93FDF821FE9F}" destId="{9A14F079-F04B-4CC9-9700-618484CACBA1}" srcOrd="7" destOrd="0" parTransId="{6B6E3BE4-034D-49F9-B705-99516622DF0B}" sibTransId="{E9A69AA7-B434-477C-A848-F3319E85C266}"/>
-    <dgm:cxn modelId="{D724B969-C453-40A9-A4DD-724E37D812DE}" type="presOf" srcId="{16DB864F-1D40-4E34-8BD9-F1C660CD2CFB}" destId="{D5C5BD5A-4727-46B4-AED3-2156E2F1911C}" srcOrd="0" destOrd="0" presId="urn:microsoft.com/office/officeart/2005/8/layout/process2"/>
-    <dgm:cxn modelId="{70AE856C-5F5E-4DEC-B46B-465564D97C8A}" type="presOf" srcId="{05504F13-8F6D-4A96-A060-7C7C04BCCDC5}" destId="{FC02DA56-149D-4855-9DCF-0DD82448A01C}" srcOrd="1" destOrd="0" presId="urn:microsoft.com/office/officeart/2005/8/layout/process2"/>
-    <dgm:cxn modelId="{74E0374E-C34F-4DBF-9C88-16D4690BFED2}" type="presOf" srcId="{F27D3CED-FAAD-45A0-B25C-96C0B097E61C}" destId="{99F1D40A-DB5B-4C5D-98D8-82EDE31912FE}" srcOrd="0" destOrd="0" presId="urn:microsoft.com/office/officeart/2005/8/layout/process2"/>
-    <dgm:cxn modelId="{C1508D8D-DC9F-4A4C-B426-EDCB0C2D4635}" type="presOf" srcId="{BEF039B9-78B3-44AC-BCD2-D5D97EFF241A}" destId="{AA747EB2-8553-4BFB-A459-0AE4760BF603}" srcOrd="0" destOrd="0" presId="urn:microsoft.com/office/officeart/2005/8/layout/process2"/>
-    <dgm:cxn modelId="{97036991-5E3A-46EC-8150-B28E18F668ED}" type="presOf" srcId="{1E64BDA1-8C1C-4293-9ECF-B16190F3555C}" destId="{BB051662-59CA-41A7-A56A-FFBA00380174}" srcOrd="0" destOrd="0" presId="urn:microsoft.com/office/officeart/2005/8/layout/process2"/>
-    <dgm:cxn modelId="{1FAAEAA8-DA69-4D24-A321-784C7150EC4E}" srcId="{831248B5-42BE-41CC-B00B-93FDF821FE9F}" destId="{16DB864F-1D40-4E34-8BD9-F1C660CD2CFB}" srcOrd="1" destOrd="0" parTransId="{93C0F5D2-7285-4DBC-9CFC-540D03F09FCC}" sibTransId="{0CC9A380-740E-4425-AC43-31F4F13B3004}"/>
-    <dgm:cxn modelId="{E273DFAF-B31F-4432-9592-248697CD484E}" type="presOf" srcId="{0CC9A380-740E-4425-AC43-31F4F13B3004}" destId="{70E8EFBD-24AF-49C1-AB74-E0E433B72786}" srcOrd="0" destOrd="0" presId="urn:microsoft.com/office/officeart/2005/8/layout/process2"/>
-    <dgm:cxn modelId="{2BFA0FB1-DBF7-4A7A-A74C-9B7753CD19FE}" type="presOf" srcId="{F77B9BF5-4593-4B18-BA5C-8BE2B8071A44}" destId="{52BF1B02-38BA-490D-B49F-F7F428D4159F}" srcOrd="0" destOrd="0" presId="urn:microsoft.com/office/officeart/2005/8/layout/process2"/>
-    <dgm:cxn modelId="{CA6ECBB7-3C85-4C7D-B933-A652218F8480}" type="presOf" srcId="{76AC9EB8-B499-4014-9C2D-CF84A71AB784}" destId="{E5D9E9D1-B554-4B69-88C2-23DB15039166}" srcOrd="0" destOrd="0" presId="urn:microsoft.com/office/officeart/2005/8/layout/process2"/>
+    <dgm:cxn modelId="{902323CF-0A5E-4ECB-AB85-D3ACCE8529C8}" type="presOf" srcId="{76AC9EB8-B499-4014-9C2D-CF84A71AB784}" destId="{7BEE8685-09E9-4964-906A-51AD9B41B2B2}" srcOrd="1" destOrd="0" presId="urn:microsoft.com/office/officeart/2005/8/layout/process2"/>
     <dgm:cxn modelId="{2D6458B8-D429-4A32-8FAC-D38FBB9C07AF}" type="presOf" srcId="{9A14F079-F04B-4CC9-9700-618484CACBA1}" destId="{C66BF0E9-CB5D-486D-B436-1555A05A59F0}" srcOrd="0" destOrd="0" presId="urn:microsoft.com/office/officeart/2005/8/layout/process2"/>
     <dgm:cxn modelId="{BE13A2BF-22E0-4EFB-A743-7E04366FF557}" type="presOf" srcId="{44D9E930-28F8-42A2-AEDE-C2AF9832F680}" destId="{CFBA9DB8-BD38-47A9-83E9-C039D73A7363}" srcOrd="0" destOrd="0" presId="urn:microsoft.com/office/officeart/2005/8/layout/process2"/>
-    <dgm:cxn modelId="{9E8B0EC8-CDD5-4D01-BB78-42B94FC3B680}" srcId="{831248B5-42BE-41CC-B00B-93FDF821FE9F}" destId="{44D9E930-28F8-42A2-AEDE-C2AF9832F680}" srcOrd="6" destOrd="0" parTransId="{F461D74D-E1BE-4262-9A51-8AF93A2A9DAE}" sibTransId="{BEF039B9-78B3-44AC-BCD2-D5D97EFF241A}"/>
+    <dgm:cxn modelId="{67A6795E-B981-4D59-8045-63955DC05E94}" type="presOf" srcId="{B8A5FD80-BDA8-4DB0-BAA6-7D996DB83F32}" destId="{F99DF6A8-FCCC-45FE-984E-74BB5D13A325}" srcOrd="1" destOrd="0" presId="urn:microsoft.com/office/officeart/2005/8/layout/process2"/>
+    <dgm:cxn modelId="{D497E32E-9E75-4ED1-AB75-FDC6416370FF}" type="presOf" srcId="{1E64BDA1-8C1C-4293-9ECF-B16190F3555C}" destId="{85ACBFE3-ED12-472D-9155-8AECC46A625D}" srcOrd="1" destOrd="0" presId="urn:microsoft.com/office/officeart/2005/8/layout/process2"/>
+    <dgm:cxn modelId="{70AE856C-5F5E-4DEC-B46B-465564D97C8A}" type="presOf" srcId="{05504F13-8F6D-4A96-A060-7C7C04BCCDC5}" destId="{FC02DA56-149D-4855-9DCF-0DD82448A01C}" srcOrd="1" destOrd="0" presId="urn:microsoft.com/office/officeart/2005/8/layout/process2"/>
+    <dgm:cxn modelId="{2BFA0FB1-DBF7-4A7A-A74C-9B7753CD19FE}" type="presOf" srcId="{F77B9BF5-4593-4B18-BA5C-8BE2B8071A44}" destId="{52BF1B02-38BA-490D-B49F-F7F428D4159F}" srcOrd="0" destOrd="0" presId="urn:microsoft.com/office/officeart/2005/8/layout/process2"/>
     <dgm:cxn modelId="{2F596BCC-CA9C-4A5D-9021-F5F196D3E80D}" srcId="{831248B5-42BE-41CC-B00B-93FDF821FE9F}" destId="{4E8DDCF5-1131-4B7B-8DC9-CA1D909DEB4C}" srcOrd="3" destOrd="0" parTransId="{5D085E46-E5F5-4C17-A2B4-EEDB4B73AAFC}" sibTransId="{1E64BDA1-8C1C-4293-9ECF-B16190F3555C}"/>
-    <dgm:cxn modelId="{902323CF-0A5E-4ECB-AB85-D3ACCE8529C8}" type="presOf" srcId="{76AC9EB8-B499-4014-9C2D-CF84A71AB784}" destId="{7BEE8685-09E9-4964-906A-51AD9B41B2B2}" srcOrd="1" destOrd="0" presId="urn:microsoft.com/office/officeart/2005/8/layout/process2"/>
+    <dgm:cxn modelId="{17625CDE-390A-4A16-A1DA-1A2728D2592E}" srcId="{831248B5-42BE-41CC-B00B-93FDF821FE9F}" destId="{B0120D59-46F5-4609-8A90-D19147655A7C}" srcOrd="2" destOrd="0" parTransId="{8B65003E-F843-4BAC-92BF-31469B2EB546}" sibTransId="{05504F13-8F6D-4A96-A060-7C7C04BCCDC5}"/>
+    <dgm:cxn modelId="{6B5C7332-53C1-44A1-987C-DD115C27287D}" type="presOf" srcId="{B0120D59-46F5-4609-8A90-D19147655A7C}" destId="{5E07831F-96AB-45D4-BDD8-76735DEC4F3D}" srcOrd="0" destOrd="0" presId="urn:microsoft.com/office/officeart/2005/8/layout/process2"/>
+    <dgm:cxn modelId="{CCBB2E18-AEAA-4DC0-9E3C-F88CDCA45059}" type="presOf" srcId="{F27D3CED-FAAD-45A0-B25C-96C0B097E61C}" destId="{228957F4-EE3C-408A-83BB-E73D4ED2802F}" srcOrd="1" destOrd="0" presId="urn:microsoft.com/office/officeart/2005/8/layout/process2"/>
+    <dgm:cxn modelId="{1FAAEAA8-DA69-4D24-A321-784C7150EC4E}" srcId="{831248B5-42BE-41CC-B00B-93FDF821FE9F}" destId="{16DB864F-1D40-4E34-8BD9-F1C660CD2CFB}" srcOrd="1" destOrd="0" parTransId="{93C0F5D2-7285-4DBC-9CFC-540D03F09FCC}" sibTransId="{0CC9A380-740E-4425-AC43-31F4F13B3004}"/>
     <dgm:cxn modelId="{96CE0AD5-C6CE-45A8-A85E-9565EFC97971}" type="presOf" srcId="{B8A5FD80-BDA8-4DB0-BAA6-7D996DB83F32}" destId="{FFAB1546-EE89-4905-B200-014D9D15DEB5}" srcOrd="0" destOrd="0" presId="urn:microsoft.com/office/officeart/2005/8/layout/process2"/>
-    <dgm:cxn modelId="{17625CDE-390A-4A16-A1DA-1A2728D2592E}" srcId="{831248B5-42BE-41CC-B00B-93FDF821FE9F}" destId="{B0120D59-46F5-4609-8A90-D19147655A7C}" srcOrd="2" destOrd="0" parTransId="{8B65003E-F843-4BAC-92BF-31469B2EB546}" sibTransId="{05504F13-8F6D-4A96-A060-7C7C04BCCDC5}"/>
     <dgm:cxn modelId="{88F421F2-D2A7-469A-8DCA-2378615C3DC3}" type="presOf" srcId="{6BB4A08D-9009-408D-A672-847AAAD9D481}" destId="{DE8A9ADE-4EA7-4E5F-9B22-8F0A88EF3F94}" srcOrd="0" destOrd="0" presId="urn:microsoft.com/office/officeart/2005/8/layout/process2"/>
-    <dgm:cxn modelId="{62E71CF5-02C6-426F-B29D-352D349A767B}" type="presOf" srcId="{831248B5-42BE-41CC-B00B-93FDF821FE9F}" destId="{D7B6869B-4E62-4ED6-98D4-117812227983}" srcOrd="0" destOrd="0" presId="urn:microsoft.com/office/officeart/2005/8/layout/process2"/>
-    <dgm:cxn modelId="{AFB1F2F6-1307-4941-86BA-4A12F4B9B558}" type="presOf" srcId="{05504F13-8F6D-4A96-A060-7C7C04BCCDC5}" destId="{C3ADE6CA-9FE3-4A69-9EF9-3DEB92BC6215}" srcOrd="0" destOrd="0" presId="urn:microsoft.com/office/officeart/2005/8/layout/process2"/>
     <dgm:cxn modelId="{7951D0FC-694C-465C-9AEF-49EFD7FC6F31}" srcId="{831248B5-42BE-41CC-B00B-93FDF821FE9F}" destId="{F77B9BF5-4593-4B18-BA5C-8BE2B8071A44}" srcOrd="5" destOrd="0" parTransId="{AB9DBF93-67DD-431C-9F2B-6F4233019072}" sibTransId="{B8A5FD80-BDA8-4DB0-BAA6-7D996DB83F32}"/>
     <dgm:cxn modelId="{E5C19EE4-CFFB-483E-A68C-7DCC76A5FFC6}" type="presParOf" srcId="{D7B6869B-4E62-4ED6-98D4-117812227983}" destId="{189D6A4B-21E2-4FCD-A1A9-B0A37070679D}" srcOrd="0" destOrd="0" presId="urn:microsoft.com/office/officeart/2005/8/layout/process2"/>
     <dgm:cxn modelId="{5BF10D62-1437-4C72-9C38-50537DECC45B}" type="presParOf" srcId="{D7B6869B-4E62-4ED6-98D4-117812227983}" destId="{E5D9E9D1-B554-4B69-88C2-23DB15039166}" srcOrd="1" destOrd="0" presId="urn:microsoft.com/office/officeart/2005/8/layout/process2"/>
@@ -3457,6 +3692,13 @@
         </dgm:presLayoutVars>
       </dgm:prSet>
       <dgm:spPr/>
+      <dgm:t>
+        <a:bodyPr/>
+        <a:lstStyle/>
+        <a:p>
+          <a:endParaRPr lang="en-US"/>
+        </a:p>
+      </dgm:t>
     </dgm:pt>
     <dgm:pt modelId="{BE10170A-FDA7-46C6-8080-0CD272A11F79}" type="pres">
       <dgm:prSet presAssocID="{A50D5CE9-E57C-47DB-BC25-0E5B3A25D369}" presName="node" presStyleLbl="node1" presStyleIdx="0" presStyleCnt="6">
@@ -3465,14 +3707,35 @@
         </dgm:presLayoutVars>
       </dgm:prSet>
       <dgm:spPr/>
+      <dgm:t>
+        <a:bodyPr/>
+        <a:lstStyle/>
+        <a:p>
+          <a:endParaRPr lang="en-US"/>
+        </a:p>
+      </dgm:t>
     </dgm:pt>
     <dgm:pt modelId="{9CB5DCF6-A9AB-46CF-8F54-44562297832B}" type="pres">
       <dgm:prSet presAssocID="{6BB16651-A2C7-44E6-8B71-595F1464C6E6}" presName="sibTrans" presStyleLbl="sibTrans2D1" presStyleIdx="0" presStyleCnt="6"/>
       <dgm:spPr/>
+      <dgm:t>
+        <a:bodyPr/>
+        <a:lstStyle/>
+        <a:p>
+          <a:endParaRPr lang="en-US"/>
+        </a:p>
+      </dgm:t>
     </dgm:pt>
     <dgm:pt modelId="{532A4D80-CC45-47DE-9B33-C25D9F0311CD}" type="pres">
       <dgm:prSet presAssocID="{6BB16651-A2C7-44E6-8B71-595F1464C6E6}" presName="connectorText" presStyleLbl="sibTrans2D1" presStyleIdx="0" presStyleCnt="6"/>
       <dgm:spPr/>
+      <dgm:t>
+        <a:bodyPr/>
+        <a:lstStyle/>
+        <a:p>
+          <a:endParaRPr lang="en-US"/>
+        </a:p>
+      </dgm:t>
     </dgm:pt>
     <dgm:pt modelId="{10C40DD1-8F53-4982-AE25-5D301BBB4035}" type="pres">
       <dgm:prSet presAssocID="{48370AF3-FC86-4D8C-8C54-83EAC2041CE6}" presName="node" presStyleLbl="node1" presStyleIdx="1" presStyleCnt="6">
@@ -3481,14 +3744,35 @@
         </dgm:presLayoutVars>
       </dgm:prSet>
       <dgm:spPr/>
+      <dgm:t>
+        <a:bodyPr/>
+        <a:lstStyle/>
+        <a:p>
+          <a:endParaRPr lang="en-US"/>
+        </a:p>
+      </dgm:t>
     </dgm:pt>
     <dgm:pt modelId="{AF055774-033E-4FAB-99C5-EF82DA73AF6B}" type="pres">
       <dgm:prSet presAssocID="{F7548831-CA11-41DD-8ECC-17CA536DA611}" presName="sibTrans" presStyleLbl="sibTrans2D1" presStyleIdx="1" presStyleCnt="6"/>
       <dgm:spPr/>
+      <dgm:t>
+        <a:bodyPr/>
+        <a:lstStyle/>
+        <a:p>
+          <a:endParaRPr lang="en-US"/>
+        </a:p>
+      </dgm:t>
     </dgm:pt>
     <dgm:pt modelId="{4E111617-F5D3-4634-A4E7-55A35BA10C3B}" type="pres">
       <dgm:prSet presAssocID="{F7548831-CA11-41DD-8ECC-17CA536DA611}" presName="connectorText" presStyleLbl="sibTrans2D1" presStyleIdx="1" presStyleCnt="6"/>
       <dgm:spPr/>
+      <dgm:t>
+        <a:bodyPr/>
+        <a:lstStyle/>
+        <a:p>
+          <a:endParaRPr lang="en-US"/>
+        </a:p>
+      </dgm:t>
     </dgm:pt>
     <dgm:pt modelId="{6B2B7F8F-AC97-4494-991D-C5A102C5BF61}" type="pres">
       <dgm:prSet presAssocID="{1DF69D38-253C-4136-A31C-13D074756DBD}" presName="node" presStyleLbl="node1" presStyleIdx="2" presStyleCnt="6">
@@ -3497,14 +3781,35 @@
         </dgm:presLayoutVars>
       </dgm:prSet>
       <dgm:spPr/>
+      <dgm:t>
+        <a:bodyPr/>
+        <a:lstStyle/>
+        <a:p>
+          <a:endParaRPr lang="en-US"/>
+        </a:p>
+      </dgm:t>
     </dgm:pt>
     <dgm:pt modelId="{8B3EA9F3-EF7C-4031-8349-AFC02CD2E8E9}" type="pres">
       <dgm:prSet presAssocID="{18589C4B-236C-4770-ACA6-5F2BC1925825}" presName="sibTrans" presStyleLbl="sibTrans2D1" presStyleIdx="2" presStyleCnt="6"/>
       <dgm:spPr/>
+      <dgm:t>
+        <a:bodyPr/>
+        <a:lstStyle/>
+        <a:p>
+          <a:endParaRPr lang="en-US"/>
+        </a:p>
+      </dgm:t>
     </dgm:pt>
     <dgm:pt modelId="{76D2A737-E894-45DA-A9E2-0913B236F12E}" type="pres">
       <dgm:prSet presAssocID="{18589C4B-236C-4770-ACA6-5F2BC1925825}" presName="connectorText" presStyleLbl="sibTrans2D1" presStyleIdx="2" presStyleCnt="6"/>
       <dgm:spPr/>
+      <dgm:t>
+        <a:bodyPr/>
+        <a:lstStyle/>
+        <a:p>
+          <a:endParaRPr lang="en-US"/>
+        </a:p>
+      </dgm:t>
     </dgm:pt>
     <dgm:pt modelId="{B38A756C-2FBC-4753-8A72-C64909D7B55D}" type="pres">
       <dgm:prSet presAssocID="{82D99C4C-3601-4F2B-B062-F76B7FA58351}" presName="node" presStyleLbl="node1" presStyleIdx="3" presStyleCnt="6">
@@ -3513,14 +3818,35 @@
         </dgm:presLayoutVars>
       </dgm:prSet>
       <dgm:spPr/>
+      <dgm:t>
+        <a:bodyPr/>
+        <a:lstStyle/>
+        <a:p>
+          <a:endParaRPr lang="en-US"/>
+        </a:p>
+      </dgm:t>
     </dgm:pt>
     <dgm:pt modelId="{C0492A94-958F-4DF2-8E31-D0E5D431B110}" type="pres">
       <dgm:prSet presAssocID="{2CEB24EB-0E4B-4978-B141-AD1017CE08DB}" presName="sibTrans" presStyleLbl="sibTrans2D1" presStyleIdx="3" presStyleCnt="6"/>
       <dgm:spPr/>
+      <dgm:t>
+        <a:bodyPr/>
+        <a:lstStyle/>
+        <a:p>
+          <a:endParaRPr lang="en-US"/>
+        </a:p>
+      </dgm:t>
     </dgm:pt>
     <dgm:pt modelId="{5BD3947E-EAF4-4999-8F41-16C31CDD1897}" type="pres">
       <dgm:prSet presAssocID="{2CEB24EB-0E4B-4978-B141-AD1017CE08DB}" presName="connectorText" presStyleLbl="sibTrans2D1" presStyleIdx="3" presStyleCnt="6"/>
       <dgm:spPr/>
+      <dgm:t>
+        <a:bodyPr/>
+        <a:lstStyle/>
+        <a:p>
+          <a:endParaRPr lang="en-US"/>
+        </a:p>
+      </dgm:t>
     </dgm:pt>
     <dgm:pt modelId="{1AD34968-D5D1-4171-B98B-6A348B13B975}" type="pres">
       <dgm:prSet presAssocID="{7D0E5FE9-BEBD-455F-9242-519724FB6C96}" presName="node" presStyleLbl="node1" presStyleIdx="4" presStyleCnt="6">
@@ -3529,14 +3855,35 @@
         </dgm:presLayoutVars>
       </dgm:prSet>
       <dgm:spPr/>
+      <dgm:t>
+        <a:bodyPr/>
+        <a:lstStyle/>
+        <a:p>
+          <a:endParaRPr lang="en-US"/>
+        </a:p>
+      </dgm:t>
     </dgm:pt>
     <dgm:pt modelId="{3FD4A819-E359-4474-A779-65CA5E4E5F5E}" type="pres">
       <dgm:prSet presAssocID="{CB2D6001-FAA4-49C6-8385-9A9576EB7A0B}" presName="sibTrans" presStyleLbl="sibTrans2D1" presStyleIdx="4" presStyleCnt="6"/>
       <dgm:spPr/>
+      <dgm:t>
+        <a:bodyPr/>
+        <a:lstStyle/>
+        <a:p>
+          <a:endParaRPr lang="en-US"/>
+        </a:p>
+      </dgm:t>
     </dgm:pt>
     <dgm:pt modelId="{D229D606-AC96-466B-9F97-EAB3C96DE430}" type="pres">
       <dgm:prSet presAssocID="{CB2D6001-FAA4-49C6-8385-9A9576EB7A0B}" presName="connectorText" presStyleLbl="sibTrans2D1" presStyleIdx="4" presStyleCnt="6"/>
       <dgm:spPr/>
+      <dgm:t>
+        <a:bodyPr/>
+        <a:lstStyle/>
+        <a:p>
+          <a:endParaRPr lang="en-US"/>
+        </a:p>
+      </dgm:t>
     </dgm:pt>
     <dgm:pt modelId="{372A6A97-E412-4CCA-A607-235CF3A22C9C}" type="pres">
       <dgm:prSet presAssocID="{9C08A4B8-0C14-4C76-8B82-048ACA771F15}" presName="node" presStyleLbl="node1" presStyleIdx="5" presStyleCnt="6">
@@ -3545,42 +3892,63 @@
         </dgm:presLayoutVars>
       </dgm:prSet>
       <dgm:spPr/>
+      <dgm:t>
+        <a:bodyPr/>
+        <a:lstStyle/>
+        <a:p>
+          <a:endParaRPr lang="en-US"/>
+        </a:p>
+      </dgm:t>
     </dgm:pt>
     <dgm:pt modelId="{B33D451D-E7ED-453E-BBDD-2A7104931649}" type="pres">
       <dgm:prSet presAssocID="{9928AC29-F93D-4104-B656-07B79942F478}" presName="sibTrans" presStyleLbl="sibTrans2D1" presStyleIdx="5" presStyleCnt="6"/>
       <dgm:spPr/>
+      <dgm:t>
+        <a:bodyPr/>
+        <a:lstStyle/>
+        <a:p>
+          <a:endParaRPr lang="en-US"/>
+        </a:p>
+      </dgm:t>
     </dgm:pt>
     <dgm:pt modelId="{F23F354F-B930-43EC-A3E6-2AA7B3937FDE}" type="pres">
       <dgm:prSet presAssocID="{9928AC29-F93D-4104-B656-07B79942F478}" presName="connectorText" presStyleLbl="sibTrans2D1" presStyleIdx="5" presStyleCnt="6"/>
       <dgm:spPr/>
+      <dgm:t>
+        <a:bodyPr/>
+        <a:lstStyle/>
+        <a:p>
+          <a:endParaRPr lang="en-US"/>
+        </a:p>
+      </dgm:t>
     </dgm:pt>
   </dgm:ptLst>
   <dgm:cxnLst>
-    <dgm:cxn modelId="{2A800102-3E86-4CE6-B237-FF976FE460A5}" type="presOf" srcId="{18589C4B-236C-4770-ACA6-5F2BC1925825}" destId="{8B3EA9F3-EF7C-4031-8349-AFC02CD2E8E9}" srcOrd="0" destOrd="0" presId="urn:microsoft.com/office/officeart/2005/8/layout/cycle2"/>
-    <dgm:cxn modelId="{73A6D81D-B121-4772-B9DC-D989684794EC}" type="presOf" srcId="{9928AC29-F93D-4104-B656-07B79942F478}" destId="{B33D451D-E7ED-453E-BBDD-2A7104931649}" srcOrd="0" destOrd="0" presId="urn:microsoft.com/office/officeart/2005/8/layout/cycle2"/>
-    <dgm:cxn modelId="{7B997E21-E386-4BDB-BA73-FEFE3B52E673}" type="presOf" srcId="{1DF69D38-253C-4136-A31C-13D074756DBD}" destId="{6B2B7F8F-AC97-4494-991D-C5A102C5BF61}" srcOrd="0" destOrd="0" presId="urn:microsoft.com/office/officeart/2005/8/layout/cycle2"/>
-    <dgm:cxn modelId="{B8047E24-67A3-4FF3-A06A-9E28AB623A31}" type="presOf" srcId="{F7548831-CA11-41DD-8ECC-17CA536DA611}" destId="{AF055774-033E-4FAB-99C5-EF82DA73AF6B}" srcOrd="0" destOrd="0" presId="urn:microsoft.com/office/officeart/2005/8/layout/cycle2"/>
-    <dgm:cxn modelId="{D7756D26-48D8-4543-8ECF-B43045B6A7A2}" type="presOf" srcId="{6BB16651-A2C7-44E6-8B71-595F1464C6E6}" destId="{9CB5DCF6-A9AB-46CF-8F54-44562297832B}" srcOrd="0" destOrd="0" presId="urn:microsoft.com/office/officeart/2005/8/layout/cycle2"/>
-    <dgm:cxn modelId="{6C92652C-2ECF-4C26-BCCB-EFA2B76571F3}" type="presOf" srcId="{CB2D6001-FAA4-49C6-8385-9A9576EB7A0B}" destId="{D229D606-AC96-466B-9F97-EAB3C96DE430}" srcOrd="1" destOrd="0" presId="urn:microsoft.com/office/officeart/2005/8/layout/cycle2"/>
-    <dgm:cxn modelId="{656CE130-0515-41FF-B2F2-2BD43856E3D0}" srcId="{7D813336-3D77-46FD-BFBE-B927186F4EE8}" destId="{7D0E5FE9-BEBD-455F-9242-519724FB6C96}" srcOrd="4" destOrd="0" parTransId="{594E2760-2BA1-4C56-8104-2C3A58C07462}" sibTransId="{CB2D6001-FAA4-49C6-8385-9A9576EB7A0B}"/>
-    <dgm:cxn modelId="{48826F36-B9DF-44EC-8ED7-EAA8DE65A165}" type="presOf" srcId="{2CEB24EB-0E4B-4978-B141-AD1017CE08DB}" destId="{C0492A94-958F-4DF2-8E31-D0E5D431B110}" srcOrd="0" destOrd="0" presId="urn:microsoft.com/office/officeart/2005/8/layout/cycle2"/>
-    <dgm:cxn modelId="{4E474562-B74A-44EB-B45F-D3DD735B2501}" srcId="{7D813336-3D77-46FD-BFBE-B927186F4EE8}" destId="{82D99C4C-3601-4F2B-B062-F76B7FA58351}" srcOrd="3" destOrd="0" parTransId="{3F9BE72A-4745-41D5-8CC6-99AC9FE77223}" sibTransId="{2CEB24EB-0E4B-4978-B141-AD1017CE08DB}"/>
-    <dgm:cxn modelId="{1EDB6766-CD7C-4414-9C27-EBE463506CFF}" srcId="{7D813336-3D77-46FD-BFBE-B927186F4EE8}" destId="{9C08A4B8-0C14-4C76-8B82-048ACA771F15}" srcOrd="5" destOrd="0" parTransId="{28249315-D3C7-43BE-B88A-6DD1138B7A0C}" sibTransId="{9928AC29-F93D-4104-B656-07B79942F478}"/>
-    <dgm:cxn modelId="{4A6FDB47-80DA-4A96-8D2C-B887792CB495}" type="presOf" srcId="{9C08A4B8-0C14-4C76-8B82-048ACA771F15}" destId="{372A6A97-E412-4CCA-A607-235CF3A22C9C}" srcOrd="0" destOrd="0" presId="urn:microsoft.com/office/officeart/2005/8/layout/cycle2"/>
-    <dgm:cxn modelId="{A150B94E-B2C2-4D6C-9C4B-F76456348E67}" srcId="{7D813336-3D77-46FD-BFBE-B927186F4EE8}" destId="{48370AF3-FC86-4D8C-8C54-83EAC2041CE6}" srcOrd="1" destOrd="0" parTransId="{AB741C83-841B-426D-A5E0-6EEA4C052CE4}" sibTransId="{F7548831-CA11-41DD-8ECC-17CA536DA611}"/>
-    <dgm:cxn modelId="{8A9D6073-56F9-4A3D-A71D-5DB15EB2E2ED}" type="presOf" srcId="{A50D5CE9-E57C-47DB-BC25-0E5B3A25D369}" destId="{BE10170A-FDA7-46C6-8080-0CD272A11F79}" srcOrd="0" destOrd="0" presId="urn:microsoft.com/office/officeart/2005/8/layout/cycle2"/>
-    <dgm:cxn modelId="{E422C681-256E-41AA-A0D8-4F7AD719AE70}" type="presOf" srcId="{18589C4B-236C-4770-ACA6-5F2BC1925825}" destId="{76D2A737-E894-45DA-A9E2-0913B236F12E}" srcOrd="1" destOrd="0" presId="urn:microsoft.com/office/officeart/2005/8/layout/cycle2"/>
-    <dgm:cxn modelId="{E4650F96-8B96-45DB-9B8B-739BA4DAFC00}" type="presOf" srcId="{2CEB24EB-0E4B-4978-B141-AD1017CE08DB}" destId="{5BD3947E-EAF4-4999-8F41-16C31CDD1897}" srcOrd="1" destOrd="0" presId="urn:microsoft.com/office/officeart/2005/8/layout/cycle2"/>
-    <dgm:cxn modelId="{5A8FC996-E36A-4A4D-B9A9-E0F5F95CDF30}" type="presOf" srcId="{7D0E5FE9-BEBD-455F-9242-519724FB6C96}" destId="{1AD34968-D5D1-4171-B98B-6A348B13B975}" srcOrd="0" destOrd="0" presId="urn:microsoft.com/office/officeart/2005/8/layout/cycle2"/>
-    <dgm:cxn modelId="{6B494198-39DB-42F7-8AB5-4A5BE7D87F39}" type="presOf" srcId="{9928AC29-F93D-4104-B656-07B79942F478}" destId="{F23F354F-B930-43EC-A3E6-2AA7B3937FDE}" srcOrd="1" destOrd="0" presId="urn:microsoft.com/office/officeart/2005/8/layout/cycle2"/>
-    <dgm:cxn modelId="{5DE7A598-F75C-47B9-8814-209880B6FE11}" srcId="{7D813336-3D77-46FD-BFBE-B927186F4EE8}" destId="{1DF69D38-253C-4136-A31C-13D074756DBD}" srcOrd="2" destOrd="0" parTransId="{7471E316-4330-4726-8E0C-E8DF4CBE672C}" sibTransId="{18589C4B-236C-4770-ACA6-5F2BC1925825}"/>
-    <dgm:cxn modelId="{E7A5AF9B-C11A-40EC-9AE6-7726E1A9A711}" type="presOf" srcId="{F7548831-CA11-41DD-8ECC-17CA536DA611}" destId="{4E111617-F5D3-4634-A4E7-55A35BA10C3B}" srcOrd="1" destOrd="0" presId="urn:microsoft.com/office/officeart/2005/8/layout/cycle2"/>
-    <dgm:cxn modelId="{072D75B5-AE8A-4BF9-813C-52F86070C69F}" type="presOf" srcId="{82D99C4C-3601-4F2B-B062-F76B7FA58351}" destId="{B38A756C-2FBC-4753-8A72-C64909D7B55D}" srcOrd="0" destOrd="0" presId="urn:microsoft.com/office/officeart/2005/8/layout/cycle2"/>
-    <dgm:cxn modelId="{A7F74FB7-397D-4268-8170-C932BF344E33}" type="presOf" srcId="{48370AF3-FC86-4D8C-8C54-83EAC2041CE6}" destId="{10C40DD1-8F53-4982-AE25-5D301BBB4035}" srcOrd="0" destOrd="0" presId="urn:microsoft.com/office/officeart/2005/8/layout/cycle2"/>
-    <dgm:cxn modelId="{E25464BC-A09B-48BD-B113-8CA3576F5146}" type="presOf" srcId="{CB2D6001-FAA4-49C6-8385-9A9576EB7A0B}" destId="{3FD4A819-E359-4474-A779-65CA5E4E5F5E}" srcOrd="0" destOrd="0" presId="urn:microsoft.com/office/officeart/2005/8/layout/cycle2"/>
-    <dgm:cxn modelId="{64927DD7-80D9-485A-AE3F-823FDF4E1B88}" type="presOf" srcId="{7D813336-3D77-46FD-BFBE-B927186F4EE8}" destId="{1F7049C3-AAE1-4856-8433-BA85AFDAFBB4}" srcOrd="0" destOrd="0" presId="urn:microsoft.com/office/officeart/2005/8/layout/cycle2"/>
     <dgm:cxn modelId="{59B76DF1-434E-481D-A352-8E17439334E8}" type="presOf" srcId="{6BB16651-A2C7-44E6-8B71-595F1464C6E6}" destId="{532A4D80-CC45-47DE-9B33-C25D9F0311CD}" srcOrd="1" destOrd="0" presId="urn:microsoft.com/office/officeart/2005/8/layout/cycle2"/>
     <dgm:cxn modelId="{3476ECF5-227F-4D63-9092-E8019B1A260C}" srcId="{7D813336-3D77-46FD-BFBE-B927186F4EE8}" destId="{A50D5CE9-E57C-47DB-BC25-0E5B3A25D369}" srcOrd="0" destOrd="0" parTransId="{97BD9E98-8AC2-41C2-9323-5F440CC4246A}" sibTransId="{6BB16651-A2C7-44E6-8B71-595F1464C6E6}"/>
+    <dgm:cxn modelId="{4A6FDB47-80DA-4A96-8D2C-B887792CB495}" type="presOf" srcId="{9C08A4B8-0C14-4C76-8B82-048ACA771F15}" destId="{372A6A97-E412-4CCA-A607-235CF3A22C9C}" srcOrd="0" destOrd="0" presId="urn:microsoft.com/office/officeart/2005/8/layout/cycle2"/>
+    <dgm:cxn modelId="{5DE7A598-F75C-47B9-8814-209880B6FE11}" srcId="{7D813336-3D77-46FD-BFBE-B927186F4EE8}" destId="{1DF69D38-253C-4136-A31C-13D074756DBD}" srcOrd="2" destOrd="0" parTransId="{7471E316-4330-4726-8E0C-E8DF4CBE672C}" sibTransId="{18589C4B-236C-4770-ACA6-5F2BC1925825}"/>
+    <dgm:cxn modelId="{2A800102-3E86-4CE6-B237-FF976FE460A5}" type="presOf" srcId="{18589C4B-236C-4770-ACA6-5F2BC1925825}" destId="{8B3EA9F3-EF7C-4031-8349-AFC02CD2E8E9}" srcOrd="0" destOrd="0" presId="urn:microsoft.com/office/officeart/2005/8/layout/cycle2"/>
+    <dgm:cxn modelId="{B8047E24-67A3-4FF3-A06A-9E28AB623A31}" type="presOf" srcId="{F7548831-CA11-41DD-8ECC-17CA536DA611}" destId="{AF055774-033E-4FAB-99C5-EF82DA73AF6B}" srcOrd="0" destOrd="0" presId="urn:microsoft.com/office/officeart/2005/8/layout/cycle2"/>
+    <dgm:cxn modelId="{8A9D6073-56F9-4A3D-A71D-5DB15EB2E2ED}" type="presOf" srcId="{A50D5CE9-E57C-47DB-BC25-0E5B3A25D369}" destId="{BE10170A-FDA7-46C6-8080-0CD272A11F79}" srcOrd="0" destOrd="0" presId="urn:microsoft.com/office/officeart/2005/8/layout/cycle2"/>
+    <dgm:cxn modelId="{4E474562-B74A-44EB-B45F-D3DD735B2501}" srcId="{7D813336-3D77-46FD-BFBE-B927186F4EE8}" destId="{82D99C4C-3601-4F2B-B062-F76B7FA58351}" srcOrd="3" destOrd="0" parTransId="{3F9BE72A-4745-41D5-8CC6-99AC9FE77223}" sibTransId="{2CEB24EB-0E4B-4978-B141-AD1017CE08DB}"/>
+    <dgm:cxn modelId="{64927DD7-80D9-485A-AE3F-823FDF4E1B88}" type="presOf" srcId="{7D813336-3D77-46FD-BFBE-B927186F4EE8}" destId="{1F7049C3-AAE1-4856-8433-BA85AFDAFBB4}" srcOrd="0" destOrd="0" presId="urn:microsoft.com/office/officeart/2005/8/layout/cycle2"/>
+    <dgm:cxn modelId="{7B997E21-E386-4BDB-BA73-FEFE3B52E673}" type="presOf" srcId="{1DF69D38-253C-4136-A31C-13D074756DBD}" destId="{6B2B7F8F-AC97-4494-991D-C5A102C5BF61}" srcOrd="0" destOrd="0" presId="urn:microsoft.com/office/officeart/2005/8/layout/cycle2"/>
+    <dgm:cxn modelId="{1EDB6766-CD7C-4414-9C27-EBE463506CFF}" srcId="{7D813336-3D77-46FD-BFBE-B927186F4EE8}" destId="{9C08A4B8-0C14-4C76-8B82-048ACA771F15}" srcOrd="5" destOrd="0" parTransId="{28249315-D3C7-43BE-B88A-6DD1138B7A0C}" sibTransId="{9928AC29-F93D-4104-B656-07B79942F478}"/>
+    <dgm:cxn modelId="{6B494198-39DB-42F7-8AB5-4A5BE7D87F39}" type="presOf" srcId="{9928AC29-F93D-4104-B656-07B79942F478}" destId="{F23F354F-B930-43EC-A3E6-2AA7B3937FDE}" srcOrd="1" destOrd="0" presId="urn:microsoft.com/office/officeart/2005/8/layout/cycle2"/>
+    <dgm:cxn modelId="{E25464BC-A09B-48BD-B113-8CA3576F5146}" type="presOf" srcId="{CB2D6001-FAA4-49C6-8385-9A9576EB7A0B}" destId="{3FD4A819-E359-4474-A779-65CA5E4E5F5E}" srcOrd="0" destOrd="0" presId="urn:microsoft.com/office/officeart/2005/8/layout/cycle2"/>
+    <dgm:cxn modelId="{A7F74FB7-397D-4268-8170-C932BF344E33}" type="presOf" srcId="{48370AF3-FC86-4D8C-8C54-83EAC2041CE6}" destId="{10C40DD1-8F53-4982-AE25-5D301BBB4035}" srcOrd="0" destOrd="0" presId="urn:microsoft.com/office/officeart/2005/8/layout/cycle2"/>
+    <dgm:cxn modelId="{E422C681-256E-41AA-A0D8-4F7AD719AE70}" type="presOf" srcId="{18589C4B-236C-4770-ACA6-5F2BC1925825}" destId="{76D2A737-E894-45DA-A9E2-0913B236F12E}" srcOrd="1" destOrd="0" presId="urn:microsoft.com/office/officeart/2005/8/layout/cycle2"/>
+    <dgm:cxn modelId="{072D75B5-AE8A-4BF9-813C-52F86070C69F}" type="presOf" srcId="{82D99C4C-3601-4F2B-B062-F76B7FA58351}" destId="{B38A756C-2FBC-4753-8A72-C64909D7B55D}" srcOrd="0" destOrd="0" presId="urn:microsoft.com/office/officeart/2005/8/layout/cycle2"/>
+    <dgm:cxn modelId="{73A6D81D-B121-4772-B9DC-D989684794EC}" type="presOf" srcId="{9928AC29-F93D-4104-B656-07B79942F478}" destId="{B33D451D-E7ED-453E-BBDD-2A7104931649}" srcOrd="0" destOrd="0" presId="urn:microsoft.com/office/officeart/2005/8/layout/cycle2"/>
+    <dgm:cxn modelId="{D7756D26-48D8-4543-8ECF-B43045B6A7A2}" type="presOf" srcId="{6BB16651-A2C7-44E6-8B71-595F1464C6E6}" destId="{9CB5DCF6-A9AB-46CF-8F54-44562297832B}" srcOrd="0" destOrd="0" presId="urn:microsoft.com/office/officeart/2005/8/layout/cycle2"/>
+    <dgm:cxn modelId="{A150B94E-B2C2-4D6C-9C4B-F76456348E67}" srcId="{7D813336-3D77-46FD-BFBE-B927186F4EE8}" destId="{48370AF3-FC86-4D8C-8C54-83EAC2041CE6}" srcOrd="1" destOrd="0" parTransId="{AB741C83-841B-426D-A5E0-6EEA4C052CE4}" sibTransId="{F7548831-CA11-41DD-8ECC-17CA536DA611}"/>
+    <dgm:cxn modelId="{5A8FC996-E36A-4A4D-B9A9-E0F5F95CDF30}" type="presOf" srcId="{7D0E5FE9-BEBD-455F-9242-519724FB6C96}" destId="{1AD34968-D5D1-4171-B98B-6A348B13B975}" srcOrd="0" destOrd="0" presId="urn:microsoft.com/office/officeart/2005/8/layout/cycle2"/>
+    <dgm:cxn modelId="{E4650F96-8B96-45DB-9B8B-739BA4DAFC00}" type="presOf" srcId="{2CEB24EB-0E4B-4978-B141-AD1017CE08DB}" destId="{5BD3947E-EAF4-4999-8F41-16C31CDD1897}" srcOrd="1" destOrd="0" presId="urn:microsoft.com/office/officeart/2005/8/layout/cycle2"/>
+    <dgm:cxn modelId="{48826F36-B9DF-44EC-8ED7-EAA8DE65A165}" type="presOf" srcId="{2CEB24EB-0E4B-4978-B141-AD1017CE08DB}" destId="{C0492A94-958F-4DF2-8E31-D0E5D431B110}" srcOrd="0" destOrd="0" presId="urn:microsoft.com/office/officeart/2005/8/layout/cycle2"/>
+    <dgm:cxn modelId="{6C92652C-2ECF-4C26-BCCB-EFA2B76571F3}" type="presOf" srcId="{CB2D6001-FAA4-49C6-8385-9A9576EB7A0B}" destId="{D229D606-AC96-466B-9F97-EAB3C96DE430}" srcOrd="1" destOrd="0" presId="urn:microsoft.com/office/officeart/2005/8/layout/cycle2"/>
+    <dgm:cxn modelId="{E7A5AF9B-C11A-40EC-9AE6-7726E1A9A711}" type="presOf" srcId="{F7548831-CA11-41DD-8ECC-17CA536DA611}" destId="{4E111617-F5D3-4634-A4E7-55A35BA10C3B}" srcOrd="1" destOrd="0" presId="urn:microsoft.com/office/officeart/2005/8/layout/cycle2"/>
+    <dgm:cxn modelId="{656CE130-0515-41FF-B2F2-2BD43856E3D0}" srcId="{7D813336-3D77-46FD-BFBE-B927186F4EE8}" destId="{7D0E5FE9-BEBD-455F-9242-519724FB6C96}" srcOrd="4" destOrd="0" parTransId="{594E2760-2BA1-4C56-8104-2C3A58C07462}" sibTransId="{CB2D6001-FAA4-49C6-8385-9A9576EB7A0B}"/>
     <dgm:cxn modelId="{755746E8-407D-44DE-81DE-2817DFAC9717}" type="presParOf" srcId="{1F7049C3-AAE1-4856-8433-BA85AFDAFBB4}" destId="{BE10170A-FDA7-46C6-8080-0CD272A11F79}" srcOrd="0" destOrd="0" presId="urn:microsoft.com/office/officeart/2005/8/layout/cycle2"/>
     <dgm:cxn modelId="{3CC0E0F5-28E0-4741-9540-40DA4F37F3CB}" type="presParOf" srcId="{1F7049C3-AAE1-4856-8433-BA85AFDAFBB4}" destId="{9CB5DCF6-A9AB-46CF-8F54-44562297832B}" srcOrd="1" destOrd="0" presId="urn:microsoft.com/office/officeart/2005/8/layout/cycle2"/>
     <dgm:cxn modelId="{754C5F5A-FF0E-468D-9F76-F99066A63CA1}" type="presParOf" srcId="{9CB5DCF6-A9AB-46CF-8F54-44562297832B}" destId="{532A4D80-CC45-47DE-9B33-C25D9F0311CD}" srcOrd="0" destOrd="0" presId="urn:microsoft.com/office/officeart/2005/8/layout/cycle2"/>
@@ -3675,7 +4043,7 @@
         </a:bodyPr>
         <a:lstStyle/>
         <a:p>
-          <a:pPr marL="0" lvl="0" indent="0" algn="ctr" defTabSz="844550">
+          <a:pPr lvl="0" algn="ctr" defTabSz="844550">
             <a:lnSpc>
               <a:spcPct val="90000"/>
             </a:lnSpc>
@@ -3685,7 +4053,6 @@
             <a:spcAft>
               <a:spcPct val="35000"/>
             </a:spcAft>
-            <a:buNone/>
           </a:pPr>
           <a:r>
             <a:rPr lang="en-US" sz="1900" kern="1200"/>
@@ -3748,7 +4115,7 @@
         </a:bodyPr>
         <a:lstStyle/>
         <a:p>
-          <a:pPr marL="0" lvl="0" indent="0" algn="ctr" defTabSz="666750">
+          <a:pPr lvl="0" algn="ctr" defTabSz="666750">
             <a:lnSpc>
               <a:spcPct val="90000"/>
             </a:lnSpc>
@@ -3758,7 +4125,6 @@
             <a:spcAft>
               <a:spcPct val="35000"/>
             </a:spcAft>
-            <a:buNone/>
           </a:pPr>
           <a:endParaRPr lang="en-US" sz="1500" kern="1200"/>
         </a:p>
@@ -3820,7 +4186,7 @@
         </a:bodyPr>
         <a:lstStyle/>
         <a:p>
-          <a:pPr marL="0" lvl="0" indent="0" algn="ctr" defTabSz="844550">
+          <a:pPr lvl="0" algn="ctr" defTabSz="844550">
             <a:lnSpc>
               <a:spcPct val="90000"/>
             </a:lnSpc>
@@ -3830,7 +4196,6 @@
             <a:spcAft>
               <a:spcPct val="35000"/>
             </a:spcAft>
-            <a:buNone/>
           </a:pPr>
           <a:r>
             <a:rPr lang="en-US" sz="1900" kern="1200"/>
@@ -3893,7 +4258,7 @@
         </a:bodyPr>
         <a:lstStyle/>
         <a:p>
-          <a:pPr marL="0" lvl="0" indent="0" algn="ctr" defTabSz="666750">
+          <a:pPr lvl="0" algn="ctr" defTabSz="666750">
             <a:lnSpc>
               <a:spcPct val="90000"/>
             </a:lnSpc>
@@ -3903,7 +4268,6 @@
             <a:spcAft>
               <a:spcPct val="35000"/>
             </a:spcAft>
-            <a:buNone/>
           </a:pPr>
           <a:endParaRPr lang="en-US" sz="1500" kern="1200"/>
         </a:p>
@@ -3965,7 +4329,7 @@
         </a:bodyPr>
         <a:lstStyle/>
         <a:p>
-          <a:pPr marL="0" lvl="0" indent="0" algn="ctr" defTabSz="844550">
+          <a:pPr lvl="0" algn="ctr" defTabSz="844550">
             <a:lnSpc>
               <a:spcPct val="90000"/>
             </a:lnSpc>
@@ -3975,7 +4339,6 @@
             <a:spcAft>
               <a:spcPct val="35000"/>
             </a:spcAft>
-            <a:buNone/>
           </a:pPr>
           <a:r>
             <a:rPr lang="en-US" sz="1900" kern="1200"/>
@@ -4038,7 +4401,7 @@
         </a:bodyPr>
         <a:lstStyle/>
         <a:p>
-          <a:pPr marL="0" lvl="0" indent="0" algn="ctr" defTabSz="666750">
+          <a:pPr lvl="0" algn="ctr" defTabSz="666750">
             <a:lnSpc>
               <a:spcPct val="90000"/>
             </a:lnSpc>
@@ -4048,7 +4411,6 @@
             <a:spcAft>
               <a:spcPct val="35000"/>
             </a:spcAft>
-            <a:buNone/>
           </a:pPr>
           <a:endParaRPr lang="en-US" sz="1500" kern="1200"/>
         </a:p>
@@ -4115,7 +4477,7 @@
         </a:bodyPr>
         <a:lstStyle/>
         <a:p>
-          <a:pPr marL="0" lvl="0" indent="0" algn="ctr" defTabSz="844550">
+          <a:pPr lvl="0" algn="ctr" defTabSz="844550">
             <a:lnSpc>
               <a:spcPct val="90000"/>
             </a:lnSpc>
@@ -4125,7 +4487,6 @@
             <a:spcAft>
               <a:spcPct val="35000"/>
             </a:spcAft>
-            <a:buNone/>
           </a:pPr>
           <a:r>
             <a:rPr lang="en-US" sz="1900" kern="1200"/>
@@ -4207,7 +4568,7 @@
         </a:bodyPr>
         <a:lstStyle/>
         <a:p>
-          <a:pPr marL="0" lvl="0" indent="0" algn="ctr" defTabSz="444500">
+          <a:pPr lvl="0" algn="ctr" defTabSz="444500">
             <a:lnSpc>
               <a:spcPct val="90000"/>
             </a:lnSpc>
@@ -4217,7 +4578,6 @@
             <a:spcAft>
               <a:spcPct val="35000"/>
             </a:spcAft>
-            <a:buNone/>
           </a:pPr>
           <a:r>
             <a:rPr lang="en-US" sz="1000" kern="1200"/>
@@ -4280,7 +4640,7 @@
         </a:bodyPr>
         <a:lstStyle/>
         <a:p>
-          <a:pPr marL="0" lvl="0" indent="0" algn="ctr" defTabSz="355600">
+          <a:pPr lvl="0" algn="ctr" defTabSz="355600">
             <a:lnSpc>
               <a:spcPct val="90000"/>
             </a:lnSpc>
@@ -4290,7 +4650,6 @@
             <a:spcAft>
               <a:spcPct val="35000"/>
             </a:spcAft>
-            <a:buNone/>
           </a:pPr>
           <a:endParaRPr lang="en-US" sz="800" kern="1200"/>
         </a:p>
@@ -4352,7 +4711,7 @@
         </a:bodyPr>
         <a:lstStyle/>
         <a:p>
-          <a:pPr marL="0" lvl="0" indent="0" algn="ctr" defTabSz="444500">
+          <a:pPr lvl="0" algn="ctr" defTabSz="444500">
             <a:lnSpc>
               <a:spcPct val="90000"/>
             </a:lnSpc>
@@ -4362,7 +4721,6 @@
             <a:spcAft>
               <a:spcPct val="35000"/>
             </a:spcAft>
-            <a:buNone/>
           </a:pPr>
           <a:r>
             <a:rPr lang="en-US" sz="1000" kern="1200"/>
@@ -4370,7 +4728,7 @@
           </a:r>
         </a:p>
         <a:p>
-          <a:pPr marL="0" lvl="0" indent="0" algn="ctr" defTabSz="444500">
+          <a:pPr lvl="0" algn="ctr" defTabSz="444500">
             <a:lnSpc>
               <a:spcPct val="90000"/>
             </a:lnSpc>
@@ -4380,7 +4738,6 @@
             <a:spcAft>
               <a:spcPct val="35000"/>
             </a:spcAft>
-            <a:buNone/>
           </a:pPr>
           <a:r>
             <a:rPr lang="en-US" sz="1000" kern="1200"/>
@@ -4443,7 +4800,7 @@
         </a:bodyPr>
         <a:lstStyle/>
         <a:p>
-          <a:pPr marL="0" lvl="0" indent="0" algn="ctr" defTabSz="355600">
+          <a:pPr lvl="0" algn="ctr" defTabSz="355600">
             <a:lnSpc>
               <a:spcPct val="90000"/>
             </a:lnSpc>
@@ -4453,7 +4810,6 @@
             <a:spcAft>
               <a:spcPct val="35000"/>
             </a:spcAft>
-            <a:buNone/>
           </a:pPr>
           <a:endParaRPr lang="en-US" sz="800" kern="1200"/>
         </a:p>
@@ -4515,7 +4871,7 @@
         </a:bodyPr>
         <a:lstStyle/>
         <a:p>
-          <a:pPr marL="0" lvl="0" indent="0" algn="ctr" defTabSz="444500">
+          <a:pPr lvl="0" algn="ctr" defTabSz="444500">
             <a:lnSpc>
               <a:spcPct val="90000"/>
             </a:lnSpc>
@@ -4525,7 +4881,6 @@
             <a:spcAft>
               <a:spcPct val="35000"/>
             </a:spcAft>
-            <a:buNone/>
           </a:pPr>
           <a:r>
             <a:rPr lang="en-US" sz="1000" kern="1200"/>
@@ -4533,7 +4888,7 @@
           </a:r>
         </a:p>
         <a:p>
-          <a:pPr marL="0" lvl="0" indent="0" algn="ctr" defTabSz="444500">
+          <a:pPr lvl="0" algn="ctr" defTabSz="444500">
             <a:lnSpc>
               <a:spcPct val="90000"/>
             </a:lnSpc>
@@ -4543,7 +4898,6 @@
             <a:spcAft>
               <a:spcPct val="35000"/>
             </a:spcAft>
-            <a:buNone/>
           </a:pPr>
           <a:r>
             <a:rPr lang="en-US" sz="1000" kern="1200"/>
@@ -4606,7 +4960,7 @@
         </a:bodyPr>
         <a:lstStyle/>
         <a:p>
-          <a:pPr marL="0" lvl="0" indent="0" algn="ctr" defTabSz="355600">
+          <a:pPr lvl="0" algn="ctr" defTabSz="355600">
             <a:lnSpc>
               <a:spcPct val="90000"/>
             </a:lnSpc>
@@ -4616,7 +4970,6 @@
             <a:spcAft>
               <a:spcPct val="35000"/>
             </a:spcAft>
-            <a:buNone/>
           </a:pPr>
           <a:endParaRPr lang="en-US" sz="800" kern="1200"/>
         </a:p>
@@ -4678,7 +5031,7 @@
         </a:bodyPr>
         <a:lstStyle/>
         <a:p>
-          <a:pPr marL="0" lvl="0" indent="0" algn="ctr" defTabSz="444500">
+          <a:pPr lvl="0" algn="ctr" defTabSz="444500">
             <a:lnSpc>
               <a:spcPct val="90000"/>
             </a:lnSpc>
@@ -4688,7 +5041,6 @@
             <a:spcAft>
               <a:spcPct val="35000"/>
             </a:spcAft>
-            <a:buNone/>
           </a:pPr>
           <a:r>
             <a:rPr lang="en-US" sz="1000" kern="1200"/>
@@ -4696,7 +5048,7 @@
           </a:r>
         </a:p>
         <a:p>
-          <a:pPr marL="0" lvl="0" indent="0" algn="ctr" defTabSz="444500">
+          <a:pPr lvl="0" algn="ctr" defTabSz="444500">
             <a:lnSpc>
               <a:spcPct val="90000"/>
             </a:lnSpc>
@@ -4706,7 +5058,6 @@
             <a:spcAft>
               <a:spcPct val="35000"/>
             </a:spcAft>
-            <a:buNone/>
           </a:pPr>
           <a:r>
             <a:rPr lang="en-US" sz="1000" kern="1200"/>
@@ -4769,7 +5120,7 @@
         </a:bodyPr>
         <a:lstStyle/>
         <a:p>
-          <a:pPr marL="0" lvl="0" indent="0" algn="ctr" defTabSz="355600">
+          <a:pPr lvl="0" algn="ctr" defTabSz="355600">
             <a:lnSpc>
               <a:spcPct val="90000"/>
             </a:lnSpc>
@@ -4779,7 +5130,6 @@
             <a:spcAft>
               <a:spcPct val="35000"/>
             </a:spcAft>
-            <a:buNone/>
           </a:pPr>
           <a:endParaRPr lang="en-US" sz="800" kern="1200"/>
         </a:p>
@@ -4841,7 +5191,7 @@
         </a:bodyPr>
         <a:lstStyle/>
         <a:p>
-          <a:pPr marL="0" lvl="0" indent="0" algn="ctr" defTabSz="444500">
+          <a:pPr lvl="0" algn="ctr" defTabSz="444500">
             <a:lnSpc>
               <a:spcPct val="90000"/>
             </a:lnSpc>
@@ -4851,7 +5201,6 @@
             <a:spcAft>
               <a:spcPct val="35000"/>
             </a:spcAft>
-            <a:buNone/>
           </a:pPr>
           <a:r>
             <a:rPr lang="en-US" sz="1000" kern="1200"/>
@@ -4859,7 +5208,7 @@
           </a:r>
         </a:p>
         <a:p>
-          <a:pPr marL="0" lvl="0" indent="0" algn="ctr" defTabSz="444500">
+          <a:pPr lvl="0" algn="ctr" defTabSz="444500">
             <a:lnSpc>
               <a:spcPct val="90000"/>
             </a:lnSpc>
@@ -4869,7 +5218,6 @@
             <a:spcAft>
               <a:spcPct val="35000"/>
             </a:spcAft>
-            <a:buNone/>
           </a:pPr>
           <a:r>
             <a:rPr lang="en-US" sz="1000" kern="1200"/>
@@ -4932,7 +5280,7 @@
         </a:bodyPr>
         <a:lstStyle/>
         <a:p>
-          <a:pPr marL="0" lvl="0" indent="0" algn="ctr" defTabSz="355600">
+          <a:pPr lvl="0" algn="ctr" defTabSz="355600">
             <a:lnSpc>
               <a:spcPct val="90000"/>
             </a:lnSpc>
@@ -4942,7 +5290,6 @@
             <a:spcAft>
               <a:spcPct val="35000"/>
             </a:spcAft>
-            <a:buNone/>
           </a:pPr>
           <a:endParaRPr lang="en-US" sz="800" kern="1200"/>
         </a:p>
@@ -5004,7 +5351,7 @@
         </a:bodyPr>
         <a:lstStyle/>
         <a:p>
-          <a:pPr marL="0" lvl="0" indent="0" algn="ctr" defTabSz="444500">
+          <a:pPr lvl="0" algn="ctr" defTabSz="444500">
             <a:lnSpc>
               <a:spcPct val="90000"/>
             </a:lnSpc>
@@ -5014,7 +5361,6 @@
             <a:spcAft>
               <a:spcPct val="35000"/>
             </a:spcAft>
-            <a:buNone/>
           </a:pPr>
           <a:r>
             <a:rPr lang="en-US" sz="1000" kern="1200"/>
@@ -5022,7 +5368,7 @@
           </a:r>
         </a:p>
         <a:p>
-          <a:pPr marL="0" lvl="0" indent="0" algn="ctr" defTabSz="444500">
+          <a:pPr lvl="0" algn="ctr" defTabSz="444500">
             <a:lnSpc>
               <a:spcPct val="90000"/>
             </a:lnSpc>
@@ -5032,7 +5378,6 @@
             <a:spcAft>
               <a:spcPct val="35000"/>
             </a:spcAft>
-            <a:buNone/>
           </a:pPr>
           <a:r>
             <a:rPr lang="en-US" sz="1000" kern="1200"/>
@@ -5095,7 +5440,7 @@
         </a:bodyPr>
         <a:lstStyle/>
         <a:p>
-          <a:pPr marL="0" lvl="0" indent="0" algn="ctr" defTabSz="355600">
+          <a:pPr lvl="0" algn="ctr" defTabSz="355600">
             <a:lnSpc>
               <a:spcPct val="90000"/>
             </a:lnSpc>
@@ -5105,7 +5450,6 @@
             <a:spcAft>
               <a:spcPct val="35000"/>
             </a:spcAft>
-            <a:buNone/>
           </a:pPr>
           <a:endParaRPr lang="en-US" sz="800" kern="1200"/>
         </a:p>
@@ -5167,7 +5511,7 @@
         </a:bodyPr>
         <a:lstStyle/>
         <a:p>
-          <a:pPr marL="0" lvl="0" indent="0" algn="ctr" defTabSz="444500">
+          <a:pPr lvl="0" algn="ctr" defTabSz="444500">
             <a:lnSpc>
               <a:spcPct val="90000"/>
             </a:lnSpc>
@@ -5177,7 +5521,6 @@
             <a:spcAft>
               <a:spcPct val="35000"/>
             </a:spcAft>
-            <a:buNone/>
           </a:pPr>
           <a:r>
             <a:rPr lang="en-US" sz="1000" kern="1200"/>
@@ -5185,7 +5528,7 @@
           </a:r>
         </a:p>
         <a:p>
-          <a:pPr marL="0" lvl="0" indent="0" algn="ctr" defTabSz="444500">
+          <a:pPr lvl="0" algn="ctr" defTabSz="444500">
             <a:lnSpc>
               <a:spcPct val="90000"/>
             </a:lnSpc>
@@ -5195,7 +5538,6 @@
             <a:spcAft>
               <a:spcPct val="35000"/>
             </a:spcAft>
-            <a:buNone/>
           </a:pPr>
           <a:r>
             <a:rPr lang="en-US" sz="1000" kern="1200"/>
@@ -5258,7 +5600,7 @@
         </a:bodyPr>
         <a:lstStyle/>
         <a:p>
-          <a:pPr marL="0" lvl="0" indent="0" algn="ctr" defTabSz="355600">
+          <a:pPr lvl="0" algn="ctr" defTabSz="355600">
             <a:lnSpc>
               <a:spcPct val="90000"/>
             </a:lnSpc>
@@ -5268,7 +5610,6 @@
             <a:spcAft>
               <a:spcPct val="35000"/>
             </a:spcAft>
-            <a:buNone/>
           </a:pPr>
           <a:endParaRPr lang="en-US" sz="800" kern="1200"/>
         </a:p>
@@ -5335,7 +5676,7 @@
         </a:bodyPr>
         <a:lstStyle/>
         <a:p>
-          <a:pPr marL="0" lvl="0" indent="0" algn="ctr" defTabSz="444500">
+          <a:pPr lvl="0" algn="ctr" defTabSz="444500">
             <a:lnSpc>
               <a:spcPct val="90000"/>
             </a:lnSpc>
@@ -5345,7 +5686,6 @@
             <a:spcAft>
               <a:spcPct val="35000"/>
             </a:spcAft>
-            <a:buNone/>
           </a:pPr>
           <a:r>
             <a:rPr lang="en-US" sz="1000" kern="1200"/>
@@ -5425,7 +5765,7 @@
         </a:bodyPr>
         <a:lstStyle/>
         <a:p>
-          <a:pPr marL="0" lvl="0" indent="0" algn="ctr" defTabSz="533400">
+          <a:pPr lvl="0" algn="ctr" defTabSz="533400">
             <a:lnSpc>
               <a:spcPct val="90000"/>
             </a:lnSpc>
@@ -5435,7 +5775,6 @@
             <a:spcAft>
               <a:spcPct val="35000"/>
             </a:spcAft>
-            <a:buNone/>
           </a:pPr>
           <a:r>
             <a:rPr lang="en-US" sz="1200" kern="1200"/>
@@ -5498,7 +5837,7 @@
         </a:bodyPr>
         <a:lstStyle/>
         <a:p>
-          <a:pPr marL="0" lvl="0" indent="0" algn="ctr" defTabSz="444500">
+          <a:pPr lvl="0" algn="ctr" defTabSz="444500">
             <a:lnSpc>
               <a:spcPct val="90000"/>
             </a:lnSpc>
@@ -5508,7 +5847,6 @@
             <a:spcAft>
               <a:spcPct val="35000"/>
             </a:spcAft>
-            <a:buNone/>
           </a:pPr>
           <a:endParaRPr lang="en-US" sz="1000" kern="1200"/>
         </a:p>
@@ -5573,7 +5911,7 @@
         </a:bodyPr>
         <a:lstStyle/>
         <a:p>
-          <a:pPr marL="0" lvl="0" indent="0" algn="ctr" defTabSz="533400">
+          <a:pPr lvl="0" algn="ctr" defTabSz="533400">
             <a:lnSpc>
               <a:spcPct val="90000"/>
             </a:lnSpc>
@@ -5583,7 +5921,6 @@
             <a:spcAft>
               <a:spcPct val="35000"/>
             </a:spcAft>
-            <a:buNone/>
           </a:pPr>
           <a:r>
             <a:rPr lang="en-US" sz="1200" kern="1200"/>
@@ -5646,7 +5983,7 @@
         </a:bodyPr>
         <a:lstStyle/>
         <a:p>
-          <a:pPr marL="0" lvl="0" indent="0" algn="ctr" defTabSz="444500">
+          <a:pPr lvl="0" algn="ctr" defTabSz="444500">
             <a:lnSpc>
               <a:spcPct val="90000"/>
             </a:lnSpc>
@@ -5656,7 +5993,6 @@
             <a:spcAft>
               <a:spcPct val="35000"/>
             </a:spcAft>
-            <a:buNone/>
           </a:pPr>
           <a:endParaRPr lang="en-US" sz="1000" kern="1200"/>
         </a:p>
@@ -5721,7 +6057,7 @@
         </a:bodyPr>
         <a:lstStyle/>
         <a:p>
-          <a:pPr marL="0" lvl="0" indent="0" algn="ctr" defTabSz="533400">
+          <a:pPr lvl="0" algn="ctr" defTabSz="533400">
             <a:lnSpc>
               <a:spcPct val="90000"/>
             </a:lnSpc>
@@ -5731,7 +6067,6 @@
             <a:spcAft>
               <a:spcPct val="35000"/>
             </a:spcAft>
-            <a:buNone/>
           </a:pPr>
           <a:r>
             <a:rPr lang="en-US" sz="1200" kern="1200"/>
@@ -5794,7 +6129,7 @@
         </a:bodyPr>
         <a:lstStyle/>
         <a:p>
-          <a:pPr marL="0" lvl="0" indent="0" algn="ctr" defTabSz="444500">
+          <a:pPr lvl="0" algn="ctr" defTabSz="444500">
             <a:lnSpc>
               <a:spcPct val="90000"/>
             </a:lnSpc>
@@ -5804,7 +6139,6 @@
             <a:spcAft>
               <a:spcPct val="35000"/>
             </a:spcAft>
-            <a:buNone/>
           </a:pPr>
           <a:endParaRPr lang="en-US" sz="1000" kern="1200"/>
         </a:p>
@@ -5869,7 +6203,7 @@
         </a:bodyPr>
         <a:lstStyle/>
         <a:p>
-          <a:pPr marL="0" lvl="0" indent="0" algn="ctr" defTabSz="533400">
+          <a:pPr lvl="0" algn="ctr" defTabSz="533400">
             <a:lnSpc>
               <a:spcPct val="90000"/>
             </a:lnSpc>
@@ -5879,7 +6213,6 @@
             <a:spcAft>
               <a:spcPct val="35000"/>
             </a:spcAft>
-            <a:buNone/>
           </a:pPr>
           <a:r>
             <a:rPr lang="en-US" sz="1200" kern="1200"/>
@@ -5942,7 +6275,7 @@
         </a:bodyPr>
         <a:lstStyle/>
         <a:p>
-          <a:pPr marL="0" lvl="0" indent="0" algn="ctr" defTabSz="444500">
+          <a:pPr lvl="0" algn="ctr" defTabSz="444500">
             <a:lnSpc>
               <a:spcPct val="90000"/>
             </a:lnSpc>
@@ -5952,7 +6285,6 @@
             <a:spcAft>
               <a:spcPct val="35000"/>
             </a:spcAft>
-            <a:buNone/>
           </a:pPr>
           <a:endParaRPr lang="en-US" sz="1000" kern="1200"/>
         </a:p>
@@ -6017,7 +6349,7 @@
         </a:bodyPr>
         <a:lstStyle/>
         <a:p>
-          <a:pPr marL="0" lvl="0" indent="0" algn="ctr" defTabSz="533400">
+          <a:pPr lvl="0" algn="ctr" defTabSz="533400">
             <a:lnSpc>
               <a:spcPct val="90000"/>
             </a:lnSpc>
@@ -6027,7 +6359,6 @@
             <a:spcAft>
               <a:spcPct val="35000"/>
             </a:spcAft>
-            <a:buNone/>
           </a:pPr>
           <a:r>
             <a:rPr lang="en-US" sz="1200" kern="1200"/>
@@ -6090,7 +6421,7 @@
         </a:bodyPr>
         <a:lstStyle/>
         <a:p>
-          <a:pPr marL="0" lvl="0" indent="0" algn="ctr" defTabSz="444500">
+          <a:pPr lvl="0" algn="ctr" defTabSz="444500">
             <a:lnSpc>
               <a:spcPct val="90000"/>
             </a:lnSpc>
@@ -6100,7 +6431,6 @@
             <a:spcAft>
               <a:spcPct val="35000"/>
             </a:spcAft>
-            <a:buNone/>
           </a:pPr>
           <a:endParaRPr lang="en-US" sz="1000" kern="1200"/>
         </a:p>
@@ -6165,7 +6495,7 @@
         </a:bodyPr>
         <a:lstStyle/>
         <a:p>
-          <a:pPr marL="0" lvl="0" indent="0" algn="ctr" defTabSz="533400">
+          <a:pPr lvl="0" algn="ctr" defTabSz="533400">
             <a:lnSpc>
               <a:spcPct val="90000"/>
             </a:lnSpc>
@@ -6175,7 +6505,6 @@
             <a:spcAft>
               <a:spcPct val="35000"/>
             </a:spcAft>
-            <a:buNone/>
           </a:pPr>
           <a:r>
             <a:rPr lang="en-US" sz="1200" kern="1200"/>
@@ -6238,7 +6567,7 @@
         </a:bodyPr>
         <a:lstStyle/>
         <a:p>
-          <a:pPr marL="0" lvl="0" indent="0" algn="ctr" defTabSz="444500">
+          <a:pPr lvl="0" algn="ctr" defTabSz="444500">
             <a:lnSpc>
               <a:spcPct val="90000"/>
             </a:lnSpc>
@@ -6248,7 +6577,6 @@
             <a:spcAft>
               <a:spcPct val="35000"/>
             </a:spcAft>
-            <a:buNone/>
           </a:pPr>
           <a:endParaRPr lang="en-US" sz="1000" kern="1200"/>
         </a:p>
@@ -9952,7 +10280,7 @@
           <a:p>
             <a:fld id="{43F1A4C9-FB5C-B247-A357-650712A3F0A8}" type="datetimeFigureOut">
               <a:rPr lang="en-US" smtClean="0"/>
-              <a:t>10/16/2020</a:t>
+              <a:t>10/20/2020</a:t>
             </a:fld>
             <a:endParaRPr lang="en-US" dirty="0"/>
           </a:p>
@@ -10117,7 +10445,7 @@
           <a:p>
             <a:fld id="{EA4960E5-F060-4C88-B1C5-5A6F5890BEF6}" type="datetimeFigureOut">
               <a:rPr lang="en-SG" smtClean="0"/>
-              <a:t>16/10/2020</a:t>
+              <a:t>10/20/2020</a:t>
             </a:fld>
             <a:endParaRPr lang="en-SG" dirty="0"/>
           </a:p>
@@ -16215,7 +16543,7 @@
           <a:graphicData uri="http://schemas.openxmlformats.org/presentationml/2006/ole">
             <mc:AlternateContent xmlns:mc="http://schemas.openxmlformats.org/markup-compatibility/2006">
               <mc:Choice xmlns:v="urn:schemas-microsoft-com:vml" Requires="v">
-                <p:oleObj spid="_x0000_s2063" name="Bitmap Image" r:id="rId3" imgW="4915326" imgH="3505504" progId="Paint.Picture">
+                <p:oleObj spid="_x0000_s2077" name="Bitmap Image" r:id="rId3" imgW="4915326" imgH="3505504" progId="Paint.Picture">
                   <p:embed/>
                 </p:oleObj>
               </mc:Choice>
@@ -16357,7 +16685,7 @@
           <a:graphicData uri="http://schemas.openxmlformats.org/presentationml/2006/ole">
             <mc:AlternateContent xmlns:mc="http://schemas.openxmlformats.org/markup-compatibility/2006">
               <mc:Choice xmlns:v="urn:schemas-microsoft-com:vml" Requires="v">
-                <p:oleObj spid="_x0000_s2064" name="Bitmap Image" r:id="rId5" imgW="5014395" imgH="4572396" progId="Paint.Picture">
+                <p:oleObj spid="_x0000_s2078" name="Bitmap Image" r:id="rId5" imgW="5014395" imgH="4572396" progId="Paint.Picture">
                   <p:embed/>
                 </p:oleObj>
               </mc:Choice>
@@ -16920,7 +17248,7 @@
           <a:graphicData uri="http://schemas.openxmlformats.org/presentationml/2006/ole">
             <mc:AlternateContent xmlns:mc="http://schemas.openxmlformats.org/markup-compatibility/2006">
               <mc:Choice xmlns:v="urn:schemas-microsoft-com:vml" Requires="v">
-                <p:oleObj spid="_x0000_s5125" name="Bitmap Image" r:id="rId3" imgW="5014395" imgH="4572396" progId="Paint.Picture">
+                <p:oleObj spid="_x0000_s5132" name="Bitmap Image" r:id="rId3" imgW="5014395" imgH="4572396" progId="Paint.Picture">
                   <p:embed/>
                 </p:oleObj>
               </mc:Choice>
@@ -17534,7 +17862,7 @@
           <a:graphicData uri="http://schemas.openxmlformats.org/presentationml/2006/ole">
             <mc:AlternateContent xmlns:mc="http://schemas.openxmlformats.org/markup-compatibility/2006">
               <mc:Choice xmlns:v="urn:schemas-microsoft-com:vml" Requires="v">
-                <p:oleObj spid="_x0000_s3078" name="Bitmap Image" r:id="rId3" imgW="5014395" imgH="4572396" progId="Paint.Picture">
+                <p:oleObj spid="_x0000_s3085" name="Bitmap Image" r:id="rId3" imgW="5014395" imgH="4572396" progId="Paint.Picture">
                   <p:embed/>
                 </p:oleObj>
               </mc:Choice>
@@ -17741,26 +18069,272 @@
             <p:ph type="title"/>
           </p:nvPr>
         </p:nvSpPr>
-        <p:spPr>
-          <a:xfrm>
-            <a:off x="2573601" y="3053030"/>
-            <a:ext cx="4648197" cy="545561"/>
-          </a:xfrm>
-        </p:spPr>
+        <p:spPr/>
         <p:txBody>
           <a:bodyPr/>
           <a:lstStyle/>
           <a:p>
             <a:r>
-              <a:rPr lang="en-US" dirty="0"/>
-              <a:t>Thank you! </a:t>
+              <a:rPr lang="en-US" dirty="0" smtClean="0"/>
+              <a:t>Comparison</a:t>
+            </a:r>
+            <a:endParaRPr lang="en-SG" dirty="0"/>
+          </a:p>
+        </p:txBody>
+      </p:sp>
+      <p:sp>
+        <p:nvSpPr>
+          <p:cNvPr id="3" name="Content Placeholder 2"/>
+          <p:cNvSpPr>
+            <a:spLocks noGrp="1"/>
+          </p:cNvSpPr>
+          <p:nvPr>
+            <p:ph sz="quarter" idx="13"/>
+          </p:nvPr>
+        </p:nvSpPr>
+        <p:spPr/>
+        <p:txBody>
+          <a:bodyPr>
+            <a:normAutofit fontScale="55000" lnSpcReduction="20000"/>
+          </a:bodyPr>
+          <a:lstStyle/>
+          <a:p>
+            <a:r>
+              <a:rPr lang="en-US" dirty="0" smtClean="0">
+                <a:solidFill>
+                  <a:schemeClr val="tx1"/>
+                </a:solidFill>
+              </a:rPr>
+              <a:t>Localization Algorithms</a:t>
+            </a:r>
+          </a:p>
+          <a:p>
+            <a:pPr lvl="1"/>
+            <a:r>
+              <a:rPr lang="en-US" dirty="0" smtClean="0">
+                <a:solidFill>
+                  <a:schemeClr val="tx1"/>
+                </a:solidFill>
+              </a:rPr>
+              <a:t>Monte </a:t>
             </a:r>
             <a:r>
               <a:rPr lang="en-US" dirty="0">
-                <a:sym typeface="Wingdings" panose="05000000000000000000" pitchFamily="2" charset="2"/>
+                <a:solidFill>
+                  <a:schemeClr val="tx1"/>
+                </a:solidFill>
               </a:rPr>
-              <a:t> </a:t>
+              <a:t>Carlo </a:t>
             </a:r>
+            <a:r>
+              <a:rPr lang="en-US" dirty="0" smtClean="0">
+                <a:solidFill>
+                  <a:schemeClr val="tx1"/>
+                </a:solidFill>
+              </a:rPr>
+              <a:t>Localization (MCL)</a:t>
+            </a:r>
+          </a:p>
+          <a:p>
+            <a:pPr lvl="2"/>
+            <a:r>
+              <a:rPr lang="en-US" dirty="0" smtClean="0">
+                <a:solidFill>
+                  <a:schemeClr val="tx1"/>
+                </a:solidFill>
+              </a:rPr>
+              <a:t>Most popular in robot localization</a:t>
+            </a:r>
+          </a:p>
+          <a:p>
+            <a:pPr lvl="2"/>
+            <a:r>
+              <a:rPr lang="en-US" dirty="0">
+                <a:solidFill>
+                  <a:schemeClr val="tx1"/>
+                </a:solidFill>
+              </a:rPr>
+              <a:t>Also referred to as Particle Filter</a:t>
+            </a:r>
+          </a:p>
+          <a:p>
+            <a:pPr lvl="2"/>
+            <a:r>
+              <a:rPr lang="en-US" dirty="0">
+                <a:solidFill>
+                  <a:schemeClr val="tx1"/>
+                </a:solidFill>
+              </a:rPr>
+              <a:t>Relies on </a:t>
+            </a:r>
+          </a:p>
+          <a:p>
+            <a:pPr lvl="3"/>
+            <a:r>
+              <a:rPr lang="en-US" dirty="0">
+                <a:solidFill>
+                  <a:schemeClr val="tx1"/>
+                </a:solidFill>
+              </a:rPr>
+              <a:t>Accurate Environment Map</a:t>
+            </a:r>
+          </a:p>
+          <a:p>
+            <a:pPr lvl="3"/>
+            <a:r>
+              <a:rPr lang="en-US" dirty="0">
+                <a:solidFill>
+                  <a:schemeClr val="tx1"/>
+                </a:solidFill>
+              </a:rPr>
+              <a:t>Particle position and </a:t>
+            </a:r>
+            <a:r>
+              <a:rPr lang="en-US" dirty="0" smtClean="0">
+                <a:solidFill>
+                  <a:schemeClr val="tx1"/>
+                </a:solidFill>
+              </a:rPr>
+              <a:t>orientation</a:t>
+            </a:r>
+          </a:p>
+          <a:p>
+            <a:pPr lvl="1"/>
+            <a:r>
+              <a:rPr lang="en-US" dirty="0">
+                <a:solidFill>
+                  <a:schemeClr val="tx1"/>
+                </a:solidFill>
+              </a:rPr>
+              <a:t>Adaptive Monte Carlo </a:t>
+            </a:r>
+            <a:r>
+              <a:rPr lang="en-US" dirty="0" smtClean="0">
+                <a:solidFill>
+                  <a:schemeClr val="tx1"/>
+                </a:solidFill>
+              </a:rPr>
+              <a:t>Localization (AMCL)</a:t>
+            </a:r>
+          </a:p>
+          <a:p>
+            <a:pPr lvl="2"/>
+            <a:r>
+              <a:rPr lang="en-US" dirty="0" smtClean="0">
+                <a:solidFill>
+                  <a:schemeClr val="tx1"/>
+                </a:solidFill>
+              </a:rPr>
+              <a:t>Improved version of MCL</a:t>
+            </a:r>
+          </a:p>
+          <a:p>
+            <a:pPr lvl="2"/>
+            <a:endParaRPr lang="en-US" dirty="0" smtClean="0">
+              <a:solidFill>
+                <a:schemeClr val="tx1"/>
+              </a:solidFill>
+            </a:endParaRPr>
+          </a:p>
+          <a:p>
+            <a:r>
+              <a:rPr lang="en-SG" dirty="0" smtClean="0">
+                <a:solidFill>
+                  <a:schemeClr val="tx1"/>
+                </a:solidFill>
+              </a:rPr>
+              <a:t>Deep </a:t>
+            </a:r>
+            <a:r>
+              <a:rPr lang="en-SG" dirty="0">
+                <a:solidFill>
+                  <a:schemeClr val="tx1"/>
+                </a:solidFill>
+              </a:rPr>
+              <a:t>Neural Network Robotic </a:t>
+            </a:r>
+            <a:r>
+              <a:rPr lang="en-SG" dirty="0" smtClean="0">
+                <a:solidFill>
+                  <a:schemeClr val="tx1"/>
+                </a:solidFill>
+              </a:rPr>
+              <a:t>Mapping</a:t>
+            </a:r>
+          </a:p>
+          <a:p>
+            <a:pPr lvl="1"/>
+            <a:r>
+              <a:rPr lang="en-SG" dirty="0" smtClean="0">
+                <a:solidFill>
+                  <a:schemeClr val="tx1"/>
+                </a:solidFill>
+              </a:rPr>
+              <a:t>Relies on GPS and 3D scan data</a:t>
+            </a:r>
+          </a:p>
+          <a:p>
+            <a:pPr lvl="1"/>
+            <a:r>
+              <a:rPr lang="en-US" dirty="0" smtClean="0">
+                <a:solidFill>
+                  <a:schemeClr val="tx1"/>
+                </a:solidFill>
+              </a:rPr>
+              <a:t>Produces more accuracy map</a:t>
+            </a:r>
+          </a:p>
+          <a:p>
+            <a:pPr lvl="2"/>
+            <a:r>
+              <a:rPr lang="en-US" dirty="0" smtClean="0">
+                <a:solidFill>
+                  <a:schemeClr val="tx1"/>
+                </a:solidFill>
+              </a:rPr>
+              <a:t>Comparing with traditional approach such as k-means</a:t>
+            </a:r>
+          </a:p>
+          <a:p>
+            <a:pPr lvl="2"/>
+            <a:endParaRPr lang="en-US" dirty="0">
+              <a:solidFill>
+                <a:schemeClr val="tx1"/>
+              </a:solidFill>
+            </a:endParaRPr>
+          </a:p>
+          <a:p>
+            <a:r>
+              <a:rPr lang="en-US" dirty="0" smtClean="0">
+                <a:solidFill>
+                  <a:schemeClr val="tx1"/>
+                </a:solidFill>
+              </a:rPr>
+              <a:t>Therefore, AMCL and </a:t>
+            </a:r>
+            <a:r>
+              <a:rPr lang="en-SG" dirty="0">
+                <a:solidFill>
+                  <a:schemeClr val="tx1"/>
+                </a:solidFill>
+              </a:rPr>
+              <a:t>Deep Neural Network Robotic </a:t>
+            </a:r>
+            <a:r>
+              <a:rPr lang="en-SG" dirty="0" smtClean="0">
+                <a:solidFill>
+                  <a:schemeClr val="tx1"/>
+                </a:solidFill>
+              </a:rPr>
+              <a:t>Mapping are good candidates for complement on localization and map in certain conditions</a:t>
+            </a:r>
+            <a:endParaRPr lang="en-US" dirty="0">
+              <a:solidFill>
+                <a:schemeClr val="tx1"/>
+              </a:solidFill>
+            </a:endParaRPr>
+          </a:p>
+          <a:p>
             <a:endParaRPr lang="en-SG" dirty="0"/>
           </a:p>
         </p:txBody>
@@ -17782,7 +18356,7 @@
           <a:p>
             <a:pPr algn="l"/>
             <a:r>
-              <a:rPr lang="en-SG" sz="1000" dirty="0"/>
+              <a:rPr lang="en-SG" sz="1000" smtClean="0"/>
               <a:t>© 2018 National University of Singapore. All Rights Reserved</a:t>
             </a:r>
             <a:endParaRPr lang="en-SG" dirty="0"/>
@@ -17816,7 +18390,711 @@
     </p:spTree>
     <p:extLst>
       <p:ext uri="{BB962C8B-B14F-4D97-AF65-F5344CB8AC3E}">
-        <p14:creationId xmlns:p14="http://schemas.microsoft.com/office/powerpoint/2010/main" val="3351845363"/>
+        <p14:creationId xmlns:p14="http://schemas.microsoft.com/office/powerpoint/2010/main" val="1574460477"/>
+      </p:ext>
+    </p:extLst>
+  </p:cSld>
+  <p:clrMapOvr>
+    <a:masterClrMapping/>
+  </p:clrMapOvr>
+</p:sld>
+</file>
+
+<file path=ppt/slides/slide27.xml><?xml version="1.0" encoding="utf-8"?>
+<p:sld xmlns:a="http://schemas.openxmlformats.org/drawingml/2006/main" xmlns:r="http://schemas.openxmlformats.org/officeDocument/2006/relationships" xmlns:p="http://schemas.openxmlformats.org/presentationml/2006/main">
+  <p:cSld>
+    <p:spTree>
+      <p:nvGrpSpPr>
+        <p:cNvPr id="1" name=""/>
+        <p:cNvGrpSpPr/>
+        <p:nvPr/>
+      </p:nvGrpSpPr>
+      <p:grpSpPr>
+        <a:xfrm>
+          <a:off x="0" y="0"/>
+          <a:ext cx="0" cy="0"/>
+          <a:chOff x="0" y="0"/>
+          <a:chExt cx="0" cy="0"/>
+        </a:xfrm>
+      </p:grpSpPr>
+      <p:sp>
+        <p:nvSpPr>
+          <p:cNvPr id="2" name="Title 1"/>
+          <p:cNvSpPr>
+            <a:spLocks noGrp="1"/>
+          </p:cNvSpPr>
+          <p:nvPr>
+            <p:ph type="title"/>
+          </p:nvPr>
+        </p:nvSpPr>
+        <p:spPr/>
+        <p:txBody>
+          <a:bodyPr>
+            <a:normAutofit fontScale="90000"/>
+          </a:bodyPr>
+          <a:lstStyle/>
+          <a:p>
+            <a:r>
+              <a:rPr lang="en-US" dirty="0" smtClean="0"/>
+              <a:t>System Design -</a:t>
+            </a:r>
+            <a:br>
+              <a:rPr lang="en-US" dirty="0" smtClean="0"/>
+            </a:br>
+            <a:r>
+              <a:rPr lang="en-US" dirty="0" smtClean="0"/>
+              <a:t>Visualization</a:t>
+            </a:r>
+            <a:endParaRPr lang="en-SG" dirty="0"/>
+          </a:p>
+        </p:txBody>
+      </p:sp>
+      <p:sp>
+        <p:nvSpPr>
+          <p:cNvPr id="3" name="Content Placeholder 2"/>
+          <p:cNvSpPr>
+            <a:spLocks noGrp="1"/>
+          </p:cNvSpPr>
+          <p:nvPr>
+            <p:ph sz="quarter" idx="13"/>
+          </p:nvPr>
+        </p:nvSpPr>
+        <p:spPr/>
+        <p:txBody>
+          <a:bodyPr/>
+          <a:lstStyle/>
+          <a:p>
+            <a:endParaRPr lang="en-SG" dirty="0"/>
+          </a:p>
+        </p:txBody>
+      </p:sp>
+      <p:sp>
+        <p:nvSpPr>
+          <p:cNvPr id="4" name="Footer Placeholder 3"/>
+          <p:cNvSpPr>
+            <a:spLocks noGrp="1"/>
+          </p:cNvSpPr>
+          <p:nvPr>
+            <p:ph type="ftr" sz="quarter" idx="15"/>
+          </p:nvPr>
+        </p:nvSpPr>
+        <p:spPr/>
+        <p:txBody>
+          <a:bodyPr/>
+          <a:lstStyle/>
+          <a:p>
+            <a:pPr algn="l"/>
+            <a:r>
+              <a:rPr lang="en-SG" sz="1000" smtClean="0"/>
+              <a:t>© 2018 National University of Singapore. All Rights Reserved</a:t>
+            </a:r>
+            <a:endParaRPr lang="en-SG" dirty="0"/>
+          </a:p>
+        </p:txBody>
+      </p:sp>
+      <p:sp>
+        <p:nvSpPr>
+          <p:cNvPr id="5" name="Slide Number Placeholder 4"/>
+          <p:cNvSpPr>
+            <a:spLocks noGrp="1"/>
+          </p:cNvSpPr>
+          <p:nvPr>
+            <p:ph type="sldNum" sz="quarter" idx="16"/>
+          </p:nvPr>
+        </p:nvSpPr>
+        <p:spPr/>
+        <p:txBody>
+          <a:bodyPr/>
+          <a:lstStyle/>
+          <a:p>
+            <a:fld id="{2F63C605-4FC6-46DE-BC90-871762EA3F52}" type="slidenum">
+              <a:rPr lang="en-SG" smtClean="0"/>
+              <a:pPr/>
+              <a:t>27</a:t>
+            </a:fld>
+            <a:endParaRPr lang="en-SG" dirty="0"/>
+          </a:p>
+        </p:txBody>
+      </p:sp>
+      <p:pic>
+        <p:nvPicPr>
+          <p:cNvPr id="10" name="Picture 9"/>
+          <p:cNvPicPr>
+            <a:picLocks noChangeAspect="1"/>
+          </p:cNvPicPr>
+          <p:nvPr/>
+        </p:nvPicPr>
+        <p:blipFill>
+          <a:blip r:embed="rId2"/>
+          <a:stretch>
+            <a:fillRect/>
+          </a:stretch>
+        </p:blipFill>
+        <p:spPr>
+          <a:xfrm>
+            <a:off x="1072874" y="1313382"/>
+            <a:ext cx="6998251" cy="4520201"/>
+          </a:xfrm>
+          <a:prstGeom prst="rect">
+            <a:avLst/>
+          </a:prstGeom>
+        </p:spPr>
+      </p:pic>
+    </p:spTree>
+    <p:extLst>
+      <p:ext uri="{BB962C8B-B14F-4D97-AF65-F5344CB8AC3E}">
+        <p14:creationId xmlns:p14="http://schemas.microsoft.com/office/powerpoint/2010/main" val="10502414"/>
+      </p:ext>
+    </p:extLst>
+  </p:cSld>
+  <p:clrMapOvr>
+    <a:masterClrMapping/>
+  </p:clrMapOvr>
+</p:sld>
+</file>
+
+<file path=ppt/slides/slide28.xml><?xml version="1.0" encoding="utf-8"?>
+<p:sld xmlns:a="http://schemas.openxmlformats.org/drawingml/2006/main" xmlns:r="http://schemas.openxmlformats.org/officeDocument/2006/relationships" xmlns:p="http://schemas.openxmlformats.org/presentationml/2006/main">
+  <p:cSld>
+    <p:spTree>
+      <p:nvGrpSpPr>
+        <p:cNvPr id="1" name=""/>
+        <p:cNvGrpSpPr/>
+        <p:nvPr/>
+      </p:nvGrpSpPr>
+      <p:grpSpPr>
+        <a:xfrm>
+          <a:off x="0" y="0"/>
+          <a:ext cx="0" cy="0"/>
+          <a:chOff x="0" y="0"/>
+          <a:chExt cx="0" cy="0"/>
+        </a:xfrm>
+      </p:grpSpPr>
+      <p:sp>
+        <p:nvSpPr>
+          <p:cNvPr id="2" name="Title 1"/>
+          <p:cNvSpPr>
+            <a:spLocks noGrp="1"/>
+          </p:cNvSpPr>
+          <p:nvPr>
+            <p:ph type="title"/>
+          </p:nvPr>
+        </p:nvSpPr>
+        <p:spPr/>
+        <p:txBody>
+          <a:bodyPr/>
+          <a:lstStyle/>
+          <a:p>
+            <a:r>
+              <a:rPr lang="en-US" dirty="0" smtClean="0"/>
+              <a:t>Open3D Visualizer</a:t>
+            </a:r>
+            <a:endParaRPr lang="en-SG" dirty="0"/>
+          </a:p>
+        </p:txBody>
+      </p:sp>
+      <p:sp>
+        <p:nvSpPr>
+          <p:cNvPr id="3" name="Content Placeholder 2"/>
+          <p:cNvSpPr>
+            <a:spLocks noGrp="1"/>
+          </p:cNvSpPr>
+          <p:nvPr>
+            <p:ph sz="quarter" idx="13"/>
+          </p:nvPr>
+        </p:nvSpPr>
+        <p:spPr/>
+        <p:txBody>
+          <a:bodyPr>
+            <a:normAutofit fontScale="92500" lnSpcReduction="10000"/>
+          </a:bodyPr>
+          <a:lstStyle/>
+          <a:p>
+            <a:r>
+              <a:rPr lang="en-US" dirty="0" smtClean="0">
+                <a:solidFill>
+                  <a:schemeClr val="tx1"/>
+                </a:solidFill>
+              </a:rPr>
+              <a:t>Read </a:t>
+            </a:r>
+            <a:r>
+              <a:rPr lang="en-US" dirty="0" smtClean="0">
+                <a:solidFill>
+                  <a:schemeClr val="tx1"/>
+                </a:solidFill>
+              </a:rPr>
+              <a:t>3D </a:t>
+            </a:r>
+            <a:r>
+              <a:rPr lang="en-US" dirty="0" smtClean="0">
+                <a:solidFill>
+                  <a:schemeClr val="tx1"/>
+                </a:solidFill>
+              </a:rPr>
+              <a:t>Map </a:t>
+            </a:r>
+            <a:r>
+              <a:rPr lang="en-US" dirty="0" smtClean="0">
+                <a:solidFill>
+                  <a:schemeClr val="tx1"/>
+                </a:solidFill>
+              </a:rPr>
+              <a:t>Data</a:t>
+            </a:r>
+          </a:p>
+          <a:p>
+            <a:pPr lvl="1"/>
+            <a:r>
+              <a:rPr lang="en-US" dirty="0" smtClean="0">
+                <a:solidFill>
+                  <a:schemeClr val="tx1"/>
+                </a:solidFill>
+              </a:rPr>
+              <a:t>3D map data </a:t>
+            </a:r>
+          </a:p>
+          <a:p>
+            <a:pPr lvl="1"/>
+            <a:r>
+              <a:rPr lang="en-US" dirty="0" smtClean="0">
+                <a:solidFill>
+                  <a:schemeClr val="tx1"/>
+                </a:solidFill>
+              </a:rPr>
+              <a:t>produced by </a:t>
+            </a:r>
+            <a:r>
+              <a:rPr lang="en-SG" dirty="0" smtClean="0">
+                <a:solidFill>
+                  <a:schemeClr val="tx1"/>
+                </a:solidFill>
+              </a:rPr>
+              <a:t>DNNRM</a:t>
+            </a:r>
+            <a:endParaRPr lang="en-SG" dirty="0">
+              <a:solidFill>
+                <a:schemeClr val="tx1"/>
+              </a:solidFill>
+            </a:endParaRPr>
+          </a:p>
+          <a:p>
+            <a:pPr lvl="1"/>
+            <a:endParaRPr lang="en-US" dirty="0" smtClean="0">
+              <a:solidFill>
+                <a:schemeClr val="tx1"/>
+              </a:solidFill>
+            </a:endParaRPr>
+          </a:p>
+          <a:p>
+            <a:r>
+              <a:rPr lang="en-US" dirty="0" smtClean="0">
+                <a:solidFill>
+                  <a:schemeClr val="tx1"/>
+                </a:solidFill>
+              </a:rPr>
+              <a:t>Generates views</a:t>
+            </a:r>
+          </a:p>
+          <a:p>
+            <a:pPr lvl="1"/>
+            <a:r>
+              <a:rPr lang="en-US" dirty="0" smtClean="0">
+                <a:solidFill>
+                  <a:schemeClr val="tx1"/>
+                </a:solidFill>
+              </a:rPr>
+              <a:t>2D Map</a:t>
+            </a:r>
+          </a:p>
+          <a:p>
+            <a:pPr lvl="1"/>
+            <a:r>
+              <a:rPr lang="en-US" dirty="0" smtClean="0">
+                <a:solidFill>
+                  <a:schemeClr val="tx1"/>
+                </a:solidFill>
+              </a:rPr>
+              <a:t>Front / Rear View</a:t>
+            </a:r>
+          </a:p>
+          <a:p>
+            <a:pPr lvl="1"/>
+            <a:r>
+              <a:rPr lang="en-US" dirty="0" smtClean="0">
+                <a:solidFill>
+                  <a:schemeClr val="tx1"/>
+                </a:solidFill>
+              </a:rPr>
+              <a:t>Based on </a:t>
+            </a:r>
+          </a:p>
+          <a:p>
+            <a:pPr lvl="2"/>
+            <a:r>
+              <a:rPr lang="en-US" dirty="0" smtClean="0">
+                <a:solidFill>
+                  <a:schemeClr val="tx1"/>
+                </a:solidFill>
+              </a:rPr>
+              <a:t>robot position</a:t>
+            </a:r>
+          </a:p>
+          <a:p>
+            <a:pPr lvl="2"/>
+            <a:r>
+              <a:rPr lang="en-US" dirty="0" smtClean="0">
+                <a:solidFill>
+                  <a:schemeClr val="tx1"/>
+                </a:solidFill>
+              </a:rPr>
+              <a:t>orientation</a:t>
+            </a:r>
+            <a:endParaRPr lang="en-SG" dirty="0">
+              <a:solidFill>
+                <a:schemeClr val="tx1"/>
+              </a:solidFill>
+            </a:endParaRPr>
+          </a:p>
+        </p:txBody>
+      </p:sp>
+      <p:sp>
+        <p:nvSpPr>
+          <p:cNvPr id="4" name="Footer Placeholder 3"/>
+          <p:cNvSpPr>
+            <a:spLocks noGrp="1"/>
+          </p:cNvSpPr>
+          <p:nvPr>
+            <p:ph type="ftr" sz="quarter" idx="15"/>
+          </p:nvPr>
+        </p:nvSpPr>
+        <p:spPr/>
+        <p:txBody>
+          <a:bodyPr/>
+          <a:lstStyle/>
+          <a:p>
+            <a:pPr algn="l"/>
+            <a:r>
+              <a:rPr lang="en-SG" sz="1000" smtClean="0"/>
+              <a:t>© 2018 National University of Singapore. All Rights Reserved</a:t>
+            </a:r>
+            <a:endParaRPr lang="en-SG" dirty="0"/>
+          </a:p>
+        </p:txBody>
+      </p:sp>
+      <p:sp>
+        <p:nvSpPr>
+          <p:cNvPr id="5" name="Slide Number Placeholder 4"/>
+          <p:cNvSpPr>
+            <a:spLocks noGrp="1"/>
+          </p:cNvSpPr>
+          <p:nvPr>
+            <p:ph type="sldNum" sz="quarter" idx="16"/>
+          </p:nvPr>
+        </p:nvSpPr>
+        <p:spPr/>
+        <p:txBody>
+          <a:bodyPr/>
+          <a:lstStyle/>
+          <a:p>
+            <a:fld id="{2F63C605-4FC6-46DE-BC90-871762EA3F52}" type="slidenum">
+              <a:rPr lang="en-SG" smtClean="0"/>
+              <a:pPr/>
+              <a:t>28</a:t>
+            </a:fld>
+            <a:endParaRPr lang="en-SG" dirty="0"/>
+          </a:p>
+        </p:txBody>
+      </p:sp>
+      <p:pic>
+        <p:nvPicPr>
+          <p:cNvPr id="6" name="Picture 5"/>
+          <p:cNvPicPr/>
+          <p:nvPr/>
+        </p:nvPicPr>
+        <p:blipFill>
+          <a:blip r:embed="rId2"/>
+          <a:stretch>
+            <a:fillRect/>
+          </a:stretch>
+        </p:blipFill>
+        <p:spPr>
+          <a:xfrm>
+            <a:off x="5057367" y="3394177"/>
+            <a:ext cx="2393225" cy="2122834"/>
+          </a:xfrm>
+          <a:prstGeom prst="rect">
+            <a:avLst/>
+          </a:prstGeom>
+        </p:spPr>
+      </p:pic>
+      <p:pic>
+        <p:nvPicPr>
+          <p:cNvPr id="7" name="Picture 6"/>
+          <p:cNvPicPr>
+            <a:picLocks noChangeAspect="1"/>
+          </p:cNvPicPr>
+          <p:nvPr/>
+        </p:nvPicPr>
+        <p:blipFill>
+          <a:blip r:embed="rId3"/>
+          <a:stretch>
+            <a:fillRect/>
+          </a:stretch>
+        </p:blipFill>
+        <p:spPr>
+          <a:xfrm>
+            <a:off x="5408023" y="1277586"/>
+            <a:ext cx="1691915" cy="2021213"/>
+          </a:xfrm>
+          <a:prstGeom prst="rect">
+            <a:avLst/>
+          </a:prstGeom>
+        </p:spPr>
+      </p:pic>
+    </p:spTree>
+    <p:extLst>
+      <p:ext uri="{BB962C8B-B14F-4D97-AF65-F5344CB8AC3E}">
+        <p14:creationId xmlns:p14="http://schemas.microsoft.com/office/powerpoint/2010/main" val="522751754"/>
+      </p:ext>
+    </p:extLst>
+  </p:cSld>
+  <p:clrMapOvr>
+    <a:masterClrMapping/>
+  </p:clrMapOvr>
+</p:sld>
+</file>
+
+<file path=ppt/slides/slide29.xml><?xml version="1.0" encoding="utf-8"?>
+<p:sld xmlns:a="http://schemas.openxmlformats.org/drawingml/2006/main" xmlns:r="http://schemas.openxmlformats.org/officeDocument/2006/relationships" xmlns:p="http://schemas.openxmlformats.org/presentationml/2006/main">
+  <p:cSld>
+    <p:spTree>
+      <p:nvGrpSpPr>
+        <p:cNvPr id="1" name=""/>
+        <p:cNvGrpSpPr/>
+        <p:nvPr/>
+      </p:nvGrpSpPr>
+      <p:grpSpPr>
+        <a:xfrm>
+          <a:off x="0" y="0"/>
+          <a:ext cx="0" cy="0"/>
+          <a:chOff x="0" y="0"/>
+          <a:chExt cx="0" cy="0"/>
+        </a:xfrm>
+      </p:grpSpPr>
+      <p:sp>
+        <p:nvSpPr>
+          <p:cNvPr id="2" name="Title 1"/>
+          <p:cNvSpPr>
+            <a:spLocks noGrp="1"/>
+          </p:cNvSpPr>
+          <p:nvPr>
+            <p:ph type="title"/>
+          </p:nvPr>
+        </p:nvSpPr>
+        <p:spPr/>
+        <p:txBody>
+          <a:bodyPr/>
+          <a:lstStyle/>
+          <a:p>
+            <a:r>
+              <a:rPr lang="en-US" dirty="0" smtClean="0"/>
+              <a:t>Map Tracking Viewer</a:t>
+            </a:r>
+            <a:endParaRPr lang="en-SG" dirty="0"/>
+          </a:p>
+        </p:txBody>
+      </p:sp>
+      <p:sp>
+        <p:nvSpPr>
+          <p:cNvPr id="3" name="Content Placeholder 2"/>
+          <p:cNvSpPr>
+            <a:spLocks noGrp="1"/>
+          </p:cNvSpPr>
+          <p:nvPr>
+            <p:ph sz="quarter" idx="13"/>
+          </p:nvPr>
+        </p:nvSpPr>
+        <p:spPr/>
+        <p:txBody>
+          <a:bodyPr/>
+          <a:lstStyle/>
+          <a:p>
+            <a:r>
+              <a:rPr lang="en-US" dirty="0" smtClean="0">
+                <a:solidFill>
+                  <a:schemeClr val="tx1"/>
+                </a:solidFill>
+              </a:rPr>
+              <a:t>Python </a:t>
+            </a:r>
+            <a:r>
+              <a:rPr lang="en-US" dirty="0" err="1" smtClean="0">
+                <a:solidFill>
+                  <a:schemeClr val="tx1"/>
+                </a:solidFill>
+              </a:rPr>
+              <a:t>Tkinter</a:t>
+            </a:r>
+            <a:r>
+              <a:rPr lang="en-US" dirty="0" smtClean="0">
+                <a:solidFill>
+                  <a:schemeClr val="tx1"/>
+                </a:solidFill>
+              </a:rPr>
+              <a:t> GUI</a:t>
+            </a:r>
+          </a:p>
+          <a:p>
+            <a:r>
+              <a:rPr lang="en-US" dirty="0" smtClean="0">
+                <a:solidFill>
+                  <a:schemeClr val="tx1"/>
+                </a:solidFill>
+              </a:rPr>
+              <a:t>Read Robot Data</a:t>
+            </a:r>
+          </a:p>
+          <a:p>
+            <a:pPr lvl="1"/>
+            <a:r>
+              <a:rPr lang="en-US" dirty="0" smtClean="0">
+                <a:solidFill>
+                  <a:schemeClr val="tx1"/>
+                </a:solidFill>
+              </a:rPr>
+              <a:t>Position</a:t>
+            </a:r>
+          </a:p>
+          <a:p>
+            <a:pPr lvl="1"/>
+            <a:r>
+              <a:rPr lang="en-US" dirty="0" smtClean="0">
+                <a:solidFill>
+                  <a:schemeClr val="tx1"/>
+                </a:solidFill>
+              </a:rPr>
+              <a:t>Orientation</a:t>
+            </a:r>
+          </a:p>
+          <a:p>
+            <a:r>
+              <a:rPr lang="en-US" dirty="0" smtClean="0">
+                <a:solidFill>
+                  <a:schemeClr val="tx1"/>
+                </a:solidFill>
+              </a:rPr>
+              <a:t>Display </a:t>
+            </a:r>
+          </a:p>
+          <a:p>
+            <a:pPr lvl="1"/>
+            <a:r>
+              <a:rPr lang="en-US" dirty="0" smtClean="0">
+                <a:solidFill>
+                  <a:schemeClr val="tx1"/>
+                </a:solidFill>
+              </a:rPr>
+              <a:t>2D Map</a:t>
+            </a:r>
+          </a:p>
+          <a:p>
+            <a:pPr lvl="1"/>
+            <a:r>
+              <a:rPr lang="en-US" dirty="0" smtClean="0">
+                <a:solidFill>
+                  <a:schemeClr val="tx1"/>
+                </a:solidFill>
+              </a:rPr>
+              <a:t>Front / Rear View</a:t>
+            </a:r>
+          </a:p>
+          <a:p>
+            <a:pPr lvl="1"/>
+            <a:endParaRPr lang="en-US" dirty="0">
+              <a:solidFill>
+                <a:schemeClr val="tx1"/>
+              </a:solidFill>
+            </a:endParaRPr>
+          </a:p>
+        </p:txBody>
+      </p:sp>
+      <p:sp>
+        <p:nvSpPr>
+          <p:cNvPr id="4" name="Footer Placeholder 3"/>
+          <p:cNvSpPr>
+            <a:spLocks noGrp="1"/>
+          </p:cNvSpPr>
+          <p:nvPr>
+            <p:ph type="ftr" sz="quarter" idx="15"/>
+          </p:nvPr>
+        </p:nvSpPr>
+        <p:spPr/>
+        <p:txBody>
+          <a:bodyPr/>
+          <a:lstStyle/>
+          <a:p>
+            <a:pPr algn="l"/>
+            <a:r>
+              <a:rPr lang="en-SG" sz="1000" smtClean="0"/>
+              <a:t>© 2018 National University of Singapore. All Rights Reserved</a:t>
+            </a:r>
+            <a:endParaRPr lang="en-SG" dirty="0"/>
+          </a:p>
+        </p:txBody>
+      </p:sp>
+      <p:sp>
+        <p:nvSpPr>
+          <p:cNvPr id="5" name="Slide Number Placeholder 4"/>
+          <p:cNvSpPr>
+            <a:spLocks noGrp="1"/>
+          </p:cNvSpPr>
+          <p:nvPr>
+            <p:ph type="sldNum" sz="quarter" idx="16"/>
+          </p:nvPr>
+        </p:nvSpPr>
+        <p:spPr/>
+        <p:txBody>
+          <a:bodyPr/>
+          <a:lstStyle/>
+          <a:p>
+            <a:fld id="{2F63C605-4FC6-46DE-BC90-871762EA3F52}" type="slidenum">
+              <a:rPr lang="en-SG" smtClean="0"/>
+              <a:pPr/>
+              <a:t>29</a:t>
+            </a:fld>
+            <a:endParaRPr lang="en-SG" dirty="0"/>
+          </a:p>
+        </p:txBody>
+      </p:sp>
+      <p:pic>
+        <p:nvPicPr>
+          <p:cNvPr id="7" name="Picture 6"/>
+          <p:cNvPicPr>
+            <a:picLocks noChangeAspect="1"/>
+          </p:cNvPicPr>
+          <p:nvPr/>
+        </p:nvPicPr>
+        <p:blipFill>
+          <a:blip r:embed="rId2"/>
+          <a:stretch>
+            <a:fillRect/>
+          </a:stretch>
+        </p:blipFill>
+        <p:spPr>
+          <a:xfrm>
+            <a:off x="4105940" y="2030516"/>
+            <a:ext cx="4472392" cy="2808477"/>
+          </a:xfrm>
+          <a:prstGeom prst="rect">
+            <a:avLst/>
+          </a:prstGeom>
+        </p:spPr>
+      </p:pic>
+    </p:spTree>
+    <p:extLst>
+      <p:ext uri="{BB962C8B-B14F-4D97-AF65-F5344CB8AC3E}">
+        <p14:creationId xmlns:p14="http://schemas.microsoft.com/office/powerpoint/2010/main" val="277305452"/>
       </p:ext>
     </p:extLst>
   </p:cSld>
@@ -17974,6 +19252,118 @@
     <p:extLst>
       <p:ext uri="{BB962C8B-B14F-4D97-AF65-F5344CB8AC3E}">
         <p14:creationId xmlns:p14="http://schemas.microsoft.com/office/powerpoint/2010/main" val="1105590467"/>
+      </p:ext>
+    </p:extLst>
+  </p:cSld>
+  <p:clrMapOvr>
+    <a:masterClrMapping/>
+  </p:clrMapOvr>
+</p:sld>
+</file>
+
+<file path=ppt/slides/slide30.xml><?xml version="1.0" encoding="utf-8"?>
+<p:sld xmlns:a="http://schemas.openxmlformats.org/drawingml/2006/main" xmlns:r="http://schemas.openxmlformats.org/officeDocument/2006/relationships" xmlns:p="http://schemas.openxmlformats.org/presentationml/2006/main">
+  <p:cSld>
+    <p:spTree>
+      <p:nvGrpSpPr>
+        <p:cNvPr id="1" name=""/>
+        <p:cNvGrpSpPr/>
+        <p:nvPr/>
+      </p:nvGrpSpPr>
+      <p:grpSpPr>
+        <a:xfrm>
+          <a:off x="0" y="0"/>
+          <a:ext cx="0" cy="0"/>
+          <a:chOff x="0" y="0"/>
+          <a:chExt cx="0" cy="0"/>
+        </a:xfrm>
+      </p:grpSpPr>
+      <p:sp>
+        <p:nvSpPr>
+          <p:cNvPr id="2" name="Title 1"/>
+          <p:cNvSpPr>
+            <a:spLocks noGrp="1"/>
+          </p:cNvSpPr>
+          <p:nvPr>
+            <p:ph type="title"/>
+          </p:nvPr>
+        </p:nvSpPr>
+        <p:spPr>
+          <a:xfrm>
+            <a:off x="2573601" y="3053030"/>
+            <a:ext cx="4648197" cy="545561"/>
+          </a:xfrm>
+        </p:spPr>
+        <p:txBody>
+          <a:bodyPr/>
+          <a:lstStyle/>
+          <a:p>
+            <a:r>
+              <a:rPr lang="en-US" dirty="0"/>
+              <a:t>Thank you! </a:t>
+            </a:r>
+            <a:r>
+              <a:rPr lang="en-US" dirty="0">
+                <a:sym typeface="Wingdings" panose="05000000000000000000" pitchFamily="2" charset="2"/>
+              </a:rPr>
+              <a:t> </a:t>
+            </a:r>
+            <a:endParaRPr lang="en-SG" dirty="0"/>
+          </a:p>
+        </p:txBody>
+      </p:sp>
+      <p:sp>
+        <p:nvSpPr>
+          <p:cNvPr id="4" name="Footer Placeholder 3"/>
+          <p:cNvSpPr>
+            <a:spLocks noGrp="1"/>
+          </p:cNvSpPr>
+          <p:nvPr>
+            <p:ph type="ftr" sz="quarter" idx="15"/>
+          </p:nvPr>
+        </p:nvSpPr>
+        <p:spPr/>
+        <p:txBody>
+          <a:bodyPr/>
+          <a:lstStyle/>
+          <a:p>
+            <a:pPr algn="l"/>
+            <a:r>
+              <a:rPr lang="en-SG" sz="1000" dirty="0"/>
+              <a:t>© 2018 National University of Singapore. All Rights Reserved</a:t>
+            </a:r>
+            <a:endParaRPr lang="en-SG" dirty="0"/>
+          </a:p>
+        </p:txBody>
+      </p:sp>
+      <p:sp>
+        <p:nvSpPr>
+          <p:cNvPr id="5" name="Slide Number Placeholder 4"/>
+          <p:cNvSpPr>
+            <a:spLocks noGrp="1"/>
+          </p:cNvSpPr>
+          <p:nvPr>
+            <p:ph type="sldNum" sz="quarter" idx="16"/>
+          </p:nvPr>
+        </p:nvSpPr>
+        <p:spPr/>
+        <p:txBody>
+          <a:bodyPr/>
+          <a:lstStyle/>
+          <a:p>
+            <a:fld id="{2F63C605-4FC6-46DE-BC90-871762EA3F52}" type="slidenum">
+              <a:rPr lang="en-SG" smtClean="0"/>
+              <a:pPr/>
+              <a:t>30</a:t>
+            </a:fld>
+            <a:endParaRPr lang="en-SG" dirty="0"/>
+          </a:p>
+        </p:txBody>
+      </p:sp>
+    </p:spTree>
+    <p:extLst>
+      <p:ext uri="{BB962C8B-B14F-4D97-AF65-F5344CB8AC3E}">
+        <p14:creationId xmlns:p14="http://schemas.microsoft.com/office/powerpoint/2010/main" val="3351845363"/>
       </p:ext>
     </p:extLst>
   </p:cSld>

</xml_diff>

<commit_message>
Update report and presentation documents on visualization;
</commit_message>
<xml_diff>
--- a/PracticeModule_Presentation.pptx
+++ b/PracticeModule_Presentation.pptx
@@ -5,10 +5,10 @@
     <p:sldMasterId id="2147483684" r:id="rId1"/>
   </p:sldMasterIdLst>
   <p:notesMasterIdLst>
-    <p:notesMasterId r:id="rId29"/>
+    <p:notesMasterId r:id="rId33"/>
   </p:notesMasterIdLst>
   <p:handoutMasterIdLst>
-    <p:handoutMasterId r:id="rId30"/>
+    <p:handoutMasterId r:id="rId34"/>
   </p:handoutMasterIdLst>
   <p:sldIdLst>
     <p:sldId id="281" r:id="rId2"/>
@@ -37,12 +37,16 @@
     <p:sldId id="516" r:id="rId25"/>
     <p:sldId id="507" r:id="rId26"/>
     <p:sldId id="508" r:id="rId27"/>
-    <p:sldId id="370" r:id="rId28"/>
+    <p:sldId id="517" r:id="rId28"/>
+    <p:sldId id="518" r:id="rId29"/>
+    <p:sldId id="519" r:id="rId30"/>
+    <p:sldId id="520" r:id="rId31"/>
+    <p:sldId id="370" r:id="rId32"/>
   </p:sldIdLst>
   <p:sldSz cx="9144000" cy="6858000" type="screen4x3"/>
   <p:notesSz cx="7099300" cy="10234613"/>
   <p:custDataLst>
-    <p:tags r:id="rId31"/>
+    <p:tags r:id="rId35"/>
   </p:custDataLst>
   <p:defaultTextStyle>
     <a:defPPr>
@@ -2577,14 +2581,35 @@
         </dgm:presLayoutVars>
       </dgm:prSet>
       <dgm:spPr/>
+      <dgm:t>
+        <a:bodyPr/>
+        <a:lstStyle/>
+        <a:p>
+          <a:endParaRPr lang="en-US"/>
+        </a:p>
+      </dgm:t>
     </dgm:pt>
     <dgm:pt modelId="{4B5D39CA-8147-4B81-8770-5E31FC6D1CFB}" type="pres">
       <dgm:prSet presAssocID="{91D0FCC9-0385-42AC-A8E5-78283D5D669C}" presName="sibTrans" presStyleLbl="sibTrans2D1" presStyleIdx="0" presStyleCnt="3"/>
       <dgm:spPr/>
+      <dgm:t>
+        <a:bodyPr/>
+        <a:lstStyle/>
+        <a:p>
+          <a:endParaRPr lang="en-US"/>
+        </a:p>
+      </dgm:t>
     </dgm:pt>
     <dgm:pt modelId="{41341A21-0806-411D-A443-625FA97E4491}" type="pres">
       <dgm:prSet presAssocID="{91D0FCC9-0385-42AC-A8E5-78283D5D669C}" presName="connectorText" presStyleLbl="sibTrans2D1" presStyleIdx="0" presStyleCnt="3"/>
       <dgm:spPr/>
+      <dgm:t>
+        <a:bodyPr/>
+        <a:lstStyle/>
+        <a:p>
+          <a:endParaRPr lang="en-US"/>
+        </a:p>
+      </dgm:t>
     </dgm:pt>
     <dgm:pt modelId="{EA5BC1ED-EB03-45BA-BC56-621EEE9BEBD1}" type="pres">
       <dgm:prSet presAssocID="{92249E20-58D4-4E75-BB12-FE5FBD54F135}" presName="node" presStyleLbl="node1" presStyleIdx="1" presStyleCnt="4">
@@ -2593,14 +2618,35 @@
         </dgm:presLayoutVars>
       </dgm:prSet>
       <dgm:spPr/>
+      <dgm:t>
+        <a:bodyPr/>
+        <a:lstStyle/>
+        <a:p>
+          <a:endParaRPr lang="en-US"/>
+        </a:p>
+      </dgm:t>
     </dgm:pt>
     <dgm:pt modelId="{95B3EF49-35D3-4519-9F1F-B39D5A0566E4}" type="pres">
       <dgm:prSet presAssocID="{0B72DC99-4E95-4ADB-960C-E769354E6A5D}" presName="sibTrans" presStyleLbl="sibTrans2D1" presStyleIdx="1" presStyleCnt="3"/>
       <dgm:spPr/>
+      <dgm:t>
+        <a:bodyPr/>
+        <a:lstStyle/>
+        <a:p>
+          <a:endParaRPr lang="en-US"/>
+        </a:p>
+      </dgm:t>
     </dgm:pt>
     <dgm:pt modelId="{9B203DD1-3145-4590-8ACC-2517ACFE25A8}" type="pres">
       <dgm:prSet presAssocID="{0B72DC99-4E95-4ADB-960C-E769354E6A5D}" presName="connectorText" presStyleLbl="sibTrans2D1" presStyleIdx="1" presStyleCnt="3"/>
       <dgm:spPr/>
+      <dgm:t>
+        <a:bodyPr/>
+        <a:lstStyle/>
+        <a:p>
+          <a:endParaRPr lang="en-US"/>
+        </a:p>
+      </dgm:t>
     </dgm:pt>
     <dgm:pt modelId="{A37733E1-C31E-4430-AEEA-7CC4BDFAF84B}" type="pres">
       <dgm:prSet presAssocID="{38DD500D-6BEB-44F1-A480-39EBC85B7D1B}" presName="node" presStyleLbl="node1" presStyleIdx="2" presStyleCnt="4">
@@ -2609,14 +2655,35 @@
         </dgm:presLayoutVars>
       </dgm:prSet>
       <dgm:spPr/>
+      <dgm:t>
+        <a:bodyPr/>
+        <a:lstStyle/>
+        <a:p>
+          <a:endParaRPr lang="en-US"/>
+        </a:p>
+      </dgm:t>
     </dgm:pt>
     <dgm:pt modelId="{7300E7F4-ED3F-436A-A1F0-90BEABB46E71}" type="pres">
       <dgm:prSet presAssocID="{6D1E928F-781F-462C-A8AC-2A960BFDA67A}" presName="sibTrans" presStyleLbl="sibTrans2D1" presStyleIdx="2" presStyleCnt="3"/>
       <dgm:spPr/>
+      <dgm:t>
+        <a:bodyPr/>
+        <a:lstStyle/>
+        <a:p>
+          <a:endParaRPr lang="en-US"/>
+        </a:p>
+      </dgm:t>
     </dgm:pt>
     <dgm:pt modelId="{D7B13FD1-4A98-4993-ACFA-933B70FB5D81}" type="pres">
       <dgm:prSet presAssocID="{6D1E928F-781F-462C-A8AC-2A960BFDA67A}" presName="connectorText" presStyleLbl="sibTrans2D1" presStyleIdx="2" presStyleCnt="3"/>
       <dgm:spPr/>
+      <dgm:t>
+        <a:bodyPr/>
+        <a:lstStyle/>
+        <a:p>
+          <a:endParaRPr lang="en-US"/>
+        </a:p>
+      </dgm:t>
     </dgm:pt>
     <dgm:pt modelId="{F65F4BF1-A7B9-4C27-8B28-16C04C25982E}" type="pres">
       <dgm:prSet presAssocID="{764C4D4F-B7F7-4995-9F46-8E01C62C581B}" presName="node" presStyleLbl="node1" presStyleIdx="3" presStyleCnt="4">
@@ -2625,23 +2692,30 @@
         </dgm:presLayoutVars>
       </dgm:prSet>
       <dgm:spPr/>
+      <dgm:t>
+        <a:bodyPr/>
+        <a:lstStyle/>
+        <a:p>
+          <a:endParaRPr lang="en-US"/>
+        </a:p>
+      </dgm:t>
     </dgm:pt>
   </dgm:ptLst>
   <dgm:cxnLst>
+    <dgm:cxn modelId="{3EBFAACE-A4CF-4057-9EC8-3A59330D069F}" type="presOf" srcId="{69C95212-ACBD-498E-A011-59076A4285CB}" destId="{4D4E5D9B-DE30-46F3-864F-B20CBCB47B81}" srcOrd="0" destOrd="0" presId="urn:microsoft.com/office/officeart/2005/8/layout/process1"/>
+    <dgm:cxn modelId="{2D076695-4491-4B11-95EC-7786C59603C3}" type="presOf" srcId="{0B72DC99-4E95-4ADB-960C-E769354E6A5D}" destId="{95B3EF49-35D3-4519-9F1F-B39D5A0566E4}" srcOrd="0" destOrd="0" presId="urn:microsoft.com/office/officeart/2005/8/layout/process1"/>
+    <dgm:cxn modelId="{05EBE6A4-21D9-4E6D-96DC-9D3E50C88595}" type="presOf" srcId="{38DD500D-6BEB-44F1-A480-39EBC85B7D1B}" destId="{A37733E1-C31E-4430-AEEA-7CC4BDFAF84B}" srcOrd="0" destOrd="0" presId="urn:microsoft.com/office/officeart/2005/8/layout/process1"/>
+    <dgm:cxn modelId="{B7AF3A68-AEB3-4860-978B-B262BEBB9ECB}" type="presOf" srcId="{6D1E928F-781F-462C-A8AC-2A960BFDA67A}" destId="{7300E7F4-ED3F-436A-A1F0-90BEABB46E71}" srcOrd="0" destOrd="0" presId="urn:microsoft.com/office/officeart/2005/8/layout/process1"/>
+    <dgm:cxn modelId="{31005A28-3819-43FC-A794-27C122A41925}" srcId="{9496E0A2-784B-483A-9A32-E68AF617843D}" destId="{38DD500D-6BEB-44F1-A480-39EBC85B7D1B}" srcOrd="2" destOrd="0" parTransId="{3CE2BC79-A484-4240-A2CB-1BC232A1E53F}" sibTransId="{6D1E928F-781F-462C-A8AC-2A960BFDA67A}"/>
+    <dgm:cxn modelId="{01F09420-6EB0-4A7F-B4CE-2315FD06751C}" type="presOf" srcId="{6D1E928F-781F-462C-A8AC-2A960BFDA67A}" destId="{D7B13FD1-4A98-4993-ACFA-933B70FB5D81}" srcOrd="1" destOrd="0" presId="urn:microsoft.com/office/officeart/2005/8/layout/process1"/>
+    <dgm:cxn modelId="{1530AF90-D573-4EFA-A3BC-840C3370D71B}" srcId="{9496E0A2-784B-483A-9A32-E68AF617843D}" destId="{764C4D4F-B7F7-4995-9F46-8E01C62C581B}" srcOrd="3" destOrd="0" parTransId="{A6A82594-4016-4707-8656-642BA426B3D4}" sibTransId="{356D9044-9DCA-4929-92DF-A2BDE3B61A47}"/>
+    <dgm:cxn modelId="{D1CF8BBB-F3E6-4482-8B69-D1BE9774788E}" type="presOf" srcId="{91D0FCC9-0385-42AC-A8E5-78283D5D669C}" destId="{4B5D39CA-8147-4B81-8770-5E31FC6D1CFB}" srcOrd="0" destOrd="0" presId="urn:microsoft.com/office/officeart/2005/8/layout/process1"/>
+    <dgm:cxn modelId="{5E0FD1A2-149D-4CF9-AEE7-688223EDC542}" type="presOf" srcId="{764C4D4F-B7F7-4995-9F46-8E01C62C581B}" destId="{F65F4BF1-A7B9-4C27-8B28-16C04C25982E}" srcOrd="0" destOrd="0" presId="urn:microsoft.com/office/officeart/2005/8/layout/process1"/>
+    <dgm:cxn modelId="{79D506E8-F752-4BA4-B280-EF0BEBC86F63}" srcId="{9496E0A2-784B-483A-9A32-E68AF617843D}" destId="{92249E20-58D4-4E75-BB12-FE5FBD54F135}" srcOrd="1" destOrd="0" parTransId="{105B3AA3-CBE4-4ECA-BC44-B6DCA5E7A036}" sibTransId="{0B72DC99-4E95-4ADB-960C-E769354E6A5D}"/>
     <dgm:cxn modelId="{23BC981F-CC7C-4D5F-91BD-DE6EC72DB040}" srcId="{9496E0A2-784B-483A-9A32-E68AF617843D}" destId="{69C95212-ACBD-498E-A011-59076A4285CB}" srcOrd="0" destOrd="0" parTransId="{BF3D5BE3-835C-4027-9271-54CEA95A0702}" sibTransId="{91D0FCC9-0385-42AC-A8E5-78283D5D669C}"/>
-    <dgm:cxn modelId="{01F09420-6EB0-4A7F-B4CE-2315FD06751C}" type="presOf" srcId="{6D1E928F-781F-462C-A8AC-2A960BFDA67A}" destId="{D7B13FD1-4A98-4993-ACFA-933B70FB5D81}" srcOrd="1" destOrd="0" presId="urn:microsoft.com/office/officeart/2005/8/layout/process1"/>
-    <dgm:cxn modelId="{31005A28-3819-43FC-A794-27C122A41925}" srcId="{9496E0A2-784B-483A-9A32-E68AF617843D}" destId="{38DD500D-6BEB-44F1-A480-39EBC85B7D1B}" srcOrd="2" destOrd="0" parTransId="{3CE2BC79-A484-4240-A2CB-1BC232A1E53F}" sibTransId="{6D1E928F-781F-462C-A8AC-2A960BFDA67A}"/>
-    <dgm:cxn modelId="{B7AF3A68-AEB3-4860-978B-B262BEBB9ECB}" type="presOf" srcId="{6D1E928F-781F-462C-A8AC-2A960BFDA67A}" destId="{7300E7F4-ED3F-436A-A1F0-90BEABB46E71}" srcOrd="0" destOrd="0" presId="urn:microsoft.com/office/officeart/2005/8/layout/process1"/>
     <dgm:cxn modelId="{F4BB5269-9705-4D80-8BF8-3B73A8F8EE8D}" type="presOf" srcId="{91D0FCC9-0385-42AC-A8E5-78283D5D669C}" destId="{41341A21-0806-411D-A443-625FA97E4491}" srcOrd="1" destOrd="0" presId="urn:microsoft.com/office/officeart/2005/8/layout/process1"/>
     <dgm:cxn modelId="{FEAE6454-4E5D-4190-8A76-D27FC4FC4790}" type="presOf" srcId="{9496E0A2-784B-483A-9A32-E68AF617843D}" destId="{9EA8A120-7984-4A2B-9532-24393BA5D7A2}" srcOrd="0" destOrd="0" presId="urn:microsoft.com/office/officeart/2005/8/layout/process1"/>
     <dgm:cxn modelId="{F8BD9F76-8AA1-4A33-B686-C2C5DEA97305}" type="presOf" srcId="{0B72DC99-4E95-4ADB-960C-E769354E6A5D}" destId="{9B203DD1-3145-4590-8ACC-2517ACFE25A8}" srcOrd="1" destOrd="0" presId="urn:microsoft.com/office/officeart/2005/8/layout/process1"/>
-    <dgm:cxn modelId="{1530AF90-D573-4EFA-A3BC-840C3370D71B}" srcId="{9496E0A2-784B-483A-9A32-E68AF617843D}" destId="{764C4D4F-B7F7-4995-9F46-8E01C62C581B}" srcOrd="3" destOrd="0" parTransId="{A6A82594-4016-4707-8656-642BA426B3D4}" sibTransId="{356D9044-9DCA-4929-92DF-A2BDE3B61A47}"/>
-    <dgm:cxn modelId="{2D076695-4491-4B11-95EC-7786C59603C3}" type="presOf" srcId="{0B72DC99-4E95-4ADB-960C-E769354E6A5D}" destId="{95B3EF49-35D3-4519-9F1F-B39D5A0566E4}" srcOrd="0" destOrd="0" presId="urn:microsoft.com/office/officeart/2005/8/layout/process1"/>
-    <dgm:cxn modelId="{5E0FD1A2-149D-4CF9-AEE7-688223EDC542}" type="presOf" srcId="{764C4D4F-B7F7-4995-9F46-8E01C62C581B}" destId="{F65F4BF1-A7B9-4C27-8B28-16C04C25982E}" srcOrd="0" destOrd="0" presId="urn:microsoft.com/office/officeart/2005/8/layout/process1"/>
-    <dgm:cxn modelId="{05EBE6A4-21D9-4E6D-96DC-9D3E50C88595}" type="presOf" srcId="{38DD500D-6BEB-44F1-A480-39EBC85B7D1B}" destId="{A37733E1-C31E-4430-AEEA-7CC4BDFAF84B}" srcOrd="0" destOrd="0" presId="urn:microsoft.com/office/officeart/2005/8/layout/process1"/>
-    <dgm:cxn modelId="{D1CF8BBB-F3E6-4482-8B69-D1BE9774788E}" type="presOf" srcId="{91D0FCC9-0385-42AC-A8E5-78283D5D669C}" destId="{4B5D39CA-8147-4B81-8770-5E31FC6D1CFB}" srcOrd="0" destOrd="0" presId="urn:microsoft.com/office/officeart/2005/8/layout/process1"/>
-    <dgm:cxn modelId="{3EBFAACE-A4CF-4057-9EC8-3A59330D069F}" type="presOf" srcId="{69C95212-ACBD-498E-A011-59076A4285CB}" destId="{4D4E5D9B-DE30-46F3-864F-B20CBCB47B81}" srcOrd="0" destOrd="0" presId="urn:microsoft.com/office/officeart/2005/8/layout/process1"/>
-    <dgm:cxn modelId="{79D506E8-F752-4BA4-B280-EF0BEBC86F63}" srcId="{9496E0A2-784B-483A-9A32-E68AF617843D}" destId="{92249E20-58D4-4E75-BB12-FE5FBD54F135}" srcOrd="1" destOrd="0" parTransId="{105B3AA3-CBE4-4ECA-BC44-B6DCA5E7A036}" sibTransId="{0B72DC99-4E95-4ADB-960C-E769354E6A5D}"/>
     <dgm:cxn modelId="{099D99FB-52B2-434C-BA10-1675505A420B}" type="presOf" srcId="{92249E20-58D4-4E75-BB12-FE5FBD54F135}" destId="{EA5BC1ED-EB03-45BA-BC56-621EEE9BEBD1}" srcOrd="0" destOrd="0" presId="urn:microsoft.com/office/officeart/2005/8/layout/process1"/>
     <dgm:cxn modelId="{DA8115C2-D2F4-4CCB-9D90-0A509018B8F1}" type="presParOf" srcId="{9EA8A120-7984-4A2B-9532-24393BA5D7A2}" destId="{4D4E5D9B-DE30-46F3-864F-B20CBCB47B81}" srcOrd="0" destOrd="0" presId="urn:microsoft.com/office/officeart/2005/8/layout/process1"/>
     <dgm:cxn modelId="{0C3F32CC-6A85-4291-B66A-941971627454}" type="presParOf" srcId="{9EA8A120-7984-4A2B-9532-24393BA5D7A2}" destId="{4B5D39CA-8147-4B81-8770-5E31FC6D1CFB}" srcOrd="1" destOrd="0" presId="urn:microsoft.com/office/officeart/2005/8/layout/process1"/>
@@ -3033,6 +3107,13 @@
         </dgm:presLayoutVars>
       </dgm:prSet>
       <dgm:spPr/>
+      <dgm:t>
+        <a:bodyPr/>
+        <a:lstStyle/>
+        <a:p>
+          <a:endParaRPr lang="en-US"/>
+        </a:p>
+      </dgm:t>
     </dgm:pt>
     <dgm:pt modelId="{189D6A4B-21E2-4FCD-A1A9-B0A37070679D}" type="pres">
       <dgm:prSet presAssocID="{6909E702-DF4A-4621-83E4-C7AE51A47D48}" presName="node" presStyleLbl="node1" presStyleIdx="0" presStyleCnt="8">
@@ -3041,14 +3122,35 @@
         </dgm:presLayoutVars>
       </dgm:prSet>
       <dgm:spPr/>
+      <dgm:t>
+        <a:bodyPr/>
+        <a:lstStyle/>
+        <a:p>
+          <a:endParaRPr lang="en-US"/>
+        </a:p>
+      </dgm:t>
     </dgm:pt>
     <dgm:pt modelId="{E5D9E9D1-B554-4B69-88C2-23DB15039166}" type="pres">
       <dgm:prSet presAssocID="{76AC9EB8-B499-4014-9C2D-CF84A71AB784}" presName="sibTrans" presStyleLbl="sibTrans2D1" presStyleIdx="0" presStyleCnt="7"/>
       <dgm:spPr/>
+      <dgm:t>
+        <a:bodyPr/>
+        <a:lstStyle/>
+        <a:p>
+          <a:endParaRPr lang="en-US"/>
+        </a:p>
+      </dgm:t>
     </dgm:pt>
     <dgm:pt modelId="{7BEE8685-09E9-4964-906A-51AD9B41B2B2}" type="pres">
       <dgm:prSet presAssocID="{76AC9EB8-B499-4014-9C2D-CF84A71AB784}" presName="connectorText" presStyleLbl="sibTrans2D1" presStyleIdx="0" presStyleCnt="7"/>
       <dgm:spPr/>
+      <dgm:t>
+        <a:bodyPr/>
+        <a:lstStyle/>
+        <a:p>
+          <a:endParaRPr lang="en-US"/>
+        </a:p>
+      </dgm:t>
     </dgm:pt>
     <dgm:pt modelId="{D5C5BD5A-4727-46B4-AED3-2156E2F1911C}" type="pres">
       <dgm:prSet presAssocID="{16DB864F-1D40-4E34-8BD9-F1C660CD2CFB}" presName="node" presStyleLbl="node1" presStyleIdx="1" presStyleCnt="8" custScaleX="177674">
@@ -3057,14 +3159,35 @@
         </dgm:presLayoutVars>
       </dgm:prSet>
       <dgm:spPr/>
+      <dgm:t>
+        <a:bodyPr/>
+        <a:lstStyle/>
+        <a:p>
+          <a:endParaRPr lang="en-US"/>
+        </a:p>
+      </dgm:t>
     </dgm:pt>
     <dgm:pt modelId="{70E8EFBD-24AF-49C1-AB74-E0E433B72786}" type="pres">
       <dgm:prSet presAssocID="{0CC9A380-740E-4425-AC43-31F4F13B3004}" presName="sibTrans" presStyleLbl="sibTrans2D1" presStyleIdx="1" presStyleCnt="7"/>
       <dgm:spPr/>
+      <dgm:t>
+        <a:bodyPr/>
+        <a:lstStyle/>
+        <a:p>
+          <a:endParaRPr lang="en-US"/>
+        </a:p>
+      </dgm:t>
     </dgm:pt>
     <dgm:pt modelId="{6C363702-4613-491B-B93A-F5677269E603}" type="pres">
       <dgm:prSet presAssocID="{0CC9A380-740E-4425-AC43-31F4F13B3004}" presName="connectorText" presStyleLbl="sibTrans2D1" presStyleIdx="1" presStyleCnt="7"/>
       <dgm:spPr/>
+      <dgm:t>
+        <a:bodyPr/>
+        <a:lstStyle/>
+        <a:p>
+          <a:endParaRPr lang="en-US"/>
+        </a:p>
+      </dgm:t>
     </dgm:pt>
     <dgm:pt modelId="{5E07831F-96AB-45D4-BDD8-76735DEC4F3D}" type="pres">
       <dgm:prSet presAssocID="{B0120D59-46F5-4609-8A90-D19147655A7C}" presName="node" presStyleLbl="node1" presStyleIdx="2" presStyleCnt="8" custScaleX="178712">
@@ -3073,14 +3196,35 @@
         </dgm:presLayoutVars>
       </dgm:prSet>
       <dgm:spPr/>
+      <dgm:t>
+        <a:bodyPr/>
+        <a:lstStyle/>
+        <a:p>
+          <a:endParaRPr lang="en-US"/>
+        </a:p>
+      </dgm:t>
     </dgm:pt>
     <dgm:pt modelId="{C3ADE6CA-9FE3-4A69-9EF9-3DEB92BC6215}" type="pres">
       <dgm:prSet presAssocID="{05504F13-8F6D-4A96-A060-7C7C04BCCDC5}" presName="sibTrans" presStyleLbl="sibTrans2D1" presStyleIdx="2" presStyleCnt="7"/>
       <dgm:spPr/>
+      <dgm:t>
+        <a:bodyPr/>
+        <a:lstStyle/>
+        <a:p>
+          <a:endParaRPr lang="en-US"/>
+        </a:p>
+      </dgm:t>
     </dgm:pt>
     <dgm:pt modelId="{FC02DA56-149D-4855-9DCF-0DD82448A01C}" type="pres">
       <dgm:prSet presAssocID="{05504F13-8F6D-4A96-A060-7C7C04BCCDC5}" presName="connectorText" presStyleLbl="sibTrans2D1" presStyleIdx="2" presStyleCnt="7"/>
       <dgm:spPr/>
+      <dgm:t>
+        <a:bodyPr/>
+        <a:lstStyle/>
+        <a:p>
+          <a:endParaRPr lang="en-US"/>
+        </a:p>
+      </dgm:t>
     </dgm:pt>
     <dgm:pt modelId="{015423F5-9245-4C68-91D2-E0D99B323ECB}" type="pres">
       <dgm:prSet presAssocID="{4E8DDCF5-1131-4B7B-8DC9-CA1D909DEB4C}" presName="node" presStyleLbl="node1" presStyleIdx="3" presStyleCnt="8" custScaleX="181548">
@@ -3089,14 +3233,35 @@
         </dgm:presLayoutVars>
       </dgm:prSet>
       <dgm:spPr/>
+      <dgm:t>
+        <a:bodyPr/>
+        <a:lstStyle/>
+        <a:p>
+          <a:endParaRPr lang="en-US"/>
+        </a:p>
+      </dgm:t>
     </dgm:pt>
     <dgm:pt modelId="{BB051662-59CA-41A7-A56A-FFBA00380174}" type="pres">
       <dgm:prSet presAssocID="{1E64BDA1-8C1C-4293-9ECF-B16190F3555C}" presName="sibTrans" presStyleLbl="sibTrans2D1" presStyleIdx="3" presStyleCnt="7"/>
       <dgm:spPr/>
+      <dgm:t>
+        <a:bodyPr/>
+        <a:lstStyle/>
+        <a:p>
+          <a:endParaRPr lang="en-US"/>
+        </a:p>
+      </dgm:t>
     </dgm:pt>
     <dgm:pt modelId="{85ACBFE3-ED12-472D-9155-8AECC46A625D}" type="pres">
       <dgm:prSet presAssocID="{1E64BDA1-8C1C-4293-9ECF-B16190F3555C}" presName="connectorText" presStyleLbl="sibTrans2D1" presStyleIdx="3" presStyleCnt="7"/>
       <dgm:spPr/>
+      <dgm:t>
+        <a:bodyPr/>
+        <a:lstStyle/>
+        <a:p>
+          <a:endParaRPr lang="en-US"/>
+        </a:p>
+      </dgm:t>
     </dgm:pt>
     <dgm:pt modelId="{DE8A9ADE-4EA7-4E5F-9B22-8F0A88EF3F94}" type="pres">
       <dgm:prSet presAssocID="{6BB4A08D-9009-408D-A672-847AAAD9D481}" presName="node" presStyleLbl="node1" presStyleIdx="4" presStyleCnt="8" custScaleX="184493">
@@ -3105,14 +3270,35 @@
         </dgm:presLayoutVars>
       </dgm:prSet>
       <dgm:spPr/>
+      <dgm:t>
+        <a:bodyPr/>
+        <a:lstStyle/>
+        <a:p>
+          <a:endParaRPr lang="en-US"/>
+        </a:p>
+      </dgm:t>
     </dgm:pt>
     <dgm:pt modelId="{99F1D40A-DB5B-4C5D-98D8-82EDE31912FE}" type="pres">
       <dgm:prSet presAssocID="{F27D3CED-FAAD-45A0-B25C-96C0B097E61C}" presName="sibTrans" presStyleLbl="sibTrans2D1" presStyleIdx="4" presStyleCnt="7"/>
       <dgm:spPr/>
+      <dgm:t>
+        <a:bodyPr/>
+        <a:lstStyle/>
+        <a:p>
+          <a:endParaRPr lang="en-US"/>
+        </a:p>
+      </dgm:t>
     </dgm:pt>
     <dgm:pt modelId="{228957F4-EE3C-408A-83BB-E73D4ED2802F}" type="pres">
       <dgm:prSet presAssocID="{F27D3CED-FAAD-45A0-B25C-96C0B097E61C}" presName="connectorText" presStyleLbl="sibTrans2D1" presStyleIdx="4" presStyleCnt="7"/>
       <dgm:spPr/>
+      <dgm:t>
+        <a:bodyPr/>
+        <a:lstStyle/>
+        <a:p>
+          <a:endParaRPr lang="en-US"/>
+        </a:p>
+      </dgm:t>
     </dgm:pt>
     <dgm:pt modelId="{52BF1B02-38BA-490D-B49F-F7F428D4159F}" type="pres">
       <dgm:prSet presAssocID="{F77B9BF5-4593-4B18-BA5C-8BE2B8071A44}" presName="node" presStyleLbl="node1" presStyleIdx="5" presStyleCnt="8" custScaleX="183378">
@@ -3121,14 +3307,35 @@
         </dgm:presLayoutVars>
       </dgm:prSet>
       <dgm:spPr/>
+      <dgm:t>
+        <a:bodyPr/>
+        <a:lstStyle/>
+        <a:p>
+          <a:endParaRPr lang="en-US"/>
+        </a:p>
+      </dgm:t>
     </dgm:pt>
     <dgm:pt modelId="{FFAB1546-EE89-4905-B200-014D9D15DEB5}" type="pres">
       <dgm:prSet presAssocID="{B8A5FD80-BDA8-4DB0-BAA6-7D996DB83F32}" presName="sibTrans" presStyleLbl="sibTrans2D1" presStyleIdx="5" presStyleCnt="7"/>
       <dgm:spPr/>
+      <dgm:t>
+        <a:bodyPr/>
+        <a:lstStyle/>
+        <a:p>
+          <a:endParaRPr lang="en-US"/>
+        </a:p>
+      </dgm:t>
     </dgm:pt>
     <dgm:pt modelId="{F99DF6A8-FCCC-45FE-984E-74BB5D13A325}" type="pres">
       <dgm:prSet presAssocID="{B8A5FD80-BDA8-4DB0-BAA6-7D996DB83F32}" presName="connectorText" presStyleLbl="sibTrans2D1" presStyleIdx="5" presStyleCnt="7"/>
       <dgm:spPr/>
+      <dgm:t>
+        <a:bodyPr/>
+        <a:lstStyle/>
+        <a:p>
+          <a:endParaRPr lang="en-US"/>
+        </a:p>
+      </dgm:t>
     </dgm:pt>
     <dgm:pt modelId="{CFBA9DB8-BD38-47A9-83E9-C039D73A7363}" type="pres">
       <dgm:prSet presAssocID="{44D9E930-28F8-42A2-AEDE-C2AF9832F680}" presName="node" presStyleLbl="node1" presStyleIdx="6" presStyleCnt="8" custScaleX="187609">
@@ -3137,14 +3344,35 @@
         </dgm:presLayoutVars>
       </dgm:prSet>
       <dgm:spPr/>
+      <dgm:t>
+        <a:bodyPr/>
+        <a:lstStyle/>
+        <a:p>
+          <a:endParaRPr lang="en-US"/>
+        </a:p>
+      </dgm:t>
     </dgm:pt>
     <dgm:pt modelId="{AA747EB2-8553-4BFB-A459-0AE4760BF603}" type="pres">
       <dgm:prSet presAssocID="{BEF039B9-78B3-44AC-BCD2-D5D97EFF241A}" presName="sibTrans" presStyleLbl="sibTrans2D1" presStyleIdx="6" presStyleCnt="7"/>
       <dgm:spPr/>
+      <dgm:t>
+        <a:bodyPr/>
+        <a:lstStyle/>
+        <a:p>
+          <a:endParaRPr lang="en-US"/>
+        </a:p>
+      </dgm:t>
     </dgm:pt>
     <dgm:pt modelId="{6B4A65B5-2DFC-4228-9C5F-110DC47622B7}" type="pres">
       <dgm:prSet presAssocID="{BEF039B9-78B3-44AC-BCD2-D5D97EFF241A}" presName="connectorText" presStyleLbl="sibTrans2D1" presStyleIdx="6" presStyleCnt="7"/>
       <dgm:spPr/>
+      <dgm:t>
+        <a:bodyPr/>
+        <a:lstStyle/>
+        <a:p>
+          <a:endParaRPr lang="en-US"/>
+        </a:p>
+      </dgm:t>
     </dgm:pt>
     <dgm:pt modelId="{C66BF0E9-CB5D-486D-B436-1555A05A59F0}" type="pres">
       <dgm:prSet presAssocID="{9A14F079-F04B-4CC9-9700-618484CACBA1}" presName="node" presStyleLbl="node1" presStyleIdx="7" presStyleCnt="8">
@@ -3153,39 +3381,46 @@
         </dgm:presLayoutVars>
       </dgm:prSet>
       <dgm:spPr/>
+      <dgm:t>
+        <a:bodyPr/>
+        <a:lstStyle/>
+        <a:p>
+          <a:endParaRPr lang="en-US"/>
+        </a:p>
+      </dgm:t>
     </dgm:pt>
   </dgm:ptLst>
   <dgm:cxnLst>
+    <dgm:cxn modelId="{CA6ECBB7-3C85-4C7D-B933-A652218F8480}" type="presOf" srcId="{76AC9EB8-B499-4014-9C2D-CF84A71AB784}" destId="{E5D9E9D1-B554-4B69-88C2-23DB15039166}" srcOrd="0" destOrd="0" presId="urn:microsoft.com/office/officeart/2005/8/layout/process2"/>
+    <dgm:cxn modelId="{B1AAA544-2A7A-462B-8263-6FCDC6C98228}" type="presOf" srcId="{0CC9A380-740E-4425-AC43-31F4F13B3004}" destId="{6C363702-4613-491B-B93A-F5677269E603}" srcOrd="1" destOrd="0" presId="urn:microsoft.com/office/officeart/2005/8/layout/process2"/>
+    <dgm:cxn modelId="{97036991-5E3A-46EC-8150-B28E18F668ED}" type="presOf" srcId="{1E64BDA1-8C1C-4293-9ECF-B16190F3555C}" destId="{BB051662-59CA-41A7-A56A-FFBA00380174}" srcOrd="0" destOrd="0" presId="urn:microsoft.com/office/officeart/2005/8/layout/process2"/>
+    <dgm:cxn modelId="{62E71CF5-02C6-426F-B29D-352D349A767B}" type="presOf" srcId="{831248B5-42BE-41CC-B00B-93FDF821FE9F}" destId="{D7B6869B-4E62-4ED6-98D4-117812227983}" srcOrd="0" destOrd="0" presId="urn:microsoft.com/office/officeart/2005/8/layout/process2"/>
+    <dgm:cxn modelId="{C1508D8D-DC9F-4A4C-B426-EDCB0C2D4635}" type="presOf" srcId="{BEF039B9-78B3-44AC-BCD2-D5D97EFF241A}" destId="{AA747EB2-8553-4BFB-A459-0AE4760BF603}" srcOrd="0" destOrd="0" presId="urn:microsoft.com/office/officeart/2005/8/layout/process2"/>
+    <dgm:cxn modelId="{9E8B0EC8-CDD5-4D01-BB78-42B94FC3B680}" srcId="{831248B5-42BE-41CC-B00B-93FDF821FE9F}" destId="{44D9E930-28F8-42A2-AEDE-C2AF9832F680}" srcOrd="6" destOrd="0" parTransId="{F461D74D-E1BE-4262-9A51-8AF93A2A9DAE}" sibTransId="{BEF039B9-78B3-44AC-BCD2-D5D97EFF241A}"/>
+    <dgm:cxn modelId="{AFB1F2F6-1307-4941-86BA-4A12F4B9B558}" type="presOf" srcId="{05504F13-8F6D-4A96-A060-7C7C04BCCDC5}" destId="{C3ADE6CA-9FE3-4A69-9EF9-3DEB92BC6215}" srcOrd="0" destOrd="0" presId="urn:microsoft.com/office/officeart/2005/8/layout/process2"/>
+    <dgm:cxn modelId="{417CA51D-93DA-40F2-8DB1-5C199B54D276}" type="presOf" srcId="{6909E702-DF4A-4621-83E4-C7AE51A47D48}" destId="{189D6A4B-21E2-4FCD-A1A9-B0A37070679D}" srcOrd="0" destOrd="0" presId="urn:microsoft.com/office/officeart/2005/8/layout/process2"/>
+    <dgm:cxn modelId="{D724B969-C453-40A9-A4DD-724E37D812DE}" type="presOf" srcId="{16DB864F-1D40-4E34-8BD9-F1C660CD2CFB}" destId="{D5C5BD5A-4727-46B4-AED3-2156E2F1911C}" srcOrd="0" destOrd="0" presId="urn:microsoft.com/office/officeart/2005/8/layout/process2"/>
     <dgm:cxn modelId="{1B41AA09-DD62-4EB7-9BBC-88AFF9167CB2}" type="presOf" srcId="{BEF039B9-78B3-44AC-BCD2-D5D97EFF241A}" destId="{6B4A65B5-2DFC-4228-9C5F-110DC47622B7}" srcOrd="1" destOrd="0" presId="urn:microsoft.com/office/officeart/2005/8/layout/process2"/>
-    <dgm:cxn modelId="{CCBB2E18-AEAA-4DC0-9E3C-F88CDCA45059}" type="presOf" srcId="{F27D3CED-FAAD-45A0-B25C-96C0B097E61C}" destId="{228957F4-EE3C-408A-83BB-E73D4ED2802F}" srcOrd="1" destOrd="0" presId="urn:microsoft.com/office/officeart/2005/8/layout/process2"/>
     <dgm:cxn modelId="{F848FD1B-9938-40DA-B871-80D23B94C0A1}" srcId="{831248B5-42BE-41CC-B00B-93FDF821FE9F}" destId="{6BB4A08D-9009-408D-A672-847AAAD9D481}" srcOrd="4" destOrd="0" parTransId="{41DA4F41-3DCF-4131-AA4C-8DFB2599D393}" sibTransId="{F27D3CED-FAAD-45A0-B25C-96C0B097E61C}"/>
-    <dgm:cxn modelId="{417CA51D-93DA-40F2-8DB1-5C199B54D276}" type="presOf" srcId="{6909E702-DF4A-4621-83E4-C7AE51A47D48}" destId="{189D6A4B-21E2-4FCD-A1A9-B0A37070679D}" srcOrd="0" destOrd="0" presId="urn:microsoft.com/office/officeart/2005/8/layout/process2"/>
-    <dgm:cxn modelId="{D497E32E-9E75-4ED1-AB75-FDC6416370FF}" type="presOf" srcId="{1E64BDA1-8C1C-4293-9ECF-B16190F3555C}" destId="{85ACBFE3-ED12-472D-9155-8AECC46A625D}" srcOrd="1" destOrd="0" presId="urn:microsoft.com/office/officeart/2005/8/layout/process2"/>
-    <dgm:cxn modelId="{6B5C7332-53C1-44A1-987C-DD115C27287D}" type="presOf" srcId="{B0120D59-46F5-4609-8A90-D19147655A7C}" destId="{5E07831F-96AB-45D4-BDD8-76735DEC4F3D}" srcOrd="0" destOrd="0" presId="urn:microsoft.com/office/officeart/2005/8/layout/process2"/>
+    <dgm:cxn modelId="{74E0374E-C34F-4DBF-9C88-16D4690BFED2}" type="presOf" srcId="{F27D3CED-FAAD-45A0-B25C-96C0B097E61C}" destId="{99F1D40A-DB5B-4C5D-98D8-82EDE31912FE}" srcOrd="0" destOrd="0" presId="urn:microsoft.com/office/officeart/2005/8/layout/process2"/>
+    <dgm:cxn modelId="{E273DFAF-B31F-4432-9592-248697CD484E}" type="presOf" srcId="{0CC9A380-740E-4425-AC43-31F4F13B3004}" destId="{70E8EFBD-24AF-49C1-AB74-E0E433B72786}" srcOrd="0" destOrd="0" presId="urn:microsoft.com/office/officeart/2005/8/layout/process2"/>
     <dgm:cxn modelId="{94C5DB3A-31F4-43ED-AF25-F5889F60EB0E}" type="presOf" srcId="{4E8DDCF5-1131-4B7B-8DC9-CA1D909DEB4C}" destId="{015423F5-9245-4C68-91D2-E0D99B323ECB}" srcOrd="0" destOrd="0" presId="urn:microsoft.com/office/officeart/2005/8/layout/process2"/>
-    <dgm:cxn modelId="{67A6795E-B981-4D59-8045-63955DC05E94}" type="presOf" srcId="{B8A5FD80-BDA8-4DB0-BAA6-7D996DB83F32}" destId="{F99DF6A8-FCCC-45FE-984E-74BB5D13A325}" srcOrd="1" destOrd="0" presId="urn:microsoft.com/office/officeart/2005/8/layout/process2"/>
-    <dgm:cxn modelId="{B1AAA544-2A7A-462B-8263-6FCDC6C98228}" type="presOf" srcId="{0CC9A380-740E-4425-AC43-31F4F13B3004}" destId="{6C363702-4613-491B-B93A-F5677269E603}" srcOrd="1" destOrd="0" presId="urn:microsoft.com/office/officeart/2005/8/layout/process2"/>
     <dgm:cxn modelId="{3C976765-D4C8-4738-B7C4-C1318D78CD1F}" srcId="{831248B5-42BE-41CC-B00B-93FDF821FE9F}" destId="{6909E702-DF4A-4621-83E4-C7AE51A47D48}" srcOrd="0" destOrd="0" parTransId="{1DE2D664-EDBC-46EB-96F3-DDBF3F502ACD}" sibTransId="{76AC9EB8-B499-4014-9C2D-CF84A71AB784}"/>
     <dgm:cxn modelId="{F15E6F49-4000-47CC-8885-1783141097E5}" srcId="{831248B5-42BE-41CC-B00B-93FDF821FE9F}" destId="{9A14F079-F04B-4CC9-9700-618484CACBA1}" srcOrd="7" destOrd="0" parTransId="{6B6E3BE4-034D-49F9-B705-99516622DF0B}" sibTransId="{E9A69AA7-B434-477C-A848-F3319E85C266}"/>
-    <dgm:cxn modelId="{D724B969-C453-40A9-A4DD-724E37D812DE}" type="presOf" srcId="{16DB864F-1D40-4E34-8BD9-F1C660CD2CFB}" destId="{D5C5BD5A-4727-46B4-AED3-2156E2F1911C}" srcOrd="0" destOrd="0" presId="urn:microsoft.com/office/officeart/2005/8/layout/process2"/>
-    <dgm:cxn modelId="{70AE856C-5F5E-4DEC-B46B-465564D97C8A}" type="presOf" srcId="{05504F13-8F6D-4A96-A060-7C7C04BCCDC5}" destId="{FC02DA56-149D-4855-9DCF-0DD82448A01C}" srcOrd="1" destOrd="0" presId="urn:microsoft.com/office/officeart/2005/8/layout/process2"/>
-    <dgm:cxn modelId="{74E0374E-C34F-4DBF-9C88-16D4690BFED2}" type="presOf" srcId="{F27D3CED-FAAD-45A0-B25C-96C0B097E61C}" destId="{99F1D40A-DB5B-4C5D-98D8-82EDE31912FE}" srcOrd="0" destOrd="0" presId="urn:microsoft.com/office/officeart/2005/8/layout/process2"/>
-    <dgm:cxn modelId="{C1508D8D-DC9F-4A4C-B426-EDCB0C2D4635}" type="presOf" srcId="{BEF039B9-78B3-44AC-BCD2-D5D97EFF241A}" destId="{AA747EB2-8553-4BFB-A459-0AE4760BF603}" srcOrd="0" destOrd="0" presId="urn:microsoft.com/office/officeart/2005/8/layout/process2"/>
-    <dgm:cxn modelId="{97036991-5E3A-46EC-8150-B28E18F668ED}" type="presOf" srcId="{1E64BDA1-8C1C-4293-9ECF-B16190F3555C}" destId="{BB051662-59CA-41A7-A56A-FFBA00380174}" srcOrd="0" destOrd="0" presId="urn:microsoft.com/office/officeart/2005/8/layout/process2"/>
-    <dgm:cxn modelId="{1FAAEAA8-DA69-4D24-A321-784C7150EC4E}" srcId="{831248B5-42BE-41CC-B00B-93FDF821FE9F}" destId="{16DB864F-1D40-4E34-8BD9-F1C660CD2CFB}" srcOrd="1" destOrd="0" parTransId="{93C0F5D2-7285-4DBC-9CFC-540D03F09FCC}" sibTransId="{0CC9A380-740E-4425-AC43-31F4F13B3004}"/>
-    <dgm:cxn modelId="{E273DFAF-B31F-4432-9592-248697CD484E}" type="presOf" srcId="{0CC9A380-740E-4425-AC43-31F4F13B3004}" destId="{70E8EFBD-24AF-49C1-AB74-E0E433B72786}" srcOrd="0" destOrd="0" presId="urn:microsoft.com/office/officeart/2005/8/layout/process2"/>
-    <dgm:cxn modelId="{2BFA0FB1-DBF7-4A7A-A74C-9B7753CD19FE}" type="presOf" srcId="{F77B9BF5-4593-4B18-BA5C-8BE2B8071A44}" destId="{52BF1B02-38BA-490D-B49F-F7F428D4159F}" srcOrd="0" destOrd="0" presId="urn:microsoft.com/office/officeart/2005/8/layout/process2"/>
-    <dgm:cxn modelId="{CA6ECBB7-3C85-4C7D-B933-A652218F8480}" type="presOf" srcId="{76AC9EB8-B499-4014-9C2D-CF84A71AB784}" destId="{E5D9E9D1-B554-4B69-88C2-23DB15039166}" srcOrd="0" destOrd="0" presId="urn:microsoft.com/office/officeart/2005/8/layout/process2"/>
+    <dgm:cxn modelId="{902323CF-0A5E-4ECB-AB85-D3ACCE8529C8}" type="presOf" srcId="{76AC9EB8-B499-4014-9C2D-CF84A71AB784}" destId="{7BEE8685-09E9-4964-906A-51AD9B41B2B2}" srcOrd="1" destOrd="0" presId="urn:microsoft.com/office/officeart/2005/8/layout/process2"/>
     <dgm:cxn modelId="{2D6458B8-D429-4A32-8FAC-D38FBB9C07AF}" type="presOf" srcId="{9A14F079-F04B-4CC9-9700-618484CACBA1}" destId="{C66BF0E9-CB5D-486D-B436-1555A05A59F0}" srcOrd="0" destOrd="0" presId="urn:microsoft.com/office/officeart/2005/8/layout/process2"/>
     <dgm:cxn modelId="{BE13A2BF-22E0-4EFB-A743-7E04366FF557}" type="presOf" srcId="{44D9E930-28F8-42A2-AEDE-C2AF9832F680}" destId="{CFBA9DB8-BD38-47A9-83E9-C039D73A7363}" srcOrd="0" destOrd="0" presId="urn:microsoft.com/office/officeart/2005/8/layout/process2"/>
-    <dgm:cxn modelId="{9E8B0EC8-CDD5-4D01-BB78-42B94FC3B680}" srcId="{831248B5-42BE-41CC-B00B-93FDF821FE9F}" destId="{44D9E930-28F8-42A2-AEDE-C2AF9832F680}" srcOrd="6" destOrd="0" parTransId="{F461D74D-E1BE-4262-9A51-8AF93A2A9DAE}" sibTransId="{BEF039B9-78B3-44AC-BCD2-D5D97EFF241A}"/>
+    <dgm:cxn modelId="{67A6795E-B981-4D59-8045-63955DC05E94}" type="presOf" srcId="{B8A5FD80-BDA8-4DB0-BAA6-7D996DB83F32}" destId="{F99DF6A8-FCCC-45FE-984E-74BB5D13A325}" srcOrd="1" destOrd="0" presId="urn:microsoft.com/office/officeart/2005/8/layout/process2"/>
+    <dgm:cxn modelId="{D497E32E-9E75-4ED1-AB75-FDC6416370FF}" type="presOf" srcId="{1E64BDA1-8C1C-4293-9ECF-B16190F3555C}" destId="{85ACBFE3-ED12-472D-9155-8AECC46A625D}" srcOrd="1" destOrd="0" presId="urn:microsoft.com/office/officeart/2005/8/layout/process2"/>
+    <dgm:cxn modelId="{70AE856C-5F5E-4DEC-B46B-465564D97C8A}" type="presOf" srcId="{05504F13-8F6D-4A96-A060-7C7C04BCCDC5}" destId="{FC02DA56-149D-4855-9DCF-0DD82448A01C}" srcOrd="1" destOrd="0" presId="urn:microsoft.com/office/officeart/2005/8/layout/process2"/>
+    <dgm:cxn modelId="{2BFA0FB1-DBF7-4A7A-A74C-9B7753CD19FE}" type="presOf" srcId="{F77B9BF5-4593-4B18-BA5C-8BE2B8071A44}" destId="{52BF1B02-38BA-490D-B49F-F7F428D4159F}" srcOrd="0" destOrd="0" presId="urn:microsoft.com/office/officeart/2005/8/layout/process2"/>
     <dgm:cxn modelId="{2F596BCC-CA9C-4A5D-9021-F5F196D3E80D}" srcId="{831248B5-42BE-41CC-B00B-93FDF821FE9F}" destId="{4E8DDCF5-1131-4B7B-8DC9-CA1D909DEB4C}" srcOrd="3" destOrd="0" parTransId="{5D085E46-E5F5-4C17-A2B4-EEDB4B73AAFC}" sibTransId="{1E64BDA1-8C1C-4293-9ECF-B16190F3555C}"/>
-    <dgm:cxn modelId="{902323CF-0A5E-4ECB-AB85-D3ACCE8529C8}" type="presOf" srcId="{76AC9EB8-B499-4014-9C2D-CF84A71AB784}" destId="{7BEE8685-09E9-4964-906A-51AD9B41B2B2}" srcOrd="1" destOrd="0" presId="urn:microsoft.com/office/officeart/2005/8/layout/process2"/>
+    <dgm:cxn modelId="{17625CDE-390A-4A16-A1DA-1A2728D2592E}" srcId="{831248B5-42BE-41CC-B00B-93FDF821FE9F}" destId="{B0120D59-46F5-4609-8A90-D19147655A7C}" srcOrd="2" destOrd="0" parTransId="{8B65003E-F843-4BAC-92BF-31469B2EB546}" sibTransId="{05504F13-8F6D-4A96-A060-7C7C04BCCDC5}"/>
+    <dgm:cxn modelId="{6B5C7332-53C1-44A1-987C-DD115C27287D}" type="presOf" srcId="{B0120D59-46F5-4609-8A90-D19147655A7C}" destId="{5E07831F-96AB-45D4-BDD8-76735DEC4F3D}" srcOrd="0" destOrd="0" presId="urn:microsoft.com/office/officeart/2005/8/layout/process2"/>
+    <dgm:cxn modelId="{CCBB2E18-AEAA-4DC0-9E3C-F88CDCA45059}" type="presOf" srcId="{F27D3CED-FAAD-45A0-B25C-96C0B097E61C}" destId="{228957F4-EE3C-408A-83BB-E73D4ED2802F}" srcOrd="1" destOrd="0" presId="urn:microsoft.com/office/officeart/2005/8/layout/process2"/>
+    <dgm:cxn modelId="{1FAAEAA8-DA69-4D24-A321-784C7150EC4E}" srcId="{831248B5-42BE-41CC-B00B-93FDF821FE9F}" destId="{16DB864F-1D40-4E34-8BD9-F1C660CD2CFB}" srcOrd="1" destOrd="0" parTransId="{93C0F5D2-7285-4DBC-9CFC-540D03F09FCC}" sibTransId="{0CC9A380-740E-4425-AC43-31F4F13B3004}"/>
     <dgm:cxn modelId="{96CE0AD5-C6CE-45A8-A85E-9565EFC97971}" type="presOf" srcId="{B8A5FD80-BDA8-4DB0-BAA6-7D996DB83F32}" destId="{FFAB1546-EE89-4905-B200-014D9D15DEB5}" srcOrd="0" destOrd="0" presId="urn:microsoft.com/office/officeart/2005/8/layout/process2"/>
-    <dgm:cxn modelId="{17625CDE-390A-4A16-A1DA-1A2728D2592E}" srcId="{831248B5-42BE-41CC-B00B-93FDF821FE9F}" destId="{B0120D59-46F5-4609-8A90-D19147655A7C}" srcOrd="2" destOrd="0" parTransId="{8B65003E-F843-4BAC-92BF-31469B2EB546}" sibTransId="{05504F13-8F6D-4A96-A060-7C7C04BCCDC5}"/>
     <dgm:cxn modelId="{88F421F2-D2A7-469A-8DCA-2378615C3DC3}" type="presOf" srcId="{6BB4A08D-9009-408D-A672-847AAAD9D481}" destId="{DE8A9ADE-4EA7-4E5F-9B22-8F0A88EF3F94}" srcOrd="0" destOrd="0" presId="urn:microsoft.com/office/officeart/2005/8/layout/process2"/>
-    <dgm:cxn modelId="{62E71CF5-02C6-426F-B29D-352D349A767B}" type="presOf" srcId="{831248B5-42BE-41CC-B00B-93FDF821FE9F}" destId="{D7B6869B-4E62-4ED6-98D4-117812227983}" srcOrd="0" destOrd="0" presId="urn:microsoft.com/office/officeart/2005/8/layout/process2"/>
-    <dgm:cxn modelId="{AFB1F2F6-1307-4941-86BA-4A12F4B9B558}" type="presOf" srcId="{05504F13-8F6D-4A96-A060-7C7C04BCCDC5}" destId="{C3ADE6CA-9FE3-4A69-9EF9-3DEB92BC6215}" srcOrd="0" destOrd="0" presId="urn:microsoft.com/office/officeart/2005/8/layout/process2"/>
     <dgm:cxn modelId="{7951D0FC-694C-465C-9AEF-49EFD7FC6F31}" srcId="{831248B5-42BE-41CC-B00B-93FDF821FE9F}" destId="{F77B9BF5-4593-4B18-BA5C-8BE2B8071A44}" srcOrd="5" destOrd="0" parTransId="{AB9DBF93-67DD-431C-9F2B-6F4233019072}" sibTransId="{B8A5FD80-BDA8-4DB0-BAA6-7D996DB83F32}"/>
     <dgm:cxn modelId="{E5C19EE4-CFFB-483E-A68C-7DCC76A5FFC6}" type="presParOf" srcId="{D7B6869B-4E62-4ED6-98D4-117812227983}" destId="{189D6A4B-21E2-4FCD-A1A9-B0A37070679D}" srcOrd="0" destOrd="0" presId="urn:microsoft.com/office/officeart/2005/8/layout/process2"/>
     <dgm:cxn modelId="{5BF10D62-1437-4C72-9C38-50537DECC45B}" type="presParOf" srcId="{D7B6869B-4E62-4ED6-98D4-117812227983}" destId="{E5D9E9D1-B554-4B69-88C2-23DB15039166}" srcOrd="1" destOrd="0" presId="urn:microsoft.com/office/officeart/2005/8/layout/process2"/>
@@ -3458,6 +3693,13 @@
         </dgm:presLayoutVars>
       </dgm:prSet>
       <dgm:spPr/>
+      <dgm:t>
+        <a:bodyPr/>
+        <a:lstStyle/>
+        <a:p>
+          <a:endParaRPr lang="en-US"/>
+        </a:p>
+      </dgm:t>
     </dgm:pt>
     <dgm:pt modelId="{BE10170A-FDA7-46C6-8080-0CD272A11F79}" type="pres">
       <dgm:prSet presAssocID="{A50D5CE9-E57C-47DB-BC25-0E5B3A25D369}" presName="node" presStyleLbl="node1" presStyleIdx="0" presStyleCnt="6">
@@ -3466,14 +3708,35 @@
         </dgm:presLayoutVars>
       </dgm:prSet>
       <dgm:spPr/>
+      <dgm:t>
+        <a:bodyPr/>
+        <a:lstStyle/>
+        <a:p>
+          <a:endParaRPr lang="en-US"/>
+        </a:p>
+      </dgm:t>
     </dgm:pt>
     <dgm:pt modelId="{9CB5DCF6-A9AB-46CF-8F54-44562297832B}" type="pres">
       <dgm:prSet presAssocID="{6BB16651-A2C7-44E6-8B71-595F1464C6E6}" presName="sibTrans" presStyleLbl="sibTrans2D1" presStyleIdx="0" presStyleCnt="6"/>
       <dgm:spPr/>
+      <dgm:t>
+        <a:bodyPr/>
+        <a:lstStyle/>
+        <a:p>
+          <a:endParaRPr lang="en-US"/>
+        </a:p>
+      </dgm:t>
     </dgm:pt>
     <dgm:pt modelId="{532A4D80-CC45-47DE-9B33-C25D9F0311CD}" type="pres">
       <dgm:prSet presAssocID="{6BB16651-A2C7-44E6-8B71-595F1464C6E6}" presName="connectorText" presStyleLbl="sibTrans2D1" presStyleIdx="0" presStyleCnt="6"/>
       <dgm:spPr/>
+      <dgm:t>
+        <a:bodyPr/>
+        <a:lstStyle/>
+        <a:p>
+          <a:endParaRPr lang="en-US"/>
+        </a:p>
+      </dgm:t>
     </dgm:pt>
     <dgm:pt modelId="{10C40DD1-8F53-4982-AE25-5D301BBB4035}" type="pres">
       <dgm:prSet presAssocID="{48370AF3-FC86-4D8C-8C54-83EAC2041CE6}" presName="node" presStyleLbl="node1" presStyleIdx="1" presStyleCnt="6">
@@ -3482,14 +3745,35 @@
         </dgm:presLayoutVars>
       </dgm:prSet>
       <dgm:spPr/>
+      <dgm:t>
+        <a:bodyPr/>
+        <a:lstStyle/>
+        <a:p>
+          <a:endParaRPr lang="en-US"/>
+        </a:p>
+      </dgm:t>
     </dgm:pt>
     <dgm:pt modelId="{AF055774-033E-4FAB-99C5-EF82DA73AF6B}" type="pres">
       <dgm:prSet presAssocID="{F7548831-CA11-41DD-8ECC-17CA536DA611}" presName="sibTrans" presStyleLbl="sibTrans2D1" presStyleIdx="1" presStyleCnt="6"/>
       <dgm:spPr/>
+      <dgm:t>
+        <a:bodyPr/>
+        <a:lstStyle/>
+        <a:p>
+          <a:endParaRPr lang="en-US"/>
+        </a:p>
+      </dgm:t>
     </dgm:pt>
     <dgm:pt modelId="{4E111617-F5D3-4634-A4E7-55A35BA10C3B}" type="pres">
       <dgm:prSet presAssocID="{F7548831-CA11-41DD-8ECC-17CA536DA611}" presName="connectorText" presStyleLbl="sibTrans2D1" presStyleIdx="1" presStyleCnt="6"/>
       <dgm:spPr/>
+      <dgm:t>
+        <a:bodyPr/>
+        <a:lstStyle/>
+        <a:p>
+          <a:endParaRPr lang="en-US"/>
+        </a:p>
+      </dgm:t>
     </dgm:pt>
     <dgm:pt modelId="{6B2B7F8F-AC97-4494-991D-C5A102C5BF61}" type="pres">
       <dgm:prSet presAssocID="{1DF69D38-253C-4136-A31C-13D074756DBD}" presName="node" presStyleLbl="node1" presStyleIdx="2" presStyleCnt="6">
@@ -3498,14 +3782,35 @@
         </dgm:presLayoutVars>
       </dgm:prSet>
       <dgm:spPr/>
+      <dgm:t>
+        <a:bodyPr/>
+        <a:lstStyle/>
+        <a:p>
+          <a:endParaRPr lang="en-US"/>
+        </a:p>
+      </dgm:t>
     </dgm:pt>
     <dgm:pt modelId="{8B3EA9F3-EF7C-4031-8349-AFC02CD2E8E9}" type="pres">
       <dgm:prSet presAssocID="{18589C4B-236C-4770-ACA6-5F2BC1925825}" presName="sibTrans" presStyleLbl="sibTrans2D1" presStyleIdx="2" presStyleCnt="6"/>
       <dgm:spPr/>
+      <dgm:t>
+        <a:bodyPr/>
+        <a:lstStyle/>
+        <a:p>
+          <a:endParaRPr lang="en-US"/>
+        </a:p>
+      </dgm:t>
     </dgm:pt>
     <dgm:pt modelId="{76D2A737-E894-45DA-A9E2-0913B236F12E}" type="pres">
       <dgm:prSet presAssocID="{18589C4B-236C-4770-ACA6-5F2BC1925825}" presName="connectorText" presStyleLbl="sibTrans2D1" presStyleIdx="2" presStyleCnt="6"/>
       <dgm:spPr/>
+      <dgm:t>
+        <a:bodyPr/>
+        <a:lstStyle/>
+        <a:p>
+          <a:endParaRPr lang="en-US"/>
+        </a:p>
+      </dgm:t>
     </dgm:pt>
     <dgm:pt modelId="{B38A756C-2FBC-4753-8A72-C64909D7B55D}" type="pres">
       <dgm:prSet presAssocID="{82D99C4C-3601-4F2B-B062-F76B7FA58351}" presName="node" presStyleLbl="node1" presStyleIdx="3" presStyleCnt="6">
@@ -3514,14 +3819,35 @@
         </dgm:presLayoutVars>
       </dgm:prSet>
       <dgm:spPr/>
+      <dgm:t>
+        <a:bodyPr/>
+        <a:lstStyle/>
+        <a:p>
+          <a:endParaRPr lang="en-US"/>
+        </a:p>
+      </dgm:t>
     </dgm:pt>
     <dgm:pt modelId="{C0492A94-958F-4DF2-8E31-D0E5D431B110}" type="pres">
       <dgm:prSet presAssocID="{2CEB24EB-0E4B-4978-B141-AD1017CE08DB}" presName="sibTrans" presStyleLbl="sibTrans2D1" presStyleIdx="3" presStyleCnt="6"/>
       <dgm:spPr/>
+      <dgm:t>
+        <a:bodyPr/>
+        <a:lstStyle/>
+        <a:p>
+          <a:endParaRPr lang="en-US"/>
+        </a:p>
+      </dgm:t>
     </dgm:pt>
     <dgm:pt modelId="{5BD3947E-EAF4-4999-8F41-16C31CDD1897}" type="pres">
       <dgm:prSet presAssocID="{2CEB24EB-0E4B-4978-B141-AD1017CE08DB}" presName="connectorText" presStyleLbl="sibTrans2D1" presStyleIdx="3" presStyleCnt="6"/>
       <dgm:spPr/>
+      <dgm:t>
+        <a:bodyPr/>
+        <a:lstStyle/>
+        <a:p>
+          <a:endParaRPr lang="en-US"/>
+        </a:p>
+      </dgm:t>
     </dgm:pt>
     <dgm:pt modelId="{1AD34968-D5D1-4171-B98B-6A348B13B975}" type="pres">
       <dgm:prSet presAssocID="{7D0E5FE9-BEBD-455F-9242-519724FB6C96}" presName="node" presStyleLbl="node1" presStyleIdx="4" presStyleCnt="6">
@@ -3530,14 +3856,35 @@
         </dgm:presLayoutVars>
       </dgm:prSet>
       <dgm:spPr/>
+      <dgm:t>
+        <a:bodyPr/>
+        <a:lstStyle/>
+        <a:p>
+          <a:endParaRPr lang="en-US"/>
+        </a:p>
+      </dgm:t>
     </dgm:pt>
     <dgm:pt modelId="{3FD4A819-E359-4474-A779-65CA5E4E5F5E}" type="pres">
       <dgm:prSet presAssocID="{CB2D6001-FAA4-49C6-8385-9A9576EB7A0B}" presName="sibTrans" presStyleLbl="sibTrans2D1" presStyleIdx="4" presStyleCnt="6"/>
       <dgm:spPr/>
+      <dgm:t>
+        <a:bodyPr/>
+        <a:lstStyle/>
+        <a:p>
+          <a:endParaRPr lang="en-US"/>
+        </a:p>
+      </dgm:t>
     </dgm:pt>
     <dgm:pt modelId="{D229D606-AC96-466B-9F97-EAB3C96DE430}" type="pres">
       <dgm:prSet presAssocID="{CB2D6001-FAA4-49C6-8385-9A9576EB7A0B}" presName="connectorText" presStyleLbl="sibTrans2D1" presStyleIdx="4" presStyleCnt="6"/>
       <dgm:spPr/>
+      <dgm:t>
+        <a:bodyPr/>
+        <a:lstStyle/>
+        <a:p>
+          <a:endParaRPr lang="en-US"/>
+        </a:p>
+      </dgm:t>
     </dgm:pt>
     <dgm:pt modelId="{372A6A97-E412-4CCA-A607-235CF3A22C9C}" type="pres">
       <dgm:prSet presAssocID="{9C08A4B8-0C14-4C76-8B82-048ACA771F15}" presName="node" presStyleLbl="node1" presStyleIdx="5" presStyleCnt="6">
@@ -3546,42 +3893,63 @@
         </dgm:presLayoutVars>
       </dgm:prSet>
       <dgm:spPr/>
+      <dgm:t>
+        <a:bodyPr/>
+        <a:lstStyle/>
+        <a:p>
+          <a:endParaRPr lang="en-US"/>
+        </a:p>
+      </dgm:t>
     </dgm:pt>
     <dgm:pt modelId="{B33D451D-E7ED-453E-BBDD-2A7104931649}" type="pres">
       <dgm:prSet presAssocID="{9928AC29-F93D-4104-B656-07B79942F478}" presName="sibTrans" presStyleLbl="sibTrans2D1" presStyleIdx="5" presStyleCnt="6"/>
       <dgm:spPr/>
+      <dgm:t>
+        <a:bodyPr/>
+        <a:lstStyle/>
+        <a:p>
+          <a:endParaRPr lang="en-US"/>
+        </a:p>
+      </dgm:t>
     </dgm:pt>
     <dgm:pt modelId="{F23F354F-B930-43EC-A3E6-2AA7B3937FDE}" type="pres">
       <dgm:prSet presAssocID="{9928AC29-F93D-4104-B656-07B79942F478}" presName="connectorText" presStyleLbl="sibTrans2D1" presStyleIdx="5" presStyleCnt="6"/>
       <dgm:spPr/>
+      <dgm:t>
+        <a:bodyPr/>
+        <a:lstStyle/>
+        <a:p>
+          <a:endParaRPr lang="en-US"/>
+        </a:p>
+      </dgm:t>
     </dgm:pt>
   </dgm:ptLst>
   <dgm:cxnLst>
-    <dgm:cxn modelId="{2A800102-3E86-4CE6-B237-FF976FE460A5}" type="presOf" srcId="{18589C4B-236C-4770-ACA6-5F2BC1925825}" destId="{8B3EA9F3-EF7C-4031-8349-AFC02CD2E8E9}" srcOrd="0" destOrd="0" presId="urn:microsoft.com/office/officeart/2005/8/layout/cycle2"/>
-    <dgm:cxn modelId="{73A6D81D-B121-4772-B9DC-D989684794EC}" type="presOf" srcId="{9928AC29-F93D-4104-B656-07B79942F478}" destId="{B33D451D-E7ED-453E-BBDD-2A7104931649}" srcOrd="0" destOrd="0" presId="urn:microsoft.com/office/officeart/2005/8/layout/cycle2"/>
-    <dgm:cxn modelId="{7B997E21-E386-4BDB-BA73-FEFE3B52E673}" type="presOf" srcId="{1DF69D38-253C-4136-A31C-13D074756DBD}" destId="{6B2B7F8F-AC97-4494-991D-C5A102C5BF61}" srcOrd="0" destOrd="0" presId="urn:microsoft.com/office/officeart/2005/8/layout/cycle2"/>
-    <dgm:cxn modelId="{B8047E24-67A3-4FF3-A06A-9E28AB623A31}" type="presOf" srcId="{F7548831-CA11-41DD-8ECC-17CA536DA611}" destId="{AF055774-033E-4FAB-99C5-EF82DA73AF6B}" srcOrd="0" destOrd="0" presId="urn:microsoft.com/office/officeart/2005/8/layout/cycle2"/>
-    <dgm:cxn modelId="{D7756D26-48D8-4543-8ECF-B43045B6A7A2}" type="presOf" srcId="{6BB16651-A2C7-44E6-8B71-595F1464C6E6}" destId="{9CB5DCF6-A9AB-46CF-8F54-44562297832B}" srcOrd="0" destOrd="0" presId="urn:microsoft.com/office/officeart/2005/8/layout/cycle2"/>
-    <dgm:cxn modelId="{6C92652C-2ECF-4C26-BCCB-EFA2B76571F3}" type="presOf" srcId="{CB2D6001-FAA4-49C6-8385-9A9576EB7A0B}" destId="{D229D606-AC96-466B-9F97-EAB3C96DE430}" srcOrd="1" destOrd="0" presId="urn:microsoft.com/office/officeart/2005/8/layout/cycle2"/>
-    <dgm:cxn modelId="{656CE130-0515-41FF-B2F2-2BD43856E3D0}" srcId="{7D813336-3D77-46FD-BFBE-B927186F4EE8}" destId="{7D0E5FE9-BEBD-455F-9242-519724FB6C96}" srcOrd="4" destOrd="0" parTransId="{594E2760-2BA1-4C56-8104-2C3A58C07462}" sibTransId="{CB2D6001-FAA4-49C6-8385-9A9576EB7A0B}"/>
-    <dgm:cxn modelId="{48826F36-B9DF-44EC-8ED7-EAA8DE65A165}" type="presOf" srcId="{2CEB24EB-0E4B-4978-B141-AD1017CE08DB}" destId="{C0492A94-958F-4DF2-8E31-D0E5D431B110}" srcOrd="0" destOrd="0" presId="urn:microsoft.com/office/officeart/2005/8/layout/cycle2"/>
-    <dgm:cxn modelId="{4E474562-B74A-44EB-B45F-D3DD735B2501}" srcId="{7D813336-3D77-46FD-BFBE-B927186F4EE8}" destId="{82D99C4C-3601-4F2B-B062-F76B7FA58351}" srcOrd="3" destOrd="0" parTransId="{3F9BE72A-4745-41D5-8CC6-99AC9FE77223}" sibTransId="{2CEB24EB-0E4B-4978-B141-AD1017CE08DB}"/>
-    <dgm:cxn modelId="{1EDB6766-CD7C-4414-9C27-EBE463506CFF}" srcId="{7D813336-3D77-46FD-BFBE-B927186F4EE8}" destId="{9C08A4B8-0C14-4C76-8B82-048ACA771F15}" srcOrd="5" destOrd="0" parTransId="{28249315-D3C7-43BE-B88A-6DD1138B7A0C}" sibTransId="{9928AC29-F93D-4104-B656-07B79942F478}"/>
-    <dgm:cxn modelId="{4A6FDB47-80DA-4A96-8D2C-B887792CB495}" type="presOf" srcId="{9C08A4B8-0C14-4C76-8B82-048ACA771F15}" destId="{372A6A97-E412-4CCA-A607-235CF3A22C9C}" srcOrd="0" destOrd="0" presId="urn:microsoft.com/office/officeart/2005/8/layout/cycle2"/>
-    <dgm:cxn modelId="{A150B94E-B2C2-4D6C-9C4B-F76456348E67}" srcId="{7D813336-3D77-46FD-BFBE-B927186F4EE8}" destId="{48370AF3-FC86-4D8C-8C54-83EAC2041CE6}" srcOrd="1" destOrd="0" parTransId="{AB741C83-841B-426D-A5E0-6EEA4C052CE4}" sibTransId="{F7548831-CA11-41DD-8ECC-17CA536DA611}"/>
-    <dgm:cxn modelId="{8A9D6073-56F9-4A3D-A71D-5DB15EB2E2ED}" type="presOf" srcId="{A50D5CE9-E57C-47DB-BC25-0E5B3A25D369}" destId="{BE10170A-FDA7-46C6-8080-0CD272A11F79}" srcOrd="0" destOrd="0" presId="urn:microsoft.com/office/officeart/2005/8/layout/cycle2"/>
-    <dgm:cxn modelId="{E422C681-256E-41AA-A0D8-4F7AD719AE70}" type="presOf" srcId="{18589C4B-236C-4770-ACA6-5F2BC1925825}" destId="{76D2A737-E894-45DA-A9E2-0913B236F12E}" srcOrd="1" destOrd="0" presId="urn:microsoft.com/office/officeart/2005/8/layout/cycle2"/>
-    <dgm:cxn modelId="{E4650F96-8B96-45DB-9B8B-739BA4DAFC00}" type="presOf" srcId="{2CEB24EB-0E4B-4978-B141-AD1017CE08DB}" destId="{5BD3947E-EAF4-4999-8F41-16C31CDD1897}" srcOrd="1" destOrd="0" presId="urn:microsoft.com/office/officeart/2005/8/layout/cycle2"/>
-    <dgm:cxn modelId="{5A8FC996-E36A-4A4D-B9A9-E0F5F95CDF30}" type="presOf" srcId="{7D0E5FE9-BEBD-455F-9242-519724FB6C96}" destId="{1AD34968-D5D1-4171-B98B-6A348B13B975}" srcOrd="0" destOrd="0" presId="urn:microsoft.com/office/officeart/2005/8/layout/cycle2"/>
-    <dgm:cxn modelId="{6B494198-39DB-42F7-8AB5-4A5BE7D87F39}" type="presOf" srcId="{9928AC29-F93D-4104-B656-07B79942F478}" destId="{F23F354F-B930-43EC-A3E6-2AA7B3937FDE}" srcOrd="1" destOrd="0" presId="urn:microsoft.com/office/officeart/2005/8/layout/cycle2"/>
-    <dgm:cxn modelId="{5DE7A598-F75C-47B9-8814-209880B6FE11}" srcId="{7D813336-3D77-46FD-BFBE-B927186F4EE8}" destId="{1DF69D38-253C-4136-A31C-13D074756DBD}" srcOrd="2" destOrd="0" parTransId="{7471E316-4330-4726-8E0C-E8DF4CBE672C}" sibTransId="{18589C4B-236C-4770-ACA6-5F2BC1925825}"/>
-    <dgm:cxn modelId="{E7A5AF9B-C11A-40EC-9AE6-7726E1A9A711}" type="presOf" srcId="{F7548831-CA11-41DD-8ECC-17CA536DA611}" destId="{4E111617-F5D3-4634-A4E7-55A35BA10C3B}" srcOrd="1" destOrd="0" presId="urn:microsoft.com/office/officeart/2005/8/layout/cycle2"/>
-    <dgm:cxn modelId="{072D75B5-AE8A-4BF9-813C-52F86070C69F}" type="presOf" srcId="{82D99C4C-3601-4F2B-B062-F76B7FA58351}" destId="{B38A756C-2FBC-4753-8A72-C64909D7B55D}" srcOrd="0" destOrd="0" presId="urn:microsoft.com/office/officeart/2005/8/layout/cycle2"/>
-    <dgm:cxn modelId="{A7F74FB7-397D-4268-8170-C932BF344E33}" type="presOf" srcId="{48370AF3-FC86-4D8C-8C54-83EAC2041CE6}" destId="{10C40DD1-8F53-4982-AE25-5D301BBB4035}" srcOrd="0" destOrd="0" presId="urn:microsoft.com/office/officeart/2005/8/layout/cycle2"/>
-    <dgm:cxn modelId="{E25464BC-A09B-48BD-B113-8CA3576F5146}" type="presOf" srcId="{CB2D6001-FAA4-49C6-8385-9A9576EB7A0B}" destId="{3FD4A819-E359-4474-A779-65CA5E4E5F5E}" srcOrd="0" destOrd="0" presId="urn:microsoft.com/office/officeart/2005/8/layout/cycle2"/>
-    <dgm:cxn modelId="{64927DD7-80D9-485A-AE3F-823FDF4E1B88}" type="presOf" srcId="{7D813336-3D77-46FD-BFBE-B927186F4EE8}" destId="{1F7049C3-AAE1-4856-8433-BA85AFDAFBB4}" srcOrd="0" destOrd="0" presId="urn:microsoft.com/office/officeart/2005/8/layout/cycle2"/>
     <dgm:cxn modelId="{59B76DF1-434E-481D-A352-8E17439334E8}" type="presOf" srcId="{6BB16651-A2C7-44E6-8B71-595F1464C6E6}" destId="{532A4D80-CC45-47DE-9B33-C25D9F0311CD}" srcOrd="1" destOrd="0" presId="urn:microsoft.com/office/officeart/2005/8/layout/cycle2"/>
     <dgm:cxn modelId="{3476ECF5-227F-4D63-9092-E8019B1A260C}" srcId="{7D813336-3D77-46FD-BFBE-B927186F4EE8}" destId="{A50D5CE9-E57C-47DB-BC25-0E5B3A25D369}" srcOrd="0" destOrd="0" parTransId="{97BD9E98-8AC2-41C2-9323-5F440CC4246A}" sibTransId="{6BB16651-A2C7-44E6-8B71-595F1464C6E6}"/>
+    <dgm:cxn modelId="{4A6FDB47-80DA-4A96-8D2C-B887792CB495}" type="presOf" srcId="{9C08A4B8-0C14-4C76-8B82-048ACA771F15}" destId="{372A6A97-E412-4CCA-A607-235CF3A22C9C}" srcOrd="0" destOrd="0" presId="urn:microsoft.com/office/officeart/2005/8/layout/cycle2"/>
+    <dgm:cxn modelId="{5DE7A598-F75C-47B9-8814-209880B6FE11}" srcId="{7D813336-3D77-46FD-BFBE-B927186F4EE8}" destId="{1DF69D38-253C-4136-A31C-13D074756DBD}" srcOrd="2" destOrd="0" parTransId="{7471E316-4330-4726-8E0C-E8DF4CBE672C}" sibTransId="{18589C4B-236C-4770-ACA6-5F2BC1925825}"/>
+    <dgm:cxn modelId="{2A800102-3E86-4CE6-B237-FF976FE460A5}" type="presOf" srcId="{18589C4B-236C-4770-ACA6-5F2BC1925825}" destId="{8B3EA9F3-EF7C-4031-8349-AFC02CD2E8E9}" srcOrd="0" destOrd="0" presId="urn:microsoft.com/office/officeart/2005/8/layout/cycle2"/>
+    <dgm:cxn modelId="{B8047E24-67A3-4FF3-A06A-9E28AB623A31}" type="presOf" srcId="{F7548831-CA11-41DD-8ECC-17CA536DA611}" destId="{AF055774-033E-4FAB-99C5-EF82DA73AF6B}" srcOrd="0" destOrd="0" presId="urn:microsoft.com/office/officeart/2005/8/layout/cycle2"/>
+    <dgm:cxn modelId="{8A9D6073-56F9-4A3D-A71D-5DB15EB2E2ED}" type="presOf" srcId="{A50D5CE9-E57C-47DB-BC25-0E5B3A25D369}" destId="{BE10170A-FDA7-46C6-8080-0CD272A11F79}" srcOrd="0" destOrd="0" presId="urn:microsoft.com/office/officeart/2005/8/layout/cycle2"/>
+    <dgm:cxn modelId="{4E474562-B74A-44EB-B45F-D3DD735B2501}" srcId="{7D813336-3D77-46FD-BFBE-B927186F4EE8}" destId="{82D99C4C-3601-4F2B-B062-F76B7FA58351}" srcOrd="3" destOrd="0" parTransId="{3F9BE72A-4745-41D5-8CC6-99AC9FE77223}" sibTransId="{2CEB24EB-0E4B-4978-B141-AD1017CE08DB}"/>
+    <dgm:cxn modelId="{64927DD7-80D9-485A-AE3F-823FDF4E1B88}" type="presOf" srcId="{7D813336-3D77-46FD-BFBE-B927186F4EE8}" destId="{1F7049C3-AAE1-4856-8433-BA85AFDAFBB4}" srcOrd="0" destOrd="0" presId="urn:microsoft.com/office/officeart/2005/8/layout/cycle2"/>
+    <dgm:cxn modelId="{7B997E21-E386-4BDB-BA73-FEFE3B52E673}" type="presOf" srcId="{1DF69D38-253C-4136-A31C-13D074756DBD}" destId="{6B2B7F8F-AC97-4494-991D-C5A102C5BF61}" srcOrd="0" destOrd="0" presId="urn:microsoft.com/office/officeart/2005/8/layout/cycle2"/>
+    <dgm:cxn modelId="{1EDB6766-CD7C-4414-9C27-EBE463506CFF}" srcId="{7D813336-3D77-46FD-BFBE-B927186F4EE8}" destId="{9C08A4B8-0C14-4C76-8B82-048ACA771F15}" srcOrd="5" destOrd="0" parTransId="{28249315-D3C7-43BE-B88A-6DD1138B7A0C}" sibTransId="{9928AC29-F93D-4104-B656-07B79942F478}"/>
+    <dgm:cxn modelId="{6B494198-39DB-42F7-8AB5-4A5BE7D87F39}" type="presOf" srcId="{9928AC29-F93D-4104-B656-07B79942F478}" destId="{F23F354F-B930-43EC-A3E6-2AA7B3937FDE}" srcOrd="1" destOrd="0" presId="urn:microsoft.com/office/officeart/2005/8/layout/cycle2"/>
+    <dgm:cxn modelId="{E25464BC-A09B-48BD-B113-8CA3576F5146}" type="presOf" srcId="{CB2D6001-FAA4-49C6-8385-9A9576EB7A0B}" destId="{3FD4A819-E359-4474-A779-65CA5E4E5F5E}" srcOrd="0" destOrd="0" presId="urn:microsoft.com/office/officeart/2005/8/layout/cycle2"/>
+    <dgm:cxn modelId="{A7F74FB7-397D-4268-8170-C932BF344E33}" type="presOf" srcId="{48370AF3-FC86-4D8C-8C54-83EAC2041CE6}" destId="{10C40DD1-8F53-4982-AE25-5D301BBB4035}" srcOrd="0" destOrd="0" presId="urn:microsoft.com/office/officeart/2005/8/layout/cycle2"/>
+    <dgm:cxn modelId="{E422C681-256E-41AA-A0D8-4F7AD719AE70}" type="presOf" srcId="{18589C4B-236C-4770-ACA6-5F2BC1925825}" destId="{76D2A737-E894-45DA-A9E2-0913B236F12E}" srcOrd="1" destOrd="0" presId="urn:microsoft.com/office/officeart/2005/8/layout/cycle2"/>
+    <dgm:cxn modelId="{072D75B5-AE8A-4BF9-813C-52F86070C69F}" type="presOf" srcId="{82D99C4C-3601-4F2B-B062-F76B7FA58351}" destId="{B38A756C-2FBC-4753-8A72-C64909D7B55D}" srcOrd="0" destOrd="0" presId="urn:microsoft.com/office/officeart/2005/8/layout/cycle2"/>
+    <dgm:cxn modelId="{73A6D81D-B121-4772-B9DC-D989684794EC}" type="presOf" srcId="{9928AC29-F93D-4104-B656-07B79942F478}" destId="{B33D451D-E7ED-453E-BBDD-2A7104931649}" srcOrd="0" destOrd="0" presId="urn:microsoft.com/office/officeart/2005/8/layout/cycle2"/>
+    <dgm:cxn modelId="{D7756D26-48D8-4543-8ECF-B43045B6A7A2}" type="presOf" srcId="{6BB16651-A2C7-44E6-8B71-595F1464C6E6}" destId="{9CB5DCF6-A9AB-46CF-8F54-44562297832B}" srcOrd="0" destOrd="0" presId="urn:microsoft.com/office/officeart/2005/8/layout/cycle2"/>
+    <dgm:cxn modelId="{A150B94E-B2C2-4D6C-9C4B-F76456348E67}" srcId="{7D813336-3D77-46FD-BFBE-B927186F4EE8}" destId="{48370AF3-FC86-4D8C-8C54-83EAC2041CE6}" srcOrd="1" destOrd="0" parTransId="{AB741C83-841B-426D-A5E0-6EEA4C052CE4}" sibTransId="{F7548831-CA11-41DD-8ECC-17CA536DA611}"/>
+    <dgm:cxn modelId="{5A8FC996-E36A-4A4D-B9A9-E0F5F95CDF30}" type="presOf" srcId="{7D0E5FE9-BEBD-455F-9242-519724FB6C96}" destId="{1AD34968-D5D1-4171-B98B-6A348B13B975}" srcOrd="0" destOrd="0" presId="urn:microsoft.com/office/officeart/2005/8/layout/cycle2"/>
+    <dgm:cxn modelId="{E4650F96-8B96-45DB-9B8B-739BA4DAFC00}" type="presOf" srcId="{2CEB24EB-0E4B-4978-B141-AD1017CE08DB}" destId="{5BD3947E-EAF4-4999-8F41-16C31CDD1897}" srcOrd="1" destOrd="0" presId="urn:microsoft.com/office/officeart/2005/8/layout/cycle2"/>
+    <dgm:cxn modelId="{48826F36-B9DF-44EC-8ED7-EAA8DE65A165}" type="presOf" srcId="{2CEB24EB-0E4B-4978-B141-AD1017CE08DB}" destId="{C0492A94-958F-4DF2-8E31-D0E5D431B110}" srcOrd="0" destOrd="0" presId="urn:microsoft.com/office/officeart/2005/8/layout/cycle2"/>
+    <dgm:cxn modelId="{6C92652C-2ECF-4C26-BCCB-EFA2B76571F3}" type="presOf" srcId="{CB2D6001-FAA4-49C6-8385-9A9576EB7A0B}" destId="{D229D606-AC96-466B-9F97-EAB3C96DE430}" srcOrd="1" destOrd="0" presId="urn:microsoft.com/office/officeart/2005/8/layout/cycle2"/>
+    <dgm:cxn modelId="{E7A5AF9B-C11A-40EC-9AE6-7726E1A9A711}" type="presOf" srcId="{F7548831-CA11-41DD-8ECC-17CA536DA611}" destId="{4E111617-F5D3-4634-A4E7-55A35BA10C3B}" srcOrd="1" destOrd="0" presId="urn:microsoft.com/office/officeart/2005/8/layout/cycle2"/>
+    <dgm:cxn modelId="{656CE130-0515-41FF-B2F2-2BD43856E3D0}" srcId="{7D813336-3D77-46FD-BFBE-B927186F4EE8}" destId="{7D0E5FE9-BEBD-455F-9242-519724FB6C96}" srcOrd="4" destOrd="0" parTransId="{594E2760-2BA1-4C56-8104-2C3A58C07462}" sibTransId="{CB2D6001-FAA4-49C6-8385-9A9576EB7A0B}"/>
     <dgm:cxn modelId="{755746E8-407D-44DE-81DE-2817DFAC9717}" type="presParOf" srcId="{1F7049C3-AAE1-4856-8433-BA85AFDAFBB4}" destId="{BE10170A-FDA7-46C6-8080-0CD272A11F79}" srcOrd="0" destOrd="0" presId="urn:microsoft.com/office/officeart/2005/8/layout/cycle2"/>
     <dgm:cxn modelId="{3CC0E0F5-28E0-4741-9540-40DA4F37F3CB}" type="presParOf" srcId="{1F7049C3-AAE1-4856-8433-BA85AFDAFBB4}" destId="{9CB5DCF6-A9AB-46CF-8F54-44562297832B}" srcOrd="1" destOrd="0" presId="urn:microsoft.com/office/officeart/2005/8/layout/cycle2"/>
     <dgm:cxn modelId="{754C5F5A-FF0E-468D-9F76-F99066A63CA1}" type="presParOf" srcId="{9CB5DCF6-A9AB-46CF-8F54-44562297832B}" destId="{532A4D80-CC45-47DE-9B33-C25D9F0311CD}" srcOrd="0" destOrd="0" presId="urn:microsoft.com/office/officeart/2005/8/layout/cycle2"/>
@@ -3676,7 +4044,7 @@
         </a:bodyPr>
         <a:lstStyle/>
         <a:p>
-          <a:pPr marL="0" lvl="0" indent="0" algn="ctr" defTabSz="844550">
+          <a:pPr lvl="0" algn="ctr" defTabSz="844550">
             <a:lnSpc>
               <a:spcPct val="90000"/>
             </a:lnSpc>
@@ -3686,7 +4054,6 @@
             <a:spcAft>
               <a:spcPct val="35000"/>
             </a:spcAft>
-            <a:buNone/>
           </a:pPr>
           <a:r>
             <a:rPr lang="en-US" sz="1900" kern="1200"/>
@@ -3749,7 +4116,7 @@
         </a:bodyPr>
         <a:lstStyle/>
         <a:p>
-          <a:pPr marL="0" lvl="0" indent="0" algn="ctr" defTabSz="666750">
+          <a:pPr lvl="0" algn="ctr" defTabSz="666750">
             <a:lnSpc>
               <a:spcPct val="90000"/>
             </a:lnSpc>
@@ -3759,7 +4126,6 @@
             <a:spcAft>
               <a:spcPct val="35000"/>
             </a:spcAft>
-            <a:buNone/>
           </a:pPr>
           <a:endParaRPr lang="en-US" sz="1500" kern="1200"/>
         </a:p>
@@ -3821,7 +4187,7 @@
         </a:bodyPr>
         <a:lstStyle/>
         <a:p>
-          <a:pPr marL="0" lvl="0" indent="0" algn="ctr" defTabSz="844550">
+          <a:pPr lvl="0" algn="ctr" defTabSz="844550">
             <a:lnSpc>
               <a:spcPct val="90000"/>
             </a:lnSpc>
@@ -3831,7 +4197,6 @@
             <a:spcAft>
               <a:spcPct val="35000"/>
             </a:spcAft>
-            <a:buNone/>
           </a:pPr>
           <a:r>
             <a:rPr lang="en-US" sz="1900" kern="1200"/>
@@ -3894,7 +4259,7 @@
         </a:bodyPr>
         <a:lstStyle/>
         <a:p>
-          <a:pPr marL="0" lvl="0" indent="0" algn="ctr" defTabSz="666750">
+          <a:pPr lvl="0" algn="ctr" defTabSz="666750">
             <a:lnSpc>
               <a:spcPct val="90000"/>
             </a:lnSpc>
@@ -3904,7 +4269,6 @@
             <a:spcAft>
               <a:spcPct val="35000"/>
             </a:spcAft>
-            <a:buNone/>
           </a:pPr>
           <a:endParaRPr lang="en-US" sz="1500" kern="1200"/>
         </a:p>
@@ -3966,7 +4330,7 @@
         </a:bodyPr>
         <a:lstStyle/>
         <a:p>
-          <a:pPr marL="0" lvl="0" indent="0" algn="ctr" defTabSz="844550">
+          <a:pPr lvl="0" algn="ctr" defTabSz="844550">
             <a:lnSpc>
               <a:spcPct val="90000"/>
             </a:lnSpc>
@@ -3976,7 +4340,6 @@
             <a:spcAft>
               <a:spcPct val="35000"/>
             </a:spcAft>
-            <a:buNone/>
           </a:pPr>
           <a:r>
             <a:rPr lang="en-US" sz="1900" kern="1200"/>
@@ -4039,7 +4402,7 @@
         </a:bodyPr>
         <a:lstStyle/>
         <a:p>
-          <a:pPr marL="0" lvl="0" indent="0" algn="ctr" defTabSz="666750">
+          <a:pPr lvl="0" algn="ctr" defTabSz="666750">
             <a:lnSpc>
               <a:spcPct val="90000"/>
             </a:lnSpc>
@@ -4049,7 +4412,6 @@
             <a:spcAft>
               <a:spcPct val="35000"/>
             </a:spcAft>
-            <a:buNone/>
           </a:pPr>
           <a:endParaRPr lang="en-US" sz="1500" kern="1200"/>
         </a:p>
@@ -4116,7 +4478,7 @@
         </a:bodyPr>
         <a:lstStyle/>
         <a:p>
-          <a:pPr marL="0" lvl="0" indent="0" algn="ctr" defTabSz="844550">
+          <a:pPr lvl="0" algn="ctr" defTabSz="844550">
             <a:lnSpc>
               <a:spcPct val="90000"/>
             </a:lnSpc>
@@ -4126,7 +4488,6 @@
             <a:spcAft>
               <a:spcPct val="35000"/>
             </a:spcAft>
-            <a:buNone/>
           </a:pPr>
           <a:r>
             <a:rPr lang="en-US" sz="1900" kern="1200"/>
@@ -4208,7 +4569,7 @@
         </a:bodyPr>
         <a:lstStyle/>
         <a:p>
-          <a:pPr marL="0" lvl="0" indent="0" algn="ctr" defTabSz="444500">
+          <a:pPr lvl="0" algn="ctr" defTabSz="444500">
             <a:lnSpc>
               <a:spcPct val="90000"/>
             </a:lnSpc>
@@ -4218,7 +4579,6 @@
             <a:spcAft>
               <a:spcPct val="35000"/>
             </a:spcAft>
-            <a:buNone/>
           </a:pPr>
           <a:r>
             <a:rPr lang="en-US" sz="1000" kern="1200"/>
@@ -4281,7 +4641,7 @@
         </a:bodyPr>
         <a:lstStyle/>
         <a:p>
-          <a:pPr marL="0" lvl="0" indent="0" algn="ctr" defTabSz="355600">
+          <a:pPr lvl="0" algn="ctr" defTabSz="355600">
             <a:lnSpc>
               <a:spcPct val="90000"/>
             </a:lnSpc>
@@ -4291,7 +4651,6 @@
             <a:spcAft>
               <a:spcPct val="35000"/>
             </a:spcAft>
-            <a:buNone/>
           </a:pPr>
           <a:endParaRPr lang="en-US" sz="800" kern="1200"/>
         </a:p>
@@ -4353,7 +4712,7 @@
         </a:bodyPr>
         <a:lstStyle/>
         <a:p>
-          <a:pPr marL="0" lvl="0" indent="0" algn="ctr" defTabSz="444500">
+          <a:pPr lvl="0" algn="ctr" defTabSz="444500">
             <a:lnSpc>
               <a:spcPct val="90000"/>
             </a:lnSpc>
@@ -4363,7 +4722,6 @@
             <a:spcAft>
               <a:spcPct val="35000"/>
             </a:spcAft>
-            <a:buNone/>
           </a:pPr>
           <a:r>
             <a:rPr lang="en-US" sz="1000" kern="1200"/>
@@ -4371,7 +4729,7 @@
           </a:r>
         </a:p>
         <a:p>
-          <a:pPr marL="0" lvl="0" indent="0" algn="ctr" defTabSz="444500">
+          <a:pPr lvl="0" algn="ctr" defTabSz="444500">
             <a:lnSpc>
               <a:spcPct val="90000"/>
             </a:lnSpc>
@@ -4381,7 +4739,6 @@
             <a:spcAft>
               <a:spcPct val="35000"/>
             </a:spcAft>
-            <a:buNone/>
           </a:pPr>
           <a:r>
             <a:rPr lang="en-US" sz="1000" kern="1200"/>
@@ -4444,7 +4801,7 @@
         </a:bodyPr>
         <a:lstStyle/>
         <a:p>
-          <a:pPr marL="0" lvl="0" indent="0" algn="ctr" defTabSz="355600">
+          <a:pPr lvl="0" algn="ctr" defTabSz="355600">
             <a:lnSpc>
               <a:spcPct val="90000"/>
             </a:lnSpc>
@@ -4454,7 +4811,6 @@
             <a:spcAft>
               <a:spcPct val="35000"/>
             </a:spcAft>
-            <a:buNone/>
           </a:pPr>
           <a:endParaRPr lang="en-US" sz="800" kern="1200"/>
         </a:p>
@@ -4516,7 +4872,7 @@
         </a:bodyPr>
         <a:lstStyle/>
         <a:p>
-          <a:pPr marL="0" lvl="0" indent="0" algn="ctr" defTabSz="444500">
+          <a:pPr lvl="0" algn="ctr" defTabSz="444500">
             <a:lnSpc>
               <a:spcPct val="90000"/>
             </a:lnSpc>
@@ -4526,7 +4882,6 @@
             <a:spcAft>
               <a:spcPct val="35000"/>
             </a:spcAft>
-            <a:buNone/>
           </a:pPr>
           <a:r>
             <a:rPr lang="en-US" sz="1000" kern="1200"/>
@@ -4534,7 +4889,7 @@
           </a:r>
         </a:p>
         <a:p>
-          <a:pPr marL="0" lvl="0" indent="0" algn="ctr" defTabSz="444500">
+          <a:pPr lvl="0" algn="ctr" defTabSz="444500">
             <a:lnSpc>
               <a:spcPct val="90000"/>
             </a:lnSpc>
@@ -4544,7 +4899,6 @@
             <a:spcAft>
               <a:spcPct val="35000"/>
             </a:spcAft>
-            <a:buNone/>
           </a:pPr>
           <a:r>
             <a:rPr lang="en-US" sz="1000" kern="1200"/>
@@ -4607,7 +4961,7 @@
         </a:bodyPr>
         <a:lstStyle/>
         <a:p>
-          <a:pPr marL="0" lvl="0" indent="0" algn="ctr" defTabSz="355600">
+          <a:pPr lvl="0" algn="ctr" defTabSz="355600">
             <a:lnSpc>
               <a:spcPct val="90000"/>
             </a:lnSpc>
@@ -4617,7 +4971,6 @@
             <a:spcAft>
               <a:spcPct val="35000"/>
             </a:spcAft>
-            <a:buNone/>
           </a:pPr>
           <a:endParaRPr lang="en-US" sz="800" kern="1200"/>
         </a:p>
@@ -4679,7 +5032,7 @@
         </a:bodyPr>
         <a:lstStyle/>
         <a:p>
-          <a:pPr marL="0" lvl="0" indent="0" algn="ctr" defTabSz="444500">
+          <a:pPr lvl="0" algn="ctr" defTabSz="444500">
             <a:lnSpc>
               <a:spcPct val="90000"/>
             </a:lnSpc>
@@ -4689,7 +5042,6 @@
             <a:spcAft>
               <a:spcPct val="35000"/>
             </a:spcAft>
-            <a:buNone/>
           </a:pPr>
           <a:r>
             <a:rPr lang="en-US" sz="1000" kern="1200"/>
@@ -4697,7 +5049,7 @@
           </a:r>
         </a:p>
         <a:p>
-          <a:pPr marL="0" lvl="0" indent="0" algn="ctr" defTabSz="444500">
+          <a:pPr lvl="0" algn="ctr" defTabSz="444500">
             <a:lnSpc>
               <a:spcPct val="90000"/>
             </a:lnSpc>
@@ -4707,7 +5059,6 @@
             <a:spcAft>
               <a:spcPct val="35000"/>
             </a:spcAft>
-            <a:buNone/>
           </a:pPr>
           <a:r>
             <a:rPr lang="en-US" sz="1000" kern="1200"/>
@@ -4770,7 +5121,7 @@
         </a:bodyPr>
         <a:lstStyle/>
         <a:p>
-          <a:pPr marL="0" lvl="0" indent="0" algn="ctr" defTabSz="355600">
+          <a:pPr lvl="0" algn="ctr" defTabSz="355600">
             <a:lnSpc>
               <a:spcPct val="90000"/>
             </a:lnSpc>
@@ -4780,7 +5131,6 @@
             <a:spcAft>
               <a:spcPct val="35000"/>
             </a:spcAft>
-            <a:buNone/>
           </a:pPr>
           <a:endParaRPr lang="en-US" sz="800" kern="1200"/>
         </a:p>
@@ -4842,7 +5192,7 @@
         </a:bodyPr>
         <a:lstStyle/>
         <a:p>
-          <a:pPr marL="0" lvl="0" indent="0" algn="ctr" defTabSz="444500">
+          <a:pPr lvl="0" algn="ctr" defTabSz="444500">
             <a:lnSpc>
               <a:spcPct val="90000"/>
             </a:lnSpc>
@@ -4852,7 +5202,6 @@
             <a:spcAft>
               <a:spcPct val="35000"/>
             </a:spcAft>
-            <a:buNone/>
           </a:pPr>
           <a:r>
             <a:rPr lang="en-US" sz="1000" kern="1200"/>
@@ -4860,7 +5209,7 @@
           </a:r>
         </a:p>
         <a:p>
-          <a:pPr marL="0" lvl="0" indent="0" algn="ctr" defTabSz="444500">
+          <a:pPr lvl="0" algn="ctr" defTabSz="444500">
             <a:lnSpc>
               <a:spcPct val="90000"/>
             </a:lnSpc>
@@ -4870,7 +5219,6 @@
             <a:spcAft>
               <a:spcPct val="35000"/>
             </a:spcAft>
-            <a:buNone/>
           </a:pPr>
           <a:r>
             <a:rPr lang="en-US" sz="1000" kern="1200"/>
@@ -4933,7 +5281,7 @@
         </a:bodyPr>
         <a:lstStyle/>
         <a:p>
-          <a:pPr marL="0" lvl="0" indent="0" algn="ctr" defTabSz="355600">
+          <a:pPr lvl="0" algn="ctr" defTabSz="355600">
             <a:lnSpc>
               <a:spcPct val="90000"/>
             </a:lnSpc>
@@ -4943,7 +5291,6 @@
             <a:spcAft>
               <a:spcPct val="35000"/>
             </a:spcAft>
-            <a:buNone/>
           </a:pPr>
           <a:endParaRPr lang="en-US" sz="800" kern="1200"/>
         </a:p>
@@ -5005,7 +5352,7 @@
         </a:bodyPr>
         <a:lstStyle/>
         <a:p>
-          <a:pPr marL="0" lvl="0" indent="0" algn="ctr" defTabSz="444500">
+          <a:pPr lvl="0" algn="ctr" defTabSz="444500">
             <a:lnSpc>
               <a:spcPct val="90000"/>
             </a:lnSpc>
@@ -5015,7 +5362,6 @@
             <a:spcAft>
               <a:spcPct val="35000"/>
             </a:spcAft>
-            <a:buNone/>
           </a:pPr>
           <a:r>
             <a:rPr lang="en-US" sz="1000" kern="1200"/>
@@ -5023,7 +5369,7 @@
           </a:r>
         </a:p>
         <a:p>
-          <a:pPr marL="0" lvl="0" indent="0" algn="ctr" defTabSz="444500">
+          <a:pPr lvl="0" algn="ctr" defTabSz="444500">
             <a:lnSpc>
               <a:spcPct val="90000"/>
             </a:lnSpc>
@@ -5033,7 +5379,6 @@
             <a:spcAft>
               <a:spcPct val="35000"/>
             </a:spcAft>
-            <a:buNone/>
           </a:pPr>
           <a:r>
             <a:rPr lang="en-US" sz="1000" kern="1200"/>
@@ -5096,7 +5441,7 @@
         </a:bodyPr>
         <a:lstStyle/>
         <a:p>
-          <a:pPr marL="0" lvl="0" indent="0" algn="ctr" defTabSz="355600">
+          <a:pPr lvl="0" algn="ctr" defTabSz="355600">
             <a:lnSpc>
               <a:spcPct val="90000"/>
             </a:lnSpc>
@@ -5106,7 +5451,6 @@
             <a:spcAft>
               <a:spcPct val="35000"/>
             </a:spcAft>
-            <a:buNone/>
           </a:pPr>
           <a:endParaRPr lang="en-US" sz="800" kern="1200"/>
         </a:p>
@@ -5168,7 +5512,7 @@
         </a:bodyPr>
         <a:lstStyle/>
         <a:p>
-          <a:pPr marL="0" lvl="0" indent="0" algn="ctr" defTabSz="444500">
+          <a:pPr lvl="0" algn="ctr" defTabSz="444500">
             <a:lnSpc>
               <a:spcPct val="90000"/>
             </a:lnSpc>
@@ -5178,7 +5522,6 @@
             <a:spcAft>
               <a:spcPct val="35000"/>
             </a:spcAft>
-            <a:buNone/>
           </a:pPr>
           <a:r>
             <a:rPr lang="en-US" sz="1000" kern="1200"/>
@@ -5186,7 +5529,7 @@
           </a:r>
         </a:p>
         <a:p>
-          <a:pPr marL="0" lvl="0" indent="0" algn="ctr" defTabSz="444500">
+          <a:pPr lvl="0" algn="ctr" defTabSz="444500">
             <a:lnSpc>
               <a:spcPct val="90000"/>
             </a:lnSpc>
@@ -5196,7 +5539,6 @@
             <a:spcAft>
               <a:spcPct val="35000"/>
             </a:spcAft>
-            <a:buNone/>
           </a:pPr>
           <a:r>
             <a:rPr lang="en-US" sz="1000" kern="1200"/>
@@ -5259,7 +5601,7 @@
         </a:bodyPr>
         <a:lstStyle/>
         <a:p>
-          <a:pPr marL="0" lvl="0" indent="0" algn="ctr" defTabSz="355600">
+          <a:pPr lvl="0" algn="ctr" defTabSz="355600">
             <a:lnSpc>
               <a:spcPct val="90000"/>
             </a:lnSpc>
@@ -5269,7 +5611,6 @@
             <a:spcAft>
               <a:spcPct val="35000"/>
             </a:spcAft>
-            <a:buNone/>
           </a:pPr>
           <a:endParaRPr lang="en-US" sz="800" kern="1200"/>
         </a:p>
@@ -5336,7 +5677,7 @@
         </a:bodyPr>
         <a:lstStyle/>
         <a:p>
-          <a:pPr marL="0" lvl="0" indent="0" algn="ctr" defTabSz="444500">
+          <a:pPr lvl="0" algn="ctr" defTabSz="444500">
             <a:lnSpc>
               <a:spcPct val="90000"/>
             </a:lnSpc>
@@ -5346,7 +5687,6 @@
             <a:spcAft>
               <a:spcPct val="35000"/>
             </a:spcAft>
-            <a:buNone/>
           </a:pPr>
           <a:r>
             <a:rPr lang="en-US" sz="1000" kern="1200"/>
@@ -5426,7 +5766,7 @@
         </a:bodyPr>
         <a:lstStyle/>
         <a:p>
-          <a:pPr marL="0" lvl="0" indent="0" algn="ctr" defTabSz="533400">
+          <a:pPr lvl="0" algn="ctr" defTabSz="533400">
             <a:lnSpc>
               <a:spcPct val="90000"/>
             </a:lnSpc>
@@ -5436,7 +5776,6 @@
             <a:spcAft>
               <a:spcPct val="35000"/>
             </a:spcAft>
-            <a:buNone/>
           </a:pPr>
           <a:r>
             <a:rPr lang="en-US" sz="1200" kern="1200"/>
@@ -5499,7 +5838,7 @@
         </a:bodyPr>
         <a:lstStyle/>
         <a:p>
-          <a:pPr marL="0" lvl="0" indent="0" algn="ctr" defTabSz="444500">
+          <a:pPr lvl="0" algn="ctr" defTabSz="444500">
             <a:lnSpc>
               <a:spcPct val="90000"/>
             </a:lnSpc>
@@ -5509,7 +5848,6 @@
             <a:spcAft>
               <a:spcPct val="35000"/>
             </a:spcAft>
-            <a:buNone/>
           </a:pPr>
           <a:endParaRPr lang="en-US" sz="1000" kern="1200"/>
         </a:p>
@@ -5574,7 +5912,7 @@
         </a:bodyPr>
         <a:lstStyle/>
         <a:p>
-          <a:pPr marL="0" lvl="0" indent="0" algn="ctr" defTabSz="533400">
+          <a:pPr lvl="0" algn="ctr" defTabSz="533400">
             <a:lnSpc>
               <a:spcPct val="90000"/>
             </a:lnSpc>
@@ -5584,7 +5922,6 @@
             <a:spcAft>
               <a:spcPct val="35000"/>
             </a:spcAft>
-            <a:buNone/>
           </a:pPr>
           <a:r>
             <a:rPr lang="en-US" sz="1200" kern="1200"/>
@@ -5647,7 +5984,7 @@
         </a:bodyPr>
         <a:lstStyle/>
         <a:p>
-          <a:pPr marL="0" lvl="0" indent="0" algn="ctr" defTabSz="444500">
+          <a:pPr lvl="0" algn="ctr" defTabSz="444500">
             <a:lnSpc>
               <a:spcPct val="90000"/>
             </a:lnSpc>
@@ -5657,7 +5994,6 @@
             <a:spcAft>
               <a:spcPct val="35000"/>
             </a:spcAft>
-            <a:buNone/>
           </a:pPr>
           <a:endParaRPr lang="en-US" sz="1000" kern="1200"/>
         </a:p>
@@ -5722,7 +6058,7 @@
         </a:bodyPr>
         <a:lstStyle/>
         <a:p>
-          <a:pPr marL="0" lvl="0" indent="0" algn="ctr" defTabSz="533400">
+          <a:pPr lvl="0" algn="ctr" defTabSz="533400">
             <a:lnSpc>
               <a:spcPct val="90000"/>
             </a:lnSpc>
@@ -5732,7 +6068,6 @@
             <a:spcAft>
               <a:spcPct val="35000"/>
             </a:spcAft>
-            <a:buNone/>
           </a:pPr>
           <a:r>
             <a:rPr lang="en-US" sz="1200" kern="1200"/>
@@ -5795,7 +6130,7 @@
         </a:bodyPr>
         <a:lstStyle/>
         <a:p>
-          <a:pPr marL="0" lvl="0" indent="0" algn="ctr" defTabSz="444500">
+          <a:pPr lvl="0" algn="ctr" defTabSz="444500">
             <a:lnSpc>
               <a:spcPct val="90000"/>
             </a:lnSpc>
@@ -5805,7 +6140,6 @@
             <a:spcAft>
               <a:spcPct val="35000"/>
             </a:spcAft>
-            <a:buNone/>
           </a:pPr>
           <a:endParaRPr lang="en-US" sz="1000" kern="1200"/>
         </a:p>
@@ -5870,7 +6204,7 @@
         </a:bodyPr>
         <a:lstStyle/>
         <a:p>
-          <a:pPr marL="0" lvl="0" indent="0" algn="ctr" defTabSz="533400">
+          <a:pPr lvl="0" algn="ctr" defTabSz="533400">
             <a:lnSpc>
               <a:spcPct val="90000"/>
             </a:lnSpc>
@@ -5880,7 +6214,6 @@
             <a:spcAft>
               <a:spcPct val="35000"/>
             </a:spcAft>
-            <a:buNone/>
           </a:pPr>
           <a:r>
             <a:rPr lang="en-US" sz="1200" kern="1200"/>
@@ -5943,7 +6276,7 @@
         </a:bodyPr>
         <a:lstStyle/>
         <a:p>
-          <a:pPr marL="0" lvl="0" indent="0" algn="ctr" defTabSz="444500">
+          <a:pPr lvl="0" algn="ctr" defTabSz="444500">
             <a:lnSpc>
               <a:spcPct val="90000"/>
             </a:lnSpc>
@@ -5953,7 +6286,6 @@
             <a:spcAft>
               <a:spcPct val="35000"/>
             </a:spcAft>
-            <a:buNone/>
           </a:pPr>
           <a:endParaRPr lang="en-US" sz="1000" kern="1200"/>
         </a:p>
@@ -6018,7 +6350,7 @@
         </a:bodyPr>
         <a:lstStyle/>
         <a:p>
-          <a:pPr marL="0" lvl="0" indent="0" algn="ctr" defTabSz="533400">
+          <a:pPr lvl="0" algn="ctr" defTabSz="533400">
             <a:lnSpc>
               <a:spcPct val="90000"/>
             </a:lnSpc>
@@ -6028,7 +6360,6 @@
             <a:spcAft>
               <a:spcPct val="35000"/>
             </a:spcAft>
-            <a:buNone/>
           </a:pPr>
           <a:r>
             <a:rPr lang="en-US" sz="1200" kern="1200"/>
@@ -6091,7 +6422,7 @@
         </a:bodyPr>
         <a:lstStyle/>
         <a:p>
-          <a:pPr marL="0" lvl="0" indent="0" algn="ctr" defTabSz="444500">
+          <a:pPr lvl="0" algn="ctr" defTabSz="444500">
             <a:lnSpc>
               <a:spcPct val="90000"/>
             </a:lnSpc>
@@ -6101,7 +6432,6 @@
             <a:spcAft>
               <a:spcPct val="35000"/>
             </a:spcAft>
-            <a:buNone/>
           </a:pPr>
           <a:endParaRPr lang="en-US" sz="1000" kern="1200"/>
         </a:p>
@@ -6166,7 +6496,7 @@
         </a:bodyPr>
         <a:lstStyle/>
         <a:p>
-          <a:pPr marL="0" lvl="0" indent="0" algn="ctr" defTabSz="533400">
+          <a:pPr lvl="0" algn="ctr" defTabSz="533400">
             <a:lnSpc>
               <a:spcPct val="90000"/>
             </a:lnSpc>
@@ -6176,7 +6506,6 @@
             <a:spcAft>
               <a:spcPct val="35000"/>
             </a:spcAft>
-            <a:buNone/>
           </a:pPr>
           <a:r>
             <a:rPr lang="en-US" sz="1200" kern="1200"/>
@@ -6239,7 +6568,7 @@
         </a:bodyPr>
         <a:lstStyle/>
         <a:p>
-          <a:pPr marL="0" lvl="0" indent="0" algn="ctr" defTabSz="444500">
+          <a:pPr lvl="0" algn="ctr" defTabSz="444500">
             <a:lnSpc>
               <a:spcPct val="90000"/>
             </a:lnSpc>
@@ -6249,7 +6578,6 @@
             <a:spcAft>
               <a:spcPct val="35000"/>
             </a:spcAft>
-            <a:buNone/>
           </a:pPr>
           <a:endParaRPr lang="en-US" sz="1000" kern="1200"/>
         </a:p>
@@ -10118,7 +10446,7 @@
           <a:p>
             <a:fld id="{EA4960E5-F060-4C88-B1C5-5A6F5890BEF6}" type="datetimeFigureOut">
               <a:rPr lang="en-SG" smtClean="0"/>
-              <a:t>21/10/2020</a:t>
+              <a:t>10/21/2020</a:t>
             </a:fld>
             <a:endParaRPr lang="en-SG" dirty="0"/>
           </a:p>
@@ -16369,7 +16697,7 @@
           <a:graphicData uri="http://schemas.openxmlformats.org/presentationml/2006/ole">
             <mc:AlternateContent xmlns:mc="http://schemas.openxmlformats.org/markup-compatibility/2006">
               <mc:Choice xmlns:v="urn:schemas-microsoft-com:vml" Requires="v">
-                <p:oleObj spid="_x0000_s2066" name="Bitmap Image" r:id="rId3" imgW="5014395" imgH="4572396" progId="Paint.Picture">
+                <p:oleObj spid="_x0000_s2068" name="Bitmap Image" r:id="rId3" imgW="5014395" imgH="4572396" progId="Paint.Picture">
                   <p:embed/>
                 </p:oleObj>
               </mc:Choice>
@@ -16750,7 +17078,7 @@
           <a:graphicData uri="http://schemas.openxmlformats.org/presentationml/2006/ole">
             <mc:AlternateContent xmlns:mc="http://schemas.openxmlformats.org/markup-compatibility/2006">
               <mc:Choice xmlns:v="urn:schemas-microsoft-com:vml" Requires="v">
-                <p:oleObj spid="_x0000_s6148" name="Bitmap Image" r:id="rId3" imgW="4915326" imgH="3505504" progId="Paint.Picture">
+                <p:oleObj spid="_x0000_s6150" name="Bitmap Image" r:id="rId3" imgW="4915326" imgH="3505504" progId="Paint.Picture">
                   <p:embed/>
                 </p:oleObj>
               </mc:Choice>
@@ -17427,7 +17755,7 @@
           <a:graphicData uri="http://schemas.openxmlformats.org/presentationml/2006/ole">
             <mc:AlternateContent xmlns:mc="http://schemas.openxmlformats.org/markup-compatibility/2006">
               <mc:Choice xmlns:v="urn:schemas-microsoft-com:vml" Requires="v">
-                <p:oleObj spid="_x0000_s7170" name="Bitmap Image" r:id="rId3" imgW="5014395" imgH="4572396" progId="Paint.Picture">
+                <p:oleObj spid="_x0000_s7172" name="Bitmap Image" r:id="rId3" imgW="5014395" imgH="4572396" progId="Paint.Picture">
                   <p:embed/>
                 </p:oleObj>
               </mc:Choice>
@@ -18041,7 +18369,7 @@
           <a:graphicData uri="http://schemas.openxmlformats.org/presentationml/2006/ole">
             <mc:AlternateContent xmlns:mc="http://schemas.openxmlformats.org/markup-compatibility/2006">
               <mc:Choice xmlns:v="urn:schemas-microsoft-com:vml" Requires="v">
-                <p:oleObj spid="_x0000_s3080" name="Bitmap Image" r:id="rId3" imgW="5014395" imgH="4572396" progId="Paint.Picture">
+                <p:oleObj spid="_x0000_s3082" name="Bitmap Image" r:id="rId3" imgW="5014395" imgH="4572396" progId="Paint.Picture">
                   <p:embed/>
                 </p:oleObj>
               </mc:Choice>
@@ -18248,26 +18576,272 @@
             <p:ph type="title"/>
           </p:nvPr>
         </p:nvSpPr>
-        <p:spPr>
-          <a:xfrm>
-            <a:off x="2573601" y="3053030"/>
-            <a:ext cx="4648197" cy="545561"/>
-          </a:xfrm>
-        </p:spPr>
+        <p:spPr/>
         <p:txBody>
           <a:bodyPr/>
           <a:lstStyle/>
           <a:p>
             <a:r>
-              <a:rPr lang="en-US" dirty="0"/>
-              <a:t>Thank you! </a:t>
+              <a:rPr lang="en-US" dirty="0" smtClean="0"/>
+              <a:t>Comparison</a:t>
+            </a:r>
+            <a:endParaRPr lang="en-SG" dirty="0"/>
+          </a:p>
+        </p:txBody>
+      </p:sp>
+      <p:sp>
+        <p:nvSpPr>
+          <p:cNvPr id="3" name="Content Placeholder 2"/>
+          <p:cNvSpPr>
+            <a:spLocks noGrp="1"/>
+          </p:cNvSpPr>
+          <p:nvPr>
+            <p:ph sz="quarter" idx="13"/>
+          </p:nvPr>
+        </p:nvSpPr>
+        <p:spPr/>
+        <p:txBody>
+          <a:bodyPr>
+            <a:normAutofit fontScale="55000" lnSpcReduction="20000"/>
+          </a:bodyPr>
+          <a:lstStyle/>
+          <a:p>
+            <a:r>
+              <a:rPr lang="en-US" dirty="0" smtClean="0">
+                <a:solidFill>
+                  <a:schemeClr val="tx1"/>
+                </a:solidFill>
+              </a:rPr>
+              <a:t>Localization Algorithms</a:t>
+            </a:r>
+          </a:p>
+          <a:p>
+            <a:pPr lvl="1"/>
+            <a:r>
+              <a:rPr lang="en-US" dirty="0" smtClean="0">
+                <a:solidFill>
+                  <a:schemeClr val="tx1"/>
+                </a:solidFill>
+              </a:rPr>
+              <a:t>Monte </a:t>
             </a:r>
             <a:r>
               <a:rPr lang="en-US" dirty="0">
-                <a:sym typeface="Wingdings" panose="05000000000000000000" pitchFamily="2" charset="2"/>
+                <a:solidFill>
+                  <a:schemeClr val="tx1"/>
+                </a:solidFill>
               </a:rPr>
-              <a:t> </a:t>
+              <a:t>Carlo </a:t>
             </a:r>
+            <a:r>
+              <a:rPr lang="en-US" dirty="0" smtClean="0">
+                <a:solidFill>
+                  <a:schemeClr val="tx1"/>
+                </a:solidFill>
+              </a:rPr>
+              <a:t>Localization (MCL)</a:t>
+            </a:r>
+          </a:p>
+          <a:p>
+            <a:pPr lvl="2"/>
+            <a:r>
+              <a:rPr lang="en-US" dirty="0" smtClean="0">
+                <a:solidFill>
+                  <a:schemeClr val="tx1"/>
+                </a:solidFill>
+              </a:rPr>
+              <a:t>Most popular in robot localization</a:t>
+            </a:r>
+          </a:p>
+          <a:p>
+            <a:pPr lvl="2"/>
+            <a:r>
+              <a:rPr lang="en-US" dirty="0">
+                <a:solidFill>
+                  <a:schemeClr val="tx1"/>
+                </a:solidFill>
+              </a:rPr>
+              <a:t>Also referred to as Particle Filter</a:t>
+            </a:r>
+          </a:p>
+          <a:p>
+            <a:pPr lvl="2"/>
+            <a:r>
+              <a:rPr lang="en-US" dirty="0">
+                <a:solidFill>
+                  <a:schemeClr val="tx1"/>
+                </a:solidFill>
+              </a:rPr>
+              <a:t>Relies on </a:t>
+            </a:r>
+          </a:p>
+          <a:p>
+            <a:pPr lvl="3"/>
+            <a:r>
+              <a:rPr lang="en-US" dirty="0">
+                <a:solidFill>
+                  <a:schemeClr val="tx1"/>
+                </a:solidFill>
+              </a:rPr>
+              <a:t>Accurate Environment Map</a:t>
+            </a:r>
+          </a:p>
+          <a:p>
+            <a:pPr lvl="3"/>
+            <a:r>
+              <a:rPr lang="en-US" dirty="0">
+                <a:solidFill>
+                  <a:schemeClr val="tx1"/>
+                </a:solidFill>
+              </a:rPr>
+              <a:t>Particle position and </a:t>
+            </a:r>
+            <a:r>
+              <a:rPr lang="en-US" dirty="0" smtClean="0">
+                <a:solidFill>
+                  <a:schemeClr val="tx1"/>
+                </a:solidFill>
+              </a:rPr>
+              <a:t>orientation</a:t>
+            </a:r>
+          </a:p>
+          <a:p>
+            <a:pPr lvl="1"/>
+            <a:r>
+              <a:rPr lang="en-US" dirty="0">
+                <a:solidFill>
+                  <a:schemeClr val="tx1"/>
+                </a:solidFill>
+              </a:rPr>
+              <a:t>Adaptive Monte Carlo </a:t>
+            </a:r>
+            <a:r>
+              <a:rPr lang="en-US" dirty="0" smtClean="0">
+                <a:solidFill>
+                  <a:schemeClr val="tx1"/>
+                </a:solidFill>
+              </a:rPr>
+              <a:t>Localization (AMCL)</a:t>
+            </a:r>
+          </a:p>
+          <a:p>
+            <a:pPr lvl="2"/>
+            <a:r>
+              <a:rPr lang="en-US" dirty="0" smtClean="0">
+                <a:solidFill>
+                  <a:schemeClr val="tx1"/>
+                </a:solidFill>
+              </a:rPr>
+              <a:t>Improved version of MCL</a:t>
+            </a:r>
+          </a:p>
+          <a:p>
+            <a:pPr lvl="2"/>
+            <a:endParaRPr lang="en-US" dirty="0" smtClean="0">
+              <a:solidFill>
+                <a:schemeClr val="tx1"/>
+              </a:solidFill>
+            </a:endParaRPr>
+          </a:p>
+          <a:p>
+            <a:r>
+              <a:rPr lang="en-SG" dirty="0" smtClean="0">
+                <a:solidFill>
+                  <a:schemeClr val="tx1"/>
+                </a:solidFill>
+              </a:rPr>
+              <a:t>Deep </a:t>
+            </a:r>
+            <a:r>
+              <a:rPr lang="en-SG" dirty="0">
+                <a:solidFill>
+                  <a:schemeClr val="tx1"/>
+                </a:solidFill>
+              </a:rPr>
+              <a:t>Neural Network Robotic </a:t>
+            </a:r>
+            <a:r>
+              <a:rPr lang="en-SG" dirty="0" smtClean="0">
+                <a:solidFill>
+                  <a:schemeClr val="tx1"/>
+                </a:solidFill>
+              </a:rPr>
+              <a:t>Mapping</a:t>
+            </a:r>
+          </a:p>
+          <a:p>
+            <a:pPr lvl="1"/>
+            <a:r>
+              <a:rPr lang="en-SG" dirty="0" smtClean="0">
+                <a:solidFill>
+                  <a:schemeClr val="tx1"/>
+                </a:solidFill>
+              </a:rPr>
+              <a:t>Relies on GPS and 3D scan data</a:t>
+            </a:r>
+          </a:p>
+          <a:p>
+            <a:pPr lvl="1"/>
+            <a:r>
+              <a:rPr lang="en-US" dirty="0" smtClean="0">
+                <a:solidFill>
+                  <a:schemeClr val="tx1"/>
+                </a:solidFill>
+              </a:rPr>
+              <a:t>Produces more accuracy map</a:t>
+            </a:r>
+          </a:p>
+          <a:p>
+            <a:pPr lvl="2"/>
+            <a:r>
+              <a:rPr lang="en-US" dirty="0" smtClean="0">
+                <a:solidFill>
+                  <a:schemeClr val="tx1"/>
+                </a:solidFill>
+              </a:rPr>
+              <a:t>Comparing with traditional approach such as k-means</a:t>
+            </a:r>
+          </a:p>
+          <a:p>
+            <a:pPr lvl="2"/>
+            <a:endParaRPr lang="en-US" dirty="0">
+              <a:solidFill>
+                <a:schemeClr val="tx1"/>
+              </a:solidFill>
+            </a:endParaRPr>
+          </a:p>
+          <a:p>
+            <a:r>
+              <a:rPr lang="en-US" dirty="0" smtClean="0">
+                <a:solidFill>
+                  <a:schemeClr val="tx1"/>
+                </a:solidFill>
+              </a:rPr>
+              <a:t>Therefore, AMCL and </a:t>
+            </a:r>
+            <a:r>
+              <a:rPr lang="en-SG" dirty="0">
+                <a:solidFill>
+                  <a:schemeClr val="tx1"/>
+                </a:solidFill>
+              </a:rPr>
+              <a:t>Deep Neural Network Robotic </a:t>
+            </a:r>
+            <a:r>
+              <a:rPr lang="en-SG" dirty="0" smtClean="0">
+                <a:solidFill>
+                  <a:schemeClr val="tx1"/>
+                </a:solidFill>
+              </a:rPr>
+              <a:t>Mapping are good candidates for complement on localization and map in certain conditions</a:t>
+            </a:r>
+            <a:endParaRPr lang="en-US" dirty="0">
+              <a:solidFill>
+                <a:schemeClr val="tx1"/>
+              </a:solidFill>
+            </a:endParaRPr>
+          </a:p>
+          <a:p>
             <a:endParaRPr lang="en-SG" dirty="0"/>
           </a:p>
         </p:txBody>
@@ -18289,7 +18863,7 @@
           <a:p>
             <a:pPr algn="l"/>
             <a:r>
-              <a:rPr lang="en-SG" sz="1000" dirty="0"/>
+              <a:rPr lang="en-SG" sz="1000" smtClean="0"/>
               <a:t>© 2018 National University of Singapore. All Rights Reserved</a:t>
             </a:r>
             <a:endParaRPr lang="en-SG" dirty="0"/>
@@ -18323,7 +18897,446 @@
     </p:spTree>
     <p:extLst>
       <p:ext uri="{BB962C8B-B14F-4D97-AF65-F5344CB8AC3E}">
-        <p14:creationId xmlns:p14="http://schemas.microsoft.com/office/powerpoint/2010/main" val="3351845363"/>
+        <p14:creationId xmlns:p14="http://schemas.microsoft.com/office/powerpoint/2010/main" val="4244244543"/>
+      </p:ext>
+    </p:extLst>
+  </p:cSld>
+  <p:clrMapOvr>
+    <a:masterClrMapping/>
+  </p:clrMapOvr>
+</p:sld>
+</file>
+
+<file path=ppt/slides/slide28.xml><?xml version="1.0" encoding="utf-8"?>
+<p:sld xmlns:a="http://schemas.openxmlformats.org/drawingml/2006/main" xmlns:r="http://schemas.openxmlformats.org/officeDocument/2006/relationships" xmlns:p="http://schemas.openxmlformats.org/presentationml/2006/main">
+  <p:cSld>
+    <p:spTree>
+      <p:nvGrpSpPr>
+        <p:cNvPr id="1" name=""/>
+        <p:cNvGrpSpPr/>
+        <p:nvPr/>
+      </p:nvGrpSpPr>
+      <p:grpSpPr>
+        <a:xfrm>
+          <a:off x="0" y="0"/>
+          <a:ext cx="0" cy="0"/>
+          <a:chOff x="0" y="0"/>
+          <a:chExt cx="0" cy="0"/>
+        </a:xfrm>
+      </p:grpSpPr>
+      <p:sp>
+        <p:nvSpPr>
+          <p:cNvPr id="2" name="Title 1"/>
+          <p:cNvSpPr>
+            <a:spLocks noGrp="1"/>
+          </p:cNvSpPr>
+          <p:nvPr>
+            <p:ph type="title"/>
+          </p:nvPr>
+        </p:nvSpPr>
+        <p:spPr/>
+        <p:txBody>
+          <a:bodyPr>
+            <a:normAutofit fontScale="90000"/>
+          </a:bodyPr>
+          <a:lstStyle/>
+          <a:p>
+            <a:r>
+              <a:rPr lang="en-US" dirty="0" smtClean="0"/>
+              <a:t>System Design -</a:t>
+            </a:r>
+            <a:br>
+              <a:rPr lang="en-US" dirty="0" smtClean="0"/>
+            </a:br>
+            <a:r>
+              <a:rPr lang="en-US" dirty="0" smtClean="0"/>
+              <a:t>Visualization</a:t>
+            </a:r>
+            <a:endParaRPr lang="en-SG" dirty="0"/>
+          </a:p>
+        </p:txBody>
+      </p:sp>
+      <p:sp>
+        <p:nvSpPr>
+          <p:cNvPr id="3" name="Content Placeholder 2"/>
+          <p:cNvSpPr>
+            <a:spLocks noGrp="1"/>
+          </p:cNvSpPr>
+          <p:nvPr>
+            <p:ph sz="quarter" idx="13"/>
+          </p:nvPr>
+        </p:nvSpPr>
+        <p:spPr/>
+        <p:txBody>
+          <a:bodyPr/>
+          <a:lstStyle/>
+          <a:p>
+            <a:endParaRPr lang="en-SG" dirty="0"/>
+          </a:p>
+        </p:txBody>
+      </p:sp>
+      <p:sp>
+        <p:nvSpPr>
+          <p:cNvPr id="4" name="Footer Placeholder 3"/>
+          <p:cNvSpPr>
+            <a:spLocks noGrp="1"/>
+          </p:cNvSpPr>
+          <p:nvPr>
+            <p:ph type="ftr" sz="quarter" idx="15"/>
+          </p:nvPr>
+        </p:nvSpPr>
+        <p:spPr/>
+        <p:txBody>
+          <a:bodyPr/>
+          <a:lstStyle/>
+          <a:p>
+            <a:pPr algn="l"/>
+            <a:r>
+              <a:rPr lang="en-SG" sz="1000" smtClean="0"/>
+              <a:t>© 2018 National University of Singapore. All Rights Reserved</a:t>
+            </a:r>
+            <a:endParaRPr lang="en-SG" dirty="0"/>
+          </a:p>
+        </p:txBody>
+      </p:sp>
+      <p:sp>
+        <p:nvSpPr>
+          <p:cNvPr id="5" name="Slide Number Placeholder 4"/>
+          <p:cNvSpPr>
+            <a:spLocks noGrp="1"/>
+          </p:cNvSpPr>
+          <p:nvPr>
+            <p:ph type="sldNum" sz="quarter" idx="16"/>
+          </p:nvPr>
+        </p:nvSpPr>
+        <p:spPr/>
+        <p:txBody>
+          <a:bodyPr/>
+          <a:lstStyle/>
+          <a:p>
+            <a:fld id="{2F63C605-4FC6-46DE-BC90-871762EA3F52}" type="slidenum">
+              <a:rPr lang="en-SG" smtClean="0"/>
+              <a:pPr/>
+              <a:t>28</a:t>
+            </a:fld>
+            <a:endParaRPr lang="en-SG" dirty="0"/>
+          </a:p>
+        </p:txBody>
+      </p:sp>
+      <p:pic>
+        <p:nvPicPr>
+          <p:cNvPr id="10" name="Picture 9"/>
+          <p:cNvPicPr>
+            <a:picLocks noChangeAspect="1"/>
+          </p:cNvPicPr>
+          <p:nvPr/>
+        </p:nvPicPr>
+        <p:blipFill>
+          <a:blip r:embed="rId2"/>
+          <a:stretch>
+            <a:fillRect/>
+          </a:stretch>
+        </p:blipFill>
+        <p:spPr>
+          <a:xfrm>
+            <a:off x="1072874" y="1313382"/>
+            <a:ext cx="6998251" cy="4520201"/>
+          </a:xfrm>
+          <a:prstGeom prst="rect">
+            <a:avLst/>
+          </a:prstGeom>
+        </p:spPr>
+      </p:pic>
+    </p:spTree>
+    <p:extLst>
+      <p:ext uri="{BB962C8B-B14F-4D97-AF65-F5344CB8AC3E}">
+        <p14:creationId xmlns:p14="http://schemas.microsoft.com/office/powerpoint/2010/main" val="1024114860"/>
+      </p:ext>
+    </p:extLst>
+  </p:cSld>
+  <p:clrMapOvr>
+    <a:masterClrMapping/>
+  </p:clrMapOvr>
+</p:sld>
+</file>
+
+<file path=ppt/slides/slide29.xml><?xml version="1.0" encoding="utf-8"?>
+<p:sld xmlns:a="http://schemas.openxmlformats.org/drawingml/2006/main" xmlns:r="http://schemas.openxmlformats.org/officeDocument/2006/relationships" xmlns:p="http://schemas.openxmlformats.org/presentationml/2006/main">
+  <p:cSld>
+    <p:spTree>
+      <p:nvGrpSpPr>
+        <p:cNvPr id="1" name=""/>
+        <p:cNvGrpSpPr/>
+        <p:nvPr/>
+      </p:nvGrpSpPr>
+      <p:grpSpPr>
+        <a:xfrm>
+          <a:off x="0" y="0"/>
+          <a:ext cx="0" cy="0"/>
+          <a:chOff x="0" y="0"/>
+          <a:chExt cx="0" cy="0"/>
+        </a:xfrm>
+      </p:grpSpPr>
+      <p:sp>
+        <p:nvSpPr>
+          <p:cNvPr id="2" name="Title 1"/>
+          <p:cNvSpPr>
+            <a:spLocks noGrp="1"/>
+          </p:cNvSpPr>
+          <p:nvPr>
+            <p:ph type="title"/>
+          </p:nvPr>
+        </p:nvSpPr>
+        <p:spPr/>
+        <p:txBody>
+          <a:bodyPr/>
+          <a:lstStyle/>
+          <a:p>
+            <a:r>
+              <a:rPr lang="en-US" dirty="0" smtClean="0"/>
+              <a:t>Open3D Visualizer</a:t>
+            </a:r>
+            <a:endParaRPr lang="en-SG" dirty="0"/>
+          </a:p>
+        </p:txBody>
+      </p:sp>
+      <p:sp>
+        <p:nvSpPr>
+          <p:cNvPr id="3" name="Content Placeholder 2"/>
+          <p:cNvSpPr>
+            <a:spLocks noGrp="1"/>
+          </p:cNvSpPr>
+          <p:nvPr>
+            <p:ph sz="quarter" idx="13"/>
+          </p:nvPr>
+        </p:nvSpPr>
+        <p:spPr/>
+        <p:txBody>
+          <a:bodyPr>
+            <a:normAutofit fontScale="92500" lnSpcReduction="10000"/>
+          </a:bodyPr>
+          <a:lstStyle/>
+          <a:p>
+            <a:r>
+              <a:rPr lang="en-US" dirty="0" smtClean="0">
+                <a:solidFill>
+                  <a:schemeClr val="tx1"/>
+                </a:solidFill>
+              </a:rPr>
+              <a:t>Read 3D Map</a:t>
+            </a:r>
+          </a:p>
+          <a:p>
+            <a:pPr lvl="1"/>
+            <a:r>
+              <a:rPr lang="en-US" dirty="0" smtClean="0">
+                <a:solidFill>
+                  <a:schemeClr val="tx1"/>
+                </a:solidFill>
+              </a:rPr>
+              <a:t>Grayscale 3D map </a:t>
+            </a:r>
+          </a:p>
+          <a:p>
+            <a:pPr lvl="1"/>
+            <a:r>
+              <a:rPr lang="en-US" dirty="0" smtClean="0">
+                <a:solidFill>
+                  <a:schemeClr val="tx1"/>
+                </a:solidFill>
+              </a:rPr>
+              <a:t>produced by </a:t>
+            </a:r>
+            <a:r>
+              <a:rPr lang="en-SG" dirty="0" smtClean="0">
+                <a:solidFill>
+                  <a:schemeClr val="tx1"/>
+                </a:solidFill>
+              </a:rPr>
+              <a:t>DNNRM</a:t>
+            </a:r>
+            <a:endParaRPr lang="en-SG" dirty="0">
+              <a:solidFill>
+                <a:schemeClr val="tx1"/>
+              </a:solidFill>
+            </a:endParaRPr>
+          </a:p>
+          <a:p>
+            <a:pPr lvl="1"/>
+            <a:endParaRPr lang="en-US" dirty="0" smtClean="0">
+              <a:solidFill>
+                <a:schemeClr val="tx1"/>
+              </a:solidFill>
+            </a:endParaRPr>
+          </a:p>
+          <a:p>
+            <a:r>
+              <a:rPr lang="en-US" dirty="0" smtClean="0">
+                <a:solidFill>
+                  <a:schemeClr val="tx1"/>
+                </a:solidFill>
+              </a:rPr>
+              <a:t>Generate views</a:t>
+            </a:r>
+          </a:p>
+          <a:p>
+            <a:pPr lvl="1"/>
+            <a:r>
+              <a:rPr lang="en-US" dirty="0" smtClean="0">
+                <a:solidFill>
+                  <a:schemeClr val="tx1"/>
+                </a:solidFill>
+              </a:rPr>
+              <a:t>2D Map</a:t>
+            </a:r>
+          </a:p>
+          <a:p>
+            <a:pPr lvl="1"/>
+            <a:r>
+              <a:rPr lang="en-US" dirty="0" smtClean="0">
+                <a:solidFill>
+                  <a:schemeClr val="tx1"/>
+                </a:solidFill>
+              </a:rPr>
+              <a:t>Front / Rear View</a:t>
+            </a:r>
+          </a:p>
+          <a:p>
+            <a:pPr lvl="1"/>
+            <a:r>
+              <a:rPr lang="en-US" dirty="0" smtClean="0">
+                <a:solidFill>
+                  <a:schemeClr val="tx1"/>
+                </a:solidFill>
+              </a:rPr>
+              <a:t>Based on </a:t>
+            </a:r>
+          </a:p>
+          <a:p>
+            <a:pPr lvl="2"/>
+            <a:r>
+              <a:rPr lang="en-US" dirty="0" smtClean="0">
+                <a:solidFill>
+                  <a:schemeClr val="tx1"/>
+                </a:solidFill>
+              </a:rPr>
+              <a:t>robot position</a:t>
+            </a:r>
+          </a:p>
+          <a:p>
+            <a:pPr lvl="2"/>
+            <a:r>
+              <a:rPr lang="en-US" dirty="0" smtClean="0">
+                <a:solidFill>
+                  <a:schemeClr val="tx1"/>
+                </a:solidFill>
+              </a:rPr>
+              <a:t>orientation</a:t>
+            </a:r>
+            <a:endParaRPr lang="en-SG" dirty="0">
+              <a:solidFill>
+                <a:schemeClr val="tx1"/>
+              </a:solidFill>
+            </a:endParaRPr>
+          </a:p>
+        </p:txBody>
+      </p:sp>
+      <p:sp>
+        <p:nvSpPr>
+          <p:cNvPr id="4" name="Footer Placeholder 3"/>
+          <p:cNvSpPr>
+            <a:spLocks noGrp="1"/>
+          </p:cNvSpPr>
+          <p:nvPr>
+            <p:ph type="ftr" sz="quarter" idx="15"/>
+          </p:nvPr>
+        </p:nvSpPr>
+        <p:spPr/>
+        <p:txBody>
+          <a:bodyPr/>
+          <a:lstStyle/>
+          <a:p>
+            <a:pPr algn="l"/>
+            <a:r>
+              <a:rPr lang="en-SG" sz="1000" smtClean="0"/>
+              <a:t>© 2018 National University of Singapore. All Rights Reserved</a:t>
+            </a:r>
+            <a:endParaRPr lang="en-SG" dirty="0"/>
+          </a:p>
+        </p:txBody>
+      </p:sp>
+      <p:sp>
+        <p:nvSpPr>
+          <p:cNvPr id="5" name="Slide Number Placeholder 4"/>
+          <p:cNvSpPr>
+            <a:spLocks noGrp="1"/>
+          </p:cNvSpPr>
+          <p:nvPr>
+            <p:ph type="sldNum" sz="quarter" idx="16"/>
+          </p:nvPr>
+        </p:nvSpPr>
+        <p:spPr/>
+        <p:txBody>
+          <a:bodyPr/>
+          <a:lstStyle/>
+          <a:p>
+            <a:fld id="{2F63C605-4FC6-46DE-BC90-871762EA3F52}" type="slidenum">
+              <a:rPr lang="en-SG" smtClean="0"/>
+              <a:pPr/>
+              <a:t>29</a:t>
+            </a:fld>
+            <a:endParaRPr lang="en-SG" dirty="0"/>
+          </a:p>
+        </p:txBody>
+      </p:sp>
+      <p:pic>
+        <p:nvPicPr>
+          <p:cNvPr id="8" name="Picture 7"/>
+          <p:cNvPicPr/>
+          <p:nvPr/>
+        </p:nvPicPr>
+        <p:blipFill>
+          <a:blip r:embed="rId2"/>
+          <a:stretch>
+            <a:fillRect/>
+          </a:stretch>
+        </p:blipFill>
+        <p:spPr>
+          <a:xfrm>
+            <a:off x="5168692" y="1242516"/>
+            <a:ext cx="1861321" cy="2213273"/>
+          </a:xfrm>
+          <a:prstGeom prst="rect">
+            <a:avLst/>
+          </a:prstGeom>
+        </p:spPr>
+      </p:pic>
+      <p:pic>
+        <p:nvPicPr>
+          <p:cNvPr id="9" name="Picture 8"/>
+          <p:cNvPicPr/>
+          <p:nvPr/>
+        </p:nvPicPr>
+        <p:blipFill>
+          <a:blip r:embed="rId3"/>
+          <a:stretch>
+            <a:fillRect/>
+          </a:stretch>
+        </p:blipFill>
+        <p:spPr>
+          <a:xfrm>
+            <a:off x="4998720" y="3264831"/>
+            <a:ext cx="2710992" cy="2423756"/>
+          </a:xfrm>
+          <a:prstGeom prst="rect">
+            <a:avLst/>
+          </a:prstGeom>
+        </p:spPr>
+      </p:pic>
+    </p:spTree>
+    <p:extLst>
+      <p:ext uri="{BB962C8B-B14F-4D97-AF65-F5344CB8AC3E}">
+        <p14:creationId xmlns:p14="http://schemas.microsoft.com/office/powerpoint/2010/main" val="3308391070"/>
       </p:ext>
     </p:extLst>
   </p:cSld>
@@ -18481,6 +19494,365 @@
     <p:extLst>
       <p:ext uri="{BB962C8B-B14F-4D97-AF65-F5344CB8AC3E}">
         <p14:creationId xmlns:p14="http://schemas.microsoft.com/office/powerpoint/2010/main" val="1105590467"/>
+      </p:ext>
+    </p:extLst>
+  </p:cSld>
+  <p:clrMapOvr>
+    <a:masterClrMapping/>
+  </p:clrMapOvr>
+</p:sld>
+</file>
+
+<file path=ppt/slides/slide30.xml><?xml version="1.0" encoding="utf-8"?>
+<p:sld xmlns:a="http://schemas.openxmlformats.org/drawingml/2006/main" xmlns:r="http://schemas.openxmlformats.org/officeDocument/2006/relationships" xmlns:p="http://schemas.openxmlformats.org/presentationml/2006/main">
+  <p:cSld>
+    <p:spTree>
+      <p:nvGrpSpPr>
+        <p:cNvPr id="1" name=""/>
+        <p:cNvGrpSpPr/>
+        <p:nvPr/>
+      </p:nvGrpSpPr>
+      <p:grpSpPr>
+        <a:xfrm>
+          <a:off x="0" y="0"/>
+          <a:ext cx="0" cy="0"/>
+          <a:chOff x="0" y="0"/>
+          <a:chExt cx="0" cy="0"/>
+        </a:xfrm>
+      </p:grpSpPr>
+      <p:sp>
+        <p:nvSpPr>
+          <p:cNvPr id="2" name="Title 1"/>
+          <p:cNvSpPr>
+            <a:spLocks noGrp="1"/>
+          </p:cNvSpPr>
+          <p:nvPr>
+            <p:ph type="title"/>
+          </p:nvPr>
+        </p:nvSpPr>
+        <p:spPr/>
+        <p:txBody>
+          <a:bodyPr/>
+          <a:lstStyle/>
+          <a:p>
+            <a:r>
+              <a:rPr lang="en-US" dirty="0" smtClean="0"/>
+              <a:t>Map Tracking Viewer</a:t>
+            </a:r>
+            <a:endParaRPr lang="en-SG" dirty="0"/>
+          </a:p>
+        </p:txBody>
+      </p:sp>
+      <p:sp>
+        <p:nvSpPr>
+          <p:cNvPr id="3" name="Content Placeholder 2"/>
+          <p:cNvSpPr>
+            <a:spLocks noGrp="1"/>
+          </p:cNvSpPr>
+          <p:nvPr>
+            <p:ph sz="quarter" idx="13"/>
+          </p:nvPr>
+        </p:nvSpPr>
+        <p:spPr/>
+        <p:txBody>
+          <a:bodyPr/>
+          <a:lstStyle/>
+          <a:p>
+            <a:r>
+              <a:rPr lang="en-US" dirty="0" smtClean="0">
+                <a:solidFill>
+                  <a:schemeClr val="tx1"/>
+                </a:solidFill>
+              </a:rPr>
+              <a:t>Python </a:t>
+            </a:r>
+            <a:r>
+              <a:rPr lang="en-US" dirty="0" err="1" smtClean="0">
+                <a:solidFill>
+                  <a:schemeClr val="tx1"/>
+                </a:solidFill>
+              </a:rPr>
+              <a:t>Tkinter</a:t>
+            </a:r>
+            <a:r>
+              <a:rPr lang="en-US" dirty="0" smtClean="0">
+                <a:solidFill>
+                  <a:schemeClr val="tx1"/>
+                </a:solidFill>
+              </a:rPr>
+              <a:t> GUI</a:t>
+            </a:r>
+          </a:p>
+          <a:p>
+            <a:r>
+              <a:rPr lang="en-US" dirty="0" smtClean="0">
+                <a:solidFill>
+                  <a:schemeClr val="tx1"/>
+                </a:solidFill>
+              </a:rPr>
+              <a:t>Simulate </a:t>
+            </a:r>
+            <a:r>
+              <a:rPr lang="en-US" dirty="0" smtClean="0">
+                <a:solidFill>
+                  <a:schemeClr val="tx1"/>
+                </a:solidFill>
+              </a:rPr>
+              <a:t>Robot Data</a:t>
+            </a:r>
+          </a:p>
+          <a:p>
+            <a:pPr lvl="1"/>
+            <a:r>
+              <a:rPr lang="en-US" dirty="0" smtClean="0">
+                <a:solidFill>
+                  <a:schemeClr val="tx1"/>
+                </a:solidFill>
+              </a:rPr>
+              <a:t>Position</a:t>
+            </a:r>
+          </a:p>
+          <a:p>
+            <a:pPr lvl="1"/>
+            <a:r>
+              <a:rPr lang="en-US" dirty="0" smtClean="0">
+                <a:solidFill>
+                  <a:schemeClr val="tx1"/>
+                </a:solidFill>
+              </a:rPr>
+              <a:t>Orientation</a:t>
+            </a:r>
+          </a:p>
+          <a:p>
+            <a:r>
+              <a:rPr lang="en-US" dirty="0" smtClean="0">
+                <a:solidFill>
+                  <a:schemeClr val="tx1"/>
+                </a:solidFill>
+              </a:rPr>
+              <a:t>Display </a:t>
+            </a:r>
+          </a:p>
+          <a:p>
+            <a:pPr lvl="1"/>
+            <a:r>
+              <a:rPr lang="en-US" dirty="0" smtClean="0">
+                <a:solidFill>
+                  <a:schemeClr val="tx1"/>
+                </a:solidFill>
+              </a:rPr>
+              <a:t>2D Map</a:t>
+            </a:r>
+          </a:p>
+          <a:p>
+            <a:pPr lvl="1"/>
+            <a:r>
+              <a:rPr lang="en-US" dirty="0" smtClean="0">
+                <a:solidFill>
+                  <a:schemeClr val="tx1"/>
+                </a:solidFill>
+              </a:rPr>
+              <a:t>Front / Rear View</a:t>
+            </a:r>
+          </a:p>
+          <a:p>
+            <a:pPr lvl="1"/>
+            <a:endParaRPr lang="en-US" dirty="0">
+              <a:solidFill>
+                <a:schemeClr val="tx1"/>
+              </a:solidFill>
+            </a:endParaRPr>
+          </a:p>
+        </p:txBody>
+      </p:sp>
+      <p:sp>
+        <p:nvSpPr>
+          <p:cNvPr id="4" name="Footer Placeholder 3"/>
+          <p:cNvSpPr>
+            <a:spLocks noGrp="1"/>
+          </p:cNvSpPr>
+          <p:nvPr>
+            <p:ph type="ftr" sz="quarter" idx="15"/>
+          </p:nvPr>
+        </p:nvSpPr>
+        <p:spPr/>
+        <p:txBody>
+          <a:bodyPr/>
+          <a:lstStyle/>
+          <a:p>
+            <a:pPr algn="l"/>
+            <a:r>
+              <a:rPr lang="en-SG" sz="1000" smtClean="0"/>
+              <a:t>© 2018 National University of Singapore. All Rights Reserved</a:t>
+            </a:r>
+            <a:endParaRPr lang="en-SG" dirty="0"/>
+          </a:p>
+        </p:txBody>
+      </p:sp>
+      <p:sp>
+        <p:nvSpPr>
+          <p:cNvPr id="5" name="Slide Number Placeholder 4"/>
+          <p:cNvSpPr>
+            <a:spLocks noGrp="1"/>
+          </p:cNvSpPr>
+          <p:nvPr>
+            <p:ph type="sldNum" sz="quarter" idx="16"/>
+          </p:nvPr>
+        </p:nvSpPr>
+        <p:spPr/>
+        <p:txBody>
+          <a:bodyPr/>
+          <a:lstStyle/>
+          <a:p>
+            <a:fld id="{2F63C605-4FC6-46DE-BC90-871762EA3F52}" type="slidenum">
+              <a:rPr lang="en-SG" smtClean="0"/>
+              <a:pPr/>
+              <a:t>30</a:t>
+            </a:fld>
+            <a:endParaRPr lang="en-SG" dirty="0"/>
+          </a:p>
+        </p:txBody>
+      </p:sp>
+      <p:pic>
+        <p:nvPicPr>
+          <p:cNvPr id="6" name="Picture 5"/>
+          <p:cNvPicPr>
+            <a:picLocks noChangeAspect="1"/>
+          </p:cNvPicPr>
+          <p:nvPr/>
+        </p:nvPicPr>
+        <p:blipFill>
+          <a:blip r:embed="rId2"/>
+          <a:stretch>
+            <a:fillRect/>
+          </a:stretch>
+        </p:blipFill>
+        <p:spPr>
+          <a:xfrm>
+            <a:off x="4406537" y="2369685"/>
+            <a:ext cx="4442822" cy="2791595"/>
+          </a:xfrm>
+          <a:prstGeom prst="rect">
+            <a:avLst/>
+          </a:prstGeom>
+        </p:spPr>
+      </p:pic>
+    </p:spTree>
+    <p:extLst>
+      <p:ext uri="{BB962C8B-B14F-4D97-AF65-F5344CB8AC3E}">
+        <p14:creationId xmlns:p14="http://schemas.microsoft.com/office/powerpoint/2010/main" val="2365702992"/>
+      </p:ext>
+    </p:extLst>
+  </p:cSld>
+  <p:clrMapOvr>
+    <a:masterClrMapping/>
+  </p:clrMapOvr>
+</p:sld>
+</file>
+
+<file path=ppt/slides/slide31.xml><?xml version="1.0" encoding="utf-8"?>
+<p:sld xmlns:a="http://schemas.openxmlformats.org/drawingml/2006/main" xmlns:r="http://schemas.openxmlformats.org/officeDocument/2006/relationships" xmlns:p="http://schemas.openxmlformats.org/presentationml/2006/main">
+  <p:cSld>
+    <p:spTree>
+      <p:nvGrpSpPr>
+        <p:cNvPr id="1" name=""/>
+        <p:cNvGrpSpPr/>
+        <p:nvPr/>
+      </p:nvGrpSpPr>
+      <p:grpSpPr>
+        <a:xfrm>
+          <a:off x="0" y="0"/>
+          <a:ext cx="0" cy="0"/>
+          <a:chOff x="0" y="0"/>
+          <a:chExt cx="0" cy="0"/>
+        </a:xfrm>
+      </p:grpSpPr>
+      <p:sp>
+        <p:nvSpPr>
+          <p:cNvPr id="2" name="Title 1"/>
+          <p:cNvSpPr>
+            <a:spLocks noGrp="1"/>
+          </p:cNvSpPr>
+          <p:nvPr>
+            <p:ph type="title"/>
+          </p:nvPr>
+        </p:nvSpPr>
+        <p:spPr>
+          <a:xfrm>
+            <a:off x="2573601" y="3053030"/>
+            <a:ext cx="4648197" cy="545561"/>
+          </a:xfrm>
+        </p:spPr>
+        <p:txBody>
+          <a:bodyPr/>
+          <a:lstStyle/>
+          <a:p>
+            <a:r>
+              <a:rPr lang="en-US" dirty="0"/>
+              <a:t>Thank you! </a:t>
+            </a:r>
+            <a:r>
+              <a:rPr lang="en-US" dirty="0">
+                <a:sym typeface="Wingdings" panose="05000000000000000000" pitchFamily="2" charset="2"/>
+              </a:rPr>
+              <a:t> </a:t>
+            </a:r>
+            <a:endParaRPr lang="en-SG" dirty="0"/>
+          </a:p>
+        </p:txBody>
+      </p:sp>
+      <p:sp>
+        <p:nvSpPr>
+          <p:cNvPr id="4" name="Footer Placeholder 3"/>
+          <p:cNvSpPr>
+            <a:spLocks noGrp="1"/>
+          </p:cNvSpPr>
+          <p:nvPr>
+            <p:ph type="ftr" sz="quarter" idx="15"/>
+          </p:nvPr>
+        </p:nvSpPr>
+        <p:spPr/>
+        <p:txBody>
+          <a:bodyPr/>
+          <a:lstStyle/>
+          <a:p>
+            <a:pPr algn="l"/>
+            <a:r>
+              <a:rPr lang="en-SG" sz="1000" dirty="0"/>
+              <a:t>© 2018 National University of Singapore. All Rights Reserved</a:t>
+            </a:r>
+            <a:endParaRPr lang="en-SG" dirty="0"/>
+          </a:p>
+        </p:txBody>
+      </p:sp>
+      <p:sp>
+        <p:nvSpPr>
+          <p:cNvPr id="5" name="Slide Number Placeholder 4"/>
+          <p:cNvSpPr>
+            <a:spLocks noGrp="1"/>
+          </p:cNvSpPr>
+          <p:nvPr>
+            <p:ph type="sldNum" sz="quarter" idx="16"/>
+          </p:nvPr>
+        </p:nvSpPr>
+        <p:spPr/>
+        <p:txBody>
+          <a:bodyPr/>
+          <a:lstStyle/>
+          <a:p>
+            <a:fld id="{2F63C605-4FC6-46DE-BC90-871762EA3F52}" type="slidenum">
+              <a:rPr lang="en-SG" smtClean="0"/>
+              <a:pPr/>
+              <a:t>31</a:t>
+            </a:fld>
+            <a:endParaRPr lang="en-SG" dirty="0"/>
+          </a:p>
+        </p:txBody>
+      </p:sp>
+    </p:spTree>
+    <p:extLst>
+      <p:ext uri="{BB962C8B-B14F-4D97-AF65-F5344CB8AC3E}">
+        <p14:creationId xmlns:p14="http://schemas.microsoft.com/office/powerpoint/2010/main" val="3351845363"/>
       </p:ext>
     </p:extLst>
   </p:cSld>

</xml_diff>

<commit_message>
Update presentation and powerpoint slide which was sent to lecturer for review.
</commit_message>
<xml_diff>
--- a/PracticeModule_Presentation.pptx
+++ b/PracticeModule_Presentation.pptx
@@ -5,10 +5,10 @@
     <p:sldMasterId id="2147483684" r:id="rId1"/>
   </p:sldMasterIdLst>
   <p:notesMasterIdLst>
-    <p:notesMasterId r:id="rId30"/>
+    <p:notesMasterId r:id="rId34"/>
   </p:notesMasterIdLst>
   <p:handoutMasterIdLst>
-    <p:handoutMasterId r:id="rId31"/>
+    <p:handoutMasterId r:id="rId35"/>
   </p:handoutMasterIdLst>
   <p:sldIdLst>
     <p:sldId id="281" r:id="rId2"/>
@@ -38,12 +38,16 @@
     <p:sldId id="507" r:id="rId26"/>
     <p:sldId id="508" r:id="rId27"/>
     <p:sldId id="517" r:id="rId28"/>
-    <p:sldId id="370" r:id="rId29"/>
+    <p:sldId id="518" r:id="rId29"/>
+    <p:sldId id="519" r:id="rId30"/>
+    <p:sldId id="520" r:id="rId31"/>
+    <p:sldId id="521" r:id="rId32"/>
+    <p:sldId id="370" r:id="rId33"/>
   </p:sldIdLst>
   <p:sldSz cx="9144000" cy="6858000" type="screen4x3"/>
   <p:notesSz cx="7099300" cy="10234613"/>
   <p:custDataLst>
-    <p:tags r:id="rId32"/>
+    <p:tags r:id="rId36"/>
   </p:custDataLst>
   <p:defaultTextStyle>
     <a:defPPr>
@@ -1084,14 +1088,35 @@
         </dgm:presLayoutVars>
       </dgm:prSet>
       <dgm:spPr/>
+      <dgm:t>
+        <a:bodyPr/>
+        <a:lstStyle/>
+        <a:p>
+          <a:endParaRPr lang="en-US"/>
+        </a:p>
+      </dgm:t>
     </dgm:pt>
     <dgm:pt modelId="{4B5D39CA-8147-4B81-8770-5E31FC6D1CFB}" type="pres">
       <dgm:prSet presAssocID="{91D0FCC9-0385-42AC-A8E5-78283D5D669C}" presName="sibTrans" presStyleLbl="sibTrans2D1" presStyleIdx="0" presStyleCnt="3"/>
       <dgm:spPr/>
+      <dgm:t>
+        <a:bodyPr/>
+        <a:lstStyle/>
+        <a:p>
+          <a:endParaRPr lang="en-US"/>
+        </a:p>
+      </dgm:t>
     </dgm:pt>
     <dgm:pt modelId="{41341A21-0806-411D-A443-625FA97E4491}" type="pres">
       <dgm:prSet presAssocID="{91D0FCC9-0385-42AC-A8E5-78283D5D669C}" presName="connectorText" presStyleLbl="sibTrans2D1" presStyleIdx="0" presStyleCnt="3"/>
       <dgm:spPr/>
+      <dgm:t>
+        <a:bodyPr/>
+        <a:lstStyle/>
+        <a:p>
+          <a:endParaRPr lang="en-US"/>
+        </a:p>
+      </dgm:t>
     </dgm:pt>
     <dgm:pt modelId="{EA5BC1ED-EB03-45BA-BC56-621EEE9BEBD1}" type="pres">
       <dgm:prSet presAssocID="{92249E20-58D4-4E75-BB12-FE5FBD54F135}" presName="node" presStyleLbl="node1" presStyleIdx="1" presStyleCnt="4">
@@ -1100,14 +1125,35 @@
         </dgm:presLayoutVars>
       </dgm:prSet>
       <dgm:spPr/>
+      <dgm:t>
+        <a:bodyPr/>
+        <a:lstStyle/>
+        <a:p>
+          <a:endParaRPr lang="en-US"/>
+        </a:p>
+      </dgm:t>
     </dgm:pt>
     <dgm:pt modelId="{95B3EF49-35D3-4519-9F1F-B39D5A0566E4}" type="pres">
       <dgm:prSet presAssocID="{0B72DC99-4E95-4ADB-960C-E769354E6A5D}" presName="sibTrans" presStyleLbl="sibTrans2D1" presStyleIdx="1" presStyleCnt="3"/>
       <dgm:spPr/>
+      <dgm:t>
+        <a:bodyPr/>
+        <a:lstStyle/>
+        <a:p>
+          <a:endParaRPr lang="en-US"/>
+        </a:p>
+      </dgm:t>
     </dgm:pt>
     <dgm:pt modelId="{9B203DD1-3145-4590-8ACC-2517ACFE25A8}" type="pres">
       <dgm:prSet presAssocID="{0B72DC99-4E95-4ADB-960C-E769354E6A5D}" presName="connectorText" presStyleLbl="sibTrans2D1" presStyleIdx="1" presStyleCnt="3"/>
       <dgm:spPr/>
+      <dgm:t>
+        <a:bodyPr/>
+        <a:lstStyle/>
+        <a:p>
+          <a:endParaRPr lang="en-US"/>
+        </a:p>
+      </dgm:t>
     </dgm:pt>
     <dgm:pt modelId="{A37733E1-C31E-4430-AEEA-7CC4BDFAF84B}" type="pres">
       <dgm:prSet presAssocID="{38DD500D-6BEB-44F1-A480-39EBC85B7D1B}" presName="node" presStyleLbl="node1" presStyleIdx="2" presStyleCnt="4">
@@ -1116,14 +1162,35 @@
         </dgm:presLayoutVars>
       </dgm:prSet>
       <dgm:spPr/>
+      <dgm:t>
+        <a:bodyPr/>
+        <a:lstStyle/>
+        <a:p>
+          <a:endParaRPr lang="en-US"/>
+        </a:p>
+      </dgm:t>
     </dgm:pt>
     <dgm:pt modelId="{7300E7F4-ED3F-436A-A1F0-90BEABB46E71}" type="pres">
       <dgm:prSet presAssocID="{6D1E928F-781F-462C-A8AC-2A960BFDA67A}" presName="sibTrans" presStyleLbl="sibTrans2D1" presStyleIdx="2" presStyleCnt="3"/>
       <dgm:spPr/>
+      <dgm:t>
+        <a:bodyPr/>
+        <a:lstStyle/>
+        <a:p>
+          <a:endParaRPr lang="en-US"/>
+        </a:p>
+      </dgm:t>
     </dgm:pt>
     <dgm:pt modelId="{D7B13FD1-4A98-4993-ACFA-933B70FB5D81}" type="pres">
       <dgm:prSet presAssocID="{6D1E928F-781F-462C-A8AC-2A960BFDA67A}" presName="connectorText" presStyleLbl="sibTrans2D1" presStyleIdx="2" presStyleCnt="3"/>
       <dgm:spPr/>
+      <dgm:t>
+        <a:bodyPr/>
+        <a:lstStyle/>
+        <a:p>
+          <a:endParaRPr lang="en-US"/>
+        </a:p>
+      </dgm:t>
     </dgm:pt>
     <dgm:pt modelId="{F65F4BF1-A7B9-4C27-8B28-16C04C25982E}" type="pres">
       <dgm:prSet presAssocID="{764C4D4F-B7F7-4995-9F46-8E01C62C581B}" presName="node" presStyleLbl="node1" presStyleIdx="3" presStyleCnt="4">
@@ -1132,23 +1199,30 @@
         </dgm:presLayoutVars>
       </dgm:prSet>
       <dgm:spPr/>
+      <dgm:t>
+        <a:bodyPr/>
+        <a:lstStyle/>
+        <a:p>
+          <a:endParaRPr lang="en-US"/>
+        </a:p>
+      </dgm:t>
     </dgm:pt>
   </dgm:ptLst>
   <dgm:cxnLst>
+    <dgm:cxn modelId="{3EBFAACE-A4CF-4057-9EC8-3A59330D069F}" type="presOf" srcId="{69C95212-ACBD-498E-A011-59076A4285CB}" destId="{4D4E5D9B-DE30-46F3-864F-B20CBCB47B81}" srcOrd="0" destOrd="0" presId="urn:microsoft.com/office/officeart/2005/8/layout/process1"/>
+    <dgm:cxn modelId="{2D076695-4491-4B11-95EC-7786C59603C3}" type="presOf" srcId="{0B72DC99-4E95-4ADB-960C-E769354E6A5D}" destId="{95B3EF49-35D3-4519-9F1F-B39D5A0566E4}" srcOrd="0" destOrd="0" presId="urn:microsoft.com/office/officeart/2005/8/layout/process1"/>
+    <dgm:cxn modelId="{05EBE6A4-21D9-4E6D-96DC-9D3E50C88595}" type="presOf" srcId="{38DD500D-6BEB-44F1-A480-39EBC85B7D1B}" destId="{A37733E1-C31E-4430-AEEA-7CC4BDFAF84B}" srcOrd="0" destOrd="0" presId="urn:microsoft.com/office/officeart/2005/8/layout/process1"/>
+    <dgm:cxn modelId="{B7AF3A68-AEB3-4860-978B-B262BEBB9ECB}" type="presOf" srcId="{6D1E928F-781F-462C-A8AC-2A960BFDA67A}" destId="{7300E7F4-ED3F-436A-A1F0-90BEABB46E71}" srcOrd="0" destOrd="0" presId="urn:microsoft.com/office/officeart/2005/8/layout/process1"/>
+    <dgm:cxn modelId="{31005A28-3819-43FC-A794-27C122A41925}" srcId="{9496E0A2-784B-483A-9A32-E68AF617843D}" destId="{38DD500D-6BEB-44F1-A480-39EBC85B7D1B}" srcOrd="2" destOrd="0" parTransId="{3CE2BC79-A484-4240-A2CB-1BC232A1E53F}" sibTransId="{6D1E928F-781F-462C-A8AC-2A960BFDA67A}"/>
+    <dgm:cxn modelId="{01F09420-6EB0-4A7F-B4CE-2315FD06751C}" type="presOf" srcId="{6D1E928F-781F-462C-A8AC-2A960BFDA67A}" destId="{D7B13FD1-4A98-4993-ACFA-933B70FB5D81}" srcOrd="1" destOrd="0" presId="urn:microsoft.com/office/officeart/2005/8/layout/process1"/>
+    <dgm:cxn modelId="{1530AF90-D573-4EFA-A3BC-840C3370D71B}" srcId="{9496E0A2-784B-483A-9A32-E68AF617843D}" destId="{764C4D4F-B7F7-4995-9F46-8E01C62C581B}" srcOrd="3" destOrd="0" parTransId="{A6A82594-4016-4707-8656-642BA426B3D4}" sibTransId="{356D9044-9DCA-4929-92DF-A2BDE3B61A47}"/>
+    <dgm:cxn modelId="{D1CF8BBB-F3E6-4482-8B69-D1BE9774788E}" type="presOf" srcId="{91D0FCC9-0385-42AC-A8E5-78283D5D669C}" destId="{4B5D39CA-8147-4B81-8770-5E31FC6D1CFB}" srcOrd="0" destOrd="0" presId="urn:microsoft.com/office/officeart/2005/8/layout/process1"/>
+    <dgm:cxn modelId="{5E0FD1A2-149D-4CF9-AEE7-688223EDC542}" type="presOf" srcId="{764C4D4F-B7F7-4995-9F46-8E01C62C581B}" destId="{F65F4BF1-A7B9-4C27-8B28-16C04C25982E}" srcOrd="0" destOrd="0" presId="urn:microsoft.com/office/officeart/2005/8/layout/process1"/>
+    <dgm:cxn modelId="{79D506E8-F752-4BA4-B280-EF0BEBC86F63}" srcId="{9496E0A2-784B-483A-9A32-E68AF617843D}" destId="{92249E20-58D4-4E75-BB12-FE5FBD54F135}" srcOrd="1" destOrd="0" parTransId="{105B3AA3-CBE4-4ECA-BC44-B6DCA5E7A036}" sibTransId="{0B72DC99-4E95-4ADB-960C-E769354E6A5D}"/>
     <dgm:cxn modelId="{23BC981F-CC7C-4D5F-91BD-DE6EC72DB040}" srcId="{9496E0A2-784B-483A-9A32-E68AF617843D}" destId="{69C95212-ACBD-498E-A011-59076A4285CB}" srcOrd="0" destOrd="0" parTransId="{BF3D5BE3-835C-4027-9271-54CEA95A0702}" sibTransId="{91D0FCC9-0385-42AC-A8E5-78283D5D669C}"/>
-    <dgm:cxn modelId="{01F09420-6EB0-4A7F-B4CE-2315FD06751C}" type="presOf" srcId="{6D1E928F-781F-462C-A8AC-2A960BFDA67A}" destId="{D7B13FD1-4A98-4993-ACFA-933B70FB5D81}" srcOrd="1" destOrd="0" presId="urn:microsoft.com/office/officeart/2005/8/layout/process1"/>
-    <dgm:cxn modelId="{31005A28-3819-43FC-A794-27C122A41925}" srcId="{9496E0A2-784B-483A-9A32-E68AF617843D}" destId="{38DD500D-6BEB-44F1-A480-39EBC85B7D1B}" srcOrd="2" destOrd="0" parTransId="{3CE2BC79-A484-4240-A2CB-1BC232A1E53F}" sibTransId="{6D1E928F-781F-462C-A8AC-2A960BFDA67A}"/>
-    <dgm:cxn modelId="{B7AF3A68-AEB3-4860-978B-B262BEBB9ECB}" type="presOf" srcId="{6D1E928F-781F-462C-A8AC-2A960BFDA67A}" destId="{7300E7F4-ED3F-436A-A1F0-90BEABB46E71}" srcOrd="0" destOrd="0" presId="urn:microsoft.com/office/officeart/2005/8/layout/process1"/>
     <dgm:cxn modelId="{F4BB5269-9705-4D80-8BF8-3B73A8F8EE8D}" type="presOf" srcId="{91D0FCC9-0385-42AC-A8E5-78283D5D669C}" destId="{41341A21-0806-411D-A443-625FA97E4491}" srcOrd="1" destOrd="0" presId="urn:microsoft.com/office/officeart/2005/8/layout/process1"/>
     <dgm:cxn modelId="{FEAE6454-4E5D-4190-8A76-D27FC4FC4790}" type="presOf" srcId="{9496E0A2-784B-483A-9A32-E68AF617843D}" destId="{9EA8A120-7984-4A2B-9532-24393BA5D7A2}" srcOrd="0" destOrd="0" presId="urn:microsoft.com/office/officeart/2005/8/layout/process1"/>
     <dgm:cxn modelId="{F8BD9F76-8AA1-4A33-B686-C2C5DEA97305}" type="presOf" srcId="{0B72DC99-4E95-4ADB-960C-E769354E6A5D}" destId="{9B203DD1-3145-4590-8ACC-2517ACFE25A8}" srcOrd="1" destOrd="0" presId="urn:microsoft.com/office/officeart/2005/8/layout/process1"/>
-    <dgm:cxn modelId="{1530AF90-D573-4EFA-A3BC-840C3370D71B}" srcId="{9496E0A2-784B-483A-9A32-E68AF617843D}" destId="{764C4D4F-B7F7-4995-9F46-8E01C62C581B}" srcOrd="3" destOrd="0" parTransId="{A6A82594-4016-4707-8656-642BA426B3D4}" sibTransId="{356D9044-9DCA-4929-92DF-A2BDE3B61A47}"/>
-    <dgm:cxn modelId="{2D076695-4491-4B11-95EC-7786C59603C3}" type="presOf" srcId="{0B72DC99-4E95-4ADB-960C-E769354E6A5D}" destId="{95B3EF49-35D3-4519-9F1F-B39D5A0566E4}" srcOrd="0" destOrd="0" presId="urn:microsoft.com/office/officeart/2005/8/layout/process1"/>
-    <dgm:cxn modelId="{5E0FD1A2-149D-4CF9-AEE7-688223EDC542}" type="presOf" srcId="{764C4D4F-B7F7-4995-9F46-8E01C62C581B}" destId="{F65F4BF1-A7B9-4C27-8B28-16C04C25982E}" srcOrd="0" destOrd="0" presId="urn:microsoft.com/office/officeart/2005/8/layout/process1"/>
-    <dgm:cxn modelId="{05EBE6A4-21D9-4E6D-96DC-9D3E50C88595}" type="presOf" srcId="{38DD500D-6BEB-44F1-A480-39EBC85B7D1B}" destId="{A37733E1-C31E-4430-AEEA-7CC4BDFAF84B}" srcOrd="0" destOrd="0" presId="urn:microsoft.com/office/officeart/2005/8/layout/process1"/>
-    <dgm:cxn modelId="{D1CF8BBB-F3E6-4482-8B69-D1BE9774788E}" type="presOf" srcId="{91D0FCC9-0385-42AC-A8E5-78283D5D669C}" destId="{4B5D39CA-8147-4B81-8770-5E31FC6D1CFB}" srcOrd="0" destOrd="0" presId="urn:microsoft.com/office/officeart/2005/8/layout/process1"/>
-    <dgm:cxn modelId="{3EBFAACE-A4CF-4057-9EC8-3A59330D069F}" type="presOf" srcId="{69C95212-ACBD-498E-A011-59076A4285CB}" destId="{4D4E5D9B-DE30-46F3-864F-B20CBCB47B81}" srcOrd="0" destOrd="0" presId="urn:microsoft.com/office/officeart/2005/8/layout/process1"/>
-    <dgm:cxn modelId="{79D506E8-F752-4BA4-B280-EF0BEBC86F63}" srcId="{9496E0A2-784B-483A-9A32-E68AF617843D}" destId="{92249E20-58D4-4E75-BB12-FE5FBD54F135}" srcOrd="1" destOrd="0" parTransId="{105B3AA3-CBE4-4ECA-BC44-B6DCA5E7A036}" sibTransId="{0B72DC99-4E95-4ADB-960C-E769354E6A5D}"/>
     <dgm:cxn modelId="{099D99FB-52B2-434C-BA10-1675505A420B}" type="presOf" srcId="{92249E20-58D4-4E75-BB12-FE5FBD54F135}" destId="{EA5BC1ED-EB03-45BA-BC56-621EEE9BEBD1}" srcOrd="0" destOrd="0" presId="urn:microsoft.com/office/officeart/2005/8/layout/process1"/>
     <dgm:cxn modelId="{DA8115C2-D2F4-4CCB-9D90-0A509018B8F1}" type="presParOf" srcId="{9EA8A120-7984-4A2B-9532-24393BA5D7A2}" destId="{4D4E5D9B-DE30-46F3-864F-B20CBCB47B81}" srcOrd="0" destOrd="0" presId="urn:microsoft.com/office/officeart/2005/8/layout/process1"/>
     <dgm:cxn modelId="{0C3F32CC-6A85-4291-B66A-941971627454}" type="presParOf" srcId="{9EA8A120-7984-4A2B-9532-24393BA5D7A2}" destId="{4B5D39CA-8147-4B81-8770-5E31FC6D1CFB}" srcOrd="1" destOrd="0" presId="urn:microsoft.com/office/officeart/2005/8/layout/process1"/>
@@ -1236,7 +1310,7 @@
         </a:bodyPr>
         <a:lstStyle/>
         <a:p>
-          <a:pPr marL="0" lvl="0" indent="0" algn="ctr" defTabSz="844550">
+          <a:pPr lvl="0" algn="ctr" defTabSz="844550">
             <a:lnSpc>
               <a:spcPct val="90000"/>
             </a:lnSpc>
@@ -1246,7 +1320,6 @@
             <a:spcAft>
               <a:spcPct val="35000"/>
             </a:spcAft>
-            <a:buNone/>
           </a:pPr>
           <a:r>
             <a:rPr lang="en-US" sz="1900" kern="1200"/>
@@ -1309,7 +1382,7 @@
         </a:bodyPr>
         <a:lstStyle/>
         <a:p>
-          <a:pPr marL="0" lvl="0" indent="0" algn="ctr" defTabSz="666750">
+          <a:pPr lvl="0" algn="ctr" defTabSz="666750">
             <a:lnSpc>
               <a:spcPct val="90000"/>
             </a:lnSpc>
@@ -1319,7 +1392,6 @@
             <a:spcAft>
               <a:spcPct val="35000"/>
             </a:spcAft>
-            <a:buNone/>
           </a:pPr>
           <a:endParaRPr lang="en-US" sz="1500" kern="1200"/>
         </a:p>
@@ -1381,7 +1453,7 @@
         </a:bodyPr>
         <a:lstStyle/>
         <a:p>
-          <a:pPr marL="0" lvl="0" indent="0" algn="ctr" defTabSz="844550">
+          <a:pPr lvl="0" algn="ctr" defTabSz="844550">
             <a:lnSpc>
               <a:spcPct val="90000"/>
             </a:lnSpc>
@@ -1391,7 +1463,6 @@
             <a:spcAft>
               <a:spcPct val="35000"/>
             </a:spcAft>
-            <a:buNone/>
           </a:pPr>
           <a:r>
             <a:rPr lang="en-US" sz="1900" kern="1200"/>
@@ -1454,7 +1525,7 @@
         </a:bodyPr>
         <a:lstStyle/>
         <a:p>
-          <a:pPr marL="0" lvl="0" indent="0" algn="ctr" defTabSz="666750">
+          <a:pPr lvl="0" algn="ctr" defTabSz="666750">
             <a:lnSpc>
               <a:spcPct val="90000"/>
             </a:lnSpc>
@@ -1464,7 +1535,6 @@
             <a:spcAft>
               <a:spcPct val="35000"/>
             </a:spcAft>
-            <a:buNone/>
           </a:pPr>
           <a:endParaRPr lang="en-US" sz="1500" kern="1200"/>
         </a:p>
@@ -1526,7 +1596,7 @@
         </a:bodyPr>
         <a:lstStyle/>
         <a:p>
-          <a:pPr marL="0" lvl="0" indent="0" algn="ctr" defTabSz="844550">
+          <a:pPr lvl="0" algn="ctr" defTabSz="844550">
             <a:lnSpc>
               <a:spcPct val="90000"/>
             </a:lnSpc>
@@ -1536,7 +1606,6 @@
             <a:spcAft>
               <a:spcPct val="35000"/>
             </a:spcAft>
-            <a:buNone/>
           </a:pPr>
           <a:r>
             <a:rPr lang="en-US" sz="1900" kern="1200"/>
@@ -1599,7 +1668,7 @@
         </a:bodyPr>
         <a:lstStyle/>
         <a:p>
-          <a:pPr marL="0" lvl="0" indent="0" algn="ctr" defTabSz="666750">
+          <a:pPr lvl="0" algn="ctr" defTabSz="666750">
             <a:lnSpc>
               <a:spcPct val="90000"/>
             </a:lnSpc>
@@ -1609,7 +1678,6 @@
             <a:spcAft>
               <a:spcPct val="35000"/>
             </a:spcAft>
-            <a:buNone/>
           </a:pPr>
           <a:endParaRPr lang="en-US" sz="1500" kern="1200"/>
         </a:p>
@@ -1676,7 +1744,7 @@
         </a:bodyPr>
         <a:lstStyle/>
         <a:p>
-          <a:pPr marL="0" lvl="0" indent="0" algn="ctr" defTabSz="844550">
+          <a:pPr lvl="0" algn="ctr" defTabSz="844550">
             <a:lnSpc>
               <a:spcPct val="90000"/>
             </a:lnSpc>
@@ -1686,7 +1754,6 @@
             <a:spcAft>
               <a:spcPct val="35000"/>
             </a:spcAft>
-            <a:buNone/>
           </a:pPr>
           <a:r>
             <a:rPr lang="en-US" sz="1900" kern="1200"/>
@@ -3130,7 +3197,7 @@
           <a:p>
             <a:fld id="{EA4960E5-F060-4C88-B1C5-5A6F5890BEF6}" type="datetimeFigureOut">
               <a:rPr lang="en-SG" smtClean="0"/>
-              <a:t>24/10/2020</a:t>
+              <a:t>10/24/2020</a:t>
             </a:fld>
             <a:endParaRPr lang="en-SG" dirty="0"/>
           </a:p>
@@ -9541,7 +9608,7 @@
           <a:graphicData uri="http://schemas.openxmlformats.org/presentationml/2006/ole">
             <mc:AlternateContent xmlns:mc="http://schemas.openxmlformats.org/markup-compatibility/2006">
               <mc:Choice xmlns:v="urn:schemas-microsoft-com:vml" Requires="v">
-                <p:oleObj spid="_x0000_s2073" name="Bitmap Image" r:id="rId3" imgW="5014395" imgH="4572396" progId="Paint.Picture">
+                <p:oleObj spid="_x0000_s2074" name="Bitmap Image" r:id="rId3" imgW="5014395" imgH="4572396" progId="Paint.Picture">
                   <p:embed/>
                 </p:oleObj>
               </mc:Choice>
@@ -9922,7 +9989,7 @@
           <a:graphicData uri="http://schemas.openxmlformats.org/presentationml/2006/ole">
             <mc:AlternateContent xmlns:mc="http://schemas.openxmlformats.org/markup-compatibility/2006">
               <mc:Choice xmlns:v="urn:schemas-microsoft-com:vml" Requires="v">
-                <p:oleObj spid="_x0000_s6155" name="Bitmap Image" r:id="rId3" imgW="4915326" imgH="3505504" progId="Paint.Picture">
+                <p:oleObj spid="_x0000_s6156" name="Bitmap Image" r:id="rId3" imgW="4915326" imgH="3505504" progId="Paint.Picture">
                   <p:embed/>
                 </p:oleObj>
               </mc:Choice>
@@ -12181,26 +12248,43 @@
             <p:ph type="title"/>
           </p:nvPr>
         </p:nvSpPr>
-        <p:spPr>
-          <a:xfrm>
-            <a:off x="2573601" y="3053030"/>
-            <a:ext cx="4648197" cy="545561"/>
-          </a:xfrm>
-        </p:spPr>
+        <p:spPr/>
+        <p:txBody>
+          <a:bodyPr>
+            <a:normAutofit fontScale="90000"/>
+          </a:bodyPr>
+          <a:lstStyle/>
+          <a:p>
+            <a:r>
+              <a:rPr lang="en-US" dirty="0" smtClean="0"/>
+              <a:t>System Design -</a:t>
+            </a:r>
+            <a:br>
+              <a:rPr lang="en-US" dirty="0" smtClean="0"/>
+            </a:br>
+            <a:r>
+              <a:rPr lang="en-US" dirty="0" smtClean="0"/>
+              <a:t>Visualization</a:t>
+            </a:r>
+            <a:endParaRPr lang="en-SG" dirty="0"/>
+          </a:p>
+        </p:txBody>
+      </p:sp>
+      <p:sp>
+        <p:nvSpPr>
+          <p:cNvPr id="3" name="Content Placeholder 2"/>
+          <p:cNvSpPr>
+            <a:spLocks noGrp="1"/>
+          </p:cNvSpPr>
+          <p:nvPr>
+            <p:ph sz="quarter" idx="13"/>
+          </p:nvPr>
+        </p:nvSpPr>
+        <p:spPr/>
         <p:txBody>
           <a:bodyPr/>
           <a:lstStyle/>
           <a:p>
-            <a:r>
-              <a:rPr lang="en-US" dirty="0"/>
-              <a:t>Thank you! </a:t>
-            </a:r>
-            <a:r>
-              <a:rPr lang="en-US" dirty="0">
-                <a:sym typeface="Wingdings" panose="05000000000000000000" pitchFamily="2" charset="2"/>
-              </a:rPr>
-              <a:t> </a:t>
-            </a:r>
             <a:endParaRPr lang="en-SG" dirty="0"/>
           </a:p>
         </p:txBody>
@@ -12222,7 +12306,7 @@
           <a:p>
             <a:pPr algn="l"/>
             <a:r>
-              <a:rPr lang="en-SG" sz="1000" dirty="0"/>
+              <a:rPr lang="en-SG" sz="1000" smtClean="0"/>
               <a:t>© 2018 National University of Singapore. All Rights Reserved</a:t>
             </a:r>
             <a:endParaRPr lang="en-SG" dirty="0"/>
@@ -12253,10 +12337,329 @@
           </a:p>
         </p:txBody>
       </p:sp>
+      <p:pic>
+        <p:nvPicPr>
+          <p:cNvPr id="10" name="Picture 9"/>
+          <p:cNvPicPr>
+            <a:picLocks noChangeAspect="1"/>
+          </p:cNvPicPr>
+          <p:nvPr/>
+        </p:nvPicPr>
+        <p:blipFill>
+          <a:blip r:embed="rId2"/>
+          <a:stretch>
+            <a:fillRect/>
+          </a:stretch>
+        </p:blipFill>
+        <p:spPr>
+          <a:xfrm>
+            <a:off x="1072874" y="1313382"/>
+            <a:ext cx="6998251" cy="4520201"/>
+          </a:xfrm>
+          <a:prstGeom prst="rect">
+            <a:avLst/>
+          </a:prstGeom>
+        </p:spPr>
+      </p:pic>
     </p:spTree>
     <p:extLst>
       <p:ext uri="{BB962C8B-B14F-4D97-AF65-F5344CB8AC3E}">
-        <p14:creationId xmlns:p14="http://schemas.microsoft.com/office/powerpoint/2010/main" val="3351845363"/>
+        <p14:creationId xmlns:p14="http://schemas.microsoft.com/office/powerpoint/2010/main" val="1199322699"/>
+      </p:ext>
+    </p:extLst>
+  </p:cSld>
+  <p:clrMapOvr>
+    <a:masterClrMapping/>
+  </p:clrMapOvr>
+</p:sld>
+</file>
+
+<file path=ppt/slides/slide29.xml><?xml version="1.0" encoding="utf-8"?>
+<p:sld xmlns:a="http://schemas.openxmlformats.org/drawingml/2006/main" xmlns:r="http://schemas.openxmlformats.org/officeDocument/2006/relationships" xmlns:p="http://schemas.openxmlformats.org/presentationml/2006/main">
+  <p:cSld>
+    <p:spTree>
+      <p:nvGrpSpPr>
+        <p:cNvPr id="1" name=""/>
+        <p:cNvGrpSpPr/>
+        <p:nvPr/>
+      </p:nvGrpSpPr>
+      <p:grpSpPr>
+        <a:xfrm>
+          <a:off x="0" y="0"/>
+          <a:ext cx="0" cy="0"/>
+          <a:chOff x="0" y="0"/>
+          <a:chExt cx="0" cy="0"/>
+        </a:xfrm>
+      </p:grpSpPr>
+      <p:sp>
+        <p:nvSpPr>
+          <p:cNvPr id="2" name="Title 1"/>
+          <p:cNvSpPr>
+            <a:spLocks noGrp="1"/>
+          </p:cNvSpPr>
+          <p:nvPr>
+            <p:ph type="title"/>
+          </p:nvPr>
+        </p:nvSpPr>
+        <p:spPr/>
+        <p:txBody>
+          <a:bodyPr/>
+          <a:lstStyle/>
+          <a:p>
+            <a:r>
+              <a:rPr lang="en-US" dirty="0" smtClean="0"/>
+              <a:t>Open3D Visualizer</a:t>
+            </a:r>
+            <a:endParaRPr lang="en-SG" dirty="0"/>
+          </a:p>
+        </p:txBody>
+      </p:sp>
+      <p:sp>
+        <p:nvSpPr>
+          <p:cNvPr id="3" name="Content Placeholder 2"/>
+          <p:cNvSpPr>
+            <a:spLocks noGrp="1"/>
+          </p:cNvSpPr>
+          <p:nvPr>
+            <p:ph sz="quarter" idx="13"/>
+          </p:nvPr>
+        </p:nvSpPr>
+        <p:spPr/>
+        <p:txBody>
+          <a:bodyPr>
+            <a:normAutofit/>
+          </a:bodyPr>
+          <a:lstStyle/>
+          <a:p>
+            <a:r>
+              <a:rPr lang="en-US" dirty="0" smtClean="0">
+                <a:solidFill>
+                  <a:schemeClr val="tx1"/>
+                </a:solidFill>
+              </a:rPr>
+              <a:t>Input Data</a:t>
+            </a:r>
+            <a:endParaRPr lang="en-US" dirty="0" smtClean="0">
+              <a:solidFill>
+                <a:schemeClr val="tx1"/>
+              </a:solidFill>
+            </a:endParaRPr>
+          </a:p>
+          <a:p>
+            <a:pPr lvl="1"/>
+            <a:r>
+              <a:rPr lang="en-US" dirty="0" smtClean="0">
+                <a:solidFill>
+                  <a:schemeClr val="tx1"/>
+                </a:solidFill>
+              </a:rPr>
+              <a:t>Grayscale </a:t>
+            </a:r>
+            <a:r>
+              <a:rPr lang="en-US" dirty="0" smtClean="0">
+                <a:solidFill>
+                  <a:schemeClr val="tx1"/>
+                </a:solidFill>
+              </a:rPr>
+              <a:t>2D map</a:t>
+            </a:r>
+          </a:p>
+          <a:p>
+            <a:pPr lvl="1"/>
+            <a:r>
+              <a:rPr lang="en-US" dirty="0" smtClean="0">
+                <a:solidFill>
+                  <a:schemeClr val="tx1"/>
+                </a:solidFill>
+              </a:rPr>
+              <a:t>Robot localization</a:t>
+            </a:r>
+            <a:endParaRPr lang="en-US" dirty="0">
+              <a:solidFill>
+                <a:schemeClr val="tx1"/>
+              </a:solidFill>
+            </a:endParaRPr>
+          </a:p>
+          <a:p>
+            <a:pPr lvl="2"/>
+            <a:r>
+              <a:rPr lang="en-US" dirty="0">
+                <a:solidFill>
+                  <a:schemeClr val="tx1"/>
+                </a:solidFill>
+              </a:rPr>
+              <a:t>robot position</a:t>
+            </a:r>
+          </a:p>
+          <a:p>
+            <a:pPr lvl="2"/>
+            <a:r>
+              <a:rPr lang="en-US" dirty="0">
+                <a:solidFill>
+                  <a:schemeClr val="tx1"/>
+                </a:solidFill>
+              </a:rPr>
+              <a:t>orientation</a:t>
+            </a:r>
+            <a:endParaRPr lang="en-SG" dirty="0">
+              <a:solidFill>
+                <a:schemeClr val="tx1"/>
+              </a:solidFill>
+            </a:endParaRPr>
+          </a:p>
+          <a:p>
+            <a:r>
+              <a:rPr lang="en-US" dirty="0" smtClean="0">
+                <a:solidFill>
+                  <a:schemeClr val="tx1"/>
+                </a:solidFill>
+              </a:rPr>
+              <a:t>Output Views</a:t>
+            </a:r>
+            <a:endParaRPr lang="en-US" dirty="0" smtClean="0">
+              <a:solidFill>
+                <a:schemeClr val="tx1"/>
+              </a:solidFill>
+            </a:endParaRPr>
+          </a:p>
+          <a:p>
+            <a:pPr lvl="1"/>
+            <a:r>
+              <a:rPr lang="en-US" dirty="0" smtClean="0">
+                <a:solidFill>
+                  <a:schemeClr val="tx1"/>
+                </a:solidFill>
+              </a:rPr>
+              <a:t>Map</a:t>
+            </a:r>
+            <a:endParaRPr lang="en-US" dirty="0" smtClean="0">
+              <a:solidFill>
+                <a:schemeClr val="tx1"/>
+              </a:solidFill>
+            </a:endParaRPr>
+          </a:p>
+          <a:p>
+            <a:pPr lvl="1"/>
+            <a:r>
+              <a:rPr lang="en-US" dirty="0" smtClean="0">
+                <a:solidFill>
+                  <a:schemeClr val="tx1"/>
+                </a:solidFill>
+              </a:rPr>
+              <a:t>Front / Rear </a:t>
+            </a:r>
+            <a:r>
+              <a:rPr lang="en-US" dirty="0" smtClean="0">
+                <a:solidFill>
+                  <a:schemeClr val="tx1"/>
+                </a:solidFill>
+              </a:rPr>
+              <a:t>View</a:t>
+            </a:r>
+            <a:endParaRPr lang="en-SG" dirty="0">
+              <a:solidFill>
+                <a:schemeClr val="tx1"/>
+              </a:solidFill>
+            </a:endParaRPr>
+          </a:p>
+        </p:txBody>
+      </p:sp>
+      <p:sp>
+        <p:nvSpPr>
+          <p:cNvPr id="4" name="Footer Placeholder 3"/>
+          <p:cNvSpPr>
+            <a:spLocks noGrp="1"/>
+          </p:cNvSpPr>
+          <p:nvPr>
+            <p:ph type="ftr" sz="quarter" idx="15"/>
+          </p:nvPr>
+        </p:nvSpPr>
+        <p:spPr/>
+        <p:txBody>
+          <a:bodyPr/>
+          <a:lstStyle/>
+          <a:p>
+            <a:pPr algn="l"/>
+            <a:r>
+              <a:rPr lang="en-SG" sz="1000" smtClean="0"/>
+              <a:t>© 2018 National University of Singapore. All Rights Reserved</a:t>
+            </a:r>
+            <a:endParaRPr lang="en-SG" dirty="0"/>
+          </a:p>
+        </p:txBody>
+      </p:sp>
+      <p:sp>
+        <p:nvSpPr>
+          <p:cNvPr id="5" name="Slide Number Placeholder 4"/>
+          <p:cNvSpPr>
+            <a:spLocks noGrp="1"/>
+          </p:cNvSpPr>
+          <p:nvPr>
+            <p:ph type="sldNum" sz="quarter" idx="16"/>
+          </p:nvPr>
+        </p:nvSpPr>
+        <p:spPr/>
+        <p:txBody>
+          <a:bodyPr/>
+          <a:lstStyle/>
+          <a:p>
+            <a:fld id="{2F63C605-4FC6-46DE-BC90-871762EA3F52}" type="slidenum">
+              <a:rPr lang="en-SG" smtClean="0"/>
+              <a:pPr/>
+              <a:t>29</a:t>
+            </a:fld>
+            <a:endParaRPr lang="en-SG" dirty="0"/>
+          </a:p>
+        </p:txBody>
+      </p:sp>
+      <p:pic>
+        <p:nvPicPr>
+          <p:cNvPr id="8" name="Picture 7"/>
+          <p:cNvPicPr/>
+          <p:nvPr/>
+        </p:nvPicPr>
+        <p:blipFill>
+          <a:blip r:embed="rId2"/>
+          <a:stretch>
+            <a:fillRect/>
+          </a:stretch>
+        </p:blipFill>
+        <p:spPr>
+          <a:xfrm>
+            <a:off x="5168692" y="1242516"/>
+            <a:ext cx="1861321" cy="2213273"/>
+          </a:xfrm>
+          <a:prstGeom prst="rect">
+            <a:avLst/>
+          </a:prstGeom>
+        </p:spPr>
+      </p:pic>
+      <p:pic>
+        <p:nvPicPr>
+          <p:cNvPr id="9" name="Picture 8"/>
+          <p:cNvPicPr/>
+          <p:nvPr/>
+        </p:nvPicPr>
+        <p:blipFill>
+          <a:blip r:embed="rId3"/>
+          <a:stretch>
+            <a:fillRect/>
+          </a:stretch>
+        </p:blipFill>
+        <p:spPr>
+          <a:xfrm>
+            <a:off x="4998720" y="3264831"/>
+            <a:ext cx="2710992" cy="2423756"/>
+          </a:xfrm>
+          <a:prstGeom prst="rect">
+            <a:avLst/>
+          </a:prstGeom>
+        </p:spPr>
+      </p:pic>
+    </p:spTree>
+    <p:extLst>
+      <p:ext uri="{BB962C8B-B14F-4D97-AF65-F5344CB8AC3E}">
+        <p14:creationId xmlns:p14="http://schemas.microsoft.com/office/powerpoint/2010/main" val="2599344292"/>
       </p:ext>
     </p:extLst>
   </p:cSld>
@@ -12414,6 +12817,767 @@
     <p:extLst>
       <p:ext uri="{BB962C8B-B14F-4D97-AF65-F5344CB8AC3E}">
         <p14:creationId xmlns:p14="http://schemas.microsoft.com/office/powerpoint/2010/main" val="1105590467"/>
+      </p:ext>
+    </p:extLst>
+  </p:cSld>
+  <p:clrMapOvr>
+    <a:masterClrMapping/>
+  </p:clrMapOvr>
+</p:sld>
+</file>
+
+<file path=ppt/slides/slide30.xml><?xml version="1.0" encoding="utf-8"?>
+<p:sld xmlns:a="http://schemas.openxmlformats.org/drawingml/2006/main" xmlns:r="http://schemas.openxmlformats.org/officeDocument/2006/relationships" xmlns:p="http://schemas.openxmlformats.org/presentationml/2006/main">
+  <p:cSld>
+    <p:spTree>
+      <p:nvGrpSpPr>
+        <p:cNvPr id="1" name=""/>
+        <p:cNvGrpSpPr/>
+        <p:nvPr/>
+      </p:nvGrpSpPr>
+      <p:grpSpPr>
+        <a:xfrm>
+          <a:off x="0" y="0"/>
+          <a:ext cx="0" cy="0"/>
+          <a:chOff x="0" y="0"/>
+          <a:chExt cx="0" cy="0"/>
+        </a:xfrm>
+      </p:grpSpPr>
+      <p:sp>
+        <p:nvSpPr>
+          <p:cNvPr id="2" name="Title 1"/>
+          <p:cNvSpPr>
+            <a:spLocks noGrp="1"/>
+          </p:cNvSpPr>
+          <p:nvPr>
+            <p:ph type="title"/>
+          </p:nvPr>
+        </p:nvSpPr>
+        <p:spPr/>
+        <p:txBody>
+          <a:bodyPr/>
+          <a:lstStyle/>
+          <a:p>
+            <a:r>
+              <a:rPr lang="en-US" dirty="0" smtClean="0"/>
+              <a:t>Map Tracking Viewer</a:t>
+            </a:r>
+            <a:endParaRPr lang="en-SG" dirty="0"/>
+          </a:p>
+        </p:txBody>
+      </p:sp>
+      <p:sp>
+        <p:nvSpPr>
+          <p:cNvPr id="3" name="Content Placeholder 2"/>
+          <p:cNvSpPr>
+            <a:spLocks noGrp="1"/>
+          </p:cNvSpPr>
+          <p:nvPr>
+            <p:ph sz="quarter" idx="13"/>
+          </p:nvPr>
+        </p:nvSpPr>
+        <p:spPr/>
+        <p:txBody>
+          <a:bodyPr/>
+          <a:lstStyle/>
+          <a:p>
+            <a:r>
+              <a:rPr lang="en-US" dirty="0" smtClean="0">
+                <a:solidFill>
+                  <a:schemeClr val="tx1"/>
+                </a:solidFill>
+              </a:rPr>
+              <a:t>Python </a:t>
+            </a:r>
+            <a:r>
+              <a:rPr lang="en-US" dirty="0" err="1" smtClean="0">
+                <a:solidFill>
+                  <a:schemeClr val="tx1"/>
+                </a:solidFill>
+              </a:rPr>
+              <a:t>Tkinter</a:t>
+            </a:r>
+            <a:r>
+              <a:rPr lang="en-US" dirty="0" smtClean="0">
+                <a:solidFill>
+                  <a:schemeClr val="tx1"/>
+                </a:solidFill>
+              </a:rPr>
+              <a:t> GUI</a:t>
+            </a:r>
+          </a:p>
+          <a:p>
+            <a:r>
+              <a:rPr lang="en-US" dirty="0" smtClean="0">
+                <a:solidFill>
+                  <a:schemeClr val="tx1"/>
+                </a:solidFill>
+              </a:rPr>
+              <a:t>Robot Simulation</a:t>
+            </a:r>
+            <a:endParaRPr lang="en-US" dirty="0" smtClean="0">
+              <a:solidFill>
+                <a:schemeClr val="tx1"/>
+              </a:solidFill>
+            </a:endParaRPr>
+          </a:p>
+          <a:p>
+            <a:pPr lvl="1"/>
+            <a:r>
+              <a:rPr lang="en-US" dirty="0" smtClean="0">
+                <a:solidFill>
+                  <a:schemeClr val="tx1"/>
+                </a:solidFill>
+              </a:rPr>
+              <a:t>Position</a:t>
+            </a:r>
+          </a:p>
+          <a:p>
+            <a:pPr lvl="1"/>
+            <a:r>
+              <a:rPr lang="en-US" dirty="0" smtClean="0">
+                <a:solidFill>
+                  <a:schemeClr val="tx1"/>
+                </a:solidFill>
+              </a:rPr>
+              <a:t>Orientation</a:t>
+            </a:r>
+          </a:p>
+          <a:p>
+            <a:r>
+              <a:rPr lang="en-US" dirty="0" smtClean="0">
+                <a:solidFill>
+                  <a:schemeClr val="tx1"/>
+                </a:solidFill>
+              </a:rPr>
+              <a:t>Visualization </a:t>
+            </a:r>
+            <a:endParaRPr lang="en-US" dirty="0" smtClean="0">
+              <a:solidFill>
+                <a:schemeClr val="tx1"/>
+              </a:solidFill>
+            </a:endParaRPr>
+          </a:p>
+          <a:p>
+            <a:pPr lvl="1"/>
+            <a:r>
+              <a:rPr lang="en-US" dirty="0" smtClean="0">
+                <a:solidFill>
+                  <a:schemeClr val="tx1"/>
+                </a:solidFill>
+              </a:rPr>
+              <a:t>Map</a:t>
+            </a:r>
+            <a:endParaRPr lang="en-US" dirty="0" smtClean="0">
+              <a:solidFill>
+                <a:schemeClr val="tx1"/>
+              </a:solidFill>
+            </a:endParaRPr>
+          </a:p>
+          <a:p>
+            <a:pPr lvl="1"/>
+            <a:r>
+              <a:rPr lang="en-US" dirty="0" smtClean="0">
+                <a:solidFill>
+                  <a:schemeClr val="tx1"/>
+                </a:solidFill>
+              </a:rPr>
+              <a:t>Front / Rear View</a:t>
+            </a:r>
+          </a:p>
+          <a:p>
+            <a:pPr lvl="1"/>
+            <a:endParaRPr lang="en-US" dirty="0">
+              <a:solidFill>
+                <a:schemeClr val="tx1"/>
+              </a:solidFill>
+            </a:endParaRPr>
+          </a:p>
+        </p:txBody>
+      </p:sp>
+      <p:sp>
+        <p:nvSpPr>
+          <p:cNvPr id="4" name="Footer Placeholder 3"/>
+          <p:cNvSpPr>
+            <a:spLocks noGrp="1"/>
+          </p:cNvSpPr>
+          <p:nvPr>
+            <p:ph type="ftr" sz="quarter" idx="15"/>
+          </p:nvPr>
+        </p:nvSpPr>
+        <p:spPr/>
+        <p:txBody>
+          <a:bodyPr/>
+          <a:lstStyle/>
+          <a:p>
+            <a:pPr algn="l"/>
+            <a:r>
+              <a:rPr lang="en-SG" sz="1000" smtClean="0"/>
+              <a:t>© 2018 National University of Singapore. All Rights Reserved</a:t>
+            </a:r>
+            <a:endParaRPr lang="en-SG" dirty="0"/>
+          </a:p>
+        </p:txBody>
+      </p:sp>
+      <p:sp>
+        <p:nvSpPr>
+          <p:cNvPr id="5" name="Slide Number Placeholder 4"/>
+          <p:cNvSpPr>
+            <a:spLocks noGrp="1"/>
+          </p:cNvSpPr>
+          <p:nvPr>
+            <p:ph type="sldNum" sz="quarter" idx="16"/>
+          </p:nvPr>
+        </p:nvSpPr>
+        <p:spPr/>
+        <p:txBody>
+          <a:bodyPr/>
+          <a:lstStyle/>
+          <a:p>
+            <a:fld id="{2F63C605-4FC6-46DE-BC90-871762EA3F52}" type="slidenum">
+              <a:rPr lang="en-SG" smtClean="0"/>
+              <a:pPr/>
+              <a:t>30</a:t>
+            </a:fld>
+            <a:endParaRPr lang="en-SG" dirty="0"/>
+          </a:p>
+        </p:txBody>
+      </p:sp>
+      <p:pic>
+        <p:nvPicPr>
+          <p:cNvPr id="6" name="Picture 5"/>
+          <p:cNvPicPr>
+            <a:picLocks noChangeAspect="1"/>
+          </p:cNvPicPr>
+          <p:nvPr/>
+        </p:nvPicPr>
+        <p:blipFill>
+          <a:blip r:embed="rId2"/>
+          <a:stretch>
+            <a:fillRect/>
+          </a:stretch>
+        </p:blipFill>
+        <p:spPr>
+          <a:xfrm>
+            <a:off x="4406537" y="2369685"/>
+            <a:ext cx="4442822" cy="2791595"/>
+          </a:xfrm>
+          <a:prstGeom prst="rect">
+            <a:avLst/>
+          </a:prstGeom>
+        </p:spPr>
+      </p:pic>
+    </p:spTree>
+    <p:extLst>
+      <p:ext uri="{BB962C8B-B14F-4D97-AF65-F5344CB8AC3E}">
+        <p14:creationId xmlns:p14="http://schemas.microsoft.com/office/powerpoint/2010/main" val="4110882693"/>
+      </p:ext>
+    </p:extLst>
+  </p:cSld>
+  <p:clrMapOvr>
+    <a:masterClrMapping/>
+  </p:clrMapOvr>
+</p:sld>
+</file>
+
+<file path=ppt/slides/slide31.xml><?xml version="1.0" encoding="utf-8"?>
+<p:sld xmlns:a="http://schemas.openxmlformats.org/drawingml/2006/main" xmlns:r="http://schemas.openxmlformats.org/officeDocument/2006/relationships" xmlns:p="http://schemas.openxmlformats.org/presentationml/2006/main">
+  <p:cSld>
+    <p:spTree>
+      <p:nvGrpSpPr>
+        <p:cNvPr id="1" name=""/>
+        <p:cNvGrpSpPr/>
+        <p:nvPr/>
+      </p:nvGrpSpPr>
+      <p:grpSpPr>
+        <a:xfrm>
+          <a:off x="0" y="0"/>
+          <a:ext cx="0" cy="0"/>
+          <a:chOff x="0" y="0"/>
+          <a:chExt cx="0" cy="0"/>
+        </a:xfrm>
+      </p:grpSpPr>
+      <p:sp>
+        <p:nvSpPr>
+          <p:cNvPr id="2" name="Title 1"/>
+          <p:cNvSpPr>
+            <a:spLocks noGrp="1"/>
+          </p:cNvSpPr>
+          <p:nvPr>
+            <p:ph type="title"/>
+          </p:nvPr>
+        </p:nvSpPr>
+        <p:spPr/>
+        <p:txBody>
+          <a:bodyPr/>
+          <a:lstStyle/>
+          <a:p>
+            <a:r>
+              <a:rPr lang="en-US" dirty="0" smtClean="0"/>
+              <a:t>Future Usage</a:t>
+            </a:r>
+            <a:endParaRPr lang="en-SG" dirty="0"/>
+          </a:p>
+        </p:txBody>
+      </p:sp>
+      <p:sp>
+        <p:nvSpPr>
+          <p:cNvPr id="3" name="Content Placeholder 2"/>
+          <p:cNvSpPr>
+            <a:spLocks noGrp="1"/>
+          </p:cNvSpPr>
+          <p:nvPr>
+            <p:ph sz="quarter" idx="13"/>
+          </p:nvPr>
+        </p:nvSpPr>
+        <p:spPr/>
+        <p:txBody>
+          <a:bodyPr>
+            <a:normAutofit fontScale="55000" lnSpcReduction="20000"/>
+          </a:bodyPr>
+          <a:lstStyle/>
+          <a:p>
+            <a:r>
+              <a:rPr lang="en-US" dirty="0" smtClean="0">
+                <a:solidFill>
+                  <a:schemeClr val="tx1"/>
+                </a:solidFill>
+              </a:rPr>
+              <a:t>Localization Algorithms</a:t>
+            </a:r>
+          </a:p>
+          <a:p>
+            <a:pPr lvl="1"/>
+            <a:r>
+              <a:rPr lang="en-US" dirty="0" smtClean="0">
+                <a:solidFill>
+                  <a:schemeClr val="tx1"/>
+                </a:solidFill>
+              </a:rPr>
+              <a:t>Monte </a:t>
+            </a:r>
+            <a:r>
+              <a:rPr lang="en-US" dirty="0">
+                <a:solidFill>
+                  <a:schemeClr val="tx1"/>
+                </a:solidFill>
+              </a:rPr>
+              <a:t>Carlo </a:t>
+            </a:r>
+            <a:r>
+              <a:rPr lang="en-US" dirty="0" smtClean="0">
+                <a:solidFill>
+                  <a:schemeClr val="tx1"/>
+                </a:solidFill>
+              </a:rPr>
+              <a:t>Localization (MCL)</a:t>
+            </a:r>
+          </a:p>
+          <a:p>
+            <a:pPr lvl="2"/>
+            <a:r>
+              <a:rPr lang="en-US" dirty="0" smtClean="0">
+                <a:solidFill>
+                  <a:schemeClr val="tx1"/>
+                </a:solidFill>
+              </a:rPr>
+              <a:t>Most popular in robot localization</a:t>
+            </a:r>
+          </a:p>
+          <a:p>
+            <a:pPr lvl="2"/>
+            <a:r>
+              <a:rPr lang="en-US" dirty="0">
+                <a:solidFill>
+                  <a:schemeClr val="tx1"/>
+                </a:solidFill>
+              </a:rPr>
+              <a:t>Also referred to as Particle Filter</a:t>
+            </a:r>
+          </a:p>
+          <a:p>
+            <a:pPr lvl="2"/>
+            <a:r>
+              <a:rPr lang="en-US" dirty="0">
+                <a:solidFill>
+                  <a:schemeClr val="tx1"/>
+                </a:solidFill>
+              </a:rPr>
+              <a:t>Relies on </a:t>
+            </a:r>
+          </a:p>
+          <a:p>
+            <a:pPr lvl="3"/>
+            <a:r>
+              <a:rPr lang="en-US" dirty="0">
+                <a:solidFill>
+                  <a:schemeClr val="tx1"/>
+                </a:solidFill>
+              </a:rPr>
+              <a:t>Accurate Environment Map</a:t>
+            </a:r>
+          </a:p>
+          <a:p>
+            <a:pPr lvl="3"/>
+            <a:r>
+              <a:rPr lang="en-US" dirty="0">
+                <a:solidFill>
+                  <a:schemeClr val="tx1"/>
+                </a:solidFill>
+              </a:rPr>
+              <a:t>Particle position and </a:t>
+            </a:r>
+            <a:r>
+              <a:rPr lang="en-US" dirty="0" smtClean="0">
+                <a:solidFill>
+                  <a:schemeClr val="tx1"/>
+                </a:solidFill>
+              </a:rPr>
+              <a:t>orientation</a:t>
+            </a:r>
+          </a:p>
+          <a:p>
+            <a:pPr lvl="1"/>
+            <a:r>
+              <a:rPr lang="en-US" dirty="0">
+                <a:solidFill>
+                  <a:schemeClr val="tx1"/>
+                </a:solidFill>
+              </a:rPr>
+              <a:t>Adaptive Monte Carlo </a:t>
+            </a:r>
+            <a:r>
+              <a:rPr lang="en-US" dirty="0" smtClean="0">
+                <a:solidFill>
+                  <a:schemeClr val="tx1"/>
+                </a:solidFill>
+              </a:rPr>
+              <a:t>Localization (AMCL)</a:t>
+            </a:r>
+          </a:p>
+          <a:p>
+            <a:pPr lvl="2"/>
+            <a:r>
+              <a:rPr lang="en-US" dirty="0" smtClean="0">
+                <a:solidFill>
+                  <a:schemeClr val="tx1"/>
+                </a:solidFill>
+              </a:rPr>
+              <a:t>Improved version of MCL</a:t>
+            </a:r>
+          </a:p>
+          <a:p>
+            <a:pPr lvl="2"/>
+            <a:endParaRPr lang="en-US" dirty="0" smtClean="0">
+              <a:solidFill>
+                <a:schemeClr val="tx1"/>
+              </a:solidFill>
+            </a:endParaRPr>
+          </a:p>
+          <a:p>
+            <a:r>
+              <a:rPr lang="en-SG" dirty="0" smtClean="0">
+                <a:solidFill>
+                  <a:schemeClr val="tx1"/>
+                </a:solidFill>
+              </a:rPr>
+              <a:t>Deep </a:t>
+            </a:r>
+            <a:r>
+              <a:rPr lang="en-SG" dirty="0">
+                <a:solidFill>
+                  <a:schemeClr val="tx1"/>
+                </a:solidFill>
+              </a:rPr>
+              <a:t>Neural Network Robotic </a:t>
+            </a:r>
+            <a:r>
+              <a:rPr lang="en-SG" dirty="0" smtClean="0">
+                <a:solidFill>
+                  <a:schemeClr val="tx1"/>
+                </a:solidFill>
+              </a:rPr>
+              <a:t>Mapping</a:t>
+            </a:r>
+          </a:p>
+          <a:p>
+            <a:pPr lvl="1"/>
+            <a:r>
+              <a:rPr lang="en-US" dirty="0" smtClean="0">
+                <a:solidFill>
+                  <a:schemeClr val="tx1"/>
+                </a:solidFill>
+              </a:rPr>
+              <a:t>Produces </a:t>
+            </a:r>
+            <a:r>
+              <a:rPr lang="en-US" dirty="0" smtClean="0">
+                <a:solidFill>
+                  <a:schemeClr val="tx1"/>
+                </a:solidFill>
+              </a:rPr>
+              <a:t>more accuracy map</a:t>
+            </a:r>
+          </a:p>
+          <a:p>
+            <a:pPr lvl="2"/>
+            <a:r>
+              <a:rPr lang="en-US" dirty="0" smtClean="0">
+                <a:solidFill>
+                  <a:schemeClr val="tx1"/>
+                </a:solidFill>
+              </a:rPr>
+              <a:t>Comparing with traditional approach such as k-means</a:t>
+            </a:r>
+          </a:p>
+          <a:p>
+            <a:pPr lvl="2"/>
+            <a:endParaRPr lang="en-US" dirty="0">
+              <a:solidFill>
+                <a:schemeClr val="tx1"/>
+              </a:solidFill>
+            </a:endParaRPr>
+          </a:p>
+          <a:p>
+            <a:r>
+              <a:rPr lang="en-US" dirty="0" smtClean="0">
+                <a:solidFill>
+                  <a:schemeClr val="tx1"/>
+                </a:solidFill>
+              </a:rPr>
+              <a:t>Therefore, </a:t>
+            </a:r>
+            <a:r>
+              <a:rPr lang="en-SG" dirty="0" smtClean="0">
+                <a:solidFill>
+                  <a:schemeClr val="tx1"/>
+                </a:solidFill>
+              </a:rPr>
+              <a:t>Deep </a:t>
+            </a:r>
+            <a:r>
+              <a:rPr lang="en-SG" dirty="0">
+                <a:solidFill>
+                  <a:schemeClr val="tx1"/>
+                </a:solidFill>
+              </a:rPr>
+              <a:t>Neural Network Robotic </a:t>
+            </a:r>
+            <a:r>
+              <a:rPr lang="en-SG" dirty="0" smtClean="0">
+                <a:solidFill>
+                  <a:schemeClr val="tx1"/>
+                </a:solidFill>
+              </a:rPr>
+              <a:t>Mapping </a:t>
+            </a:r>
+            <a:r>
+              <a:rPr lang="en-SG" dirty="0" smtClean="0">
+                <a:solidFill>
+                  <a:schemeClr val="tx1"/>
+                </a:solidFill>
+              </a:rPr>
+              <a:t>will benefit </a:t>
+            </a:r>
+            <a:r>
+              <a:rPr lang="en-US" dirty="0">
+                <a:solidFill>
+                  <a:schemeClr val="tx1"/>
+                </a:solidFill>
+              </a:rPr>
+              <a:t>AMCL </a:t>
+            </a:r>
+            <a:r>
+              <a:rPr lang="en-US" dirty="0" smtClean="0">
+                <a:solidFill>
+                  <a:schemeClr val="tx1"/>
+                </a:solidFill>
+              </a:rPr>
+              <a:t>with more accurate </a:t>
+            </a:r>
+            <a:r>
+              <a:rPr lang="en-SG" dirty="0" smtClean="0">
+                <a:solidFill>
+                  <a:schemeClr val="tx1"/>
+                </a:solidFill>
+              </a:rPr>
+              <a:t>map, and will provide map when map is not available</a:t>
+            </a:r>
+            <a:endParaRPr lang="en-US" dirty="0">
+              <a:solidFill>
+                <a:schemeClr val="tx1"/>
+              </a:solidFill>
+            </a:endParaRPr>
+          </a:p>
+          <a:p>
+            <a:endParaRPr lang="en-SG" dirty="0"/>
+          </a:p>
+        </p:txBody>
+      </p:sp>
+      <p:sp>
+        <p:nvSpPr>
+          <p:cNvPr id="4" name="Footer Placeholder 3"/>
+          <p:cNvSpPr>
+            <a:spLocks noGrp="1"/>
+          </p:cNvSpPr>
+          <p:nvPr>
+            <p:ph type="ftr" sz="quarter" idx="15"/>
+          </p:nvPr>
+        </p:nvSpPr>
+        <p:spPr/>
+        <p:txBody>
+          <a:bodyPr/>
+          <a:lstStyle/>
+          <a:p>
+            <a:pPr algn="l"/>
+            <a:r>
+              <a:rPr lang="en-SG" sz="1000" smtClean="0"/>
+              <a:t>© 2018 National University of Singapore. All Rights Reserved</a:t>
+            </a:r>
+            <a:endParaRPr lang="en-SG" dirty="0"/>
+          </a:p>
+        </p:txBody>
+      </p:sp>
+      <p:sp>
+        <p:nvSpPr>
+          <p:cNvPr id="5" name="Slide Number Placeholder 4"/>
+          <p:cNvSpPr>
+            <a:spLocks noGrp="1"/>
+          </p:cNvSpPr>
+          <p:nvPr>
+            <p:ph type="sldNum" sz="quarter" idx="16"/>
+          </p:nvPr>
+        </p:nvSpPr>
+        <p:spPr/>
+        <p:txBody>
+          <a:bodyPr/>
+          <a:lstStyle/>
+          <a:p>
+            <a:fld id="{2F63C605-4FC6-46DE-BC90-871762EA3F52}" type="slidenum">
+              <a:rPr lang="en-SG" smtClean="0"/>
+              <a:pPr/>
+              <a:t>31</a:t>
+            </a:fld>
+            <a:endParaRPr lang="en-SG" dirty="0"/>
+          </a:p>
+        </p:txBody>
+      </p:sp>
+    </p:spTree>
+    <p:extLst>
+      <p:ext uri="{BB962C8B-B14F-4D97-AF65-F5344CB8AC3E}">
+        <p14:creationId xmlns:p14="http://schemas.microsoft.com/office/powerpoint/2010/main" val="1383113111"/>
+      </p:ext>
+    </p:extLst>
+  </p:cSld>
+  <p:clrMapOvr>
+    <a:masterClrMapping/>
+  </p:clrMapOvr>
+</p:sld>
+</file>
+
+<file path=ppt/slides/slide32.xml><?xml version="1.0" encoding="utf-8"?>
+<p:sld xmlns:a="http://schemas.openxmlformats.org/drawingml/2006/main" xmlns:r="http://schemas.openxmlformats.org/officeDocument/2006/relationships" xmlns:p="http://schemas.openxmlformats.org/presentationml/2006/main">
+  <p:cSld>
+    <p:spTree>
+      <p:nvGrpSpPr>
+        <p:cNvPr id="1" name=""/>
+        <p:cNvGrpSpPr/>
+        <p:nvPr/>
+      </p:nvGrpSpPr>
+      <p:grpSpPr>
+        <a:xfrm>
+          <a:off x="0" y="0"/>
+          <a:ext cx="0" cy="0"/>
+          <a:chOff x="0" y="0"/>
+          <a:chExt cx="0" cy="0"/>
+        </a:xfrm>
+      </p:grpSpPr>
+      <p:sp>
+        <p:nvSpPr>
+          <p:cNvPr id="2" name="Title 1"/>
+          <p:cNvSpPr>
+            <a:spLocks noGrp="1"/>
+          </p:cNvSpPr>
+          <p:nvPr>
+            <p:ph type="title"/>
+          </p:nvPr>
+        </p:nvSpPr>
+        <p:spPr>
+          <a:xfrm>
+            <a:off x="2573601" y="3053030"/>
+            <a:ext cx="4648197" cy="545561"/>
+          </a:xfrm>
+        </p:spPr>
+        <p:txBody>
+          <a:bodyPr/>
+          <a:lstStyle/>
+          <a:p>
+            <a:r>
+              <a:rPr lang="en-US" dirty="0"/>
+              <a:t>Thank you! </a:t>
+            </a:r>
+            <a:r>
+              <a:rPr lang="en-US" dirty="0">
+                <a:sym typeface="Wingdings" panose="05000000000000000000" pitchFamily="2" charset="2"/>
+              </a:rPr>
+              <a:t> </a:t>
+            </a:r>
+            <a:endParaRPr lang="en-SG" dirty="0"/>
+          </a:p>
+        </p:txBody>
+      </p:sp>
+      <p:sp>
+        <p:nvSpPr>
+          <p:cNvPr id="4" name="Footer Placeholder 3"/>
+          <p:cNvSpPr>
+            <a:spLocks noGrp="1"/>
+          </p:cNvSpPr>
+          <p:nvPr>
+            <p:ph type="ftr" sz="quarter" idx="15"/>
+          </p:nvPr>
+        </p:nvSpPr>
+        <p:spPr/>
+        <p:txBody>
+          <a:bodyPr/>
+          <a:lstStyle/>
+          <a:p>
+            <a:pPr algn="l"/>
+            <a:r>
+              <a:rPr lang="en-SG" sz="1000" dirty="0"/>
+              <a:t>© 2018 National University of Singapore. All Rights Reserved</a:t>
+            </a:r>
+            <a:endParaRPr lang="en-SG" dirty="0"/>
+          </a:p>
+        </p:txBody>
+      </p:sp>
+      <p:sp>
+        <p:nvSpPr>
+          <p:cNvPr id="5" name="Slide Number Placeholder 4"/>
+          <p:cNvSpPr>
+            <a:spLocks noGrp="1"/>
+          </p:cNvSpPr>
+          <p:nvPr>
+            <p:ph type="sldNum" sz="quarter" idx="16"/>
+          </p:nvPr>
+        </p:nvSpPr>
+        <p:spPr/>
+        <p:txBody>
+          <a:bodyPr/>
+          <a:lstStyle/>
+          <a:p>
+            <a:fld id="{2F63C605-4FC6-46DE-BC90-871762EA3F52}" type="slidenum">
+              <a:rPr lang="en-SG" smtClean="0"/>
+              <a:pPr/>
+              <a:t>32</a:t>
+            </a:fld>
+            <a:endParaRPr lang="en-SG" dirty="0"/>
+          </a:p>
+        </p:txBody>
+      </p:sp>
+    </p:spTree>
+    <p:extLst>
+      <p:ext uri="{BB962C8B-B14F-4D97-AF65-F5344CB8AC3E}">
+        <p14:creationId xmlns:p14="http://schemas.microsoft.com/office/powerpoint/2010/main" val="3351845363"/>
       </p:ext>
     </p:extLst>
   </p:cSld>

</xml_diff>

<commit_message>
Update on visualization and future work;
</commit_message>
<xml_diff>
--- a/PracticeModule_Presentation.pptx
+++ b/PracticeModule_Presentation.pptx
@@ -39,10 +39,10 @@
     <p:sldId id="507" r:id="rId27"/>
     <p:sldId id="508" r:id="rId28"/>
     <p:sldId id="523" r:id="rId29"/>
-    <p:sldId id="518" r:id="rId30"/>
-    <p:sldId id="519" r:id="rId31"/>
-    <p:sldId id="520" r:id="rId32"/>
-    <p:sldId id="521" r:id="rId33"/>
+    <p:sldId id="524" r:id="rId30"/>
+    <p:sldId id="525" r:id="rId31"/>
+    <p:sldId id="526" r:id="rId32"/>
+    <p:sldId id="527" r:id="rId33"/>
     <p:sldId id="370" r:id="rId34"/>
   </p:sldIdLst>
   <p:sldSz cx="9144000" cy="6858000" type="screen4x3"/>
@@ -1089,14 +1089,35 @@
         </dgm:presLayoutVars>
       </dgm:prSet>
       <dgm:spPr/>
+      <dgm:t>
+        <a:bodyPr/>
+        <a:lstStyle/>
+        <a:p>
+          <a:endParaRPr lang="en-US"/>
+        </a:p>
+      </dgm:t>
     </dgm:pt>
     <dgm:pt modelId="{4B5D39CA-8147-4B81-8770-5E31FC6D1CFB}" type="pres">
       <dgm:prSet presAssocID="{91D0FCC9-0385-42AC-A8E5-78283D5D669C}" presName="sibTrans" presStyleLbl="sibTrans2D1" presStyleIdx="0" presStyleCnt="3"/>
       <dgm:spPr/>
+      <dgm:t>
+        <a:bodyPr/>
+        <a:lstStyle/>
+        <a:p>
+          <a:endParaRPr lang="en-US"/>
+        </a:p>
+      </dgm:t>
     </dgm:pt>
     <dgm:pt modelId="{41341A21-0806-411D-A443-625FA97E4491}" type="pres">
       <dgm:prSet presAssocID="{91D0FCC9-0385-42AC-A8E5-78283D5D669C}" presName="connectorText" presStyleLbl="sibTrans2D1" presStyleIdx="0" presStyleCnt="3"/>
       <dgm:spPr/>
+      <dgm:t>
+        <a:bodyPr/>
+        <a:lstStyle/>
+        <a:p>
+          <a:endParaRPr lang="en-US"/>
+        </a:p>
+      </dgm:t>
     </dgm:pt>
     <dgm:pt modelId="{EA5BC1ED-EB03-45BA-BC56-621EEE9BEBD1}" type="pres">
       <dgm:prSet presAssocID="{92249E20-58D4-4E75-BB12-FE5FBD54F135}" presName="node" presStyleLbl="node1" presStyleIdx="1" presStyleCnt="4">
@@ -1105,14 +1126,35 @@
         </dgm:presLayoutVars>
       </dgm:prSet>
       <dgm:spPr/>
+      <dgm:t>
+        <a:bodyPr/>
+        <a:lstStyle/>
+        <a:p>
+          <a:endParaRPr lang="en-US"/>
+        </a:p>
+      </dgm:t>
     </dgm:pt>
     <dgm:pt modelId="{95B3EF49-35D3-4519-9F1F-B39D5A0566E4}" type="pres">
       <dgm:prSet presAssocID="{0B72DC99-4E95-4ADB-960C-E769354E6A5D}" presName="sibTrans" presStyleLbl="sibTrans2D1" presStyleIdx="1" presStyleCnt="3"/>
       <dgm:spPr/>
+      <dgm:t>
+        <a:bodyPr/>
+        <a:lstStyle/>
+        <a:p>
+          <a:endParaRPr lang="en-US"/>
+        </a:p>
+      </dgm:t>
     </dgm:pt>
     <dgm:pt modelId="{9B203DD1-3145-4590-8ACC-2517ACFE25A8}" type="pres">
       <dgm:prSet presAssocID="{0B72DC99-4E95-4ADB-960C-E769354E6A5D}" presName="connectorText" presStyleLbl="sibTrans2D1" presStyleIdx="1" presStyleCnt="3"/>
       <dgm:spPr/>
+      <dgm:t>
+        <a:bodyPr/>
+        <a:lstStyle/>
+        <a:p>
+          <a:endParaRPr lang="en-US"/>
+        </a:p>
+      </dgm:t>
     </dgm:pt>
     <dgm:pt modelId="{A37733E1-C31E-4430-AEEA-7CC4BDFAF84B}" type="pres">
       <dgm:prSet presAssocID="{38DD500D-6BEB-44F1-A480-39EBC85B7D1B}" presName="node" presStyleLbl="node1" presStyleIdx="2" presStyleCnt="4">
@@ -1121,14 +1163,35 @@
         </dgm:presLayoutVars>
       </dgm:prSet>
       <dgm:spPr/>
+      <dgm:t>
+        <a:bodyPr/>
+        <a:lstStyle/>
+        <a:p>
+          <a:endParaRPr lang="en-US"/>
+        </a:p>
+      </dgm:t>
     </dgm:pt>
     <dgm:pt modelId="{7300E7F4-ED3F-436A-A1F0-90BEABB46E71}" type="pres">
       <dgm:prSet presAssocID="{6D1E928F-781F-462C-A8AC-2A960BFDA67A}" presName="sibTrans" presStyleLbl="sibTrans2D1" presStyleIdx="2" presStyleCnt="3"/>
       <dgm:spPr/>
+      <dgm:t>
+        <a:bodyPr/>
+        <a:lstStyle/>
+        <a:p>
+          <a:endParaRPr lang="en-US"/>
+        </a:p>
+      </dgm:t>
     </dgm:pt>
     <dgm:pt modelId="{D7B13FD1-4A98-4993-ACFA-933B70FB5D81}" type="pres">
       <dgm:prSet presAssocID="{6D1E928F-781F-462C-A8AC-2A960BFDA67A}" presName="connectorText" presStyleLbl="sibTrans2D1" presStyleIdx="2" presStyleCnt="3"/>
       <dgm:spPr/>
+      <dgm:t>
+        <a:bodyPr/>
+        <a:lstStyle/>
+        <a:p>
+          <a:endParaRPr lang="en-US"/>
+        </a:p>
+      </dgm:t>
     </dgm:pt>
     <dgm:pt modelId="{F65F4BF1-A7B9-4C27-8B28-16C04C25982E}" type="pres">
       <dgm:prSet presAssocID="{764C4D4F-B7F7-4995-9F46-8E01C62C581B}" presName="node" presStyleLbl="node1" presStyleIdx="3" presStyleCnt="4">
@@ -1137,23 +1200,30 @@
         </dgm:presLayoutVars>
       </dgm:prSet>
       <dgm:spPr/>
+      <dgm:t>
+        <a:bodyPr/>
+        <a:lstStyle/>
+        <a:p>
+          <a:endParaRPr lang="en-US"/>
+        </a:p>
+      </dgm:t>
     </dgm:pt>
   </dgm:ptLst>
   <dgm:cxnLst>
+    <dgm:cxn modelId="{3EBFAACE-A4CF-4057-9EC8-3A59330D069F}" type="presOf" srcId="{69C95212-ACBD-498E-A011-59076A4285CB}" destId="{4D4E5D9B-DE30-46F3-864F-B20CBCB47B81}" srcOrd="0" destOrd="0" presId="urn:microsoft.com/office/officeart/2005/8/layout/process1"/>
+    <dgm:cxn modelId="{2D076695-4491-4B11-95EC-7786C59603C3}" type="presOf" srcId="{0B72DC99-4E95-4ADB-960C-E769354E6A5D}" destId="{95B3EF49-35D3-4519-9F1F-B39D5A0566E4}" srcOrd="0" destOrd="0" presId="urn:microsoft.com/office/officeart/2005/8/layout/process1"/>
+    <dgm:cxn modelId="{05EBE6A4-21D9-4E6D-96DC-9D3E50C88595}" type="presOf" srcId="{38DD500D-6BEB-44F1-A480-39EBC85B7D1B}" destId="{A37733E1-C31E-4430-AEEA-7CC4BDFAF84B}" srcOrd="0" destOrd="0" presId="urn:microsoft.com/office/officeart/2005/8/layout/process1"/>
+    <dgm:cxn modelId="{B7AF3A68-AEB3-4860-978B-B262BEBB9ECB}" type="presOf" srcId="{6D1E928F-781F-462C-A8AC-2A960BFDA67A}" destId="{7300E7F4-ED3F-436A-A1F0-90BEABB46E71}" srcOrd="0" destOrd="0" presId="urn:microsoft.com/office/officeart/2005/8/layout/process1"/>
+    <dgm:cxn modelId="{31005A28-3819-43FC-A794-27C122A41925}" srcId="{9496E0A2-784B-483A-9A32-E68AF617843D}" destId="{38DD500D-6BEB-44F1-A480-39EBC85B7D1B}" srcOrd="2" destOrd="0" parTransId="{3CE2BC79-A484-4240-A2CB-1BC232A1E53F}" sibTransId="{6D1E928F-781F-462C-A8AC-2A960BFDA67A}"/>
+    <dgm:cxn modelId="{01F09420-6EB0-4A7F-B4CE-2315FD06751C}" type="presOf" srcId="{6D1E928F-781F-462C-A8AC-2A960BFDA67A}" destId="{D7B13FD1-4A98-4993-ACFA-933B70FB5D81}" srcOrd="1" destOrd="0" presId="urn:microsoft.com/office/officeart/2005/8/layout/process1"/>
+    <dgm:cxn modelId="{1530AF90-D573-4EFA-A3BC-840C3370D71B}" srcId="{9496E0A2-784B-483A-9A32-E68AF617843D}" destId="{764C4D4F-B7F7-4995-9F46-8E01C62C581B}" srcOrd="3" destOrd="0" parTransId="{A6A82594-4016-4707-8656-642BA426B3D4}" sibTransId="{356D9044-9DCA-4929-92DF-A2BDE3B61A47}"/>
+    <dgm:cxn modelId="{D1CF8BBB-F3E6-4482-8B69-D1BE9774788E}" type="presOf" srcId="{91D0FCC9-0385-42AC-A8E5-78283D5D669C}" destId="{4B5D39CA-8147-4B81-8770-5E31FC6D1CFB}" srcOrd="0" destOrd="0" presId="urn:microsoft.com/office/officeart/2005/8/layout/process1"/>
+    <dgm:cxn modelId="{5E0FD1A2-149D-4CF9-AEE7-688223EDC542}" type="presOf" srcId="{764C4D4F-B7F7-4995-9F46-8E01C62C581B}" destId="{F65F4BF1-A7B9-4C27-8B28-16C04C25982E}" srcOrd="0" destOrd="0" presId="urn:microsoft.com/office/officeart/2005/8/layout/process1"/>
+    <dgm:cxn modelId="{79D506E8-F752-4BA4-B280-EF0BEBC86F63}" srcId="{9496E0A2-784B-483A-9A32-E68AF617843D}" destId="{92249E20-58D4-4E75-BB12-FE5FBD54F135}" srcOrd="1" destOrd="0" parTransId="{105B3AA3-CBE4-4ECA-BC44-B6DCA5E7A036}" sibTransId="{0B72DC99-4E95-4ADB-960C-E769354E6A5D}"/>
     <dgm:cxn modelId="{23BC981F-CC7C-4D5F-91BD-DE6EC72DB040}" srcId="{9496E0A2-784B-483A-9A32-E68AF617843D}" destId="{69C95212-ACBD-498E-A011-59076A4285CB}" srcOrd="0" destOrd="0" parTransId="{BF3D5BE3-835C-4027-9271-54CEA95A0702}" sibTransId="{91D0FCC9-0385-42AC-A8E5-78283D5D669C}"/>
-    <dgm:cxn modelId="{01F09420-6EB0-4A7F-B4CE-2315FD06751C}" type="presOf" srcId="{6D1E928F-781F-462C-A8AC-2A960BFDA67A}" destId="{D7B13FD1-4A98-4993-ACFA-933B70FB5D81}" srcOrd="1" destOrd="0" presId="urn:microsoft.com/office/officeart/2005/8/layout/process1"/>
-    <dgm:cxn modelId="{31005A28-3819-43FC-A794-27C122A41925}" srcId="{9496E0A2-784B-483A-9A32-E68AF617843D}" destId="{38DD500D-6BEB-44F1-A480-39EBC85B7D1B}" srcOrd="2" destOrd="0" parTransId="{3CE2BC79-A484-4240-A2CB-1BC232A1E53F}" sibTransId="{6D1E928F-781F-462C-A8AC-2A960BFDA67A}"/>
-    <dgm:cxn modelId="{B7AF3A68-AEB3-4860-978B-B262BEBB9ECB}" type="presOf" srcId="{6D1E928F-781F-462C-A8AC-2A960BFDA67A}" destId="{7300E7F4-ED3F-436A-A1F0-90BEABB46E71}" srcOrd="0" destOrd="0" presId="urn:microsoft.com/office/officeart/2005/8/layout/process1"/>
     <dgm:cxn modelId="{F4BB5269-9705-4D80-8BF8-3B73A8F8EE8D}" type="presOf" srcId="{91D0FCC9-0385-42AC-A8E5-78283D5D669C}" destId="{41341A21-0806-411D-A443-625FA97E4491}" srcOrd="1" destOrd="0" presId="urn:microsoft.com/office/officeart/2005/8/layout/process1"/>
     <dgm:cxn modelId="{FEAE6454-4E5D-4190-8A76-D27FC4FC4790}" type="presOf" srcId="{9496E0A2-784B-483A-9A32-E68AF617843D}" destId="{9EA8A120-7984-4A2B-9532-24393BA5D7A2}" srcOrd="0" destOrd="0" presId="urn:microsoft.com/office/officeart/2005/8/layout/process1"/>
     <dgm:cxn modelId="{F8BD9F76-8AA1-4A33-B686-C2C5DEA97305}" type="presOf" srcId="{0B72DC99-4E95-4ADB-960C-E769354E6A5D}" destId="{9B203DD1-3145-4590-8ACC-2517ACFE25A8}" srcOrd="1" destOrd="0" presId="urn:microsoft.com/office/officeart/2005/8/layout/process1"/>
-    <dgm:cxn modelId="{1530AF90-D573-4EFA-A3BC-840C3370D71B}" srcId="{9496E0A2-784B-483A-9A32-E68AF617843D}" destId="{764C4D4F-B7F7-4995-9F46-8E01C62C581B}" srcOrd="3" destOrd="0" parTransId="{A6A82594-4016-4707-8656-642BA426B3D4}" sibTransId="{356D9044-9DCA-4929-92DF-A2BDE3B61A47}"/>
-    <dgm:cxn modelId="{2D076695-4491-4B11-95EC-7786C59603C3}" type="presOf" srcId="{0B72DC99-4E95-4ADB-960C-E769354E6A5D}" destId="{95B3EF49-35D3-4519-9F1F-B39D5A0566E4}" srcOrd="0" destOrd="0" presId="urn:microsoft.com/office/officeart/2005/8/layout/process1"/>
-    <dgm:cxn modelId="{5E0FD1A2-149D-4CF9-AEE7-688223EDC542}" type="presOf" srcId="{764C4D4F-B7F7-4995-9F46-8E01C62C581B}" destId="{F65F4BF1-A7B9-4C27-8B28-16C04C25982E}" srcOrd="0" destOrd="0" presId="urn:microsoft.com/office/officeart/2005/8/layout/process1"/>
-    <dgm:cxn modelId="{05EBE6A4-21D9-4E6D-96DC-9D3E50C88595}" type="presOf" srcId="{38DD500D-6BEB-44F1-A480-39EBC85B7D1B}" destId="{A37733E1-C31E-4430-AEEA-7CC4BDFAF84B}" srcOrd="0" destOrd="0" presId="urn:microsoft.com/office/officeart/2005/8/layout/process1"/>
-    <dgm:cxn modelId="{D1CF8BBB-F3E6-4482-8B69-D1BE9774788E}" type="presOf" srcId="{91D0FCC9-0385-42AC-A8E5-78283D5D669C}" destId="{4B5D39CA-8147-4B81-8770-5E31FC6D1CFB}" srcOrd="0" destOrd="0" presId="urn:microsoft.com/office/officeart/2005/8/layout/process1"/>
-    <dgm:cxn modelId="{3EBFAACE-A4CF-4057-9EC8-3A59330D069F}" type="presOf" srcId="{69C95212-ACBD-498E-A011-59076A4285CB}" destId="{4D4E5D9B-DE30-46F3-864F-B20CBCB47B81}" srcOrd="0" destOrd="0" presId="urn:microsoft.com/office/officeart/2005/8/layout/process1"/>
-    <dgm:cxn modelId="{79D506E8-F752-4BA4-B280-EF0BEBC86F63}" srcId="{9496E0A2-784B-483A-9A32-E68AF617843D}" destId="{92249E20-58D4-4E75-BB12-FE5FBD54F135}" srcOrd="1" destOrd="0" parTransId="{105B3AA3-CBE4-4ECA-BC44-B6DCA5E7A036}" sibTransId="{0B72DC99-4E95-4ADB-960C-E769354E6A5D}"/>
     <dgm:cxn modelId="{099D99FB-52B2-434C-BA10-1675505A420B}" type="presOf" srcId="{92249E20-58D4-4E75-BB12-FE5FBD54F135}" destId="{EA5BC1ED-EB03-45BA-BC56-621EEE9BEBD1}" srcOrd="0" destOrd="0" presId="urn:microsoft.com/office/officeart/2005/8/layout/process1"/>
     <dgm:cxn modelId="{DA8115C2-D2F4-4CCB-9D90-0A509018B8F1}" type="presParOf" srcId="{9EA8A120-7984-4A2B-9532-24393BA5D7A2}" destId="{4D4E5D9B-DE30-46F3-864F-B20CBCB47B81}" srcOrd="0" destOrd="0" presId="urn:microsoft.com/office/officeart/2005/8/layout/process1"/>
     <dgm:cxn modelId="{0C3F32CC-6A85-4291-B66A-941971627454}" type="presParOf" srcId="{9EA8A120-7984-4A2B-9532-24393BA5D7A2}" destId="{4B5D39CA-8147-4B81-8770-5E31FC6D1CFB}" srcOrd="1" destOrd="0" presId="urn:microsoft.com/office/officeart/2005/8/layout/process1"/>
@@ -1241,7 +1311,7 @@
         </a:bodyPr>
         <a:lstStyle/>
         <a:p>
-          <a:pPr marL="0" lvl="0" indent="0" algn="ctr" defTabSz="844550">
+          <a:pPr lvl="0" algn="ctr" defTabSz="844550">
             <a:lnSpc>
               <a:spcPct val="90000"/>
             </a:lnSpc>
@@ -1251,7 +1321,6 @@
             <a:spcAft>
               <a:spcPct val="35000"/>
             </a:spcAft>
-            <a:buNone/>
           </a:pPr>
           <a:r>
             <a:rPr lang="en-US" sz="1900" kern="1200"/>
@@ -1314,7 +1383,7 @@
         </a:bodyPr>
         <a:lstStyle/>
         <a:p>
-          <a:pPr marL="0" lvl="0" indent="0" algn="ctr" defTabSz="666750">
+          <a:pPr lvl="0" algn="ctr" defTabSz="666750">
             <a:lnSpc>
               <a:spcPct val="90000"/>
             </a:lnSpc>
@@ -1324,7 +1393,6 @@
             <a:spcAft>
               <a:spcPct val="35000"/>
             </a:spcAft>
-            <a:buNone/>
           </a:pPr>
           <a:endParaRPr lang="en-US" sz="1500" kern="1200"/>
         </a:p>
@@ -1386,7 +1454,7 @@
         </a:bodyPr>
         <a:lstStyle/>
         <a:p>
-          <a:pPr marL="0" lvl="0" indent="0" algn="ctr" defTabSz="844550">
+          <a:pPr lvl="0" algn="ctr" defTabSz="844550">
             <a:lnSpc>
               <a:spcPct val="90000"/>
             </a:lnSpc>
@@ -1396,7 +1464,6 @@
             <a:spcAft>
               <a:spcPct val="35000"/>
             </a:spcAft>
-            <a:buNone/>
           </a:pPr>
           <a:r>
             <a:rPr lang="en-US" sz="1900" kern="1200"/>
@@ -1459,7 +1526,7 @@
         </a:bodyPr>
         <a:lstStyle/>
         <a:p>
-          <a:pPr marL="0" lvl="0" indent="0" algn="ctr" defTabSz="666750">
+          <a:pPr lvl="0" algn="ctr" defTabSz="666750">
             <a:lnSpc>
               <a:spcPct val="90000"/>
             </a:lnSpc>
@@ -1469,7 +1536,6 @@
             <a:spcAft>
               <a:spcPct val="35000"/>
             </a:spcAft>
-            <a:buNone/>
           </a:pPr>
           <a:endParaRPr lang="en-US" sz="1500" kern="1200"/>
         </a:p>
@@ -1531,7 +1597,7 @@
         </a:bodyPr>
         <a:lstStyle/>
         <a:p>
-          <a:pPr marL="0" lvl="0" indent="0" algn="ctr" defTabSz="844550">
+          <a:pPr lvl="0" algn="ctr" defTabSz="844550">
             <a:lnSpc>
               <a:spcPct val="90000"/>
             </a:lnSpc>
@@ -1541,7 +1607,6 @@
             <a:spcAft>
               <a:spcPct val="35000"/>
             </a:spcAft>
-            <a:buNone/>
           </a:pPr>
           <a:r>
             <a:rPr lang="en-US" sz="1900" kern="1200"/>
@@ -1604,7 +1669,7 @@
         </a:bodyPr>
         <a:lstStyle/>
         <a:p>
-          <a:pPr marL="0" lvl="0" indent="0" algn="ctr" defTabSz="666750">
+          <a:pPr lvl="0" algn="ctr" defTabSz="666750">
             <a:lnSpc>
               <a:spcPct val="90000"/>
             </a:lnSpc>
@@ -1614,7 +1679,6 @@
             <a:spcAft>
               <a:spcPct val="35000"/>
             </a:spcAft>
-            <a:buNone/>
           </a:pPr>
           <a:endParaRPr lang="en-US" sz="1500" kern="1200"/>
         </a:p>
@@ -1681,7 +1745,7 @@
         </a:bodyPr>
         <a:lstStyle/>
         <a:p>
-          <a:pPr marL="0" lvl="0" indent="0" algn="ctr" defTabSz="844550">
+          <a:pPr lvl="0" algn="ctr" defTabSz="844550">
             <a:lnSpc>
               <a:spcPct val="90000"/>
             </a:lnSpc>
@@ -1691,7 +1755,6 @@
             <a:spcAft>
               <a:spcPct val="35000"/>
             </a:spcAft>
-            <a:buNone/>
           </a:pPr>
           <a:r>
             <a:rPr lang="en-US" sz="1900" kern="1200"/>
@@ -2970,7 +3033,7 @@
           <a:p>
             <a:fld id="{43F1A4C9-FB5C-B247-A357-650712A3F0A8}" type="datetimeFigureOut">
               <a:rPr lang="en-US" smtClean="0"/>
-              <a:t>10/31/2020</a:t>
+              <a:t>11/1/2020</a:t>
             </a:fld>
             <a:endParaRPr lang="en-US" dirty="0"/>
           </a:p>
@@ -3135,7 +3198,7 @@
           <a:p>
             <a:fld id="{EA4960E5-F060-4C88-B1C5-5A6F5890BEF6}" type="datetimeFigureOut">
               <a:rPr lang="en-SG" smtClean="0"/>
-              <a:t>31/10/2020</a:t>
+              <a:t>11/1/2020</a:t>
             </a:fld>
             <a:endParaRPr lang="en-SG" dirty="0"/>
           </a:p>
@@ -10079,7 +10142,7 @@
           <a:graphicData uri="http://schemas.openxmlformats.org/presentationml/2006/ole">
             <mc:AlternateContent xmlns:mc="http://schemas.openxmlformats.org/markup-compatibility/2006">
               <mc:Choice xmlns:v="urn:schemas-microsoft-com:vml" Requires="v">
-                <p:oleObj spid="_x0000_s2084" name="Bitmap Image" r:id="rId3" imgW="5014395" imgH="4572396" progId="Paint.Picture">
+                <p:oleObj spid="_x0000_s2085" name="Bitmap Image" r:id="rId3" imgW="5014395" imgH="4572396" progId="Paint.Picture">
                   <p:embed/>
                 </p:oleObj>
               </mc:Choice>
@@ -10460,7 +10523,7 @@
           <a:graphicData uri="http://schemas.openxmlformats.org/presentationml/2006/ole">
             <mc:AlternateContent xmlns:mc="http://schemas.openxmlformats.org/markup-compatibility/2006">
               <mc:Choice xmlns:v="urn:schemas-microsoft-com:vml" Requires="v">
-                <p:oleObj spid="_x0000_s6166" name="Bitmap Image" r:id="rId3" imgW="4915326" imgH="3505504" progId="Paint.Picture">
+                <p:oleObj spid="_x0000_s6167" name="Bitmap Image" r:id="rId3" imgW="4915326" imgH="3505504" progId="Paint.Picture">
                   <p:embed/>
                 </p:oleObj>
               </mc:Choice>
@@ -12486,7 +12549,7 @@
     </p:spTree>
     <p:extLst>
       <p:ext uri="{BB962C8B-B14F-4D97-AF65-F5344CB8AC3E}">
-        <p14:creationId xmlns:p14="http://schemas.microsoft.com/office/powerpoint/2010/main" val="1199322699"/>
+        <p14:creationId xmlns:p14="http://schemas.microsoft.com/office/powerpoint/2010/main" val="501727066"/>
       </p:ext>
     </p:extLst>
   </p:cSld>
@@ -12706,99 +12769,166 @@
         <p:spPr/>
         <p:txBody>
           <a:bodyPr>
-            <a:normAutofit/>
+            <a:normAutofit fontScale="92500" lnSpcReduction="10000"/>
           </a:bodyPr>
           <a:lstStyle/>
           <a:p>
+            <a:r>
+              <a:rPr lang="en-US" dirty="0" smtClean="0">
+                <a:solidFill>
+                  <a:schemeClr val="tx1"/>
+                </a:solidFill>
+              </a:rPr>
+              <a:t>Open3D 3D Mesh</a:t>
+            </a:r>
+          </a:p>
+          <a:p>
+            <a:pPr lvl="1">
+              <a:buFont typeface="Wingdings" panose="05000000000000000000" pitchFamily="2" charset="2"/>
+              <a:buChar char="Ø"/>
+            </a:pPr>
             <a:r>
               <a:rPr lang="en-US" dirty="0">
                 <a:solidFill>
                   <a:schemeClr val="tx1"/>
                 </a:solidFill>
               </a:rPr>
-              <a:t>Input Data</a:t>
-            </a:r>
-          </a:p>
-          <a:p>
-            <a:pPr lvl="1"/>
+              <a:t>Grayscale 2D </a:t>
+            </a:r>
+            <a:r>
+              <a:rPr lang="en-US" dirty="0" smtClean="0">
+                <a:solidFill>
+                  <a:schemeClr val="tx1"/>
+                </a:solidFill>
+              </a:rPr>
+              <a:t>map</a:t>
+            </a:r>
+          </a:p>
+          <a:p>
+            <a:r>
+              <a:rPr lang="en-US" dirty="0" smtClean="0">
+                <a:solidFill>
+                  <a:schemeClr val="tx1"/>
+                </a:solidFill>
+              </a:rPr>
+              <a:t> Input Parameters</a:t>
+            </a:r>
+          </a:p>
+          <a:p>
+            <a:pPr lvl="1">
+              <a:buFont typeface="Wingdings" panose="05000000000000000000" pitchFamily="2" charset="2"/>
+              <a:buChar char="Ø"/>
+            </a:pPr>
+            <a:r>
+              <a:rPr lang="en-US" dirty="0" smtClean="0">
+                <a:solidFill>
+                  <a:schemeClr val="tx1"/>
+                </a:solidFill>
+              </a:rPr>
+              <a:t>Received from Backend Services</a:t>
+            </a:r>
+          </a:p>
+          <a:p>
+            <a:pPr lvl="1">
+              <a:buFont typeface="Wingdings" panose="05000000000000000000" pitchFamily="2" charset="2"/>
+              <a:buChar char="Ø"/>
+            </a:pPr>
+            <a:r>
+              <a:rPr lang="en-US" dirty="0" smtClean="0">
+                <a:solidFill>
+                  <a:schemeClr val="tx1"/>
+                </a:solidFill>
+              </a:rPr>
+              <a:t>Contain</a:t>
+            </a:r>
+          </a:p>
+          <a:p>
+            <a:pPr lvl="2"/>
+            <a:r>
+              <a:rPr lang="en-US" dirty="0" smtClean="0">
+                <a:solidFill>
+                  <a:schemeClr val="tx1"/>
+                </a:solidFill>
+              </a:rPr>
+              <a:t>Position</a:t>
+            </a:r>
+          </a:p>
+          <a:p>
+            <a:pPr lvl="2"/>
+            <a:r>
+              <a:rPr lang="en-US" smtClean="0">
+                <a:solidFill>
+                  <a:schemeClr val="tx1"/>
+                </a:solidFill>
+              </a:rPr>
+              <a:t>Orientation</a:t>
+            </a:r>
+            <a:endParaRPr lang="en-US" dirty="0" smtClean="0">
+              <a:solidFill>
+                <a:schemeClr val="tx1"/>
+              </a:solidFill>
+            </a:endParaRPr>
+          </a:p>
+          <a:p>
+            <a:r>
+              <a:rPr lang="en-US" dirty="0" smtClean="0">
+                <a:solidFill>
+                  <a:schemeClr val="tx1"/>
+                </a:solidFill>
+              </a:rPr>
+              <a:t>Output </a:t>
+            </a:r>
             <a:r>
               <a:rPr lang="en-US" dirty="0">
                 <a:solidFill>
                   <a:schemeClr val="tx1"/>
                 </a:solidFill>
               </a:rPr>
-              <a:t>Grayscale 2D map</a:t>
-            </a:r>
-          </a:p>
-          <a:p>
-            <a:pPr lvl="1"/>
+              <a:t>Views</a:t>
+            </a:r>
+          </a:p>
+          <a:p>
+            <a:pPr lvl="1">
+              <a:buFont typeface="Wingdings" panose="05000000000000000000" pitchFamily="2" charset="2"/>
+              <a:buChar char="Ø"/>
+            </a:pPr>
+            <a:r>
+              <a:rPr lang="en-US" dirty="0" smtClean="0">
+                <a:solidFill>
+                  <a:schemeClr val="tx1"/>
+                </a:solidFill>
+              </a:rPr>
+              <a:t>2D Map</a:t>
+            </a:r>
+            <a:endParaRPr lang="en-US" dirty="0">
+              <a:solidFill>
+                <a:schemeClr val="tx1"/>
+              </a:solidFill>
+            </a:endParaRPr>
+          </a:p>
+          <a:p>
+            <a:pPr lvl="1">
+              <a:buFont typeface="Wingdings" panose="05000000000000000000" pitchFamily="2" charset="2"/>
+              <a:buChar char="Ø"/>
+            </a:pPr>
             <a:r>
               <a:rPr lang="en-US" dirty="0">
                 <a:solidFill>
                   <a:schemeClr val="tx1"/>
                 </a:solidFill>
               </a:rPr>
-              <a:t>Robot localization</a:t>
-            </a:r>
-          </a:p>
-          <a:p>
-            <a:pPr lvl="2"/>
-            <a:r>
-              <a:rPr lang="en-US" dirty="0">
+              <a:t>Front / Rear </a:t>
+            </a:r>
+            <a:r>
+              <a:rPr lang="en-US" dirty="0" smtClean="0">
                 <a:solidFill>
                   <a:schemeClr val="tx1"/>
                 </a:solidFill>
               </a:rPr>
-              <a:t>robot position</a:t>
-            </a:r>
-          </a:p>
-          <a:p>
-            <a:pPr lvl="2"/>
-            <a:r>
-              <a:rPr lang="en-US" dirty="0">
-                <a:solidFill>
-                  <a:schemeClr val="tx1"/>
-                </a:solidFill>
-              </a:rPr>
-              <a:t>orientation</a:t>
-            </a:r>
-            <a:endParaRPr lang="en-SG" dirty="0">
-              <a:solidFill>
-                <a:schemeClr val="tx1"/>
-              </a:solidFill>
-            </a:endParaRPr>
-          </a:p>
-          <a:p>
-            <a:r>
-              <a:rPr lang="en-US" dirty="0">
-                <a:solidFill>
-                  <a:schemeClr val="tx1"/>
-                </a:solidFill>
-              </a:rPr>
-              <a:t>Output Views</a:t>
-            </a:r>
-          </a:p>
-          <a:p>
-            <a:pPr lvl="1"/>
-            <a:r>
-              <a:rPr lang="en-US" dirty="0">
-                <a:solidFill>
-                  <a:schemeClr val="tx1"/>
-                </a:solidFill>
-              </a:rPr>
-              <a:t>Map</a:t>
-            </a:r>
-          </a:p>
-          <a:p>
-            <a:pPr lvl="1"/>
-            <a:r>
-              <a:rPr lang="en-US" dirty="0">
-                <a:solidFill>
-                  <a:schemeClr val="tx1"/>
-                </a:solidFill>
-              </a:rPr>
-              <a:t>Front / Rear View</a:t>
-            </a:r>
+              <a:t>View</a:t>
+            </a:r>
+          </a:p>
+          <a:p>
             <a:endParaRPr lang="en-SG" dirty="0">
               <a:solidFill>
                 <a:schemeClr val="tx1"/>
@@ -12869,7 +12999,7 @@
         </p:blipFill>
         <p:spPr>
           <a:xfrm>
-            <a:off x="5168692" y="1242516"/>
+            <a:off x="6126188" y="1116883"/>
             <a:ext cx="1861321" cy="2213273"/>
           </a:xfrm>
           <a:prstGeom prst="rect">
@@ -12891,7 +13021,7 @@
         </p:blipFill>
         <p:spPr>
           <a:xfrm>
-            <a:off x="4998720" y="3264831"/>
+            <a:off x="5276517" y="3409827"/>
             <a:ext cx="2710992" cy="2423756"/>
           </a:xfrm>
           <a:prstGeom prst="rect">
@@ -12902,7 +13032,7 @@
     </p:spTree>
     <p:extLst>
       <p:ext uri="{BB962C8B-B14F-4D97-AF65-F5344CB8AC3E}">
-        <p14:creationId xmlns:p14="http://schemas.microsoft.com/office/powerpoint/2010/main" val="2599344292"/>
+        <p14:creationId xmlns:p14="http://schemas.microsoft.com/office/powerpoint/2010/main" val="1823497535"/>
       </p:ext>
     </p:extLst>
   </p:cSld>
@@ -12994,35 +13124,56 @@
           </a:p>
           <a:p>
             <a:r>
-              <a:rPr lang="en-US" dirty="0">
+              <a:rPr lang="en-US" dirty="0" smtClean="0">
                 <a:solidFill>
                   <a:schemeClr val="tx1"/>
                 </a:solidFill>
               </a:rPr>
-              <a:t>Robot Simulation</a:t>
-            </a:r>
-          </a:p>
-          <a:p>
-            <a:pPr lvl="1"/>
-            <a:r>
-              <a:rPr lang="en-US" dirty="0">
+              <a:t>Simulation</a:t>
+            </a:r>
+            <a:endParaRPr lang="en-US" dirty="0">
+              <a:solidFill>
+                <a:schemeClr val="tx1"/>
+              </a:solidFill>
+            </a:endParaRPr>
+          </a:p>
+          <a:p>
+            <a:pPr lvl="1">
+              <a:buFont typeface="Wingdings" panose="05000000000000000000" pitchFamily="2" charset="2"/>
+              <a:buChar char="Ø"/>
+            </a:pPr>
+            <a:r>
+              <a:rPr lang="en-US" dirty="0" smtClean="0">
                 <a:solidFill>
                   <a:schemeClr val="tx1"/>
                 </a:solidFill>
               </a:rPr>
               <a:t>Position</a:t>
             </a:r>
-          </a:p>
-          <a:p>
-            <a:pPr lvl="1"/>
-            <a:r>
-              <a:rPr lang="en-US" dirty="0">
+            <a:endParaRPr lang="en-US" dirty="0">
+              <a:solidFill>
+                <a:schemeClr val="tx1"/>
+              </a:solidFill>
+            </a:endParaRPr>
+          </a:p>
+          <a:p>
+            <a:pPr lvl="1">
+              <a:buFont typeface="Wingdings" panose="05000000000000000000" pitchFamily="2" charset="2"/>
+              <a:buChar char="Ø"/>
+            </a:pPr>
+            <a:r>
+              <a:rPr lang="en-US" dirty="0" smtClean="0">
                 <a:solidFill>
                   <a:schemeClr val="tx1"/>
                 </a:solidFill>
               </a:rPr>
               <a:t>Orientation</a:t>
             </a:r>
+            <a:endParaRPr lang="en-US" dirty="0">
+              <a:solidFill>
+                <a:schemeClr val="tx1"/>
+              </a:solidFill>
+            </a:endParaRPr>
           </a:p>
           <a:p>
             <a:r>
@@ -13035,18 +13186,29 @@
             </a:r>
           </a:p>
           <a:p>
-            <a:pPr lvl="1"/>
-            <a:r>
-              <a:rPr lang="en-US" dirty="0">
+            <a:pPr lvl="1">
+              <a:buFont typeface="Wingdings" panose="05000000000000000000" pitchFamily="2" charset="2"/>
+              <a:buChar char="Ø"/>
+            </a:pPr>
+            <a:r>
+              <a:rPr lang="en-US" dirty="0" smtClean="0">
                 <a:solidFill>
                   <a:schemeClr val="tx1"/>
                 </a:solidFill>
               </a:rPr>
-              <a:t>Map</a:t>
-            </a:r>
-          </a:p>
-          <a:p>
-            <a:pPr lvl="1"/>
+              <a:t>Map View</a:t>
+            </a:r>
+            <a:endParaRPr lang="en-US" dirty="0">
+              <a:solidFill>
+                <a:schemeClr val="tx1"/>
+              </a:solidFill>
+            </a:endParaRPr>
+          </a:p>
+          <a:p>
+            <a:pPr lvl="1">
+              <a:buFont typeface="Wingdings" panose="05000000000000000000" pitchFamily="2" charset="2"/>
+              <a:buChar char="Ø"/>
+            </a:pPr>
             <a:r>
               <a:rPr lang="en-US" dirty="0">
                 <a:solidFill>
@@ -13141,7 +13303,7 @@
     </p:spTree>
     <p:extLst>
       <p:ext uri="{BB962C8B-B14F-4D97-AF65-F5344CB8AC3E}">
-        <p14:creationId xmlns:p14="http://schemas.microsoft.com/office/powerpoint/2010/main" val="4110882693"/>
+        <p14:creationId xmlns:p14="http://schemas.microsoft.com/office/powerpoint/2010/main" val="767067021"/>
       </p:ext>
     </p:extLst>
   </p:cSld>
@@ -13185,7 +13347,11 @@
           <a:p>
             <a:r>
               <a:rPr lang="en-US" dirty="0"/>
-              <a:t>Future Usage</a:t>
+              <a:t>Future </a:t>
+            </a:r>
+            <a:r>
+              <a:rPr lang="en-US" dirty="0" smtClean="0"/>
+              <a:t>Work</a:t>
             </a:r>
             <a:endParaRPr lang="en-SG" dirty="0"/>
           </a:p>
@@ -13204,150 +13370,85 @@
         <p:spPr/>
         <p:txBody>
           <a:bodyPr>
-            <a:normAutofit fontScale="55000" lnSpcReduction="20000"/>
+            <a:normAutofit fontScale="85000" lnSpcReduction="20000"/>
           </a:bodyPr>
           <a:lstStyle/>
           <a:p>
             <a:r>
-              <a:rPr lang="en-US" dirty="0">
+              <a:rPr lang="en-SG" dirty="0" smtClean="0">
                 <a:solidFill>
                   <a:schemeClr val="tx1"/>
                 </a:solidFill>
               </a:rPr>
-              <a:t>Localization Algorithms</a:t>
-            </a:r>
-          </a:p>
-          <a:p>
-            <a:pPr lvl="1"/>
-            <a:r>
-              <a:rPr lang="en-US" dirty="0">
-                <a:solidFill>
-                  <a:schemeClr val="tx1"/>
-                </a:solidFill>
-              </a:rPr>
-              <a:t>Monte Carlo Localization (MCL)</a:t>
-            </a:r>
-          </a:p>
-          <a:p>
-            <a:pPr lvl="2"/>
-            <a:r>
-              <a:rPr lang="en-US" dirty="0">
-                <a:solidFill>
-                  <a:schemeClr val="tx1"/>
-                </a:solidFill>
-              </a:rPr>
-              <a:t>Most popular in robot localization</a:t>
-            </a:r>
-          </a:p>
-          <a:p>
-            <a:pPr lvl="2"/>
-            <a:r>
-              <a:rPr lang="en-US" dirty="0">
-                <a:solidFill>
-                  <a:schemeClr val="tx1"/>
-                </a:solidFill>
-              </a:rPr>
-              <a:t>Also referred to as Particle Filter</a:t>
-            </a:r>
-          </a:p>
-          <a:p>
-            <a:pPr lvl="2"/>
-            <a:r>
-              <a:rPr lang="en-US" dirty="0">
-                <a:solidFill>
-                  <a:schemeClr val="tx1"/>
-                </a:solidFill>
-              </a:rPr>
-              <a:t>Relies on </a:t>
-            </a:r>
-          </a:p>
-          <a:p>
-            <a:pPr lvl="3"/>
-            <a:r>
-              <a:rPr lang="en-US" dirty="0">
-                <a:solidFill>
-                  <a:schemeClr val="tx1"/>
-                </a:solidFill>
-              </a:rPr>
-              <a:t>Accurate Environment Map</a:t>
-            </a:r>
-          </a:p>
-          <a:p>
-            <a:pPr lvl="3"/>
-            <a:r>
-              <a:rPr lang="en-US" dirty="0">
-                <a:solidFill>
-                  <a:schemeClr val="tx1"/>
-                </a:solidFill>
-              </a:rPr>
-              <a:t>Particle position and orientation</a:t>
-            </a:r>
-          </a:p>
-          <a:p>
-            <a:pPr lvl="1"/>
-            <a:r>
-              <a:rPr lang="en-US" dirty="0">
-                <a:solidFill>
-                  <a:schemeClr val="tx1"/>
-                </a:solidFill>
-              </a:rPr>
-              <a:t>Adaptive Monte Carlo Localization (AMCL)</a:t>
-            </a:r>
-          </a:p>
-          <a:p>
-            <a:pPr lvl="2"/>
-            <a:r>
-              <a:rPr lang="en-US" dirty="0">
-                <a:solidFill>
-                  <a:schemeClr val="tx1"/>
-                </a:solidFill>
-              </a:rPr>
-              <a:t>Improved version of MCL</a:t>
-            </a:r>
-          </a:p>
-          <a:p>
-            <a:pPr lvl="2"/>
-            <a:endParaRPr lang="en-US" dirty="0">
-              <a:solidFill>
-                <a:schemeClr val="tx1"/>
-              </a:solidFill>
-            </a:endParaRPr>
-          </a:p>
-          <a:p>
+              <a:t>Improvement on </a:t>
+            </a:r>
             <a:r>
               <a:rPr lang="en-SG" dirty="0">
                 <a:solidFill>
                   <a:schemeClr val="tx1"/>
                 </a:solidFill>
               </a:rPr>
-              <a:t>Deep Neural Network Robotic Mapping</a:t>
-            </a:r>
-          </a:p>
-          <a:p>
-            <a:pPr lvl="1"/>
-            <a:r>
-              <a:rPr lang="en-US" dirty="0">
+              <a:t>reduced edge </a:t>
+            </a:r>
+            <a:r>
+              <a:rPr lang="en-SG" dirty="0" smtClean="0">
                 <a:solidFill>
                   <a:schemeClr val="tx1"/>
                 </a:solidFill>
               </a:rPr>
-              <a:t>Produces more accuracy map</a:t>
-            </a:r>
-          </a:p>
-          <a:p>
-            <a:pPr lvl="2"/>
-            <a:r>
-              <a:rPr lang="en-US" dirty="0">
+              <a:t>noises</a:t>
+            </a:r>
+          </a:p>
+          <a:p>
+            <a:pPr lvl="1">
+              <a:buFont typeface="Wingdings" panose="05000000000000000000" pitchFamily="2" charset="2"/>
+              <a:buChar char="Ø"/>
+            </a:pPr>
+            <a:r>
+              <a:rPr lang="en-SG" dirty="0" smtClean="0">
                 <a:solidFill>
                   <a:schemeClr val="tx1"/>
                 </a:solidFill>
               </a:rPr>
-              <a:t>Comparing with traditional approach such as k-means</a:t>
-            </a:r>
-          </a:p>
-          <a:p>
-            <a:pPr lvl="2"/>
-            <a:endParaRPr lang="en-US" dirty="0">
+              <a:t>Edge noises due </a:t>
+            </a:r>
+            <a:r>
+              <a:rPr lang="en-SG" smtClean="0">
+                <a:solidFill>
+                  <a:schemeClr val="tx1"/>
+                </a:solidFill>
+              </a:rPr>
+              <a:t>to 1024 </a:t>
+            </a:r>
+            <a:r>
+              <a:rPr lang="en-SG" dirty="0" smtClean="0">
+                <a:solidFill>
+                  <a:schemeClr val="tx1"/>
+                </a:solidFill>
+              </a:rPr>
+              <a:t>x 1024 grid</a:t>
+            </a:r>
+          </a:p>
+          <a:p>
+            <a:pPr lvl="1">
+              <a:buFont typeface="Wingdings" panose="05000000000000000000" pitchFamily="2" charset="2"/>
+              <a:buChar char="Ø"/>
+            </a:pPr>
+            <a:r>
+              <a:rPr lang="en-SG" dirty="0" smtClean="0">
+                <a:solidFill>
+                  <a:schemeClr val="tx1"/>
+                </a:solidFill>
+              </a:rPr>
+              <a:t>Optimizing with different padding size and grid size </a:t>
+            </a:r>
+          </a:p>
+          <a:p>
+            <a:pPr lvl="1">
+              <a:buFont typeface="Wingdings" panose="05000000000000000000" pitchFamily="2" charset="2"/>
+              <a:buChar char="Ø"/>
+            </a:pPr>
+            <a:endParaRPr lang="en-SG" dirty="0">
               <a:solidFill>
                 <a:schemeClr val="tx1"/>
               </a:solidFill>
@@ -13355,12 +13456,12 @@
           </a:p>
           <a:p>
             <a:r>
-              <a:rPr lang="en-US" dirty="0">
+              <a:rPr lang="en-SG" dirty="0" smtClean="0">
                 <a:solidFill>
                   <a:schemeClr val="tx1"/>
                 </a:solidFill>
               </a:rPr>
-              <a:t>Therefore, </a:t>
+              <a:t>Reduce GPU power with </a:t>
             </a:r>
             <a:r>
               <a:rPr lang="en-SG" dirty="0">
@@ -13368,15 +13469,90 @@
                   <a:schemeClr val="tx1"/>
                 </a:solidFill>
               </a:rPr>
-              <a:t>Deep Neural Network Robotic Mapping will benefit </a:t>
-            </a:r>
-            <a:r>
-              <a:rPr lang="en-US" dirty="0">
+              <a:t>MobileNetV2</a:t>
+            </a:r>
+            <a:endParaRPr lang="en-SG" dirty="0" smtClean="0">
+              <a:solidFill>
+                <a:schemeClr val="tx1"/>
+              </a:solidFill>
+            </a:endParaRPr>
+          </a:p>
+          <a:p>
+            <a:pPr lvl="1">
+              <a:buFont typeface="Wingdings" panose="05000000000000000000" pitchFamily="2" charset="2"/>
+              <a:buChar char="Ø"/>
+            </a:pPr>
+            <a:r>
+              <a:rPr lang="en-SG" dirty="0" smtClean="0">
                 <a:solidFill>
                   <a:schemeClr val="tx1"/>
                 </a:solidFill>
               </a:rPr>
-              <a:t>AMCL with more accurate </a:t>
+              <a:t>MobileNetV2 advantages</a:t>
+            </a:r>
+          </a:p>
+          <a:p>
+            <a:pPr lvl="2"/>
+            <a:r>
+              <a:rPr lang="en-SG" dirty="0" smtClean="0">
+                <a:solidFill>
+                  <a:schemeClr val="tx1"/>
+                </a:solidFill>
+              </a:rPr>
+              <a:t>Fewer parameters</a:t>
+            </a:r>
+          </a:p>
+          <a:p>
+            <a:pPr lvl="2"/>
+            <a:r>
+              <a:rPr lang="en-SG" dirty="0" smtClean="0">
+                <a:solidFill>
+                  <a:schemeClr val="tx1"/>
+                </a:solidFill>
+              </a:rPr>
+              <a:t>Mobile platform support </a:t>
+            </a:r>
+          </a:p>
+          <a:p>
+            <a:pPr marL="804824" lvl="2" indent="0">
+              <a:buNone/>
+            </a:pPr>
+            <a:r>
+              <a:rPr lang="en-SG" dirty="0" smtClean="0">
+                <a:solidFill>
+                  <a:schemeClr val="tx1"/>
+                </a:solidFill>
+              </a:rPr>
+              <a:t> </a:t>
+            </a:r>
+            <a:endParaRPr lang="en-SG" dirty="0">
+              <a:solidFill>
+                <a:schemeClr val="tx1"/>
+              </a:solidFill>
+            </a:endParaRPr>
+          </a:p>
+          <a:p>
+            <a:r>
+              <a:rPr lang="en-SG" dirty="0" smtClean="0">
+                <a:solidFill>
+                  <a:schemeClr val="tx1"/>
+                </a:solidFill>
+              </a:rPr>
+              <a:t>Implement ROS packages</a:t>
+            </a:r>
+          </a:p>
+          <a:p>
+            <a:pPr lvl="1">
+              <a:buFont typeface="Wingdings" panose="05000000000000000000" pitchFamily="2" charset="2"/>
+              <a:buChar char="Ø"/>
+            </a:pPr>
+            <a:r>
+              <a:rPr lang="en-SG" dirty="0" smtClean="0">
+                <a:solidFill>
+                  <a:schemeClr val="tx1"/>
+                </a:solidFill>
+              </a:rPr>
+              <a:t>Reduce time </a:t>
             </a:r>
             <a:r>
               <a:rPr lang="en-SG" dirty="0">
@@ -13384,9 +13560,36 @@
                   <a:schemeClr val="tx1"/>
                 </a:solidFill>
               </a:rPr>
-              <a:t>map, and will provide map when map is not available</a:t>
-            </a:r>
-            <a:endParaRPr lang="en-US" dirty="0">
+              <a:t>and </a:t>
+            </a:r>
+            <a:r>
+              <a:rPr lang="en-SG" dirty="0" smtClean="0">
+                <a:solidFill>
+                  <a:schemeClr val="tx1"/>
+                </a:solidFill>
+              </a:rPr>
+              <a:t>effort for utilizing </a:t>
+            </a:r>
+            <a:r>
+              <a:rPr lang="en-SG" dirty="0" err="1" smtClean="0">
+                <a:solidFill>
+                  <a:schemeClr val="tx1"/>
+                </a:solidFill>
+              </a:rPr>
+              <a:t>Keras</a:t>
+            </a:r>
+            <a:r>
+              <a:rPr lang="en-SG" dirty="0" smtClean="0">
+                <a:solidFill>
+                  <a:schemeClr val="tx1"/>
+                </a:solidFill>
+              </a:rPr>
+              <a:t> neural network solution</a:t>
+            </a:r>
+          </a:p>
+          <a:p>
+            <a:pPr lvl="1"/>
+            <a:endParaRPr lang="en-SG" dirty="0" smtClean="0">
               <a:solidFill>
                 <a:schemeClr val="tx1"/>
               </a:solidFill>
@@ -13448,7 +13651,7 @@
     </p:spTree>
     <p:extLst>
       <p:ext uri="{BB962C8B-B14F-4D97-AF65-F5344CB8AC3E}">
-        <p14:creationId xmlns:p14="http://schemas.microsoft.com/office/powerpoint/2010/main" val="1383113111"/>
+        <p14:creationId xmlns:p14="http://schemas.microsoft.com/office/powerpoint/2010/main" val="2448486839"/>
       </p:ext>
     </p:extLst>
   </p:cSld>

</xml_diff>

<commit_message>
Update design diagram and visualization part;
</commit_message>
<xml_diff>
--- a/PracticeModule_Presentation.pptx
+++ b/PracticeModule_Presentation.pptx
@@ -1089,14 +1089,35 @@
         </dgm:presLayoutVars>
       </dgm:prSet>
       <dgm:spPr/>
+      <dgm:t>
+        <a:bodyPr/>
+        <a:lstStyle/>
+        <a:p>
+          <a:endParaRPr lang="en-US"/>
+        </a:p>
+      </dgm:t>
     </dgm:pt>
     <dgm:pt modelId="{4B5D39CA-8147-4B81-8770-5E31FC6D1CFB}" type="pres">
       <dgm:prSet presAssocID="{91D0FCC9-0385-42AC-A8E5-78283D5D669C}" presName="sibTrans" presStyleLbl="sibTrans2D1" presStyleIdx="0" presStyleCnt="3"/>
       <dgm:spPr/>
+      <dgm:t>
+        <a:bodyPr/>
+        <a:lstStyle/>
+        <a:p>
+          <a:endParaRPr lang="en-US"/>
+        </a:p>
+      </dgm:t>
     </dgm:pt>
     <dgm:pt modelId="{41341A21-0806-411D-A443-625FA97E4491}" type="pres">
       <dgm:prSet presAssocID="{91D0FCC9-0385-42AC-A8E5-78283D5D669C}" presName="connectorText" presStyleLbl="sibTrans2D1" presStyleIdx="0" presStyleCnt="3"/>
       <dgm:spPr/>
+      <dgm:t>
+        <a:bodyPr/>
+        <a:lstStyle/>
+        <a:p>
+          <a:endParaRPr lang="en-US"/>
+        </a:p>
+      </dgm:t>
     </dgm:pt>
     <dgm:pt modelId="{EA5BC1ED-EB03-45BA-BC56-621EEE9BEBD1}" type="pres">
       <dgm:prSet presAssocID="{92249E20-58D4-4E75-BB12-FE5FBD54F135}" presName="node" presStyleLbl="node1" presStyleIdx="1" presStyleCnt="4">
@@ -1105,14 +1126,35 @@
         </dgm:presLayoutVars>
       </dgm:prSet>
       <dgm:spPr/>
+      <dgm:t>
+        <a:bodyPr/>
+        <a:lstStyle/>
+        <a:p>
+          <a:endParaRPr lang="en-US"/>
+        </a:p>
+      </dgm:t>
     </dgm:pt>
     <dgm:pt modelId="{95B3EF49-35D3-4519-9F1F-B39D5A0566E4}" type="pres">
       <dgm:prSet presAssocID="{0B72DC99-4E95-4ADB-960C-E769354E6A5D}" presName="sibTrans" presStyleLbl="sibTrans2D1" presStyleIdx="1" presStyleCnt="3"/>
       <dgm:spPr/>
+      <dgm:t>
+        <a:bodyPr/>
+        <a:lstStyle/>
+        <a:p>
+          <a:endParaRPr lang="en-US"/>
+        </a:p>
+      </dgm:t>
     </dgm:pt>
     <dgm:pt modelId="{9B203DD1-3145-4590-8ACC-2517ACFE25A8}" type="pres">
       <dgm:prSet presAssocID="{0B72DC99-4E95-4ADB-960C-E769354E6A5D}" presName="connectorText" presStyleLbl="sibTrans2D1" presStyleIdx="1" presStyleCnt="3"/>
       <dgm:spPr/>
+      <dgm:t>
+        <a:bodyPr/>
+        <a:lstStyle/>
+        <a:p>
+          <a:endParaRPr lang="en-US"/>
+        </a:p>
+      </dgm:t>
     </dgm:pt>
     <dgm:pt modelId="{A37733E1-C31E-4430-AEEA-7CC4BDFAF84B}" type="pres">
       <dgm:prSet presAssocID="{38DD500D-6BEB-44F1-A480-39EBC85B7D1B}" presName="node" presStyleLbl="node1" presStyleIdx="2" presStyleCnt="4">
@@ -1121,14 +1163,35 @@
         </dgm:presLayoutVars>
       </dgm:prSet>
       <dgm:spPr/>
+      <dgm:t>
+        <a:bodyPr/>
+        <a:lstStyle/>
+        <a:p>
+          <a:endParaRPr lang="en-US"/>
+        </a:p>
+      </dgm:t>
     </dgm:pt>
     <dgm:pt modelId="{7300E7F4-ED3F-436A-A1F0-90BEABB46E71}" type="pres">
       <dgm:prSet presAssocID="{6D1E928F-781F-462C-A8AC-2A960BFDA67A}" presName="sibTrans" presStyleLbl="sibTrans2D1" presStyleIdx="2" presStyleCnt="3"/>
       <dgm:spPr/>
+      <dgm:t>
+        <a:bodyPr/>
+        <a:lstStyle/>
+        <a:p>
+          <a:endParaRPr lang="en-US"/>
+        </a:p>
+      </dgm:t>
     </dgm:pt>
     <dgm:pt modelId="{D7B13FD1-4A98-4993-ACFA-933B70FB5D81}" type="pres">
       <dgm:prSet presAssocID="{6D1E928F-781F-462C-A8AC-2A960BFDA67A}" presName="connectorText" presStyleLbl="sibTrans2D1" presStyleIdx="2" presStyleCnt="3"/>
       <dgm:spPr/>
+      <dgm:t>
+        <a:bodyPr/>
+        <a:lstStyle/>
+        <a:p>
+          <a:endParaRPr lang="en-US"/>
+        </a:p>
+      </dgm:t>
     </dgm:pt>
     <dgm:pt modelId="{F65F4BF1-A7B9-4C27-8B28-16C04C25982E}" type="pres">
       <dgm:prSet presAssocID="{764C4D4F-B7F7-4995-9F46-8E01C62C581B}" presName="node" presStyleLbl="node1" presStyleIdx="3" presStyleCnt="4">
@@ -1137,23 +1200,30 @@
         </dgm:presLayoutVars>
       </dgm:prSet>
       <dgm:spPr/>
+      <dgm:t>
+        <a:bodyPr/>
+        <a:lstStyle/>
+        <a:p>
+          <a:endParaRPr lang="en-US"/>
+        </a:p>
+      </dgm:t>
     </dgm:pt>
   </dgm:ptLst>
   <dgm:cxnLst>
+    <dgm:cxn modelId="{3EBFAACE-A4CF-4057-9EC8-3A59330D069F}" type="presOf" srcId="{69C95212-ACBD-498E-A011-59076A4285CB}" destId="{4D4E5D9B-DE30-46F3-864F-B20CBCB47B81}" srcOrd="0" destOrd="0" presId="urn:microsoft.com/office/officeart/2005/8/layout/process1"/>
+    <dgm:cxn modelId="{2D076695-4491-4B11-95EC-7786C59603C3}" type="presOf" srcId="{0B72DC99-4E95-4ADB-960C-E769354E6A5D}" destId="{95B3EF49-35D3-4519-9F1F-B39D5A0566E4}" srcOrd="0" destOrd="0" presId="urn:microsoft.com/office/officeart/2005/8/layout/process1"/>
+    <dgm:cxn modelId="{05EBE6A4-21D9-4E6D-96DC-9D3E50C88595}" type="presOf" srcId="{38DD500D-6BEB-44F1-A480-39EBC85B7D1B}" destId="{A37733E1-C31E-4430-AEEA-7CC4BDFAF84B}" srcOrd="0" destOrd="0" presId="urn:microsoft.com/office/officeart/2005/8/layout/process1"/>
+    <dgm:cxn modelId="{B7AF3A68-AEB3-4860-978B-B262BEBB9ECB}" type="presOf" srcId="{6D1E928F-781F-462C-A8AC-2A960BFDA67A}" destId="{7300E7F4-ED3F-436A-A1F0-90BEABB46E71}" srcOrd="0" destOrd="0" presId="urn:microsoft.com/office/officeart/2005/8/layout/process1"/>
+    <dgm:cxn modelId="{31005A28-3819-43FC-A794-27C122A41925}" srcId="{9496E0A2-784B-483A-9A32-E68AF617843D}" destId="{38DD500D-6BEB-44F1-A480-39EBC85B7D1B}" srcOrd="2" destOrd="0" parTransId="{3CE2BC79-A484-4240-A2CB-1BC232A1E53F}" sibTransId="{6D1E928F-781F-462C-A8AC-2A960BFDA67A}"/>
+    <dgm:cxn modelId="{01F09420-6EB0-4A7F-B4CE-2315FD06751C}" type="presOf" srcId="{6D1E928F-781F-462C-A8AC-2A960BFDA67A}" destId="{D7B13FD1-4A98-4993-ACFA-933B70FB5D81}" srcOrd="1" destOrd="0" presId="urn:microsoft.com/office/officeart/2005/8/layout/process1"/>
+    <dgm:cxn modelId="{1530AF90-D573-4EFA-A3BC-840C3370D71B}" srcId="{9496E0A2-784B-483A-9A32-E68AF617843D}" destId="{764C4D4F-B7F7-4995-9F46-8E01C62C581B}" srcOrd="3" destOrd="0" parTransId="{A6A82594-4016-4707-8656-642BA426B3D4}" sibTransId="{356D9044-9DCA-4929-92DF-A2BDE3B61A47}"/>
+    <dgm:cxn modelId="{D1CF8BBB-F3E6-4482-8B69-D1BE9774788E}" type="presOf" srcId="{91D0FCC9-0385-42AC-A8E5-78283D5D669C}" destId="{4B5D39CA-8147-4B81-8770-5E31FC6D1CFB}" srcOrd="0" destOrd="0" presId="urn:microsoft.com/office/officeart/2005/8/layout/process1"/>
+    <dgm:cxn modelId="{5E0FD1A2-149D-4CF9-AEE7-688223EDC542}" type="presOf" srcId="{764C4D4F-B7F7-4995-9F46-8E01C62C581B}" destId="{F65F4BF1-A7B9-4C27-8B28-16C04C25982E}" srcOrd="0" destOrd="0" presId="urn:microsoft.com/office/officeart/2005/8/layout/process1"/>
+    <dgm:cxn modelId="{79D506E8-F752-4BA4-B280-EF0BEBC86F63}" srcId="{9496E0A2-784B-483A-9A32-E68AF617843D}" destId="{92249E20-58D4-4E75-BB12-FE5FBD54F135}" srcOrd="1" destOrd="0" parTransId="{105B3AA3-CBE4-4ECA-BC44-B6DCA5E7A036}" sibTransId="{0B72DC99-4E95-4ADB-960C-E769354E6A5D}"/>
     <dgm:cxn modelId="{23BC981F-CC7C-4D5F-91BD-DE6EC72DB040}" srcId="{9496E0A2-784B-483A-9A32-E68AF617843D}" destId="{69C95212-ACBD-498E-A011-59076A4285CB}" srcOrd="0" destOrd="0" parTransId="{BF3D5BE3-835C-4027-9271-54CEA95A0702}" sibTransId="{91D0FCC9-0385-42AC-A8E5-78283D5D669C}"/>
-    <dgm:cxn modelId="{01F09420-6EB0-4A7F-B4CE-2315FD06751C}" type="presOf" srcId="{6D1E928F-781F-462C-A8AC-2A960BFDA67A}" destId="{D7B13FD1-4A98-4993-ACFA-933B70FB5D81}" srcOrd="1" destOrd="0" presId="urn:microsoft.com/office/officeart/2005/8/layout/process1"/>
-    <dgm:cxn modelId="{31005A28-3819-43FC-A794-27C122A41925}" srcId="{9496E0A2-784B-483A-9A32-E68AF617843D}" destId="{38DD500D-6BEB-44F1-A480-39EBC85B7D1B}" srcOrd="2" destOrd="0" parTransId="{3CE2BC79-A484-4240-A2CB-1BC232A1E53F}" sibTransId="{6D1E928F-781F-462C-A8AC-2A960BFDA67A}"/>
-    <dgm:cxn modelId="{B7AF3A68-AEB3-4860-978B-B262BEBB9ECB}" type="presOf" srcId="{6D1E928F-781F-462C-A8AC-2A960BFDA67A}" destId="{7300E7F4-ED3F-436A-A1F0-90BEABB46E71}" srcOrd="0" destOrd="0" presId="urn:microsoft.com/office/officeart/2005/8/layout/process1"/>
     <dgm:cxn modelId="{F4BB5269-9705-4D80-8BF8-3B73A8F8EE8D}" type="presOf" srcId="{91D0FCC9-0385-42AC-A8E5-78283D5D669C}" destId="{41341A21-0806-411D-A443-625FA97E4491}" srcOrd="1" destOrd="0" presId="urn:microsoft.com/office/officeart/2005/8/layout/process1"/>
     <dgm:cxn modelId="{FEAE6454-4E5D-4190-8A76-D27FC4FC4790}" type="presOf" srcId="{9496E0A2-784B-483A-9A32-E68AF617843D}" destId="{9EA8A120-7984-4A2B-9532-24393BA5D7A2}" srcOrd="0" destOrd="0" presId="urn:microsoft.com/office/officeart/2005/8/layout/process1"/>
     <dgm:cxn modelId="{F8BD9F76-8AA1-4A33-B686-C2C5DEA97305}" type="presOf" srcId="{0B72DC99-4E95-4ADB-960C-E769354E6A5D}" destId="{9B203DD1-3145-4590-8ACC-2517ACFE25A8}" srcOrd="1" destOrd="0" presId="urn:microsoft.com/office/officeart/2005/8/layout/process1"/>
-    <dgm:cxn modelId="{1530AF90-D573-4EFA-A3BC-840C3370D71B}" srcId="{9496E0A2-784B-483A-9A32-E68AF617843D}" destId="{764C4D4F-B7F7-4995-9F46-8E01C62C581B}" srcOrd="3" destOrd="0" parTransId="{A6A82594-4016-4707-8656-642BA426B3D4}" sibTransId="{356D9044-9DCA-4929-92DF-A2BDE3B61A47}"/>
-    <dgm:cxn modelId="{2D076695-4491-4B11-95EC-7786C59603C3}" type="presOf" srcId="{0B72DC99-4E95-4ADB-960C-E769354E6A5D}" destId="{95B3EF49-35D3-4519-9F1F-B39D5A0566E4}" srcOrd="0" destOrd="0" presId="urn:microsoft.com/office/officeart/2005/8/layout/process1"/>
-    <dgm:cxn modelId="{5E0FD1A2-149D-4CF9-AEE7-688223EDC542}" type="presOf" srcId="{764C4D4F-B7F7-4995-9F46-8E01C62C581B}" destId="{F65F4BF1-A7B9-4C27-8B28-16C04C25982E}" srcOrd="0" destOrd="0" presId="urn:microsoft.com/office/officeart/2005/8/layout/process1"/>
-    <dgm:cxn modelId="{05EBE6A4-21D9-4E6D-96DC-9D3E50C88595}" type="presOf" srcId="{38DD500D-6BEB-44F1-A480-39EBC85B7D1B}" destId="{A37733E1-C31E-4430-AEEA-7CC4BDFAF84B}" srcOrd="0" destOrd="0" presId="urn:microsoft.com/office/officeart/2005/8/layout/process1"/>
-    <dgm:cxn modelId="{D1CF8BBB-F3E6-4482-8B69-D1BE9774788E}" type="presOf" srcId="{91D0FCC9-0385-42AC-A8E5-78283D5D669C}" destId="{4B5D39CA-8147-4B81-8770-5E31FC6D1CFB}" srcOrd="0" destOrd="0" presId="urn:microsoft.com/office/officeart/2005/8/layout/process1"/>
-    <dgm:cxn modelId="{3EBFAACE-A4CF-4057-9EC8-3A59330D069F}" type="presOf" srcId="{69C95212-ACBD-498E-A011-59076A4285CB}" destId="{4D4E5D9B-DE30-46F3-864F-B20CBCB47B81}" srcOrd="0" destOrd="0" presId="urn:microsoft.com/office/officeart/2005/8/layout/process1"/>
-    <dgm:cxn modelId="{79D506E8-F752-4BA4-B280-EF0BEBC86F63}" srcId="{9496E0A2-784B-483A-9A32-E68AF617843D}" destId="{92249E20-58D4-4E75-BB12-FE5FBD54F135}" srcOrd="1" destOrd="0" parTransId="{105B3AA3-CBE4-4ECA-BC44-B6DCA5E7A036}" sibTransId="{0B72DC99-4E95-4ADB-960C-E769354E6A5D}"/>
     <dgm:cxn modelId="{099D99FB-52B2-434C-BA10-1675505A420B}" type="presOf" srcId="{92249E20-58D4-4E75-BB12-FE5FBD54F135}" destId="{EA5BC1ED-EB03-45BA-BC56-621EEE9BEBD1}" srcOrd="0" destOrd="0" presId="urn:microsoft.com/office/officeart/2005/8/layout/process1"/>
     <dgm:cxn modelId="{DA8115C2-D2F4-4CCB-9D90-0A509018B8F1}" type="presParOf" srcId="{9EA8A120-7984-4A2B-9532-24393BA5D7A2}" destId="{4D4E5D9B-DE30-46F3-864F-B20CBCB47B81}" srcOrd="0" destOrd="0" presId="urn:microsoft.com/office/officeart/2005/8/layout/process1"/>
     <dgm:cxn modelId="{0C3F32CC-6A85-4291-B66A-941971627454}" type="presParOf" srcId="{9EA8A120-7984-4A2B-9532-24393BA5D7A2}" destId="{4B5D39CA-8147-4B81-8770-5E31FC6D1CFB}" srcOrd="1" destOrd="0" presId="urn:microsoft.com/office/officeart/2005/8/layout/process1"/>
@@ -1241,7 +1311,7 @@
         </a:bodyPr>
         <a:lstStyle/>
         <a:p>
-          <a:pPr marL="0" lvl="0" indent="0" algn="ctr" defTabSz="844550">
+          <a:pPr lvl="0" algn="ctr" defTabSz="844550">
             <a:lnSpc>
               <a:spcPct val="90000"/>
             </a:lnSpc>
@@ -1251,7 +1321,6 @@
             <a:spcAft>
               <a:spcPct val="35000"/>
             </a:spcAft>
-            <a:buNone/>
           </a:pPr>
           <a:r>
             <a:rPr lang="en-US" sz="1900" kern="1200"/>
@@ -1314,7 +1383,7 @@
         </a:bodyPr>
         <a:lstStyle/>
         <a:p>
-          <a:pPr marL="0" lvl="0" indent="0" algn="ctr" defTabSz="666750">
+          <a:pPr lvl="0" algn="ctr" defTabSz="666750">
             <a:lnSpc>
               <a:spcPct val="90000"/>
             </a:lnSpc>
@@ -1324,7 +1393,6 @@
             <a:spcAft>
               <a:spcPct val="35000"/>
             </a:spcAft>
-            <a:buNone/>
           </a:pPr>
           <a:endParaRPr lang="en-US" sz="1500" kern="1200"/>
         </a:p>
@@ -1386,7 +1454,7 @@
         </a:bodyPr>
         <a:lstStyle/>
         <a:p>
-          <a:pPr marL="0" lvl="0" indent="0" algn="ctr" defTabSz="844550">
+          <a:pPr lvl="0" algn="ctr" defTabSz="844550">
             <a:lnSpc>
               <a:spcPct val="90000"/>
             </a:lnSpc>
@@ -1396,7 +1464,6 @@
             <a:spcAft>
               <a:spcPct val="35000"/>
             </a:spcAft>
-            <a:buNone/>
           </a:pPr>
           <a:r>
             <a:rPr lang="en-US" sz="1900" kern="1200"/>
@@ -1459,7 +1526,7 @@
         </a:bodyPr>
         <a:lstStyle/>
         <a:p>
-          <a:pPr marL="0" lvl="0" indent="0" algn="ctr" defTabSz="666750">
+          <a:pPr lvl="0" algn="ctr" defTabSz="666750">
             <a:lnSpc>
               <a:spcPct val="90000"/>
             </a:lnSpc>
@@ -1469,7 +1536,6 @@
             <a:spcAft>
               <a:spcPct val="35000"/>
             </a:spcAft>
-            <a:buNone/>
           </a:pPr>
           <a:endParaRPr lang="en-US" sz="1500" kern="1200"/>
         </a:p>
@@ -1531,7 +1597,7 @@
         </a:bodyPr>
         <a:lstStyle/>
         <a:p>
-          <a:pPr marL="0" lvl="0" indent="0" algn="ctr" defTabSz="844550">
+          <a:pPr lvl="0" algn="ctr" defTabSz="844550">
             <a:lnSpc>
               <a:spcPct val="90000"/>
             </a:lnSpc>
@@ -1541,7 +1607,6 @@
             <a:spcAft>
               <a:spcPct val="35000"/>
             </a:spcAft>
-            <a:buNone/>
           </a:pPr>
           <a:r>
             <a:rPr lang="en-US" sz="1900" kern="1200"/>
@@ -1604,7 +1669,7 @@
         </a:bodyPr>
         <a:lstStyle/>
         <a:p>
-          <a:pPr marL="0" lvl="0" indent="0" algn="ctr" defTabSz="666750">
+          <a:pPr lvl="0" algn="ctr" defTabSz="666750">
             <a:lnSpc>
               <a:spcPct val="90000"/>
             </a:lnSpc>
@@ -1614,7 +1679,6 @@
             <a:spcAft>
               <a:spcPct val="35000"/>
             </a:spcAft>
-            <a:buNone/>
           </a:pPr>
           <a:endParaRPr lang="en-US" sz="1500" kern="1200"/>
         </a:p>
@@ -1681,7 +1745,7 @@
         </a:bodyPr>
         <a:lstStyle/>
         <a:p>
-          <a:pPr marL="0" lvl="0" indent="0" algn="ctr" defTabSz="844550">
+          <a:pPr lvl="0" algn="ctr" defTabSz="844550">
             <a:lnSpc>
               <a:spcPct val="90000"/>
             </a:lnSpc>
@@ -1691,7 +1755,6 @@
             <a:spcAft>
               <a:spcPct val="35000"/>
             </a:spcAft>
-            <a:buNone/>
           </a:pPr>
           <a:r>
             <a:rPr lang="en-US" sz="1900" kern="1200"/>
@@ -3135,7 +3198,7 @@
           <a:p>
             <a:fld id="{EA4960E5-F060-4C88-B1C5-5A6F5890BEF6}" type="datetimeFigureOut">
               <a:rPr lang="en-SG" smtClean="0"/>
-              <a:t>1/11/2020</a:t>
+              <a:t>11/1/2020</a:t>
             </a:fld>
             <a:endParaRPr lang="en-SG" dirty="0"/>
           </a:p>
@@ -10079,7 +10142,7 @@
           <a:graphicData uri="http://schemas.openxmlformats.org/presentationml/2006/ole">
             <mc:AlternateContent xmlns:mc="http://schemas.openxmlformats.org/markup-compatibility/2006">
               <mc:Choice xmlns:v="urn:schemas-microsoft-com:vml" Requires="v">
-                <p:oleObj spid="_x0000_s2090" name="Bitmap Image" r:id="rId3" imgW="5014395" imgH="4572396" progId="Paint.Picture">
+                <p:oleObj spid="_x0000_s2091" name="Bitmap Image" r:id="rId3" imgW="5014395" imgH="4572396" progId="Paint.Picture">
                   <p:embed/>
                 </p:oleObj>
               </mc:Choice>
@@ -10460,7 +10523,7 @@
           <a:graphicData uri="http://schemas.openxmlformats.org/presentationml/2006/ole">
             <mc:AlternateContent xmlns:mc="http://schemas.openxmlformats.org/markup-compatibility/2006">
               <mc:Choice xmlns:v="urn:schemas-microsoft-com:vml" Requires="v">
-                <p:oleObj spid="_x0000_s6172" name="Bitmap Image" r:id="rId3" imgW="4915326" imgH="3505504" progId="Paint.Picture">
+                <p:oleObj spid="_x0000_s6173" name="Bitmap Image" r:id="rId3" imgW="4915326" imgH="3505504" progId="Paint.Picture">
                   <p:embed/>
                 </p:oleObj>
               </mc:Choice>
@@ -12378,8 +12441,12 @@
           <a:lstStyle/>
           <a:p>
             <a:r>
+              <a:rPr lang="en-US" dirty="0" smtClean="0"/>
+              <a:t>System Design </a:t>
+            </a:r>
+            <a:r>
               <a:rPr lang="en-US" dirty="0"/>
-              <a:t>System Design -</a:t>
+              <a:t>-</a:t>
             </a:r>
             <a:br>
               <a:rPr lang="en-US" dirty="0"/>
@@ -12763,13 +12830,18 @@
               <a:buChar char="Ø"/>
             </a:pPr>
             <a:r>
-              <a:rPr lang="en-US" dirty="0">
+              <a:rPr lang="en-US" dirty="0" smtClean="0">
                 <a:solidFill>
                   <a:schemeClr val="tx1"/>
                 </a:solidFill>
               </a:rPr>
-              <a:t>Contain</a:t>
-            </a:r>
+              <a:t>Parameters</a:t>
+            </a:r>
+            <a:endParaRPr lang="en-US" dirty="0">
+              <a:solidFill>
+                <a:schemeClr val="tx1"/>
+              </a:solidFill>
+            </a:endParaRPr>
           </a:p>
           <a:p>
             <a:pPr lvl="2"/>
@@ -12785,18 +12857,13 @@
           <a:p>
             <a:pPr lvl="2"/>
             <a:r>
-              <a:rPr lang="en-US">
+              <a:rPr lang="en-US" dirty="0">
                 <a:solidFill>
                   <a:schemeClr val="tx1"/>
                 </a:solidFill>
               </a:rPr>
               <a:t>Orientation</a:t>
             </a:r>
-            <a:endParaRPr lang="en-US" dirty="0">
-              <a:solidFill>
-                <a:schemeClr val="tx1"/>
-              </a:solidFill>
-            </a:endParaRPr>
           </a:p>
           <a:p>
             <a:r>
@@ -12814,13 +12881,18 @@
               <a:buChar char="Ø"/>
             </a:pPr>
             <a:r>
-              <a:rPr lang="en-US" dirty="0">
+              <a:rPr lang="en-US" dirty="0" smtClean="0">
                 <a:solidFill>
                   <a:schemeClr val="tx1"/>
                 </a:solidFill>
               </a:rPr>
-              <a:t>2D Map</a:t>
-            </a:r>
+              <a:t>Map View</a:t>
+            </a:r>
+            <a:endParaRPr lang="en-US" dirty="0">
+              <a:solidFill>
+                <a:schemeClr val="tx1"/>
+              </a:solidFill>
+            </a:endParaRPr>
           </a:p>
           <a:p>
             <a:pPr lvl="1">
@@ -13278,23 +13350,7 @@
                   <a:schemeClr val="tx1"/>
                 </a:solidFill>
               </a:rPr>
-              <a:t>Edge noises due </a:t>
-            </a:r>
-            <a:r>
-              <a:rPr lang="en-SG">
-                <a:solidFill>
-                  <a:schemeClr val="tx1"/>
-                </a:solidFill>
-              </a:rPr>
-              <a:t>to 1024 </a:t>
-            </a:r>
-            <a:r>
-              <a:rPr lang="en-SG" dirty="0">
-                <a:solidFill>
-                  <a:schemeClr val="tx1"/>
-                </a:solidFill>
-              </a:rPr>
-              <a:t>x 1024 grid</a:t>
+              <a:t>Edge noises due to 1024 x 1024 grid</a:t>
             </a:r>
           </a:p>
           <a:p>

</xml_diff>